<commit_message>
Some changes added. Headers correct. Two different headers if paperCopy or electronicCopy
</commit_message>
<xml_diff>
--- a/figures/figures.pptx
+++ b/figures/figures.pptx
@@ -23,6 +23,7 @@
     <p:sldId id="271" r:id="rId17"/>
     <p:sldId id="272" r:id="rId18"/>
     <p:sldId id="273" r:id="rId19"/>
+    <p:sldId id="274" r:id="rId20"/>
   </p:sldIdLst>
   <p:sldSz cx="9144000" cy="6858000" type="screen4x3"/>
   <p:notesSz cx="7315200" cy="9601200"/>
@@ -153,7 +154,7 @@
         </p:nvSpPr>
         <p:spPr>
           <a:xfrm>
-            <a:off x="685800" y="2130428"/>
+            <a:off x="685800" y="2130429"/>
             <a:ext cx="7772400" cy="1470025"/>
           </a:xfrm>
         </p:spPr>
@@ -305,7 +306,7 @@
           <a:p>
             <a:fld id="{B9D4E1D2-B082-4959-8BC1-1B0986A120C2}" type="datetimeFigureOut">
               <a:rPr lang="en-US" smtClean="0"/>
-              <a:t>8/5/2017</a:t>
+              <a:t>8/6/2017</a:t>
             </a:fld>
             <a:endParaRPr lang="en-US"/>
           </a:p>
@@ -475,7 +476,7 @@
           <a:p>
             <a:fld id="{B9D4E1D2-B082-4959-8BC1-1B0986A120C2}" type="datetimeFigureOut">
               <a:rPr lang="en-US" smtClean="0"/>
-              <a:t>8/5/2017</a:t>
+              <a:t>8/6/2017</a:t>
             </a:fld>
             <a:endParaRPr lang="en-US"/>
           </a:p>
@@ -565,7 +566,7 @@
         </p:nvSpPr>
         <p:spPr>
           <a:xfrm>
-            <a:off x="6629400" y="274640"/>
+            <a:off x="6629400" y="274641"/>
             <a:ext cx="2057400" cy="5851525"/>
           </a:xfrm>
         </p:spPr>
@@ -593,7 +594,7 @@
         </p:nvSpPr>
         <p:spPr>
           <a:xfrm>
-            <a:off x="457200" y="274640"/>
+            <a:off x="457200" y="274641"/>
             <a:ext cx="6019800" cy="5851525"/>
           </a:xfrm>
         </p:spPr>
@@ -655,7 +656,7 @@
           <a:p>
             <a:fld id="{B9D4E1D2-B082-4959-8BC1-1B0986A120C2}" type="datetimeFigureOut">
               <a:rPr lang="en-US" smtClean="0"/>
-              <a:t>8/5/2017</a:t>
+              <a:t>8/6/2017</a:t>
             </a:fld>
             <a:endParaRPr lang="en-US"/>
           </a:p>
@@ -825,7 +826,7 @@
           <a:p>
             <a:fld id="{B9D4E1D2-B082-4959-8BC1-1B0986A120C2}" type="datetimeFigureOut">
               <a:rPr lang="en-US" smtClean="0"/>
-              <a:t>8/5/2017</a:t>
+              <a:t>8/6/2017</a:t>
             </a:fld>
             <a:endParaRPr lang="en-US"/>
           </a:p>
@@ -915,7 +916,7 @@
         </p:nvSpPr>
         <p:spPr>
           <a:xfrm>
-            <a:off x="722313" y="4406901"/>
+            <a:off x="722313" y="4406902"/>
             <a:ext cx="7772400" cy="1362075"/>
           </a:xfrm>
         </p:spPr>
@@ -947,7 +948,7 @@
         </p:nvSpPr>
         <p:spPr>
           <a:xfrm>
-            <a:off x="722313" y="2906713"/>
+            <a:off x="722313" y="2906714"/>
             <a:ext cx="7772400" cy="1500187"/>
           </a:xfrm>
         </p:spPr>
@@ -1071,7 +1072,7 @@
           <a:p>
             <a:fld id="{B9D4E1D2-B082-4959-8BC1-1B0986A120C2}" type="datetimeFigureOut">
               <a:rPr lang="en-US" smtClean="0"/>
-              <a:t>8/5/2017</a:t>
+              <a:t>8/6/2017</a:t>
             </a:fld>
             <a:endParaRPr lang="en-US"/>
           </a:p>
@@ -1184,7 +1185,7 @@
         </p:nvSpPr>
         <p:spPr>
           <a:xfrm>
-            <a:off x="457200" y="1600201"/>
+            <a:off x="457200" y="1600202"/>
             <a:ext cx="4038600" cy="4525963"/>
           </a:xfrm>
         </p:spPr>
@@ -1269,7 +1270,7 @@
         </p:nvSpPr>
         <p:spPr>
           <a:xfrm>
-            <a:off x="4648200" y="1600201"/>
+            <a:off x="4648200" y="1600202"/>
             <a:ext cx="4038600" cy="4525963"/>
           </a:xfrm>
         </p:spPr>
@@ -1359,7 +1360,7 @@
           <a:p>
             <a:fld id="{B9D4E1D2-B082-4959-8BC1-1B0986A120C2}" type="datetimeFigureOut">
               <a:rPr lang="en-US" smtClean="0"/>
-              <a:t>8/5/2017</a:t>
+              <a:t>8/6/2017</a:t>
             </a:fld>
             <a:endParaRPr lang="en-US"/>
           </a:p>
@@ -1476,7 +1477,7 @@
         </p:nvSpPr>
         <p:spPr>
           <a:xfrm>
-            <a:off x="457200" y="1535113"/>
+            <a:off x="457201" y="1535114"/>
             <a:ext cx="4040188" cy="639763"/>
           </a:xfrm>
         </p:spPr>
@@ -1541,7 +1542,7 @@
         </p:nvSpPr>
         <p:spPr>
           <a:xfrm>
-            <a:off x="457200" y="2174875"/>
+            <a:off x="457201" y="2174875"/>
             <a:ext cx="4040188" cy="3951288"/>
           </a:xfrm>
         </p:spPr>
@@ -1626,7 +1627,7 @@
         </p:nvSpPr>
         <p:spPr>
           <a:xfrm>
-            <a:off x="4645029" y="1535113"/>
+            <a:off x="4645030" y="1535114"/>
             <a:ext cx="4041775" cy="639763"/>
           </a:xfrm>
         </p:spPr>
@@ -1691,7 +1692,7 @@
         </p:nvSpPr>
         <p:spPr>
           <a:xfrm>
-            <a:off x="4645029" y="2174875"/>
+            <a:off x="4645030" y="2174875"/>
             <a:ext cx="4041775" cy="3951288"/>
           </a:xfrm>
         </p:spPr>
@@ -1781,7 +1782,7 @@
           <a:p>
             <a:fld id="{B9D4E1D2-B082-4959-8BC1-1B0986A120C2}" type="datetimeFigureOut">
               <a:rPr lang="en-US" smtClean="0"/>
-              <a:t>8/5/2017</a:t>
+              <a:t>8/6/2017</a:t>
             </a:fld>
             <a:endParaRPr lang="en-US"/>
           </a:p>
@@ -1899,7 +1900,7 @@
           <a:p>
             <a:fld id="{B9D4E1D2-B082-4959-8BC1-1B0986A120C2}" type="datetimeFigureOut">
               <a:rPr lang="en-US" smtClean="0"/>
-              <a:t>8/5/2017</a:t>
+              <a:t>8/6/2017</a:t>
             </a:fld>
             <a:endParaRPr lang="en-US"/>
           </a:p>
@@ -1994,7 +1995,7 @@
           <a:p>
             <a:fld id="{B9D4E1D2-B082-4959-8BC1-1B0986A120C2}" type="datetimeFigureOut">
               <a:rPr lang="en-US" smtClean="0"/>
-              <a:t>8/5/2017</a:t>
+              <a:t>8/6/2017</a:t>
             </a:fld>
             <a:endParaRPr lang="en-US"/>
           </a:p>
@@ -2084,7 +2085,7 @@
         </p:nvSpPr>
         <p:spPr>
           <a:xfrm>
-            <a:off x="457204" y="273049"/>
+            <a:off x="457205" y="273050"/>
             <a:ext cx="3008313" cy="1162051"/>
           </a:xfrm>
         </p:spPr>
@@ -2116,8 +2117,8 @@
         </p:nvSpPr>
         <p:spPr>
           <a:xfrm>
-            <a:off x="3575050" y="273053"/>
-            <a:ext cx="5111750" cy="5853113"/>
+            <a:off x="3575050" y="273054"/>
+            <a:ext cx="5111751" cy="5853113"/>
           </a:xfrm>
         </p:spPr>
         <p:txBody>
@@ -2201,7 +2202,7 @@
         </p:nvSpPr>
         <p:spPr>
           <a:xfrm>
-            <a:off x="457204" y="1435103"/>
+            <a:off x="457205" y="1435104"/>
             <a:ext cx="3008313" cy="4691063"/>
           </a:xfrm>
         </p:spPr>
@@ -2271,7 +2272,7 @@
           <a:p>
             <a:fld id="{B9D4E1D2-B082-4959-8BC1-1B0986A120C2}" type="datetimeFigureOut">
               <a:rPr lang="en-US" smtClean="0"/>
-              <a:t>8/5/2017</a:t>
+              <a:t>8/6/2017</a:t>
             </a:fld>
             <a:endParaRPr lang="en-US"/>
           </a:p>
@@ -2361,7 +2362,7 @@
         </p:nvSpPr>
         <p:spPr>
           <a:xfrm>
-            <a:off x="1792288" y="4800601"/>
+            <a:off x="1792288" y="4800602"/>
             <a:ext cx="5486400" cy="566739"/>
           </a:xfrm>
         </p:spPr>
@@ -2454,7 +2455,7 @@
         </p:nvSpPr>
         <p:spPr>
           <a:xfrm>
-            <a:off x="1792288" y="5367339"/>
+            <a:off x="1792288" y="5367340"/>
             <a:ext cx="5486400" cy="804863"/>
           </a:xfrm>
         </p:spPr>
@@ -2524,7 +2525,7 @@
           <a:p>
             <a:fld id="{B9D4E1D2-B082-4959-8BC1-1B0986A120C2}" type="datetimeFigureOut">
               <a:rPr lang="en-US" smtClean="0"/>
-              <a:t>8/5/2017</a:t>
+              <a:t>8/6/2017</a:t>
             </a:fld>
             <a:endParaRPr lang="en-US"/>
           </a:p>
@@ -2652,7 +2653,7 @@
         </p:nvSpPr>
         <p:spPr>
           <a:xfrm>
-            <a:off x="457200" y="1600201"/>
+            <a:off x="457200" y="1600202"/>
             <a:ext cx="8229600" cy="4525963"/>
           </a:xfrm>
           <a:prstGeom prst="rect">
@@ -2714,7 +2715,7 @@
         </p:nvSpPr>
         <p:spPr>
           <a:xfrm>
-            <a:off x="457200" y="6356352"/>
+            <a:off x="457200" y="6356353"/>
             <a:ext cx="2133600" cy="365125"/>
           </a:xfrm>
           <a:prstGeom prst="rect">
@@ -2737,7 +2738,7 @@
           <a:p>
             <a:fld id="{B9D4E1D2-B082-4959-8BC1-1B0986A120C2}" type="datetimeFigureOut">
               <a:rPr lang="en-US" smtClean="0"/>
-              <a:t>8/5/2017</a:t>
+              <a:t>8/6/2017</a:t>
             </a:fld>
             <a:endParaRPr lang="en-US"/>
           </a:p>
@@ -2755,7 +2756,7 @@
         </p:nvSpPr>
         <p:spPr>
           <a:xfrm>
-            <a:off x="3124200" y="6356352"/>
+            <a:off x="3124200" y="6356353"/>
             <a:ext cx="2895600" cy="365125"/>
           </a:xfrm>
           <a:prstGeom prst="rect">
@@ -2792,7 +2793,7 @@
         </p:nvSpPr>
         <p:spPr>
           <a:xfrm>
-            <a:off x="6553200" y="6356352"/>
+            <a:off x="6553200" y="6356353"/>
             <a:ext cx="2133600" cy="365125"/>
           </a:xfrm>
           <a:prstGeom prst="rect">
@@ -3120,7 +3121,7 @@
         </p:nvGrpSpPr>
         <p:grpSpPr>
           <a:xfrm>
-            <a:off x="457200" y="3"/>
+            <a:off x="457200" y="4"/>
             <a:ext cx="8229600" cy="6476999"/>
             <a:chOff x="631620" y="347309"/>
             <a:chExt cx="7754074" cy="5971031"/>
@@ -4704,7 +4705,7 @@
         </p:nvSpPr>
         <p:spPr>
           <a:xfrm rot="5400000">
-            <a:off x="138553" y="3427969"/>
+            <a:off x="138553" y="3427970"/>
             <a:ext cx="2096614" cy="90687"/>
           </a:xfrm>
           <a:prstGeom prst="rect">
@@ -4752,7 +4753,7 @@
         </p:nvSpPr>
         <p:spPr>
           <a:xfrm>
-            <a:off x="1143001" y="4521618"/>
+            <a:off x="1143002" y="4521619"/>
             <a:ext cx="1721556" cy="90687"/>
           </a:xfrm>
           <a:prstGeom prst="rect">
@@ -4800,7 +4801,7 @@
         </p:nvSpPr>
         <p:spPr>
           <a:xfrm>
-            <a:off x="1143000" y="2349684"/>
+            <a:off x="1143001" y="2349685"/>
             <a:ext cx="1721556" cy="90687"/>
           </a:xfrm>
           <a:prstGeom prst="rect">
@@ -4848,10 +4849,10 @@
         </p:nvGrpSpPr>
         <p:grpSpPr>
           <a:xfrm>
-            <a:off x="464023" y="2349684"/>
-            <a:ext cx="3134831" cy="2700300"/>
-            <a:chOff x="2043923" y="723900"/>
-            <a:chExt cx="6585179" cy="5672384"/>
+            <a:off x="367269" y="2349684"/>
+            <a:ext cx="3328344" cy="2706693"/>
+            <a:chOff x="1840672" y="723900"/>
+            <a:chExt cx="6991681" cy="5685813"/>
           </a:xfrm>
         </p:grpSpPr>
         <p:grpSp>
@@ -5597,8 +5598,8 @@
           </p:nvSpPr>
           <p:spPr>
             <a:xfrm>
-              <a:off x="4800601" y="5633878"/>
-              <a:ext cx="914400" cy="369332"/>
+              <a:off x="4800602" y="5633876"/>
+              <a:ext cx="914402" cy="775837"/>
             </a:xfrm>
             <a:prstGeom prst="rect">
               <a:avLst/>
@@ -5628,8 +5629,8 @@
           </p:nvSpPr>
           <p:spPr>
             <a:xfrm rot="16200000">
-              <a:off x="1771389" y="2915722"/>
-              <a:ext cx="914400" cy="369332"/>
+              <a:off x="1771391" y="2712469"/>
+              <a:ext cx="914400" cy="775837"/>
             </a:xfrm>
             <a:prstGeom prst="rect">
               <a:avLst/>
@@ -5659,8 +5660,8 @@
           </p:nvSpPr>
           <p:spPr>
             <a:xfrm rot="5400000">
-              <a:off x="7987236" y="4691008"/>
-              <a:ext cx="914400" cy="369332"/>
+              <a:off x="7987235" y="4487755"/>
+              <a:ext cx="914400" cy="775837"/>
             </a:xfrm>
             <a:prstGeom prst="rect">
               <a:avLst/>
@@ -5691,7 +5692,7 @@
         </p:nvGrpSpPr>
         <p:grpSpPr>
           <a:xfrm>
-            <a:off x="4267200" y="2410155"/>
+            <a:off x="4267200" y="2410156"/>
             <a:ext cx="4187853" cy="2713424"/>
             <a:chOff x="4045111" y="1905000"/>
             <a:chExt cx="4187853" cy="2713424"/>
@@ -6115,7 +6116,7 @@
         </p:blipFill>
         <p:spPr>
           <a:xfrm>
-            <a:off x="1123380" y="2576174"/>
+            <a:off x="1123381" y="2576174"/>
             <a:ext cx="2049780" cy="1374348"/>
           </a:xfrm>
           <a:prstGeom prst="rect">
@@ -6144,7 +6145,7 @@
         </p:blipFill>
         <p:spPr>
           <a:xfrm>
-            <a:off x="5505450" y="2747901"/>
+            <a:off x="5505451" y="2747902"/>
             <a:ext cx="1333460" cy="1466183"/>
           </a:xfrm>
           <a:prstGeom prst="rect">
@@ -6298,7 +6299,7 @@
         </p:blipFill>
         <p:spPr>
           <a:xfrm>
-            <a:off x="5562600" y="1566764"/>
+            <a:off x="5562601" y="1566764"/>
             <a:ext cx="2842260" cy="3607632"/>
           </a:xfrm>
           <a:prstGeom prst="rect">
@@ -6314,7 +6315,7 @@
         </p:nvCxnSpPr>
         <p:spPr>
           <a:xfrm flipV="1">
-            <a:off x="4859748" y="5083687"/>
+            <a:off x="4859749" y="5083687"/>
             <a:ext cx="1" cy="473654"/>
           </a:xfrm>
           <a:prstGeom prst="line">
@@ -6349,7 +6350,7 @@
         </p:nvCxnSpPr>
         <p:spPr>
           <a:xfrm flipV="1">
-            <a:off x="2133600" y="5092645"/>
+            <a:off x="2133600" y="5092646"/>
             <a:ext cx="0" cy="510514"/>
           </a:xfrm>
           <a:prstGeom prst="line">
@@ -6421,8 +6422,8 @@
         </p:nvCxnSpPr>
         <p:spPr>
           <a:xfrm rot="5400000" flipV="1">
-            <a:off x="1848214" y="4813226"/>
-            <a:ext cx="1" cy="473654"/>
+            <a:off x="1848216" y="4813226"/>
+            <a:ext cx="1" cy="473655"/>
           </a:xfrm>
           <a:prstGeom prst="line">
             <a:avLst/>
@@ -6457,7 +6458,7 @@
         <p:spPr>
           <a:xfrm rot="5400000" flipV="1">
             <a:off x="1829785" y="1421143"/>
-            <a:ext cx="0" cy="510514"/>
+            <a:ext cx="0" cy="510515"/>
           </a:xfrm>
           <a:prstGeom prst="line">
             <a:avLst/>
@@ -6491,7 +6492,7 @@
         </p:nvCxnSpPr>
         <p:spPr>
           <a:xfrm flipH="1" flipV="1">
-            <a:off x="1654511" y="1676401"/>
+            <a:off x="1654512" y="1676402"/>
             <a:ext cx="3" cy="3373653"/>
           </a:xfrm>
           <a:prstGeom prst="line">
@@ -6541,7 +6542,7 @@
         </p:blipFill>
         <p:spPr>
           <a:xfrm>
-            <a:off x="0" y="4660728"/>
+            <a:off x="1" y="4660728"/>
             <a:ext cx="2049780" cy="1374348"/>
           </a:xfrm>
           <a:prstGeom prst="rect">
@@ -6557,7 +6558,7 @@
         </p:nvSpPr>
         <p:spPr>
           <a:xfrm>
-            <a:off x="2984682" y="5590280"/>
+            <a:off x="2984683" y="5590280"/>
             <a:ext cx="1041035" cy="369332"/>
           </a:xfrm>
           <a:prstGeom prst="rect">
@@ -6592,8 +6593,8 @@
         </p:nvSpPr>
         <p:spPr>
           <a:xfrm rot="16200000">
-            <a:off x="1202782" y="3286740"/>
-            <a:ext cx="550092" cy="222186"/>
+            <a:off x="1202782" y="3213167"/>
+            <a:ext cx="550092" cy="369332"/>
           </a:xfrm>
           <a:prstGeom prst="rect">
             <a:avLst/>
@@ -6623,7 +6624,7 @@
         </p:nvCxnSpPr>
         <p:spPr>
           <a:xfrm flipV="1">
-            <a:off x="8077200" y="5117855"/>
+            <a:off x="8077201" y="5117856"/>
             <a:ext cx="1" cy="473654"/>
           </a:xfrm>
           <a:prstGeom prst="line">
@@ -6658,7 +6659,7 @@
         </p:nvCxnSpPr>
         <p:spPr>
           <a:xfrm flipV="1">
-            <a:off x="5715000" y="5117855"/>
+            <a:off x="5715000" y="5117856"/>
             <a:ext cx="0" cy="510514"/>
           </a:xfrm>
           <a:prstGeom prst="line">
@@ -6730,7 +6731,7 @@
         </p:nvSpPr>
         <p:spPr>
           <a:xfrm>
-            <a:off x="6566082" y="5624448"/>
+            <a:off x="6566083" y="5624448"/>
             <a:ext cx="1041035" cy="369332"/>
           </a:xfrm>
           <a:prstGeom prst="rect">
@@ -6765,7 +6766,7 @@
         </p:nvCxnSpPr>
         <p:spPr>
           <a:xfrm>
-            <a:off x="5269014" y="5072912"/>
+            <a:off x="5269015" y="5072913"/>
             <a:ext cx="445988" cy="5"/>
           </a:xfrm>
           <a:prstGeom prst="line">
@@ -6801,7 +6802,7 @@
         <p:spPr>
           <a:xfrm>
             <a:off x="5232154" y="1661160"/>
-            <a:ext cx="482846" cy="0"/>
+            <a:ext cx="482847" cy="0"/>
           </a:xfrm>
           <a:prstGeom prst="line">
             <a:avLst/>
@@ -6835,7 +6836,7 @@
         </p:nvCxnSpPr>
         <p:spPr>
           <a:xfrm flipH="1" flipV="1">
-            <a:off x="5312140" y="1661160"/>
+            <a:off x="5312141" y="1661161"/>
             <a:ext cx="1" cy="3411755"/>
           </a:xfrm>
           <a:prstGeom prst="line">
@@ -6872,8 +6873,8 @@
         </p:nvSpPr>
         <p:spPr>
           <a:xfrm rot="16200000">
-            <a:off x="4846015" y="3286740"/>
-            <a:ext cx="550092" cy="222186"/>
+            <a:off x="4846015" y="3213167"/>
+            <a:ext cx="550092" cy="369332"/>
           </a:xfrm>
           <a:prstGeom prst="rect">
             <a:avLst/>
@@ -6938,7 +6939,7 @@
         </p:nvCxnSpPr>
         <p:spPr>
           <a:xfrm flipV="1">
-            <a:off x="7607117" y="2045957"/>
+            <a:off x="7607118" y="2045958"/>
             <a:ext cx="266700" cy="255257"/>
           </a:xfrm>
           <a:prstGeom prst="line">
@@ -7052,7 +7053,7 @@
         </p:nvGrpSpPr>
         <p:grpSpPr>
           <a:xfrm>
-            <a:off x="3288269" y="493596"/>
+            <a:off x="3288267" y="493596"/>
             <a:ext cx="369332" cy="1896288"/>
             <a:chOff x="3288269" y="493596"/>
             <a:chExt cx="369332" cy="1896288"/>
@@ -7171,7 +7172,7 @@
         </p:nvGrpSpPr>
         <p:grpSpPr>
           <a:xfrm>
-            <a:off x="6614398" y="443026"/>
+            <a:off x="6614396" y="443026"/>
             <a:ext cx="369332" cy="1896288"/>
             <a:chOff x="3288269" y="493596"/>
             <a:chExt cx="369332" cy="1896288"/>
@@ -7333,7 +7334,7 @@
         </p:blipFill>
         <p:spPr>
           <a:xfrm>
-            <a:off x="-152399" y="-304800"/>
+            <a:off x="-152398" y="-304799"/>
             <a:ext cx="9909132" cy="7131151"/>
           </a:xfrm>
           <a:prstGeom prst="rect">
@@ -7386,10 +7387,10 @@
         </p:nvGrpSpPr>
         <p:grpSpPr>
           <a:xfrm>
-            <a:off x="528881" y="381000"/>
-            <a:ext cx="7710674" cy="5953582"/>
+            <a:off x="528882" y="381000"/>
+            <a:ext cx="7634925" cy="5953582"/>
             <a:chOff x="1447800" y="1981200"/>
-            <a:chExt cx="5467805" cy="4221813"/>
+            <a:chExt cx="5414089" cy="4221813"/>
           </a:xfrm>
         </p:grpSpPr>
         <p:sp>
@@ -8319,8 +8320,8 @@
           </p:nvSpPr>
           <p:spPr>
             <a:xfrm rot="5400000">
-              <a:off x="4175827" y="3175757"/>
-              <a:ext cx="914400" cy="369332"/>
+              <a:off x="4175827" y="3229472"/>
+              <a:ext cx="914400" cy="261901"/>
             </a:xfrm>
             <a:prstGeom prst="rect">
               <a:avLst/>
@@ -8351,7 +8352,7 @@
           <p:spPr>
             <a:xfrm>
               <a:off x="3860997" y="5833681"/>
-              <a:ext cx="914400" cy="369332"/>
+              <a:ext cx="914400" cy="261901"/>
             </a:xfrm>
             <a:prstGeom prst="rect">
               <a:avLst/>
@@ -8451,8 +8452,8 @@
           </p:nvSpPr>
           <p:spPr>
             <a:xfrm rot="5400000">
-              <a:off x="6273739" y="3552644"/>
-              <a:ext cx="914400" cy="369332"/>
+              <a:off x="6273739" y="3606359"/>
+              <a:ext cx="914400" cy="261901"/>
             </a:xfrm>
             <a:prstGeom prst="rect">
               <a:avLst/>
@@ -8483,8 +8484,8 @@
         </p:nvCxnSpPr>
         <p:spPr>
           <a:xfrm flipH="1">
-            <a:off x="2448601" y="757099"/>
-            <a:ext cx="243922" cy="433487"/>
+            <a:off x="2448601" y="757100"/>
+            <a:ext cx="243923" cy="433487"/>
           </a:xfrm>
           <a:prstGeom prst="line">
             <a:avLst/>
@@ -8518,8 +8519,8 @@
         </p:nvCxnSpPr>
         <p:spPr>
           <a:xfrm flipH="1">
-            <a:off x="2448601" y="1066800"/>
-            <a:ext cx="243922" cy="433487"/>
+            <a:off x="2448601" y="1066801"/>
+            <a:ext cx="243923" cy="433487"/>
           </a:xfrm>
           <a:prstGeom prst="line">
             <a:avLst/>
@@ -8553,8 +8554,8 @@
         </p:nvCxnSpPr>
         <p:spPr>
           <a:xfrm flipH="1">
-            <a:off x="2442867" y="1447800"/>
-            <a:ext cx="243922" cy="433487"/>
+            <a:off x="2442867" y="1447801"/>
+            <a:ext cx="243923" cy="433487"/>
           </a:xfrm>
           <a:prstGeom prst="line">
             <a:avLst/>
@@ -8588,8 +8589,8 @@
         </p:nvCxnSpPr>
         <p:spPr>
           <a:xfrm flipH="1">
-            <a:off x="2448601" y="1824017"/>
-            <a:ext cx="243922" cy="433487"/>
+            <a:off x="2448601" y="1824018"/>
+            <a:ext cx="243923" cy="433487"/>
           </a:xfrm>
           <a:prstGeom prst="line">
             <a:avLst/>
@@ -8623,8 +8624,8 @@
         </p:nvCxnSpPr>
         <p:spPr>
           <a:xfrm flipH="1">
-            <a:off x="2448601" y="2161940"/>
-            <a:ext cx="243922" cy="433487"/>
+            <a:off x="2448601" y="2161941"/>
+            <a:ext cx="243923" cy="433487"/>
           </a:xfrm>
           <a:prstGeom prst="line">
             <a:avLst/>
@@ -8658,8 +8659,8 @@
         </p:nvCxnSpPr>
         <p:spPr>
           <a:xfrm flipH="1">
-            <a:off x="2442867" y="2537226"/>
-            <a:ext cx="243922" cy="433487"/>
+            <a:off x="2442867" y="2537227"/>
+            <a:ext cx="243923" cy="433487"/>
           </a:xfrm>
           <a:prstGeom prst="line">
             <a:avLst/>
@@ -8693,7 +8694,7 @@
         </p:nvCxnSpPr>
         <p:spPr>
           <a:xfrm flipH="1">
-            <a:off x="2442867" y="2809527"/>
+            <a:off x="2442868" y="2809528"/>
             <a:ext cx="300333" cy="552515"/>
           </a:xfrm>
           <a:prstGeom prst="line">
@@ -8728,8 +8729,8 @@
         </p:nvCxnSpPr>
         <p:spPr>
           <a:xfrm flipH="1">
-            <a:off x="2448601" y="3260080"/>
-            <a:ext cx="243922" cy="433487"/>
+            <a:off x="2448601" y="3260081"/>
+            <a:ext cx="243923" cy="433487"/>
           </a:xfrm>
           <a:prstGeom prst="line">
             <a:avLst/>
@@ -8763,8 +8764,8 @@
         </p:nvCxnSpPr>
         <p:spPr>
           <a:xfrm flipH="1">
-            <a:off x="2442867" y="3677811"/>
-            <a:ext cx="243922" cy="433487"/>
+            <a:off x="2442867" y="3677812"/>
+            <a:ext cx="243923" cy="433487"/>
           </a:xfrm>
           <a:prstGeom prst="line">
             <a:avLst/>
@@ -8798,8 +8799,8 @@
         </p:nvCxnSpPr>
         <p:spPr>
           <a:xfrm flipH="1">
-            <a:off x="2448601" y="3996927"/>
-            <a:ext cx="243922" cy="433487"/>
+            <a:off x="2448601" y="3996928"/>
+            <a:ext cx="243923" cy="433487"/>
           </a:xfrm>
           <a:prstGeom prst="line">
             <a:avLst/>
@@ -8833,8 +8834,8 @@
         </p:nvCxnSpPr>
         <p:spPr>
           <a:xfrm flipH="1">
-            <a:off x="2442867" y="4343400"/>
-            <a:ext cx="243922" cy="433487"/>
+            <a:off x="2442867" y="4343401"/>
+            <a:ext cx="243923" cy="433487"/>
           </a:xfrm>
           <a:prstGeom prst="line">
             <a:avLst/>
@@ -8868,8 +8869,8 @@
         </p:nvCxnSpPr>
         <p:spPr>
           <a:xfrm flipH="1">
-            <a:off x="2480351" y="4704388"/>
-            <a:ext cx="243922" cy="433487"/>
+            <a:off x="2480351" y="4704389"/>
+            <a:ext cx="243923" cy="433487"/>
           </a:xfrm>
           <a:prstGeom prst="line">
             <a:avLst/>
@@ -8903,8 +8904,8 @@
         </p:nvCxnSpPr>
         <p:spPr>
           <a:xfrm flipH="1">
-            <a:off x="6531962" y="801148"/>
-            <a:ext cx="243922" cy="433487"/>
+            <a:off x="6531961" y="801149"/>
+            <a:ext cx="243923" cy="433487"/>
           </a:xfrm>
           <a:prstGeom prst="line">
             <a:avLst/>
@@ -8938,8 +8939,8 @@
         </p:nvCxnSpPr>
         <p:spPr>
           <a:xfrm flipH="1">
-            <a:off x="6531962" y="1110849"/>
-            <a:ext cx="243922" cy="433487"/>
+            <a:off x="6531961" y="1110850"/>
+            <a:ext cx="243923" cy="433487"/>
           </a:xfrm>
           <a:prstGeom prst="line">
             <a:avLst/>
@@ -8973,8 +8974,8 @@
         </p:nvCxnSpPr>
         <p:spPr>
           <a:xfrm flipH="1">
-            <a:off x="6526228" y="1491849"/>
-            <a:ext cx="243922" cy="433487"/>
+            <a:off x="6526228" y="1491850"/>
+            <a:ext cx="243923" cy="433487"/>
           </a:xfrm>
           <a:prstGeom prst="line">
             <a:avLst/>
@@ -9008,8 +9009,8 @@
         </p:nvCxnSpPr>
         <p:spPr>
           <a:xfrm flipH="1">
-            <a:off x="6531962" y="1868066"/>
-            <a:ext cx="243922" cy="433487"/>
+            <a:off x="6531961" y="1868067"/>
+            <a:ext cx="243923" cy="433487"/>
           </a:xfrm>
           <a:prstGeom prst="line">
             <a:avLst/>
@@ -9043,8 +9044,8 @@
         </p:nvCxnSpPr>
         <p:spPr>
           <a:xfrm flipH="1">
-            <a:off x="6531962" y="2205989"/>
-            <a:ext cx="243922" cy="433487"/>
+            <a:off x="6531961" y="2205990"/>
+            <a:ext cx="243923" cy="433487"/>
           </a:xfrm>
           <a:prstGeom prst="line">
             <a:avLst/>
@@ -9078,8 +9079,8 @@
         </p:nvCxnSpPr>
         <p:spPr>
           <a:xfrm flipH="1">
-            <a:off x="6526228" y="2581275"/>
-            <a:ext cx="243922" cy="433487"/>
+            <a:off x="6526228" y="2581276"/>
+            <a:ext cx="243923" cy="433487"/>
           </a:xfrm>
           <a:prstGeom prst="line">
             <a:avLst/>
@@ -9113,8 +9114,8 @@
         </p:nvCxnSpPr>
         <p:spPr>
           <a:xfrm flipH="1">
-            <a:off x="6526228" y="2972604"/>
-            <a:ext cx="243922" cy="433487"/>
+            <a:off x="6526228" y="2972605"/>
+            <a:ext cx="243923" cy="433487"/>
           </a:xfrm>
           <a:prstGeom prst="line">
             <a:avLst/>
@@ -9148,8 +9149,8 @@
         </p:nvCxnSpPr>
         <p:spPr>
           <a:xfrm flipH="1">
-            <a:off x="6531962" y="3304129"/>
-            <a:ext cx="243922" cy="433487"/>
+            <a:off x="6531961" y="3304130"/>
+            <a:ext cx="243923" cy="433487"/>
           </a:xfrm>
           <a:prstGeom prst="line">
             <a:avLst/>
@@ -9183,8 +9184,8 @@
         </p:nvCxnSpPr>
         <p:spPr>
           <a:xfrm flipH="1">
-            <a:off x="6526228" y="3721860"/>
-            <a:ext cx="243922" cy="433487"/>
+            <a:off x="6526228" y="3721861"/>
+            <a:ext cx="243923" cy="433487"/>
           </a:xfrm>
           <a:prstGeom prst="line">
             <a:avLst/>
@@ -9218,8 +9219,8 @@
         </p:nvCxnSpPr>
         <p:spPr>
           <a:xfrm flipH="1">
-            <a:off x="6531962" y="4040976"/>
-            <a:ext cx="243922" cy="433487"/>
+            <a:off x="6531961" y="4040977"/>
+            <a:ext cx="243923" cy="433487"/>
           </a:xfrm>
           <a:prstGeom prst="line">
             <a:avLst/>
@@ -9253,8 +9254,8 @@
         </p:nvCxnSpPr>
         <p:spPr>
           <a:xfrm flipH="1">
-            <a:off x="6526228" y="4387449"/>
-            <a:ext cx="243922" cy="433487"/>
+            <a:off x="6526228" y="4387450"/>
+            <a:ext cx="243923" cy="433487"/>
           </a:xfrm>
           <a:prstGeom prst="line">
             <a:avLst/>
@@ -9288,7 +9289,7 @@
         </p:nvCxnSpPr>
         <p:spPr>
           <a:xfrm flipH="1">
-            <a:off x="6685674" y="4858924"/>
+            <a:off x="6685675" y="4858925"/>
             <a:ext cx="60979" cy="110488"/>
           </a:xfrm>
           <a:prstGeom prst="line">
@@ -9323,7 +9324,7 @@
         </p:nvCxnSpPr>
         <p:spPr>
           <a:xfrm flipH="1">
-            <a:off x="2865161" y="2788142"/>
+            <a:off x="2865162" y="2788143"/>
             <a:ext cx="121961" cy="216743"/>
           </a:xfrm>
           <a:prstGeom prst="line">
@@ -9358,7 +9359,7 @@
         </p:nvCxnSpPr>
         <p:spPr>
           <a:xfrm flipH="1">
-            <a:off x="3090687" y="2798019"/>
+            <a:off x="3090689" y="2798020"/>
             <a:ext cx="121961" cy="216743"/>
           </a:xfrm>
           <a:prstGeom prst="line">
@@ -9393,7 +9394,7 @@
         </p:nvCxnSpPr>
         <p:spPr>
           <a:xfrm flipH="1">
-            <a:off x="3352800" y="2798018"/>
+            <a:off x="3352801" y="2798019"/>
             <a:ext cx="121961" cy="216743"/>
           </a:xfrm>
           <a:prstGeom prst="line">
@@ -9428,7 +9429,7 @@
         </p:nvCxnSpPr>
         <p:spPr>
           <a:xfrm flipH="1">
-            <a:off x="3581400" y="2788142"/>
+            <a:off x="3581401" y="2788143"/>
             <a:ext cx="121961" cy="216743"/>
           </a:xfrm>
           <a:prstGeom prst="line">
@@ -9463,7 +9464,7 @@
         </p:nvCxnSpPr>
         <p:spPr>
           <a:xfrm flipH="1">
-            <a:off x="3810000" y="2793318"/>
+            <a:off x="3810001" y="2793319"/>
             <a:ext cx="121961" cy="216743"/>
           </a:xfrm>
           <a:prstGeom prst="line">
@@ -9498,7 +9499,7 @@
         </p:nvCxnSpPr>
         <p:spPr>
           <a:xfrm flipH="1">
-            <a:off x="4038600" y="2798017"/>
+            <a:off x="4038601" y="2798018"/>
             <a:ext cx="121961" cy="216743"/>
           </a:xfrm>
           <a:prstGeom prst="line">
@@ -9533,7 +9534,7 @@
         </p:nvCxnSpPr>
         <p:spPr>
           <a:xfrm flipH="1">
-            <a:off x="4240445" y="2798016"/>
+            <a:off x="4240446" y="2798017"/>
             <a:ext cx="121961" cy="216743"/>
           </a:xfrm>
           <a:prstGeom prst="line">
@@ -9568,7 +9569,7 @@
         </p:nvCxnSpPr>
         <p:spPr>
           <a:xfrm flipH="1">
-            <a:off x="4453825" y="2793317"/>
+            <a:off x="4453826" y="2793318"/>
             <a:ext cx="121961" cy="216743"/>
           </a:xfrm>
           <a:prstGeom prst="line">
@@ -9603,7 +9604,7 @@
         </p:nvCxnSpPr>
         <p:spPr>
           <a:xfrm flipH="1">
-            <a:off x="4648200" y="2798016"/>
+            <a:off x="4648201" y="2798017"/>
             <a:ext cx="121961" cy="216743"/>
           </a:xfrm>
           <a:prstGeom prst="line">
@@ -9638,7 +9639,7 @@
         </p:nvCxnSpPr>
         <p:spPr>
           <a:xfrm flipH="1">
-            <a:off x="4856277" y="2793318"/>
+            <a:off x="4856278" y="2793319"/>
             <a:ext cx="121961" cy="216743"/>
           </a:xfrm>
           <a:prstGeom prst="line">
@@ -9673,7 +9674,7 @@
         </p:nvCxnSpPr>
         <p:spPr>
           <a:xfrm flipH="1">
-            <a:off x="5076662" y="2793318"/>
+            <a:off x="5076664" y="2793319"/>
             <a:ext cx="121961" cy="216743"/>
           </a:xfrm>
           <a:prstGeom prst="line">
@@ -9708,7 +9709,7 @@
         </p:nvCxnSpPr>
         <p:spPr>
           <a:xfrm flipH="1">
-            <a:off x="5302188" y="2803195"/>
+            <a:off x="5302189" y="2803196"/>
             <a:ext cx="121961" cy="216743"/>
           </a:xfrm>
           <a:prstGeom prst="line">
@@ -9743,7 +9744,7 @@
         </p:nvCxnSpPr>
         <p:spPr>
           <a:xfrm flipH="1">
-            <a:off x="5564301" y="2803194"/>
+            <a:off x="5564302" y="2803195"/>
             <a:ext cx="121961" cy="216743"/>
           </a:xfrm>
           <a:prstGeom prst="line">
@@ -9778,7 +9779,7 @@
         </p:nvCxnSpPr>
         <p:spPr>
           <a:xfrm flipH="1">
-            <a:off x="5792901" y="2793318"/>
+            <a:off x="5792902" y="2793319"/>
             <a:ext cx="121961" cy="216743"/>
           </a:xfrm>
           <a:prstGeom prst="line">
@@ -9813,7 +9814,7 @@
         </p:nvCxnSpPr>
         <p:spPr>
           <a:xfrm flipH="1">
-            <a:off x="6021501" y="2798494"/>
+            <a:off x="6021502" y="2798495"/>
             <a:ext cx="121961" cy="216743"/>
           </a:xfrm>
           <a:prstGeom prst="line">
@@ -9848,7 +9849,7 @@
         </p:nvCxnSpPr>
         <p:spPr>
           <a:xfrm flipH="1">
-            <a:off x="6250101" y="2794724"/>
+            <a:off x="6250102" y="2794725"/>
             <a:ext cx="121961" cy="216743"/>
           </a:xfrm>
           <a:prstGeom prst="line">
@@ -9927,7 +9928,7 @@
         <p:spPr>
           <a:xfrm>
             <a:off x="381000" y="1600200"/>
-            <a:ext cx="8207458" cy="4038600"/>
+            <a:ext cx="8207459" cy="4038600"/>
           </a:xfrm>
           <a:prstGeom prst="rect">
             <a:avLst/>
@@ -10038,7 +10039,7 @@
         </p:nvGrpSpPr>
         <p:grpSpPr>
           <a:xfrm>
-            <a:off x="457200" y="3"/>
+            <a:off x="457200" y="4"/>
             <a:ext cx="8229600" cy="6476999"/>
             <a:chOff x="631620" y="347309"/>
             <a:chExt cx="7754074" cy="5971031"/>
@@ -11581,8 +11582,8 @@
         </p:nvSpPr>
         <p:spPr>
           <a:xfrm>
-            <a:off x="4749228" y="3507774"/>
-            <a:ext cx="202182" cy="204386"/>
+            <a:off x="4749229" y="3507775"/>
+            <a:ext cx="202183" cy="204386"/>
           </a:xfrm>
           <a:prstGeom prst="ellipse">
             <a:avLst/>
@@ -11629,8 +11630,8 @@
         </p:nvCxnSpPr>
         <p:spPr>
           <a:xfrm>
-            <a:off x="4792488" y="3547272"/>
-            <a:ext cx="121310" cy="125388"/>
+            <a:off x="4792489" y="3547272"/>
+            <a:ext cx="121311" cy="125388"/>
           </a:xfrm>
           <a:prstGeom prst="line">
             <a:avLst/>
@@ -11664,8 +11665,8 @@
         </p:nvCxnSpPr>
         <p:spPr>
           <a:xfrm flipV="1">
-            <a:off x="4792488" y="3547272"/>
-            <a:ext cx="121310" cy="125389"/>
+            <a:off x="4792489" y="3547273"/>
+            <a:ext cx="121311" cy="125389"/>
           </a:xfrm>
           <a:prstGeom prst="line">
             <a:avLst/>
@@ -11699,7 +11700,7 @@
         </p:nvSpPr>
         <p:spPr>
           <a:xfrm>
-            <a:off x="3886201" y="3048000"/>
+            <a:off x="3886202" y="3048001"/>
             <a:ext cx="1474599" cy="1552601"/>
           </a:xfrm>
           <a:prstGeom prst="arc">
@@ -11751,7 +11752,7 @@
         <p:spPr>
           <a:xfrm flipV="1">
             <a:off x="4921801" y="2623180"/>
-            <a:ext cx="507546" cy="914526"/>
+            <a:ext cx="507547" cy="914526"/>
           </a:xfrm>
           <a:prstGeom prst="line">
             <a:avLst/>
@@ -11791,7 +11792,7 @@
         </p:nvSpPr>
         <p:spPr>
           <a:xfrm>
-            <a:off x="5324425" y="2606170"/>
+            <a:off x="5324426" y="2606171"/>
             <a:ext cx="122924" cy="116149"/>
           </a:xfrm>
           <a:prstGeom prst="ellipse">
@@ -11837,7 +11838,7 @@
         </p:nvSpPr>
         <p:spPr>
           <a:xfrm>
-            <a:off x="4485585" y="3605906"/>
+            <a:off x="4485586" y="3605906"/>
             <a:ext cx="323492" cy="369332"/>
           </a:xfrm>
           <a:prstGeom prst="rect">
@@ -11867,7 +11868,7 @@
         </p:nvSpPr>
         <p:spPr>
           <a:xfrm rot="17890776">
-            <a:off x="4877549" y="2784666"/>
+            <a:off x="4877550" y="2784666"/>
             <a:ext cx="323492" cy="369332"/>
           </a:xfrm>
           <a:prstGeom prst="rect">
@@ -11897,7 +11898,7 @@
         </p:nvSpPr>
         <p:spPr>
           <a:xfrm>
-            <a:off x="5192413" y="3112268"/>
+            <a:off x="5192414" y="3112268"/>
             <a:ext cx="323492" cy="369332"/>
           </a:xfrm>
           <a:prstGeom prst="rect">
@@ -11991,6 +11992,2959 @@
 </p:sld>
 </file>
 
+<file path=ppt/slides/slide19.xml><?xml version="1.0" encoding="utf-8"?>
+<p:sld xmlns:a="http://schemas.openxmlformats.org/drawingml/2006/main" xmlns:r="http://schemas.openxmlformats.org/officeDocument/2006/relationships" xmlns:p="http://schemas.openxmlformats.org/presentationml/2006/main">
+  <p:cSld>
+    <p:spTree>
+      <p:nvGrpSpPr>
+        <p:cNvPr id="1" name=""/>
+        <p:cNvGrpSpPr/>
+        <p:nvPr/>
+      </p:nvGrpSpPr>
+      <p:grpSpPr>
+        <a:xfrm>
+          <a:off x="0" y="0"/>
+          <a:ext cx="0" cy="0"/>
+          <a:chOff x="0" y="0"/>
+          <a:chExt cx="0" cy="0"/>
+        </a:xfrm>
+      </p:grpSpPr>
+      <p:sp>
+        <p:nvSpPr>
+          <p:cNvPr id="2" name="Flowchart: Terminator 1"/>
+          <p:cNvSpPr/>
+          <p:nvPr/>
+        </p:nvSpPr>
+        <p:spPr>
+          <a:xfrm>
+            <a:off x="2600325" y="561646"/>
+            <a:ext cx="981075" cy="295603"/>
+          </a:xfrm>
+          <a:prstGeom prst="flowChartTerminator">
+            <a:avLst/>
+          </a:prstGeom>
+          <a:solidFill>
+            <a:schemeClr val="bg1"/>
+          </a:solidFill>
+          <a:ln>
+            <a:solidFill>
+              <a:schemeClr val="tx1"/>
+            </a:solidFill>
+          </a:ln>
+        </p:spPr>
+        <p:style>
+          <a:lnRef idx="2">
+            <a:schemeClr val="accent1">
+              <a:shade val="50000"/>
+            </a:schemeClr>
+          </a:lnRef>
+          <a:fillRef idx="1">
+            <a:schemeClr val="accent1"/>
+          </a:fillRef>
+          <a:effectRef idx="0">
+            <a:schemeClr val="accent1"/>
+          </a:effectRef>
+          <a:fontRef idx="minor">
+            <a:schemeClr val="lt1"/>
+          </a:fontRef>
+        </p:style>
+        <p:txBody>
+          <a:bodyPr rtlCol="0" anchor="ctr"/>
+          <a:lstStyle/>
+          <a:p>
+            <a:pPr algn="ctr"/>
+            <a:r>
+              <a:rPr lang="es-ES" sz="1200" dirty="0" err="1" smtClean="0">
+                <a:solidFill>
+                  <a:schemeClr val="tx1"/>
+                </a:solidFill>
+              </a:rPr>
+              <a:t>Start</a:t>
+            </a:r>
+            <a:endParaRPr lang="en-US" sz="1200" dirty="0">
+              <a:solidFill>
+                <a:schemeClr val="tx1"/>
+              </a:solidFill>
+            </a:endParaRPr>
+          </a:p>
+        </p:txBody>
+      </p:sp>
+      <p:sp>
+        <p:nvSpPr>
+          <p:cNvPr id="4" name="Flowchart: Predefined Process 3"/>
+          <p:cNvSpPr/>
+          <p:nvPr/>
+        </p:nvSpPr>
+        <p:spPr>
+          <a:xfrm>
+            <a:off x="5781675" y="2602102"/>
+            <a:ext cx="1981200" cy="381000"/>
+          </a:xfrm>
+          <a:prstGeom prst="flowChartPredefinedProcess">
+            <a:avLst/>
+          </a:prstGeom>
+          <a:solidFill>
+            <a:schemeClr val="bg1"/>
+          </a:solidFill>
+          <a:ln>
+            <a:solidFill>
+              <a:schemeClr val="tx1"/>
+            </a:solidFill>
+          </a:ln>
+        </p:spPr>
+        <p:style>
+          <a:lnRef idx="2">
+            <a:schemeClr val="accent1">
+              <a:shade val="50000"/>
+            </a:schemeClr>
+          </a:lnRef>
+          <a:fillRef idx="1">
+            <a:schemeClr val="accent1"/>
+          </a:fillRef>
+          <a:effectRef idx="0">
+            <a:schemeClr val="accent1"/>
+          </a:effectRef>
+          <a:fontRef idx="minor">
+            <a:schemeClr val="lt1"/>
+          </a:fontRef>
+        </p:style>
+        <p:txBody>
+          <a:bodyPr rtlCol="0" anchor="ctr"/>
+          <a:lstStyle/>
+          <a:p>
+            <a:pPr algn="ctr"/>
+            <a:r>
+              <a:rPr lang="es-ES" sz="1200" dirty="0" err="1" smtClean="0">
+                <a:solidFill>
+                  <a:schemeClr val="tx1"/>
+                </a:solidFill>
+              </a:rPr>
+              <a:t>Build</a:t>
+            </a:r>
+            <a:r>
+              <a:rPr lang="es-ES" sz="1200" dirty="0" smtClean="0">
+                <a:solidFill>
+                  <a:schemeClr val="tx1"/>
+                </a:solidFill>
+              </a:rPr>
+              <a:t> </a:t>
+            </a:r>
+            <a:r>
+              <a:rPr lang="es-ES" sz="1200" dirty="0" err="1" smtClean="0">
+                <a:solidFill>
+                  <a:schemeClr val="tx1"/>
+                </a:solidFill>
+              </a:rPr>
+              <a:t>model</a:t>
+            </a:r>
+            <a:endParaRPr lang="en-US" sz="1200" dirty="0">
+              <a:solidFill>
+                <a:schemeClr val="tx1"/>
+              </a:solidFill>
+            </a:endParaRPr>
+          </a:p>
+        </p:txBody>
+      </p:sp>
+      <p:sp>
+        <p:nvSpPr>
+          <p:cNvPr id="6" name="Flowchart: Process 5"/>
+          <p:cNvSpPr/>
+          <p:nvPr/>
+        </p:nvSpPr>
+        <p:spPr>
+          <a:xfrm>
+            <a:off x="2371727" y="2212121"/>
+            <a:ext cx="1447800" cy="352425"/>
+          </a:xfrm>
+          <a:prstGeom prst="flowChartProcess">
+            <a:avLst/>
+          </a:prstGeom>
+          <a:solidFill>
+            <a:schemeClr val="bg1"/>
+          </a:solidFill>
+          <a:ln>
+            <a:solidFill>
+              <a:schemeClr val="tx1"/>
+            </a:solidFill>
+          </a:ln>
+        </p:spPr>
+        <p:style>
+          <a:lnRef idx="2">
+            <a:schemeClr val="accent1">
+              <a:shade val="50000"/>
+            </a:schemeClr>
+          </a:lnRef>
+          <a:fillRef idx="1">
+            <a:schemeClr val="accent1"/>
+          </a:fillRef>
+          <a:effectRef idx="0">
+            <a:schemeClr val="accent1"/>
+          </a:effectRef>
+          <a:fontRef idx="minor">
+            <a:schemeClr val="lt1"/>
+          </a:fontRef>
+        </p:style>
+        <p:txBody>
+          <a:bodyPr rtlCol="0" anchor="ctr"/>
+          <a:lstStyle/>
+          <a:p>
+            <a:pPr algn="ctr"/>
+            <a:r>
+              <a:rPr lang="es-ES" sz="1200" dirty="0" err="1" smtClean="0">
+                <a:solidFill>
+                  <a:schemeClr val="tx1"/>
+                </a:solidFill>
+              </a:rPr>
+              <a:t>for</a:t>
+            </a:r>
+            <a:r>
+              <a:rPr lang="es-ES" sz="1200" dirty="0" smtClean="0">
+                <a:solidFill>
+                  <a:schemeClr val="tx1"/>
+                </a:solidFill>
+              </a:rPr>
+              <a:t> </a:t>
+            </a:r>
+            <a:r>
+              <a:rPr lang="es-ES" sz="1200" dirty="0" err="1" smtClean="0">
+                <a:solidFill>
+                  <a:schemeClr val="tx1"/>
+                </a:solidFill>
+              </a:rPr>
+              <a:t>all</a:t>
+            </a:r>
+            <a:r>
+              <a:rPr lang="es-ES" sz="1200" dirty="0" smtClean="0">
+                <a:solidFill>
+                  <a:schemeClr val="tx1"/>
+                </a:solidFill>
+              </a:rPr>
+              <a:t> cases</a:t>
+            </a:r>
+            <a:endParaRPr lang="en-US" sz="1200" dirty="0">
+              <a:solidFill>
+                <a:schemeClr val="tx1"/>
+              </a:solidFill>
+            </a:endParaRPr>
+          </a:p>
+        </p:txBody>
+      </p:sp>
+      <p:sp>
+        <p:nvSpPr>
+          <p:cNvPr id="10" name="Flowchart: Data 9"/>
+          <p:cNvSpPr/>
+          <p:nvPr/>
+        </p:nvSpPr>
+        <p:spPr>
+          <a:xfrm>
+            <a:off x="57153" y="1602222"/>
+            <a:ext cx="2085975" cy="609898"/>
+          </a:xfrm>
+          <a:prstGeom prst="flowChartInputOutput">
+            <a:avLst/>
+          </a:prstGeom>
+          <a:solidFill>
+            <a:schemeClr val="bg1"/>
+          </a:solidFill>
+          <a:ln>
+            <a:solidFill>
+              <a:schemeClr val="tx1"/>
+            </a:solidFill>
+          </a:ln>
+        </p:spPr>
+        <p:style>
+          <a:lnRef idx="2">
+            <a:schemeClr val="accent1">
+              <a:shade val="50000"/>
+            </a:schemeClr>
+          </a:lnRef>
+          <a:fillRef idx="1">
+            <a:schemeClr val="accent1"/>
+          </a:fillRef>
+          <a:effectRef idx="0">
+            <a:schemeClr val="accent1"/>
+          </a:effectRef>
+          <a:fontRef idx="minor">
+            <a:schemeClr val="lt1"/>
+          </a:fontRef>
+        </p:style>
+        <p:txBody>
+          <a:bodyPr rtlCol="0" anchor="ctr"/>
+          <a:lstStyle/>
+          <a:p>
+            <a:pPr algn="ctr"/>
+            <a:r>
+              <a:rPr lang="es-ES" sz="1200" dirty="0" err="1" smtClean="0">
+                <a:solidFill>
+                  <a:schemeClr val="tx1"/>
+                </a:solidFill>
+              </a:rPr>
+              <a:t>Write</a:t>
+            </a:r>
+            <a:r>
+              <a:rPr lang="es-ES" sz="1200" dirty="0" smtClean="0">
+                <a:solidFill>
+                  <a:schemeClr val="tx1"/>
+                </a:solidFill>
+              </a:rPr>
+              <a:t> </a:t>
+            </a:r>
+            <a:r>
+              <a:rPr lang="es-ES" sz="1200" dirty="0" err="1">
+                <a:solidFill>
+                  <a:schemeClr val="tx1"/>
+                </a:solidFill>
+              </a:rPr>
+              <a:t>parametric</a:t>
+            </a:r>
+            <a:r>
+              <a:rPr lang="es-ES" sz="1200" dirty="0">
+                <a:solidFill>
+                  <a:schemeClr val="tx1"/>
+                </a:solidFill>
+              </a:rPr>
+              <a:t> </a:t>
+            </a:r>
+            <a:r>
+              <a:rPr lang="es-ES" sz="1200" dirty="0" err="1">
+                <a:solidFill>
+                  <a:schemeClr val="tx1"/>
+                </a:solidFill>
+              </a:rPr>
+              <a:t>study</a:t>
+            </a:r>
+            <a:r>
+              <a:rPr lang="es-ES" sz="1200" dirty="0">
+                <a:solidFill>
+                  <a:schemeClr val="tx1"/>
+                </a:solidFill>
+              </a:rPr>
+              <a:t> </a:t>
+            </a:r>
+            <a:r>
+              <a:rPr lang="es-ES" sz="1200" dirty="0" err="1">
+                <a:solidFill>
+                  <a:schemeClr val="tx1"/>
+                </a:solidFill>
+              </a:rPr>
+              <a:t>definition</a:t>
+            </a:r>
+            <a:r>
+              <a:rPr lang="es-ES" sz="1200" dirty="0">
+                <a:solidFill>
+                  <a:schemeClr val="tx1"/>
+                </a:solidFill>
+              </a:rPr>
+              <a:t> </a:t>
+            </a:r>
+            <a:r>
+              <a:rPr lang="es-ES" sz="1200" dirty="0" err="1">
+                <a:solidFill>
+                  <a:schemeClr val="tx1"/>
+                </a:solidFill>
+              </a:rPr>
+              <a:t>to</a:t>
+            </a:r>
+            <a:r>
+              <a:rPr lang="es-ES" sz="1200" dirty="0">
+                <a:solidFill>
+                  <a:schemeClr val="tx1"/>
+                </a:solidFill>
+              </a:rPr>
+              <a:t> .</a:t>
+            </a:r>
+            <a:r>
+              <a:rPr lang="es-ES" sz="1200" dirty="0" err="1">
+                <a:solidFill>
+                  <a:schemeClr val="tx1"/>
+                </a:solidFill>
+              </a:rPr>
+              <a:t>txt</a:t>
+            </a:r>
+            <a:r>
+              <a:rPr lang="es-ES" sz="1200" dirty="0">
+                <a:solidFill>
+                  <a:schemeClr val="tx1"/>
+                </a:solidFill>
+              </a:rPr>
+              <a:t> file</a:t>
+            </a:r>
+            <a:endParaRPr lang="en-US" sz="1200" dirty="0">
+              <a:solidFill>
+                <a:schemeClr val="tx1"/>
+              </a:solidFill>
+            </a:endParaRPr>
+          </a:p>
+        </p:txBody>
+      </p:sp>
+      <p:sp>
+        <p:nvSpPr>
+          <p:cNvPr id="16" name="Flowchart: Data 15"/>
+          <p:cNvSpPr/>
+          <p:nvPr/>
+        </p:nvSpPr>
+        <p:spPr>
+          <a:xfrm>
+            <a:off x="2143127" y="2731236"/>
+            <a:ext cx="1905000" cy="457200"/>
+          </a:xfrm>
+          <a:prstGeom prst="flowChartInputOutput">
+            <a:avLst/>
+          </a:prstGeom>
+          <a:solidFill>
+            <a:schemeClr val="bg1"/>
+          </a:solidFill>
+          <a:ln>
+            <a:solidFill>
+              <a:schemeClr val="tx1"/>
+            </a:solidFill>
+          </a:ln>
+        </p:spPr>
+        <p:style>
+          <a:lnRef idx="2">
+            <a:schemeClr val="accent1">
+              <a:shade val="50000"/>
+            </a:schemeClr>
+          </a:lnRef>
+          <a:fillRef idx="1">
+            <a:schemeClr val="accent1"/>
+          </a:fillRef>
+          <a:effectRef idx="0">
+            <a:schemeClr val="accent1"/>
+          </a:effectRef>
+          <a:fontRef idx="minor">
+            <a:schemeClr val="lt1"/>
+          </a:fontRef>
+        </p:style>
+        <p:txBody>
+          <a:bodyPr rtlCol="0" anchor="ctr"/>
+          <a:lstStyle/>
+          <a:p>
+            <a:pPr algn="ctr"/>
+            <a:r>
+              <a:rPr lang="es-ES" sz="1200" dirty="0" err="1" smtClean="0">
+                <a:solidFill>
+                  <a:schemeClr val="tx1"/>
+                </a:solidFill>
+              </a:rPr>
+              <a:t>Write</a:t>
+            </a:r>
+            <a:r>
+              <a:rPr lang="es-ES" sz="1200" dirty="0" smtClean="0">
+                <a:solidFill>
+                  <a:schemeClr val="tx1"/>
+                </a:solidFill>
+              </a:rPr>
+              <a:t> </a:t>
+            </a:r>
+            <a:r>
+              <a:rPr lang="es-ES" sz="1200" dirty="0" err="1" smtClean="0">
+                <a:solidFill>
+                  <a:schemeClr val="tx1"/>
+                </a:solidFill>
+              </a:rPr>
+              <a:t>Abaqus</a:t>
+            </a:r>
+            <a:r>
+              <a:rPr lang="es-ES" sz="1200" dirty="0" smtClean="0">
+                <a:solidFill>
+                  <a:schemeClr val="tx1"/>
+                </a:solidFill>
+              </a:rPr>
+              <a:t> input </a:t>
+            </a:r>
+            <a:r>
+              <a:rPr lang="es-ES" sz="1200" dirty="0" err="1" smtClean="0">
+                <a:solidFill>
+                  <a:schemeClr val="tx1"/>
+                </a:solidFill>
+              </a:rPr>
+              <a:t>to</a:t>
+            </a:r>
+            <a:r>
+              <a:rPr lang="es-ES" sz="1200" dirty="0" smtClean="0">
+                <a:solidFill>
+                  <a:schemeClr val="tx1"/>
+                </a:solidFill>
+              </a:rPr>
+              <a:t> .</a:t>
+            </a:r>
+            <a:r>
+              <a:rPr lang="es-ES" sz="1200" dirty="0" err="1" smtClean="0">
+                <a:solidFill>
+                  <a:schemeClr val="tx1"/>
+                </a:solidFill>
+              </a:rPr>
+              <a:t>txt</a:t>
+            </a:r>
+            <a:r>
+              <a:rPr lang="es-ES" sz="1200" dirty="0" smtClean="0">
+                <a:solidFill>
+                  <a:schemeClr val="tx1"/>
+                </a:solidFill>
+              </a:rPr>
+              <a:t> file</a:t>
+            </a:r>
+            <a:endParaRPr lang="en-US" sz="1200" dirty="0">
+              <a:solidFill>
+                <a:schemeClr val="tx1"/>
+              </a:solidFill>
+            </a:endParaRPr>
+          </a:p>
+        </p:txBody>
+      </p:sp>
+      <p:sp>
+        <p:nvSpPr>
+          <p:cNvPr id="23" name="Flowchart: Process 22"/>
+          <p:cNvSpPr/>
+          <p:nvPr/>
+        </p:nvSpPr>
+        <p:spPr>
+          <a:xfrm>
+            <a:off x="2247901" y="3386082"/>
+            <a:ext cx="1695451" cy="423862"/>
+          </a:xfrm>
+          <a:prstGeom prst="flowChartProcess">
+            <a:avLst/>
+          </a:prstGeom>
+          <a:solidFill>
+            <a:schemeClr val="bg1"/>
+          </a:solidFill>
+          <a:ln>
+            <a:solidFill>
+              <a:schemeClr val="tx1"/>
+            </a:solidFill>
+          </a:ln>
+        </p:spPr>
+        <p:style>
+          <a:lnRef idx="2">
+            <a:schemeClr val="accent1">
+              <a:shade val="50000"/>
+            </a:schemeClr>
+          </a:lnRef>
+          <a:fillRef idx="1">
+            <a:schemeClr val="accent1"/>
+          </a:fillRef>
+          <a:effectRef idx="0">
+            <a:schemeClr val="accent1"/>
+          </a:effectRef>
+          <a:fontRef idx="minor">
+            <a:schemeClr val="lt1"/>
+          </a:fontRef>
+        </p:style>
+        <p:txBody>
+          <a:bodyPr rtlCol="0" anchor="ctr"/>
+          <a:lstStyle/>
+          <a:p>
+            <a:pPr algn="ctr"/>
+            <a:r>
+              <a:rPr lang="es-ES" sz="1200" dirty="0" err="1" smtClean="0">
+                <a:solidFill>
+                  <a:schemeClr val="tx1"/>
+                </a:solidFill>
+              </a:rPr>
+              <a:t>Execute</a:t>
+            </a:r>
+            <a:r>
+              <a:rPr lang="es-ES" sz="1200" dirty="0" smtClean="0">
+                <a:solidFill>
+                  <a:schemeClr val="tx1"/>
+                </a:solidFill>
+              </a:rPr>
+              <a:t> </a:t>
+            </a:r>
+            <a:r>
+              <a:rPr lang="es-ES" sz="1200" dirty="0" err="1" smtClean="0">
+                <a:solidFill>
+                  <a:schemeClr val="tx1"/>
+                </a:solidFill>
+              </a:rPr>
+              <a:t>nonlinear</a:t>
+            </a:r>
+            <a:r>
+              <a:rPr lang="es-ES" sz="1200" dirty="0" smtClean="0">
+                <a:solidFill>
+                  <a:schemeClr val="tx1"/>
+                </a:solidFill>
+              </a:rPr>
+              <a:t> </a:t>
+            </a:r>
+            <a:r>
+              <a:rPr lang="es-ES" sz="1200" dirty="0" err="1" smtClean="0">
+                <a:solidFill>
+                  <a:schemeClr val="tx1"/>
+                </a:solidFill>
+              </a:rPr>
+              <a:t>Abaqus</a:t>
+            </a:r>
+            <a:r>
+              <a:rPr lang="es-ES" sz="1200" dirty="0" smtClean="0">
+                <a:solidFill>
+                  <a:schemeClr val="tx1"/>
+                </a:solidFill>
+              </a:rPr>
+              <a:t> </a:t>
+            </a:r>
+            <a:r>
+              <a:rPr lang="es-ES" sz="1200" dirty="0" err="1" smtClean="0">
+                <a:solidFill>
+                  <a:schemeClr val="tx1"/>
+                </a:solidFill>
+              </a:rPr>
+              <a:t>simulation</a:t>
+            </a:r>
+            <a:endParaRPr lang="en-US" sz="1200" dirty="0">
+              <a:solidFill>
+                <a:schemeClr val="tx1"/>
+              </a:solidFill>
+            </a:endParaRPr>
+          </a:p>
+        </p:txBody>
+      </p:sp>
+      <p:sp>
+        <p:nvSpPr>
+          <p:cNvPr id="24" name="Flowchart: Terminator 23"/>
+          <p:cNvSpPr/>
+          <p:nvPr/>
+        </p:nvSpPr>
+        <p:spPr>
+          <a:xfrm>
+            <a:off x="6210301" y="1161274"/>
+            <a:ext cx="1123951" cy="241100"/>
+          </a:xfrm>
+          <a:prstGeom prst="flowChartTerminator">
+            <a:avLst/>
+          </a:prstGeom>
+          <a:solidFill>
+            <a:schemeClr val="bg1"/>
+          </a:solidFill>
+          <a:ln>
+            <a:solidFill>
+              <a:schemeClr val="tx1"/>
+            </a:solidFill>
+          </a:ln>
+        </p:spPr>
+        <p:style>
+          <a:lnRef idx="2">
+            <a:schemeClr val="accent1">
+              <a:shade val="50000"/>
+            </a:schemeClr>
+          </a:lnRef>
+          <a:fillRef idx="1">
+            <a:schemeClr val="accent1"/>
+          </a:fillRef>
+          <a:effectRef idx="0">
+            <a:schemeClr val="accent1"/>
+          </a:effectRef>
+          <a:fontRef idx="minor">
+            <a:schemeClr val="lt1"/>
+          </a:fontRef>
+        </p:style>
+        <p:txBody>
+          <a:bodyPr rtlCol="0" anchor="ctr"/>
+          <a:lstStyle/>
+          <a:p>
+            <a:pPr algn="ctr"/>
+            <a:r>
+              <a:rPr lang="es-ES" sz="1200" dirty="0" err="1">
+                <a:solidFill>
+                  <a:schemeClr val="tx1"/>
+                </a:solidFill>
+              </a:rPr>
+              <a:t>Start</a:t>
+            </a:r>
+            <a:endParaRPr lang="en-US" sz="1200" dirty="0">
+              <a:solidFill>
+                <a:schemeClr val="tx1"/>
+              </a:solidFill>
+            </a:endParaRPr>
+          </a:p>
+        </p:txBody>
+      </p:sp>
+      <p:sp>
+        <p:nvSpPr>
+          <p:cNvPr id="29" name="Flowchart: Data 28"/>
+          <p:cNvSpPr/>
+          <p:nvPr/>
+        </p:nvSpPr>
+        <p:spPr>
+          <a:xfrm>
+            <a:off x="5667375" y="1637092"/>
+            <a:ext cx="2209800" cy="720932"/>
+          </a:xfrm>
+          <a:prstGeom prst="flowChartInputOutput">
+            <a:avLst/>
+          </a:prstGeom>
+          <a:solidFill>
+            <a:schemeClr val="bg1"/>
+          </a:solidFill>
+          <a:ln>
+            <a:solidFill>
+              <a:schemeClr val="tx1"/>
+            </a:solidFill>
+          </a:ln>
+        </p:spPr>
+        <p:style>
+          <a:lnRef idx="2">
+            <a:schemeClr val="accent1">
+              <a:shade val="50000"/>
+            </a:schemeClr>
+          </a:lnRef>
+          <a:fillRef idx="1">
+            <a:schemeClr val="accent1"/>
+          </a:fillRef>
+          <a:effectRef idx="0">
+            <a:schemeClr val="accent1"/>
+          </a:effectRef>
+          <a:fontRef idx="minor">
+            <a:schemeClr val="lt1"/>
+          </a:fontRef>
+        </p:style>
+        <p:txBody>
+          <a:bodyPr rtlCol="0" anchor="ctr"/>
+          <a:lstStyle/>
+          <a:p>
+            <a:pPr algn="ctr"/>
+            <a:r>
+              <a:rPr lang="es-ES" sz="1200" dirty="0" err="1">
+                <a:solidFill>
+                  <a:schemeClr val="tx1"/>
+                </a:solidFill>
+              </a:rPr>
+              <a:t>R</a:t>
+            </a:r>
+            <a:r>
+              <a:rPr lang="es-ES" sz="1200" dirty="0" err="1" smtClean="0">
+                <a:solidFill>
+                  <a:schemeClr val="tx1"/>
+                </a:solidFill>
+              </a:rPr>
+              <a:t>ead</a:t>
+            </a:r>
+            <a:r>
+              <a:rPr lang="es-ES" sz="1200" dirty="0" smtClean="0">
+                <a:solidFill>
+                  <a:schemeClr val="tx1"/>
+                </a:solidFill>
+              </a:rPr>
+              <a:t> </a:t>
+            </a:r>
+            <a:r>
+              <a:rPr lang="es-ES" sz="1200" dirty="0" err="1" smtClean="0">
+                <a:solidFill>
+                  <a:schemeClr val="tx1"/>
+                </a:solidFill>
+              </a:rPr>
+              <a:t>model</a:t>
+            </a:r>
+            <a:r>
+              <a:rPr lang="es-ES" sz="1200" dirty="0" smtClean="0">
+                <a:solidFill>
+                  <a:schemeClr val="tx1"/>
+                </a:solidFill>
+              </a:rPr>
+              <a:t> </a:t>
+            </a:r>
+            <a:r>
+              <a:rPr lang="es-ES" sz="1200" dirty="0" err="1" smtClean="0">
+                <a:solidFill>
+                  <a:schemeClr val="tx1"/>
+                </a:solidFill>
+              </a:rPr>
+              <a:t>parameters</a:t>
+            </a:r>
+            <a:r>
+              <a:rPr lang="es-ES" sz="1200" dirty="0" smtClean="0">
+                <a:solidFill>
+                  <a:schemeClr val="tx1"/>
+                </a:solidFill>
+              </a:rPr>
+              <a:t> </a:t>
+            </a:r>
+            <a:r>
+              <a:rPr lang="es-ES" sz="1200" dirty="0" err="1" smtClean="0">
+                <a:solidFill>
+                  <a:schemeClr val="tx1"/>
+                </a:solidFill>
+              </a:rPr>
+              <a:t>from</a:t>
+            </a:r>
+            <a:r>
+              <a:rPr lang="es-ES" sz="1200" dirty="0" smtClean="0">
+                <a:solidFill>
+                  <a:schemeClr val="tx1"/>
+                </a:solidFill>
+              </a:rPr>
+              <a:t> .</a:t>
+            </a:r>
+            <a:r>
+              <a:rPr lang="es-ES" sz="1200" dirty="0" err="1" smtClean="0">
+                <a:solidFill>
+                  <a:schemeClr val="tx1"/>
+                </a:solidFill>
+              </a:rPr>
+              <a:t>txt</a:t>
+            </a:r>
+            <a:r>
+              <a:rPr lang="es-ES" sz="1200" dirty="0" smtClean="0">
+                <a:solidFill>
+                  <a:schemeClr val="tx1"/>
+                </a:solidFill>
+              </a:rPr>
+              <a:t> file</a:t>
+            </a:r>
+            <a:endParaRPr lang="en-US" sz="1200" dirty="0">
+              <a:solidFill>
+                <a:schemeClr val="tx1"/>
+              </a:solidFill>
+            </a:endParaRPr>
+          </a:p>
+        </p:txBody>
+      </p:sp>
+      <p:sp>
+        <p:nvSpPr>
+          <p:cNvPr id="32" name="Flowchart: Process 31"/>
+          <p:cNvSpPr/>
+          <p:nvPr/>
+        </p:nvSpPr>
+        <p:spPr>
+          <a:xfrm>
+            <a:off x="6048375" y="3202178"/>
+            <a:ext cx="1447800" cy="352425"/>
+          </a:xfrm>
+          <a:prstGeom prst="flowChartProcess">
+            <a:avLst/>
+          </a:prstGeom>
+          <a:solidFill>
+            <a:schemeClr val="bg1"/>
+          </a:solidFill>
+          <a:ln>
+            <a:solidFill>
+              <a:schemeClr val="tx1"/>
+            </a:solidFill>
+          </a:ln>
+        </p:spPr>
+        <p:style>
+          <a:lnRef idx="2">
+            <a:schemeClr val="accent1">
+              <a:shade val="50000"/>
+            </a:schemeClr>
+          </a:lnRef>
+          <a:fillRef idx="1">
+            <a:schemeClr val="accent1"/>
+          </a:fillRef>
+          <a:effectRef idx="0">
+            <a:schemeClr val="accent1"/>
+          </a:effectRef>
+          <a:fontRef idx="minor">
+            <a:schemeClr val="lt1"/>
+          </a:fontRef>
+        </p:style>
+        <p:txBody>
+          <a:bodyPr rtlCol="0" anchor="ctr"/>
+          <a:lstStyle/>
+          <a:p>
+            <a:pPr algn="ctr"/>
+            <a:r>
+              <a:rPr lang="es-ES" sz="1200" dirty="0" err="1" smtClean="0">
+                <a:solidFill>
+                  <a:schemeClr val="tx1"/>
+                </a:solidFill>
+              </a:rPr>
+              <a:t>Submit</a:t>
+            </a:r>
+            <a:r>
+              <a:rPr lang="es-ES" sz="1200" dirty="0" smtClean="0">
+                <a:solidFill>
+                  <a:schemeClr val="tx1"/>
+                </a:solidFill>
+              </a:rPr>
+              <a:t> </a:t>
+            </a:r>
+            <a:r>
+              <a:rPr lang="es-ES" sz="1200" dirty="0" err="1" smtClean="0">
+                <a:solidFill>
+                  <a:schemeClr val="tx1"/>
+                </a:solidFill>
+              </a:rPr>
+              <a:t>job</a:t>
+            </a:r>
+            <a:endParaRPr lang="en-US" sz="1200" dirty="0">
+              <a:solidFill>
+                <a:schemeClr val="tx1"/>
+              </a:solidFill>
+            </a:endParaRPr>
+          </a:p>
+        </p:txBody>
+      </p:sp>
+      <p:sp>
+        <p:nvSpPr>
+          <p:cNvPr id="33" name="Flowchart: Decision 32"/>
+          <p:cNvSpPr/>
+          <p:nvPr/>
+        </p:nvSpPr>
+        <p:spPr>
+          <a:xfrm>
+            <a:off x="5743575" y="3744511"/>
+            <a:ext cx="2057400" cy="815576"/>
+          </a:xfrm>
+          <a:prstGeom prst="flowChartDecision">
+            <a:avLst/>
+          </a:prstGeom>
+          <a:solidFill>
+            <a:schemeClr val="bg1"/>
+          </a:solidFill>
+          <a:ln>
+            <a:solidFill>
+              <a:schemeClr val="tx1"/>
+            </a:solidFill>
+          </a:ln>
+        </p:spPr>
+        <p:style>
+          <a:lnRef idx="2">
+            <a:schemeClr val="accent1">
+              <a:shade val="50000"/>
+            </a:schemeClr>
+          </a:lnRef>
+          <a:fillRef idx="1">
+            <a:schemeClr val="accent1"/>
+          </a:fillRef>
+          <a:effectRef idx="0">
+            <a:schemeClr val="accent1"/>
+          </a:effectRef>
+          <a:fontRef idx="minor">
+            <a:schemeClr val="lt1"/>
+          </a:fontRef>
+        </p:style>
+        <p:txBody>
+          <a:bodyPr rtlCol="0" anchor="ctr"/>
+          <a:lstStyle/>
+          <a:p>
+            <a:pPr algn="ctr"/>
+            <a:r>
+              <a:rPr lang="es-ES" sz="1200" dirty="0" err="1" smtClean="0">
+                <a:solidFill>
+                  <a:schemeClr val="tx1"/>
+                </a:solidFill>
+              </a:rPr>
+              <a:t>Simulation</a:t>
+            </a:r>
+            <a:r>
+              <a:rPr lang="es-ES" sz="1200" dirty="0" smtClean="0">
+                <a:solidFill>
+                  <a:schemeClr val="tx1"/>
+                </a:solidFill>
+              </a:rPr>
+              <a:t> converged?</a:t>
+            </a:r>
+            <a:endParaRPr lang="en-US" sz="1200" dirty="0">
+              <a:solidFill>
+                <a:schemeClr val="tx1"/>
+              </a:solidFill>
+            </a:endParaRPr>
+          </a:p>
+        </p:txBody>
+      </p:sp>
+      <p:sp>
+        <p:nvSpPr>
+          <p:cNvPr id="34" name="Flowchart: Terminator 33"/>
+          <p:cNvSpPr/>
+          <p:nvPr/>
+        </p:nvSpPr>
+        <p:spPr>
+          <a:xfrm>
+            <a:off x="7715251" y="4560086"/>
+            <a:ext cx="1181100" cy="392915"/>
+          </a:xfrm>
+          <a:prstGeom prst="flowChartTerminator">
+            <a:avLst/>
+          </a:prstGeom>
+          <a:solidFill>
+            <a:schemeClr val="bg1"/>
+          </a:solidFill>
+          <a:ln>
+            <a:solidFill>
+              <a:schemeClr val="tx1"/>
+            </a:solidFill>
+          </a:ln>
+        </p:spPr>
+        <p:style>
+          <a:lnRef idx="2">
+            <a:schemeClr val="accent1">
+              <a:shade val="50000"/>
+            </a:schemeClr>
+          </a:lnRef>
+          <a:fillRef idx="1">
+            <a:schemeClr val="accent1"/>
+          </a:fillRef>
+          <a:effectRef idx="0">
+            <a:schemeClr val="accent1"/>
+          </a:effectRef>
+          <a:fontRef idx="minor">
+            <a:schemeClr val="lt1"/>
+          </a:fontRef>
+        </p:style>
+        <p:txBody>
+          <a:bodyPr rtlCol="0" anchor="ctr"/>
+          <a:lstStyle/>
+          <a:p>
+            <a:pPr algn="ctr"/>
+            <a:r>
+              <a:rPr lang="es-ES" sz="1200" dirty="0" err="1" smtClean="0">
+                <a:solidFill>
+                  <a:schemeClr val="tx1"/>
+                </a:solidFill>
+              </a:rPr>
+              <a:t>Terminate</a:t>
+            </a:r>
+            <a:r>
+              <a:rPr lang="es-ES" sz="1200" dirty="0" smtClean="0">
+                <a:solidFill>
+                  <a:schemeClr val="tx1"/>
+                </a:solidFill>
+              </a:rPr>
+              <a:t> </a:t>
+            </a:r>
+            <a:r>
+              <a:rPr lang="es-ES" sz="1200" dirty="0" err="1" smtClean="0">
+                <a:solidFill>
+                  <a:schemeClr val="tx1"/>
+                </a:solidFill>
+              </a:rPr>
+              <a:t>execution</a:t>
+            </a:r>
+            <a:endParaRPr lang="en-US" sz="1200" dirty="0">
+              <a:solidFill>
+                <a:schemeClr val="tx1"/>
+              </a:solidFill>
+            </a:endParaRPr>
+          </a:p>
+        </p:txBody>
+      </p:sp>
+      <p:sp>
+        <p:nvSpPr>
+          <p:cNvPr id="40" name="TextBox 39"/>
+          <p:cNvSpPr txBox="1"/>
+          <p:nvPr/>
+        </p:nvSpPr>
+        <p:spPr>
+          <a:xfrm>
+            <a:off x="7829551" y="3888494"/>
+            <a:ext cx="457200" cy="246221"/>
+          </a:xfrm>
+          <a:prstGeom prst="rect">
+            <a:avLst/>
+          </a:prstGeom>
+          <a:noFill/>
+        </p:spPr>
+        <p:txBody>
+          <a:bodyPr wrap="square" rtlCol="0">
+            <a:spAutoFit/>
+          </a:bodyPr>
+          <a:lstStyle/>
+          <a:p>
+            <a:r>
+              <a:rPr lang="es-ES" sz="1000" dirty="0" smtClean="0"/>
+              <a:t>No</a:t>
+            </a:r>
+            <a:endParaRPr lang="en-US" sz="1000" dirty="0"/>
+          </a:p>
+        </p:txBody>
+      </p:sp>
+      <p:sp>
+        <p:nvSpPr>
+          <p:cNvPr id="41" name="Flowchart: Predefined Process 40"/>
+          <p:cNvSpPr/>
+          <p:nvPr/>
+        </p:nvSpPr>
+        <p:spPr>
+          <a:xfrm>
+            <a:off x="6048375" y="5116703"/>
+            <a:ext cx="1447800" cy="352425"/>
+          </a:xfrm>
+          <a:prstGeom prst="flowChartPredefinedProcess">
+            <a:avLst/>
+          </a:prstGeom>
+          <a:solidFill>
+            <a:schemeClr val="bg1"/>
+          </a:solidFill>
+          <a:ln>
+            <a:solidFill>
+              <a:schemeClr val="tx1"/>
+            </a:solidFill>
+          </a:ln>
+        </p:spPr>
+        <p:style>
+          <a:lnRef idx="2">
+            <a:schemeClr val="accent1">
+              <a:shade val="50000"/>
+            </a:schemeClr>
+          </a:lnRef>
+          <a:fillRef idx="1">
+            <a:schemeClr val="accent1"/>
+          </a:fillRef>
+          <a:effectRef idx="0">
+            <a:schemeClr val="accent1"/>
+          </a:effectRef>
+          <a:fontRef idx="minor">
+            <a:schemeClr val="lt1"/>
+          </a:fontRef>
+        </p:style>
+        <p:txBody>
+          <a:bodyPr rtlCol="0" anchor="ctr"/>
+          <a:lstStyle/>
+          <a:p>
+            <a:pPr algn="ctr"/>
+            <a:r>
+              <a:rPr lang="es-ES" sz="1200" dirty="0" err="1" smtClean="0">
+                <a:solidFill>
+                  <a:schemeClr val="tx1"/>
+                </a:solidFill>
+              </a:rPr>
+              <a:t>Run</a:t>
+            </a:r>
+            <a:r>
+              <a:rPr lang="es-ES" sz="1200" dirty="0" smtClean="0">
+                <a:solidFill>
+                  <a:schemeClr val="tx1"/>
+                </a:solidFill>
+              </a:rPr>
+              <a:t> post-</a:t>
+            </a:r>
+            <a:r>
+              <a:rPr lang="es-ES" sz="1200" dirty="0" err="1" smtClean="0">
+                <a:solidFill>
+                  <a:schemeClr val="tx1"/>
+                </a:solidFill>
+              </a:rPr>
+              <a:t>processing</a:t>
+            </a:r>
+            <a:endParaRPr lang="en-US" sz="1200" dirty="0">
+              <a:solidFill>
+                <a:schemeClr val="tx1"/>
+              </a:solidFill>
+            </a:endParaRPr>
+          </a:p>
+        </p:txBody>
+      </p:sp>
+      <p:sp>
+        <p:nvSpPr>
+          <p:cNvPr id="43" name="Flowchart: Data 42"/>
+          <p:cNvSpPr/>
+          <p:nvPr/>
+        </p:nvSpPr>
+        <p:spPr>
+          <a:xfrm>
+            <a:off x="7696202" y="5650104"/>
+            <a:ext cx="1323975" cy="642937"/>
+          </a:xfrm>
+          <a:prstGeom prst="flowChartInputOutput">
+            <a:avLst/>
+          </a:prstGeom>
+          <a:solidFill>
+            <a:schemeClr val="bg1"/>
+          </a:solidFill>
+          <a:ln>
+            <a:solidFill>
+              <a:schemeClr val="tx1"/>
+            </a:solidFill>
+          </a:ln>
+        </p:spPr>
+        <p:style>
+          <a:lnRef idx="2">
+            <a:schemeClr val="accent1">
+              <a:shade val="50000"/>
+            </a:schemeClr>
+          </a:lnRef>
+          <a:fillRef idx="1">
+            <a:schemeClr val="accent1"/>
+          </a:fillRef>
+          <a:effectRef idx="0">
+            <a:schemeClr val="accent1"/>
+          </a:effectRef>
+          <a:fontRef idx="minor">
+            <a:schemeClr val="lt1"/>
+          </a:fontRef>
+        </p:style>
+        <p:txBody>
+          <a:bodyPr rtlCol="0" anchor="ctr"/>
+          <a:lstStyle/>
+          <a:p>
+            <a:pPr algn="ctr"/>
+            <a:r>
+              <a:rPr lang="es-ES" sz="1200" dirty="0" err="1" smtClean="0">
+                <a:solidFill>
+                  <a:schemeClr val="tx1"/>
+                </a:solidFill>
+              </a:rPr>
+              <a:t>Write</a:t>
+            </a:r>
+            <a:r>
+              <a:rPr lang="es-ES" sz="1200" dirty="0" smtClean="0">
+                <a:solidFill>
+                  <a:schemeClr val="tx1"/>
+                </a:solidFill>
+              </a:rPr>
+              <a:t> output files</a:t>
+            </a:r>
+            <a:endParaRPr lang="en-US" sz="1200" dirty="0">
+              <a:solidFill>
+                <a:schemeClr val="tx1"/>
+              </a:solidFill>
+            </a:endParaRPr>
+          </a:p>
+        </p:txBody>
+      </p:sp>
+      <p:sp>
+        <p:nvSpPr>
+          <p:cNvPr id="64" name="TextBox 63"/>
+          <p:cNvSpPr txBox="1"/>
+          <p:nvPr/>
+        </p:nvSpPr>
+        <p:spPr>
+          <a:xfrm>
+            <a:off x="6781800" y="4666289"/>
+            <a:ext cx="457200" cy="246221"/>
+          </a:xfrm>
+          <a:prstGeom prst="rect">
+            <a:avLst/>
+          </a:prstGeom>
+          <a:noFill/>
+        </p:spPr>
+        <p:txBody>
+          <a:bodyPr wrap="square" rtlCol="0">
+            <a:spAutoFit/>
+          </a:bodyPr>
+          <a:lstStyle/>
+          <a:p>
+            <a:r>
+              <a:rPr lang="es-ES" sz="1000" dirty="0" smtClean="0"/>
+              <a:t>Yes</a:t>
+            </a:r>
+            <a:endParaRPr lang="en-US" sz="1000" dirty="0"/>
+          </a:p>
+        </p:txBody>
+      </p:sp>
+      <p:sp>
+        <p:nvSpPr>
+          <p:cNvPr id="66" name="Flowchart: Process 65"/>
+          <p:cNvSpPr/>
+          <p:nvPr/>
+        </p:nvSpPr>
+        <p:spPr>
+          <a:xfrm>
+            <a:off x="2247900" y="4221650"/>
+            <a:ext cx="1695451" cy="444640"/>
+          </a:xfrm>
+          <a:prstGeom prst="flowChartProcess">
+            <a:avLst/>
+          </a:prstGeom>
+          <a:solidFill>
+            <a:schemeClr val="bg1"/>
+          </a:solidFill>
+          <a:ln>
+            <a:solidFill>
+              <a:schemeClr val="tx1"/>
+            </a:solidFill>
+          </a:ln>
+        </p:spPr>
+        <p:style>
+          <a:lnRef idx="2">
+            <a:schemeClr val="accent1">
+              <a:shade val="50000"/>
+            </a:schemeClr>
+          </a:lnRef>
+          <a:fillRef idx="1">
+            <a:schemeClr val="accent1"/>
+          </a:fillRef>
+          <a:effectRef idx="0">
+            <a:schemeClr val="accent1"/>
+          </a:effectRef>
+          <a:fontRef idx="minor">
+            <a:schemeClr val="lt1"/>
+          </a:fontRef>
+        </p:style>
+        <p:txBody>
+          <a:bodyPr rtlCol="0" anchor="ctr"/>
+          <a:lstStyle/>
+          <a:p>
+            <a:pPr algn="ctr"/>
+            <a:r>
+              <a:rPr lang="es-ES" sz="1200" dirty="0" err="1" smtClean="0">
+                <a:solidFill>
+                  <a:schemeClr val="tx1"/>
+                </a:solidFill>
+              </a:rPr>
+              <a:t>Move</a:t>
+            </a:r>
+            <a:r>
+              <a:rPr lang="es-ES" sz="1200" dirty="0" smtClean="0">
+                <a:solidFill>
+                  <a:schemeClr val="tx1"/>
+                </a:solidFill>
+              </a:rPr>
+              <a:t> input </a:t>
+            </a:r>
+            <a:r>
+              <a:rPr lang="es-ES" sz="1200" dirty="0" err="1" smtClean="0">
+                <a:solidFill>
+                  <a:schemeClr val="tx1"/>
+                </a:solidFill>
+              </a:rPr>
+              <a:t>to</a:t>
+            </a:r>
+            <a:r>
+              <a:rPr lang="es-ES" sz="1200" dirty="0" smtClean="0">
+                <a:solidFill>
+                  <a:schemeClr val="tx1"/>
+                </a:solidFill>
+              </a:rPr>
+              <a:t> </a:t>
+            </a:r>
+            <a:r>
+              <a:rPr lang="es-ES" sz="1200" dirty="0" err="1" smtClean="0">
+                <a:solidFill>
+                  <a:schemeClr val="tx1"/>
+                </a:solidFill>
+              </a:rPr>
+              <a:t>postProc</a:t>
+            </a:r>
+            <a:r>
+              <a:rPr lang="es-ES" sz="1200" dirty="0" smtClean="0">
+                <a:solidFill>
+                  <a:schemeClr val="tx1"/>
+                </a:solidFill>
+              </a:rPr>
+              <a:t> folder</a:t>
+            </a:r>
+            <a:endParaRPr lang="en-US" sz="1200" dirty="0">
+              <a:solidFill>
+                <a:schemeClr val="tx1"/>
+              </a:solidFill>
+            </a:endParaRPr>
+          </a:p>
+        </p:txBody>
+      </p:sp>
+      <p:sp>
+        <p:nvSpPr>
+          <p:cNvPr id="68" name="Flowchart: Process 67"/>
+          <p:cNvSpPr/>
+          <p:nvPr/>
+        </p:nvSpPr>
+        <p:spPr>
+          <a:xfrm>
+            <a:off x="6019801" y="5709032"/>
+            <a:ext cx="1504951" cy="457200"/>
+          </a:xfrm>
+          <a:prstGeom prst="flowChartProcess">
+            <a:avLst/>
+          </a:prstGeom>
+          <a:solidFill>
+            <a:schemeClr val="bg1"/>
+          </a:solidFill>
+          <a:ln>
+            <a:solidFill>
+              <a:schemeClr val="tx1"/>
+            </a:solidFill>
+          </a:ln>
+        </p:spPr>
+        <p:style>
+          <a:lnRef idx="2">
+            <a:schemeClr val="accent1">
+              <a:shade val="50000"/>
+            </a:schemeClr>
+          </a:lnRef>
+          <a:fillRef idx="1">
+            <a:schemeClr val="accent1"/>
+          </a:fillRef>
+          <a:effectRef idx="0">
+            <a:schemeClr val="accent1"/>
+          </a:effectRef>
+          <a:fontRef idx="minor">
+            <a:schemeClr val="lt1"/>
+          </a:fontRef>
+        </p:style>
+        <p:txBody>
+          <a:bodyPr rtlCol="0" anchor="ctr"/>
+          <a:lstStyle/>
+          <a:p>
+            <a:pPr algn="ctr"/>
+            <a:r>
+              <a:rPr lang="es-ES" sz="1200" dirty="0" err="1" smtClean="0">
+                <a:solidFill>
+                  <a:schemeClr val="tx1"/>
+                </a:solidFill>
+              </a:rPr>
+              <a:t>Move</a:t>
+            </a:r>
+            <a:r>
+              <a:rPr lang="es-ES" sz="1200" dirty="0" smtClean="0">
+                <a:solidFill>
+                  <a:schemeClr val="tx1"/>
+                </a:solidFill>
+              </a:rPr>
+              <a:t> output files </a:t>
+            </a:r>
+            <a:r>
+              <a:rPr lang="es-ES" sz="1200" dirty="0" err="1" smtClean="0">
+                <a:solidFill>
+                  <a:schemeClr val="tx1"/>
+                </a:solidFill>
+              </a:rPr>
+              <a:t>to</a:t>
+            </a:r>
+            <a:r>
+              <a:rPr lang="es-ES" sz="1200" dirty="0" smtClean="0">
+                <a:solidFill>
+                  <a:schemeClr val="tx1"/>
+                </a:solidFill>
+              </a:rPr>
+              <a:t> </a:t>
+            </a:r>
+            <a:r>
+              <a:rPr lang="es-ES" sz="1200" dirty="0" err="1" smtClean="0">
+                <a:solidFill>
+                  <a:schemeClr val="tx1"/>
+                </a:solidFill>
+              </a:rPr>
+              <a:t>postProc</a:t>
+            </a:r>
+            <a:r>
+              <a:rPr lang="es-ES" sz="1200" dirty="0" smtClean="0">
+                <a:solidFill>
+                  <a:schemeClr val="tx1"/>
+                </a:solidFill>
+              </a:rPr>
+              <a:t> folder</a:t>
+            </a:r>
+            <a:endParaRPr lang="en-US" sz="1200" dirty="0">
+              <a:solidFill>
+                <a:schemeClr val="tx1"/>
+              </a:solidFill>
+            </a:endParaRPr>
+          </a:p>
+        </p:txBody>
+      </p:sp>
+      <p:sp>
+        <p:nvSpPr>
+          <p:cNvPr id="73" name="Flowchart: Process 72"/>
+          <p:cNvSpPr/>
+          <p:nvPr/>
+        </p:nvSpPr>
+        <p:spPr>
+          <a:xfrm>
+            <a:off x="2247900" y="4797612"/>
+            <a:ext cx="1695451" cy="423862"/>
+          </a:xfrm>
+          <a:prstGeom prst="flowChartProcess">
+            <a:avLst/>
+          </a:prstGeom>
+          <a:solidFill>
+            <a:schemeClr val="bg1"/>
+          </a:solidFill>
+          <a:ln>
+            <a:solidFill>
+              <a:schemeClr val="tx1"/>
+            </a:solidFill>
+          </a:ln>
+        </p:spPr>
+        <p:style>
+          <a:lnRef idx="2">
+            <a:schemeClr val="accent1">
+              <a:shade val="50000"/>
+            </a:schemeClr>
+          </a:lnRef>
+          <a:fillRef idx="1">
+            <a:schemeClr val="accent1"/>
+          </a:fillRef>
+          <a:effectRef idx="0">
+            <a:schemeClr val="accent1"/>
+          </a:effectRef>
+          <a:fontRef idx="minor">
+            <a:schemeClr val="lt1"/>
+          </a:fontRef>
+        </p:style>
+        <p:txBody>
+          <a:bodyPr rtlCol="0" anchor="ctr"/>
+          <a:lstStyle/>
+          <a:p>
+            <a:pPr algn="ctr"/>
+            <a:r>
+              <a:rPr lang="es-ES" sz="1200" dirty="0" err="1" smtClean="0">
+                <a:solidFill>
+                  <a:schemeClr val="tx1"/>
+                </a:solidFill>
+              </a:rPr>
+              <a:t>Execute</a:t>
+            </a:r>
+            <a:r>
+              <a:rPr lang="es-ES" sz="1200" dirty="0" smtClean="0">
+                <a:solidFill>
+                  <a:schemeClr val="tx1"/>
+                </a:solidFill>
+              </a:rPr>
+              <a:t> </a:t>
+            </a:r>
+            <a:r>
+              <a:rPr lang="es-ES" sz="1200" dirty="0" err="1" smtClean="0">
+                <a:solidFill>
+                  <a:schemeClr val="tx1"/>
+                </a:solidFill>
+              </a:rPr>
+              <a:t>nonlinear</a:t>
+            </a:r>
+            <a:r>
+              <a:rPr lang="es-ES" sz="1200" dirty="0" smtClean="0">
+                <a:solidFill>
+                  <a:schemeClr val="tx1"/>
+                </a:solidFill>
+              </a:rPr>
+              <a:t> </a:t>
+            </a:r>
+            <a:r>
+              <a:rPr lang="es-ES" sz="1200" dirty="0" err="1" smtClean="0">
+                <a:solidFill>
+                  <a:schemeClr val="tx1"/>
+                </a:solidFill>
+              </a:rPr>
+              <a:t>Abaqus</a:t>
+            </a:r>
+            <a:r>
+              <a:rPr lang="es-ES" sz="1200" dirty="0" smtClean="0">
+                <a:solidFill>
+                  <a:schemeClr val="tx1"/>
+                </a:solidFill>
+              </a:rPr>
+              <a:t> </a:t>
+            </a:r>
+            <a:r>
+              <a:rPr lang="es-ES" sz="1200" dirty="0" err="1" smtClean="0">
+                <a:solidFill>
+                  <a:schemeClr val="tx1"/>
+                </a:solidFill>
+              </a:rPr>
+              <a:t>simulation</a:t>
+            </a:r>
+            <a:endParaRPr lang="en-US" sz="1200" dirty="0">
+              <a:solidFill>
+                <a:schemeClr val="tx1"/>
+              </a:solidFill>
+            </a:endParaRPr>
+          </a:p>
+        </p:txBody>
+      </p:sp>
+      <p:sp>
+        <p:nvSpPr>
+          <p:cNvPr id="74" name="Flowchart: Process 73"/>
+          <p:cNvSpPr/>
+          <p:nvPr/>
+        </p:nvSpPr>
+        <p:spPr>
+          <a:xfrm>
+            <a:off x="2247900" y="5636445"/>
+            <a:ext cx="1695451" cy="444640"/>
+          </a:xfrm>
+          <a:prstGeom prst="flowChartProcess">
+            <a:avLst/>
+          </a:prstGeom>
+          <a:solidFill>
+            <a:schemeClr val="bg1"/>
+          </a:solidFill>
+          <a:ln>
+            <a:solidFill>
+              <a:schemeClr val="tx1"/>
+            </a:solidFill>
+          </a:ln>
+        </p:spPr>
+        <p:style>
+          <a:lnRef idx="2">
+            <a:schemeClr val="accent1">
+              <a:shade val="50000"/>
+            </a:schemeClr>
+          </a:lnRef>
+          <a:fillRef idx="1">
+            <a:schemeClr val="accent1"/>
+          </a:fillRef>
+          <a:effectRef idx="0">
+            <a:schemeClr val="accent1"/>
+          </a:effectRef>
+          <a:fontRef idx="minor">
+            <a:schemeClr val="lt1"/>
+          </a:fontRef>
+        </p:style>
+        <p:txBody>
+          <a:bodyPr rtlCol="0" anchor="ctr"/>
+          <a:lstStyle/>
+          <a:p>
+            <a:pPr algn="ctr"/>
+            <a:r>
+              <a:rPr lang="es-ES" sz="1200" dirty="0" err="1" smtClean="0">
+                <a:solidFill>
+                  <a:schemeClr val="tx1"/>
+                </a:solidFill>
+              </a:rPr>
+              <a:t>Move</a:t>
+            </a:r>
+            <a:r>
+              <a:rPr lang="es-ES" sz="1200" dirty="0" smtClean="0">
+                <a:solidFill>
+                  <a:schemeClr val="tx1"/>
+                </a:solidFill>
+              </a:rPr>
+              <a:t> input </a:t>
+            </a:r>
+            <a:r>
+              <a:rPr lang="es-ES" sz="1200" dirty="0" err="1" smtClean="0">
+                <a:solidFill>
+                  <a:schemeClr val="tx1"/>
+                </a:solidFill>
+              </a:rPr>
+              <a:t>to</a:t>
+            </a:r>
+            <a:r>
+              <a:rPr lang="es-ES" sz="1200" dirty="0" smtClean="0">
+                <a:solidFill>
+                  <a:schemeClr val="tx1"/>
+                </a:solidFill>
+              </a:rPr>
+              <a:t> </a:t>
+            </a:r>
+            <a:r>
+              <a:rPr lang="es-ES" sz="1200" dirty="0" err="1" smtClean="0">
+                <a:solidFill>
+                  <a:schemeClr val="tx1"/>
+                </a:solidFill>
+              </a:rPr>
+              <a:t>postProc</a:t>
+            </a:r>
+            <a:r>
+              <a:rPr lang="es-ES" sz="1200" dirty="0" smtClean="0">
+                <a:solidFill>
+                  <a:schemeClr val="tx1"/>
+                </a:solidFill>
+              </a:rPr>
+              <a:t> folder</a:t>
+            </a:r>
+            <a:endParaRPr lang="en-US" sz="1200" dirty="0">
+              <a:solidFill>
+                <a:schemeClr val="tx1"/>
+              </a:solidFill>
+            </a:endParaRPr>
+          </a:p>
+        </p:txBody>
+      </p:sp>
+      <p:sp>
+        <p:nvSpPr>
+          <p:cNvPr id="75" name="Flowchart: Connector 74"/>
+          <p:cNvSpPr/>
+          <p:nvPr/>
+        </p:nvSpPr>
+        <p:spPr>
+          <a:xfrm>
+            <a:off x="6657975" y="6469253"/>
+            <a:ext cx="228600" cy="228600"/>
+          </a:xfrm>
+          <a:prstGeom prst="flowChartConnector">
+            <a:avLst/>
+          </a:prstGeom>
+          <a:solidFill>
+            <a:schemeClr val="bg1"/>
+          </a:solidFill>
+          <a:ln>
+            <a:solidFill>
+              <a:schemeClr val="tx1"/>
+            </a:solidFill>
+          </a:ln>
+        </p:spPr>
+        <p:style>
+          <a:lnRef idx="2">
+            <a:schemeClr val="accent1">
+              <a:shade val="50000"/>
+            </a:schemeClr>
+          </a:lnRef>
+          <a:fillRef idx="1">
+            <a:schemeClr val="accent1"/>
+          </a:fillRef>
+          <a:effectRef idx="0">
+            <a:schemeClr val="accent1"/>
+          </a:effectRef>
+          <a:fontRef idx="minor">
+            <a:schemeClr val="lt1"/>
+          </a:fontRef>
+        </p:style>
+        <p:txBody>
+          <a:bodyPr rtlCol="0" anchor="ctr"/>
+          <a:lstStyle/>
+          <a:p>
+            <a:pPr algn="ctr"/>
+            <a:endParaRPr lang="en-US" sz="1200">
+              <a:solidFill>
+                <a:schemeClr val="tx1"/>
+              </a:solidFill>
+            </a:endParaRPr>
+          </a:p>
+        </p:txBody>
+      </p:sp>
+      <p:sp>
+        <p:nvSpPr>
+          <p:cNvPr id="81" name="Flowchart: Connector 80"/>
+          <p:cNvSpPr/>
+          <p:nvPr/>
+        </p:nvSpPr>
+        <p:spPr>
+          <a:xfrm>
+            <a:off x="3000375" y="3907345"/>
+            <a:ext cx="190500" cy="176393"/>
+          </a:xfrm>
+          <a:prstGeom prst="flowChartConnector">
+            <a:avLst/>
+          </a:prstGeom>
+          <a:solidFill>
+            <a:schemeClr val="bg1"/>
+          </a:solidFill>
+          <a:ln>
+            <a:solidFill>
+              <a:schemeClr val="tx1"/>
+            </a:solidFill>
+          </a:ln>
+        </p:spPr>
+        <p:style>
+          <a:lnRef idx="2">
+            <a:schemeClr val="accent1">
+              <a:shade val="50000"/>
+            </a:schemeClr>
+          </a:lnRef>
+          <a:fillRef idx="1">
+            <a:schemeClr val="accent1"/>
+          </a:fillRef>
+          <a:effectRef idx="0">
+            <a:schemeClr val="accent1"/>
+          </a:effectRef>
+          <a:fontRef idx="minor">
+            <a:schemeClr val="lt1"/>
+          </a:fontRef>
+        </p:style>
+        <p:txBody>
+          <a:bodyPr rtlCol="0" anchor="ctr"/>
+          <a:lstStyle/>
+          <a:p>
+            <a:pPr algn="ctr"/>
+            <a:endParaRPr lang="en-US" sz="1200">
+              <a:solidFill>
+                <a:schemeClr val="tx1"/>
+              </a:solidFill>
+            </a:endParaRPr>
+          </a:p>
+        </p:txBody>
+      </p:sp>
+      <p:sp>
+        <p:nvSpPr>
+          <p:cNvPr id="111" name="Flowchart: Terminator 110"/>
+          <p:cNvSpPr/>
+          <p:nvPr/>
+        </p:nvSpPr>
+        <p:spPr>
+          <a:xfrm>
+            <a:off x="2447927" y="6407339"/>
+            <a:ext cx="1295400" cy="352425"/>
+          </a:xfrm>
+          <a:prstGeom prst="flowChartTerminator">
+            <a:avLst/>
+          </a:prstGeom>
+          <a:solidFill>
+            <a:schemeClr val="bg1"/>
+          </a:solidFill>
+          <a:ln>
+            <a:solidFill>
+              <a:schemeClr val="tx1"/>
+            </a:solidFill>
+          </a:ln>
+        </p:spPr>
+        <p:style>
+          <a:lnRef idx="2">
+            <a:schemeClr val="accent1">
+              <a:shade val="50000"/>
+            </a:schemeClr>
+          </a:lnRef>
+          <a:fillRef idx="1">
+            <a:schemeClr val="accent1"/>
+          </a:fillRef>
+          <a:effectRef idx="0">
+            <a:schemeClr val="accent1"/>
+          </a:effectRef>
+          <a:fontRef idx="minor">
+            <a:schemeClr val="lt1"/>
+          </a:fontRef>
+        </p:style>
+        <p:txBody>
+          <a:bodyPr rtlCol="0" anchor="ctr"/>
+          <a:lstStyle/>
+          <a:p>
+            <a:pPr algn="ctr"/>
+            <a:r>
+              <a:rPr lang="es-ES" sz="1200" dirty="0" err="1" smtClean="0">
+                <a:solidFill>
+                  <a:schemeClr val="tx1"/>
+                </a:solidFill>
+              </a:rPr>
+              <a:t>End</a:t>
+            </a:r>
+            <a:endParaRPr lang="en-US" sz="1200" dirty="0">
+              <a:solidFill>
+                <a:schemeClr val="tx1"/>
+              </a:solidFill>
+            </a:endParaRPr>
+          </a:p>
+        </p:txBody>
+      </p:sp>
+      <p:sp>
+        <p:nvSpPr>
+          <p:cNvPr id="113" name="Flowchart: Connector 112"/>
+          <p:cNvSpPr/>
+          <p:nvPr/>
+        </p:nvSpPr>
+        <p:spPr>
+          <a:xfrm>
+            <a:off x="3000375" y="5305240"/>
+            <a:ext cx="190500" cy="176393"/>
+          </a:xfrm>
+          <a:prstGeom prst="flowChartConnector">
+            <a:avLst/>
+          </a:prstGeom>
+          <a:solidFill>
+            <a:schemeClr val="bg1"/>
+          </a:solidFill>
+          <a:ln>
+            <a:solidFill>
+              <a:schemeClr val="tx1"/>
+            </a:solidFill>
+          </a:ln>
+        </p:spPr>
+        <p:style>
+          <a:lnRef idx="2">
+            <a:schemeClr val="accent1">
+              <a:shade val="50000"/>
+            </a:schemeClr>
+          </a:lnRef>
+          <a:fillRef idx="1">
+            <a:schemeClr val="accent1"/>
+          </a:fillRef>
+          <a:effectRef idx="0">
+            <a:schemeClr val="accent1"/>
+          </a:effectRef>
+          <a:fontRef idx="minor">
+            <a:schemeClr val="lt1"/>
+          </a:fontRef>
+        </p:style>
+        <p:txBody>
+          <a:bodyPr rtlCol="0" anchor="ctr"/>
+          <a:lstStyle/>
+          <a:p>
+            <a:pPr algn="ctr"/>
+            <a:endParaRPr lang="en-US" sz="1200">
+              <a:solidFill>
+                <a:schemeClr val="tx1"/>
+              </a:solidFill>
+            </a:endParaRPr>
+          </a:p>
+        </p:txBody>
+      </p:sp>
+      <p:cxnSp>
+        <p:nvCxnSpPr>
+          <p:cNvPr id="122" name="Straight Arrow Connector 121"/>
+          <p:cNvCxnSpPr>
+            <a:stCxn id="74" idx="2"/>
+            <a:endCxn id="111" idx="0"/>
+          </p:cNvCxnSpPr>
+          <p:nvPr/>
+        </p:nvCxnSpPr>
+        <p:spPr>
+          <a:xfrm>
+            <a:off x="3095626" y="6081086"/>
+            <a:ext cx="1" cy="326254"/>
+          </a:xfrm>
+          <a:prstGeom prst="straightConnector1">
+            <a:avLst/>
+          </a:prstGeom>
+          <a:ln>
+            <a:solidFill>
+              <a:schemeClr val="tx1"/>
+            </a:solidFill>
+            <a:headEnd type="none" w="med" len="med"/>
+            <a:tailEnd type="triangle" w="med" len="med"/>
+          </a:ln>
+        </p:spPr>
+        <p:style>
+          <a:lnRef idx="1">
+            <a:schemeClr val="accent1"/>
+          </a:lnRef>
+          <a:fillRef idx="0">
+            <a:schemeClr val="accent1"/>
+          </a:fillRef>
+          <a:effectRef idx="0">
+            <a:schemeClr val="accent1"/>
+          </a:effectRef>
+          <a:fontRef idx="minor">
+            <a:schemeClr val="tx1"/>
+          </a:fontRef>
+        </p:style>
+      </p:cxnSp>
+      <p:grpSp>
+        <p:nvGrpSpPr>
+          <p:cNvPr id="178" name="Group 177"/>
+          <p:cNvGrpSpPr/>
+          <p:nvPr/>
+        </p:nvGrpSpPr>
+        <p:grpSpPr>
+          <a:xfrm>
+            <a:off x="1934529" y="1161275"/>
+            <a:ext cx="6423659" cy="5307979"/>
+            <a:chOff x="1934529" y="1161274"/>
+            <a:chExt cx="6423659" cy="5307979"/>
+          </a:xfrm>
+        </p:grpSpPr>
+        <p:cxnSp>
+          <p:nvCxnSpPr>
+            <p:cNvPr id="8" name="Straight Arrow Connector 7"/>
+            <p:cNvCxnSpPr>
+              <a:stCxn id="152" idx="4"/>
+              <a:endCxn id="6" idx="0"/>
+            </p:cNvCxnSpPr>
+            <p:nvPr/>
+          </p:nvCxnSpPr>
+          <p:spPr>
+            <a:xfrm>
+              <a:off x="3090863" y="1519733"/>
+              <a:ext cx="4763" cy="692387"/>
+            </a:xfrm>
+            <a:prstGeom prst="straightConnector1">
+              <a:avLst/>
+            </a:prstGeom>
+            <a:ln>
+              <a:solidFill>
+                <a:schemeClr val="tx1"/>
+              </a:solidFill>
+              <a:headEnd type="none" w="med" len="med"/>
+              <a:tailEnd type="triangle" w="med" len="med"/>
+            </a:ln>
+          </p:spPr>
+          <p:style>
+            <a:lnRef idx="1">
+              <a:schemeClr val="accent1"/>
+            </a:lnRef>
+            <a:fillRef idx="0">
+              <a:schemeClr val="accent1"/>
+            </a:fillRef>
+            <a:effectRef idx="0">
+              <a:schemeClr val="accent1"/>
+            </a:effectRef>
+            <a:fontRef idx="minor">
+              <a:schemeClr val="tx1"/>
+            </a:fontRef>
+          </p:style>
+        </p:cxnSp>
+        <p:cxnSp>
+          <p:nvCxnSpPr>
+            <p:cNvPr id="12" name="Straight Arrow Connector 11"/>
+            <p:cNvCxnSpPr>
+              <a:endCxn id="10" idx="5"/>
+            </p:cNvCxnSpPr>
+            <p:nvPr/>
+          </p:nvCxnSpPr>
+          <p:spPr>
+            <a:xfrm flipH="1">
+              <a:off x="1934529" y="1907171"/>
+              <a:ext cx="1170624" cy="0"/>
+            </a:xfrm>
+            <a:prstGeom prst="straightConnector1">
+              <a:avLst/>
+            </a:prstGeom>
+            <a:ln>
+              <a:solidFill>
+                <a:schemeClr val="tx1"/>
+              </a:solidFill>
+              <a:headEnd type="none" w="med" len="med"/>
+              <a:tailEnd type="triangle" w="med" len="med"/>
+            </a:ln>
+          </p:spPr>
+          <p:style>
+            <a:lnRef idx="1">
+              <a:schemeClr val="accent1"/>
+            </a:lnRef>
+            <a:fillRef idx="0">
+              <a:schemeClr val="accent1"/>
+            </a:fillRef>
+            <a:effectRef idx="0">
+              <a:schemeClr val="accent1"/>
+            </a:effectRef>
+            <a:fontRef idx="minor">
+              <a:schemeClr val="tx1"/>
+            </a:fontRef>
+          </p:style>
+        </p:cxnSp>
+        <p:cxnSp>
+          <p:nvCxnSpPr>
+            <p:cNvPr id="26" name="Elbow Connector 25"/>
+            <p:cNvCxnSpPr>
+              <a:stCxn id="23" idx="3"/>
+              <a:endCxn id="24" idx="0"/>
+            </p:cNvCxnSpPr>
+            <p:nvPr/>
+          </p:nvCxnSpPr>
+          <p:spPr>
+            <a:xfrm flipV="1">
+              <a:off x="3943351" y="1161274"/>
+              <a:ext cx="2828924" cy="2436738"/>
+            </a:xfrm>
+            <a:prstGeom prst="bentConnector4">
+              <a:avLst>
+                <a:gd name="adj1" fmla="val 41077"/>
+                <a:gd name="adj2" fmla="val 109381"/>
+              </a:avLst>
+            </a:prstGeom>
+            <a:ln>
+              <a:solidFill>
+                <a:schemeClr val="tx1"/>
+              </a:solidFill>
+              <a:headEnd type="none" w="med" len="med"/>
+              <a:tailEnd type="triangle" w="med" len="med"/>
+            </a:ln>
+          </p:spPr>
+          <p:style>
+            <a:lnRef idx="1">
+              <a:schemeClr val="accent1"/>
+            </a:lnRef>
+            <a:fillRef idx="0">
+              <a:schemeClr val="accent1"/>
+            </a:fillRef>
+            <a:effectRef idx="0">
+              <a:schemeClr val="accent1"/>
+            </a:effectRef>
+            <a:fontRef idx="minor">
+              <a:schemeClr val="tx1"/>
+            </a:fontRef>
+          </p:style>
+        </p:cxnSp>
+        <p:cxnSp>
+          <p:nvCxnSpPr>
+            <p:cNvPr id="38" name="Elbow Connector 37"/>
+            <p:cNvCxnSpPr>
+              <a:stCxn id="33" idx="3"/>
+              <a:endCxn id="34" idx="0"/>
+            </p:cNvCxnSpPr>
+            <p:nvPr/>
+          </p:nvCxnSpPr>
+          <p:spPr>
+            <a:xfrm>
+              <a:off x="7800975" y="4152298"/>
+              <a:ext cx="504825" cy="407787"/>
+            </a:xfrm>
+            <a:prstGeom prst="bentConnector2">
+              <a:avLst/>
+            </a:prstGeom>
+            <a:ln>
+              <a:solidFill>
+                <a:schemeClr val="tx1"/>
+              </a:solidFill>
+              <a:headEnd type="none" w="med" len="med"/>
+              <a:tailEnd type="triangle" w="med" len="med"/>
+            </a:ln>
+          </p:spPr>
+          <p:style>
+            <a:lnRef idx="1">
+              <a:schemeClr val="accent1"/>
+            </a:lnRef>
+            <a:fillRef idx="0">
+              <a:schemeClr val="accent1"/>
+            </a:fillRef>
+            <a:effectRef idx="0">
+              <a:schemeClr val="accent1"/>
+            </a:effectRef>
+            <a:fontRef idx="minor">
+              <a:schemeClr val="tx1"/>
+            </a:fontRef>
+          </p:style>
+        </p:cxnSp>
+        <p:cxnSp>
+          <p:nvCxnSpPr>
+            <p:cNvPr id="47" name="Elbow Connector 46"/>
+            <p:cNvCxnSpPr>
+              <a:stCxn id="41" idx="3"/>
+              <a:endCxn id="43" idx="1"/>
+            </p:cNvCxnSpPr>
+            <p:nvPr/>
+          </p:nvCxnSpPr>
+          <p:spPr>
+            <a:xfrm>
+              <a:off x="7496175" y="5292916"/>
+              <a:ext cx="862013" cy="357187"/>
+            </a:xfrm>
+            <a:prstGeom prst="bentConnector2">
+              <a:avLst/>
+            </a:prstGeom>
+            <a:ln>
+              <a:solidFill>
+                <a:schemeClr val="tx1"/>
+              </a:solidFill>
+              <a:headEnd type="none" w="med" len="med"/>
+              <a:tailEnd type="triangle" w="med" len="med"/>
+            </a:ln>
+          </p:spPr>
+          <p:style>
+            <a:lnRef idx="1">
+              <a:schemeClr val="accent1"/>
+            </a:lnRef>
+            <a:fillRef idx="0">
+              <a:schemeClr val="accent1"/>
+            </a:fillRef>
+            <a:effectRef idx="0">
+              <a:schemeClr val="accent1"/>
+            </a:effectRef>
+            <a:fontRef idx="minor">
+              <a:schemeClr val="tx1"/>
+            </a:fontRef>
+          </p:style>
+        </p:cxnSp>
+        <p:cxnSp>
+          <p:nvCxnSpPr>
+            <p:cNvPr id="50" name="Straight Arrow Connector 49"/>
+            <p:cNvCxnSpPr>
+              <a:stCxn id="29" idx="4"/>
+              <a:endCxn id="4" idx="0"/>
+            </p:cNvCxnSpPr>
+            <p:nvPr/>
+          </p:nvCxnSpPr>
+          <p:spPr>
+            <a:xfrm>
+              <a:off x="6772275" y="2358024"/>
+              <a:ext cx="0" cy="244078"/>
+            </a:xfrm>
+            <a:prstGeom prst="straightConnector1">
+              <a:avLst/>
+            </a:prstGeom>
+            <a:ln>
+              <a:solidFill>
+                <a:schemeClr val="tx1"/>
+              </a:solidFill>
+              <a:headEnd type="none" w="med" len="med"/>
+              <a:tailEnd type="triangle" w="med" len="med"/>
+            </a:ln>
+          </p:spPr>
+          <p:style>
+            <a:lnRef idx="1">
+              <a:schemeClr val="accent1"/>
+            </a:lnRef>
+            <a:fillRef idx="0">
+              <a:schemeClr val="accent1"/>
+            </a:fillRef>
+            <a:effectRef idx="0">
+              <a:schemeClr val="accent1"/>
+            </a:effectRef>
+            <a:fontRef idx="minor">
+              <a:schemeClr val="tx1"/>
+            </a:fontRef>
+          </p:style>
+        </p:cxnSp>
+        <p:cxnSp>
+          <p:nvCxnSpPr>
+            <p:cNvPr id="52" name="Straight Arrow Connector 51"/>
+            <p:cNvCxnSpPr>
+              <a:stCxn id="24" idx="2"/>
+              <a:endCxn id="29" idx="1"/>
+            </p:cNvCxnSpPr>
+            <p:nvPr/>
+          </p:nvCxnSpPr>
+          <p:spPr>
+            <a:xfrm>
+              <a:off x="6772275" y="1402374"/>
+              <a:ext cx="0" cy="234718"/>
+            </a:xfrm>
+            <a:prstGeom prst="straightConnector1">
+              <a:avLst/>
+            </a:prstGeom>
+            <a:ln>
+              <a:solidFill>
+                <a:schemeClr val="tx1"/>
+              </a:solidFill>
+              <a:headEnd type="none" w="med" len="med"/>
+              <a:tailEnd type="triangle" w="med" len="med"/>
+            </a:ln>
+          </p:spPr>
+          <p:style>
+            <a:lnRef idx="1">
+              <a:schemeClr val="accent1"/>
+            </a:lnRef>
+            <a:fillRef idx="0">
+              <a:schemeClr val="accent1"/>
+            </a:fillRef>
+            <a:effectRef idx="0">
+              <a:schemeClr val="accent1"/>
+            </a:effectRef>
+            <a:fontRef idx="minor">
+              <a:schemeClr val="tx1"/>
+            </a:fontRef>
+          </p:style>
+        </p:cxnSp>
+        <p:cxnSp>
+          <p:nvCxnSpPr>
+            <p:cNvPr id="54" name="Straight Arrow Connector 53"/>
+            <p:cNvCxnSpPr>
+              <a:stCxn id="4" idx="2"/>
+              <a:endCxn id="32" idx="0"/>
+            </p:cNvCxnSpPr>
+            <p:nvPr/>
+          </p:nvCxnSpPr>
+          <p:spPr>
+            <a:xfrm>
+              <a:off x="6772275" y="2983102"/>
+              <a:ext cx="0" cy="219076"/>
+            </a:xfrm>
+            <a:prstGeom prst="straightConnector1">
+              <a:avLst/>
+            </a:prstGeom>
+            <a:ln>
+              <a:solidFill>
+                <a:schemeClr val="tx1"/>
+              </a:solidFill>
+              <a:headEnd type="none" w="med" len="med"/>
+              <a:tailEnd type="triangle" w="med" len="med"/>
+            </a:ln>
+          </p:spPr>
+          <p:style>
+            <a:lnRef idx="1">
+              <a:schemeClr val="accent1"/>
+            </a:lnRef>
+            <a:fillRef idx="0">
+              <a:schemeClr val="accent1"/>
+            </a:fillRef>
+            <a:effectRef idx="0">
+              <a:schemeClr val="accent1"/>
+            </a:effectRef>
+            <a:fontRef idx="minor">
+              <a:schemeClr val="tx1"/>
+            </a:fontRef>
+          </p:style>
+        </p:cxnSp>
+        <p:cxnSp>
+          <p:nvCxnSpPr>
+            <p:cNvPr id="56" name="Straight Arrow Connector 55"/>
+            <p:cNvCxnSpPr>
+              <a:stCxn id="32" idx="2"/>
+              <a:endCxn id="33" idx="0"/>
+            </p:cNvCxnSpPr>
+            <p:nvPr/>
+          </p:nvCxnSpPr>
+          <p:spPr>
+            <a:xfrm>
+              <a:off x="6772275" y="3554603"/>
+              <a:ext cx="0" cy="189907"/>
+            </a:xfrm>
+            <a:prstGeom prst="straightConnector1">
+              <a:avLst/>
+            </a:prstGeom>
+            <a:ln>
+              <a:solidFill>
+                <a:schemeClr val="tx1"/>
+              </a:solidFill>
+              <a:headEnd type="none" w="med" len="med"/>
+              <a:tailEnd type="triangle" w="med" len="med"/>
+            </a:ln>
+          </p:spPr>
+          <p:style>
+            <a:lnRef idx="1">
+              <a:schemeClr val="accent1"/>
+            </a:lnRef>
+            <a:fillRef idx="0">
+              <a:schemeClr val="accent1"/>
+            </a:fillRef>
+            <a:effectRef idx="0">
+              <a:schemeClr val="accent1"/>
+            </a:effectRef>
+            <a:fontRef idx="minor">
+              <a:schemeClr val="tx1"/>
+            </a:fontRef>
+          </p:style>
+        </p:cxnSp>
+        <p:cxnSp>
+          <p:nvCxnSpPr>
+            <p:cNvPr id="63" name="Straight Arrow Connector 62"/>
+            <p:cNvCxnSpPr>
+              <a:stCxn id="33" idx="2"/>
+              <a:endCxn id="41" idx="0"/>
+            </p:cNvCxnSpPr>
+            <p:nvPr/>
+          </p:nvCxnSpPr>
+          <p:spPr>
+            <a:xfrm>
+              <a:off x="6772275" y="4560086"/>
+              <a:ext cx="0" cy="556617"/>
+            </a:xfrm>
+            <a:prstGeom prst="straightConnector1">
+              <a:avLst/>
+            </a:prstGeom>
+            <a:ln>
+              <a:solidFill>
+                <a:schemeClr val="tx1"/>
+              </a:solidFill>
+              <a:headEnd type="none" w="med" len="med"/>
+              <a:tailEnd type="triangle" w="med" len="med"/>
+            </a:ln>
+          </p:spPr>
+          <p:style>
+            <a:lnRef idx="1">
+              <a:schemeClr val="accent1"/>
+            </a:lnRef>
+            <a:fillRef idx="0">
+              <a:schemeClr val="accent1"/>
+            </a:fillRef>
+            <a:effectRef idx="0">
+              <a:schemeClr val="accent1"/>
+            </a:effectRef>
+            <a:fontRef idx="minor">
+              <a:schemeClr val="tx1"/>
+            </a:fontRef>
+          </p:style>
+        </p:cxnSp>
+        <p:cxnSp>
+          <p:nvCxnSpPr>
+            <p:cNvPr id="77" name="Straight Arrow Connector 76"/>
+            <p:cNvCxnSpPr>
+              <a:stCxn id="68" idx="2"/>
+              <a:endCxn id="75" idx="0"/>
+            </p:cNvCxnSpPr>
+            <p:nvPr/>
+          </p:nvCxnSpPr>
+          <p:spPr>
+            <a:xfrm>
+              <a:off x="6772275" y="6166232"/>
+              <a:ext cx="0" cy="303021"/>
+            </a:xfrm>
+            <a:prstGeom prst="straightConnector1">
+              <a:avLst/>
+            </a:prstGeom>
+            <a:ln>
+              <a:solidFill>
+                <a:schemeClr val="tx1"/>
+              </a:solidFill>
+              <a:headEnd type="none" w="med" len="med"/>
+              <a:tailEnd type="triangle" w="med" len="med"/>
+            </a:ln>
+          </p:spPr>
+          <p:style>
+            <a:lnRef idx="1">
+              <a:schemeClr val="accent1"/>
+            </a:lnRef>
+            <a:fillRef idx="0">
+              <a:schemeClr val="accent1"/>
+            </a:fillRef>
+            <a:effectRef idx="0">
+              <a:schemeClr val="accent1"/>
+            </a:effectRef>
+            <a:fontRef idx="minor">
+              <a:schemeClr val="tx1"/>
+            </a:fontRef>
+          </p:style>
+        </p:cxnSp>
+        <p:cxnSp>
+          <p:nvCxnSpPr>
+            <p:cNvPr id="83" name="Straight Arrow Connector 82"/>
+            <p:cNvCxnSpPr>
+              <a:stCxn id="81" idx="4"/>
+              <a:endCxn id="66" idx="0"/>
+            </p:cNvCxnSpPr>
+            <p:nvPr/>
+          </p:nvCxnSpPr>
+          <p:spPr>
+            <a:xfrm>
+              <a:off x="3095625" y="4083737"/>
+              <a:ext cx="0" cy="137912"/>
+            </a:xfrm>
+            <a:prstGeom prst="straightConnector1">
+              <a:avLst/>
+            </a:prstGeom>
+            <a:ln>
+              <a:solidFill>
+                <a:schemeClr val="tx1"/>
+              </a:solidFill>
+              <a:headEnd type="none" w="med" len="med"/>
+              <a:tailEnd type="triangle" w="med" len="med"/>
+            </a:ln>
+          </p:spPr>
+          <p:style>
+            <a:lnRef idx="1">
+              <a:schemeClr val="accent1"/>
+            </a:lnRef>
+            <a:fillRef idx="0">
+              <a:schemeClr val="accent1"/>
+            </a:fillRef>
+            <a:effectRef idx="0">
+              <a:schemeClr val="accent1"/>
+            </a:effectRef>
+            <a:fontRef idx="minor">
+              <a:schemeClr val="tx1"/>
+            </a:fontRef>
+          </p:style>
+        </p:cxnSp>
+        <p:cxnSp>
+          <p:nvCxnSpPr>
+            <p:cNvPr id="85" name="Straight Arrow Connector 84"/>
+            <p:cNvCxnSpPr>
+              <a:stCxn id="66" idx="2"/>
+              <a:endCxn id="73" idx="0"/>
+            </p:cNvCxnSpPr>
+            <p:nvPr/>
+          </p:nvCxnSpPr>
+          <p:spPr>
+            <a:xfrm>
+              <a:off x="3095625" y="4666289"/>
+              <a:ext cx="0" cy="131323"/>
+            </a:xfrm>
+            <a:prstGeom prst="straightConnector1">
+              <a:avLst/>
+            </a:prstGeom>
+            <a:ln>
+              <a:solidFill>
+                <a:schemeClr val="tx1"/>
+              </a:solidFill>
+              <a:headEnd type="none" w="med" len="med"/>
+              <a:tailEnd type="triangle" w="med" len="med"/>
+            </a:ln>
+          </p:spPr>
+          <p:style>
+            <a:lnRef idx="1">
+              <a:schemeClr val="accent1"/>
+            </a:lnRef>
+            <a:fillRef idx="0">
+              <a:schemeClr val="accent1"/>
+            </a:fillRef>
+            <a:effectRef idx="0">
+              <a:schemeClr val="accent1"/>
+            </a:effectRef>
+            <a:fontRef idx="minor">
+              <a:schemeClr val="tx1"/>
+            </a:fontRef>
+          </p:style>
+        </p:cxnSp>
+        <p:cxnSp>
+          <p:nvCxnSpPr>
+            <p:cNvPr id="89" name="Straight Arrow Connector 88"/>
+            <p:cNvCxnSpPr>
+              <a:stCxn id="16" idx="4"/>
+              <a:endCxn id="23" idx="0"/>
+            </p:cNvCxnSpPr>
+            <p:nvPr/>
+          </p:nvCxnSpPr>
+          <p:spPr>
+            <a:xfrm>
+              <a:off x="3095626" y="3188436"/>
+              <a:ext cx="0" cy="197645"/>
+            </a:xfrm>
+            <a:prstGeom prst="straightConnector1">
+              <a:avLst/>
+            </a:prstGeom>
+            <a:ln>
+              <a:solidFill>
+                <a:schemeClr val="tx1"/>
+              </a:solidFill>
+              <a:headEnd type="none" w="med" len="med"/>
+              <a:tailEnd type="triangle" w="med" len="med"/>
+            </a:ln>
+          </p:spPr>
+          <p:style>
+            <a:lnRef idx="1">
+              <a:schemeClr val="accent1"/>
+            </a:lnRef>
+            <a:fillRef idx="0">
+              <a:schemeClr val="accent1"/>
+            </a:fillRef>
+            <a:effectRef idx="0">
+              <a:schemeClr val="accent1"/>
+            </a:effectRef>
+            <a:fontRef idx="minor">
+              <a:schemeClr val="tx1"/>
+            </a:fontRef>
+          </p:style>
+        </p:cxnSp>
+        <p:cxnSp>
+          <p:nvCxnSpPr>
+            <p:cNvPr id="91" name="Straight Arrow Connector 90"/>
+            <p:cNvCxnSpPr>
+              <a:stCxn id="6" idx="2"/>
+              <a:endCxn id="16" idx="1"/>
+            </p:cNvCxnSpPr>
+            <p:nvPr/>
+          </p:nvCxnSpPr>
+          <p:spPr>
+            <a:xfrm>
+              <a:off x="3095626" y="2564545"/>
+              <a:ext cx="0" cy="166691"/>
+            </a:xfrm>
+            <a:prstGeom prst="straightConnector1">
+              <a:avLst/>
+            </a:prstGeom>
+            <a:ln>
+              <a:solidFill>
+                <a:schemeClr val="tx1"/>
+              </a:solidFill>
+              <a:headEnd type="none" w="med" len="med"/>
+              <a:tailEnd type="triangle" w="med" len="med"/>
+            </a:ln>
+          </p:spPr>
+          <p:style>
+            <a:lnRef idx="1">
+              <a:schemeClr val="accent1"/>
+            </a:lnRef>
+            <a:fillRef idx="0">
+              <a:schemeClr val="accent1"/>
+            </a:fillRef>
+            <a:effectRef idx="0">
+              <a:schemeClr val="accent1"/>
+            </a:effectRef>
+            <a:fontRef idx="minor">
+              <a:schemeClr val="tx1"/>
+            </a:fontRef>
+          </p:style>
+        </p:cxnSp>
+        <p:cxnSp>
+          <p:nvCxnSpPr>
+            <p:cNvPr id="100" name="Elbow Connector 99"/>
+            <p:cNvCxnSpPr>
+              <a:stCxn id="73" idx="3"/>
+            </p:cNvCxnSpPr>
+            <p:nvPr/>
+          </p:nvCxnSpPr>
+          <p:spPr>
+            <a:xfrm flipV="1">
+              <a:off x="3943350" y="3327204"/>
+              <a:ext cx="1162050" cy="1682339"/>
+            </a:xfrm>
+            <a:prstGeom prst="bentConnector2">
+              <a:avLst/>
+            </a:prstGeom>
+            <a:ln>
+              <a:solidFill>
+                <a:schemeClr val="tx1"/>
+              </a:solidFill>
+              <a:headEnd type="none" w="med" len="med"/>
+              <a:tailEnd type="none" w="med" len="med"/>
+            </a:ln>
+          </p:spPr>
+          <p:style>
+            <a:lnRef idx="1">
+              <a:schemeClr val="accent1"/>
+            </a:lnRef>
+            <a:fillRef idx="0">
+              <a:schemeClr val="accent1"/>
+            </a:fillRef>
+            <a:effectRef idx="0">
+              <a:schemeClr val="accent1"/>
+            </a:effectRef>
+            <a:fontRef idx="minor">
+              <a:schemeClr val="tx1"/>
+            </a:fontRef>
+          </p:style>
+        </p:cxnSp>
+        <p:cxnSp>
+          <p:nvCxnSpPr>
+            <p:cNvPr id="116" name="Straight Arrow Connector 115"/>
+            <p:cNvCxnSpPr>
+              <a:stCxn id="113" idx="4"/>
+              <a:endCxn id="74" idx="0"/>
+            </p:cNvCxnSpPr>
+            <p:nvPr/>
+          </p:nvCxnSpPr>
+          <p:spPr>
+            <a:xfrm>
+              <a:off x="3095625" y="5481632"/>
+              <a:ext cx="0" cy="154813"/>
+            </a:xfrm>
+            <a:prstGeom prst="straightConnector1">
+              <a:avLst/>
+            </a:prstGeom>
+            <a:ln>
+              <a:solidFill>
+                <a:schemeClr val="tx1"/>
+              </a:solidFill>
+              <a:headEnd type="none" w="med" len="med"/>
+              <a:tailEnd type="triangle" w="med" len="med"/>
+            </a:ln>
+          </p:spPr>
+          <p:style>
+            <a:lnRef idx="1">
+              <a:schemeClr val="accent1"/>
+            </a:lnRef>
+            <a:fillRef idx="0">
+              <a:schemeClr val="accent1"/>
+            </a:fillRef>
+            <a:effectRef idx="0">
+              <a:schemeClr val="accent1"/>
+            </a:effectRef>
+            <a:fontRef idx="minor">
+              <a:schemeClr val="tx1"/>
+            </a:fontRef>
+          </p:style>
+        </p:cxnSp>
+        <p:cxnSp>
+          <p:nvCxnSpPr>
+            <p:cNvPr id="118" name="Elbow Connector 117"/>
+            <p:cNvCxnSpPr>
+              <a:stCxn id="74" idx="2"/>
+              <a:endCxn id="6" idx="1"/>
+            </p:cNvCxnSpPr>
+            <p:nvPr/>
+          </p:nvCxnSpPr>
+          <p:spPr>
+            <a:xfrm rot="5400000" flipH="1">
+              <a:off x="887300" y="3872760"/>
+              <a:ext cx="3692752" cy="723899"/>
+            </a:xfrm>
+            <a:prstGeom prst="bentConnector4">
+              <a:avLst>
+                <a:gd name="adj1" fmla="val -4127"/>
+                <a:gd name="adj2" fmla="val 263158"/>
+              </a:avLst>
+            </a:prstGeom>
+            <a:ln>
+              <a:solidFill>
+                <a:schemeClr val="tx1"/>
+              </a:solidFill>
+              <a:headEnd type="none" w="med" len="med"/>
+              <a:tailEnd type="triangle" w="med" len="med"/>
+            </a:ln>
+          </p:spPr>
+          <p:style>
+            <a:lnRef idx="1">
+              <a:schemeClr val="accent1"/>
+            </a:lnRef>
+            <a:fillRef idx="0">
+              <a:schemeClr val="accent1"/>
+            </a:fillRef>
+            <a:effectRef idx="0">
+              <a:schemeClr val="accent1"/>
+            </a:effectRef>
+            <a:fontRef idx="minor">
+              <a:schemeClr val="tx1"/>
+            </a:fontRef>
+          </p:style>
+        </p:cxnSp>
+        <p:cxnSp>
+          <p:nvCxnSpPr>
+            <p:cNvPr id="128" name="Straight Arrow Connector 127"/>
+            <p:cNvCxnSpPr>
+              <a:stCxn id="41" idx="2"/>
+              <a:endCxn id="68" idx="0"/>
+            </p:cNvCxnSpPr>
+            <p:nvPr/>
+          </p:nvCxnSpPr>
+          <p:spPr>
+            <a:xfrm>
+              <a:off x="6772275" y="5469128"/>
+              <a:ext cx="0" cy="239904"/>
+            </a:xfrm>
+            <a:prstGeom prst="straightConnector1">
+              <a:avLst/>
+            </a:prstGeom>
+            <a:ln>
+              <a:solidFill>
+                <a:schemeClr val="tx1"/>
+              </a:solidFill>
+              <a:headEnd type="none" w="med" len="med"/>
+              <a:tailEnd type="triangle" w="med" len="med"/>
+            </a:ln>
+          </p:spPr>
+          <p:style>
+            <a:lnRef idx="1">
+              <a:schemeClr val="accent1"/>
+            </a:lnRef>
+            <a:fillRef idx="0">
+              <a:schemeClr val="accent1"/>
+            </a:fillRef>
+            <a:effectRef idx="0">
+              <a:schemeClr val="accent1"/>
+            </a:effectRef>
+            <a:fontRef idx="minor">
+              <a:schemeClr val="tx1"/>
+            </a:fontRef>
+          </p:style>
+        </p:cxnSp>
+      </p:grpSp>
+      <p:sp>
+        <p:nvSpPr>
+          <p:cNvPr id="130" name="TextBox 129"/>
+          <p:cNvSpPr txBox="1"/>
+          <p:nvPr/>
+        </p:nvSpPr>
+        <p:spPr>
+          <a:xfrm>
+            <a:off x="5019675" y="57804"/>
+            <a:ext cx="3733800" cy="523220"/>
+          </a:xfrm>
+          <a:prstGeom prst="rect">
+            <a:avLst/>
+          </a:prstGeom>
+          <a:noFill/>
+        </p:spPr>
+        <p:txBody>
+          <a:bodyPr wrap="square" rtlCol="0">
+            <a:spAutoFit/>
+          </a:bodyPr>
+          <a:lstStyle/>
+          <a:p>
+            <a:r>
+              <a:rPr lang="es-ES" sz="1400" u="sng" dirty="0" err="1" smtClean="0"/>
+              <a:t>Abaqus</a:t>
+            </a:r>
+            <a:r>
+              <a:rPr lang="es-ES" sz="1400" u="sng" dirty="0" smtClean="0"/>
+              <a:t> </a:t>
+            </a:r>
+            <a:r>
+              <a:rPr lang="es-ES" sz="1400" u="sng" dirty="0" err="1" smtClean="0"/>
+              <a:t>python</a:t>
+            </a:r>
+            <a:r>
+              <a:rPr lang="es-ES" sz="1400" u="sng" dirty="0" smtClean="0"/>
+              <a:t> script</a:t>
+            </a:r>
+          </a:p>
+          <a:p>
+            <a:r>
+              <a:rPr lang="es-ES" sz="1400" dirty="0" smtClean="0"/>
+              <a:t>-&gt; </a:t>
+            </a:r>
+            <a:r>
+              <a:rPr lang="es-ES" sz="1400" dirty="0" smtClean="0">
+                <a:latin typeface="Courier New" pitchFamily="49" charset="0"/>
+                <a:cs typeface="Courier New" pitchFamily="49" charset="0"/>
+              </a:rPr>
+              <a:t>mainBuildAndExecuteWingBox.py</a:t>
+            </a:r>
+            <a:endParaRPr lang="en-US" sz="1400" dirty="0">
+              <a:latin typeface="Courier New" pitchFamily="49" charset="0"/>
+              <a:cs typeface="Courier New" pitchFamily="49" charset="0"/>
+            </a:endParaRPr>
+          </a:p>
+        </p:txBody>
+      </p:sp>
+      <p:sp>
+        <p:nvSpPr>
+          <p:cNvPr id="136" name="TextBox 135"/>
+          <p:cNvSpPr txBox="1"/>
+          <p:nvPr/>
+        </p:nvSpPr>
+        <p:spPr>
+          <a:xfrm>
+            <a:off x="85725" y="57804"/>
+            <a:ext cx="3733800" cy="523220"/>
+          </a:xfrm>
+          <a:prstGeom prst="rect">
+            <a:avLst/>
+          </a:prstGeom>
+          <a:noFill/>
+        </p:spPr>
+        <p:txBody>
+          <a:bodyPr wrap="square" rtlCol="0">
+            <a:spAutoFit/>
+          </a:bodyPr>
+          <a:lstStyle/>
+          <a:p>
+            <a:r>
+              <a:rPr lang="es-ES" sz="1400" u="sng" dirty="0" err="1" smtClean="0"/>
+              <a:t>Parametric</a:t>
+            </a:r>
+            <a:r>
+              <a:rPr lang="es-ES" sz="1400" u="sng" dirty="0" smtClean="0"/>
+              <a:t> </a:t>
+            </a:r>
+            <a:r>
+              <a:rPr lang="es-ES" sz="1400" u="sng" dirty="0" err="1" smtClean="0"/>
+              <a:t>study</a:t>
+            </a:r>
+            <a:r>
+              <a:rPr lang="es-ES" sz="1400" u="sng" dirty="0" smtClean="0"/>
+              <a:t> </a:t>
+            </a:r>
+            <a:r>
+              <a:rPr lang="es-ES" sz="1400" u="sng" dirty="0" err="1" smtClean="0"/>
+              <a:t>python</a:t>
+            </a:r>
+            <a:r>
+              <a:rPr lang="es-ES" sz="1400" u="sng" dirty="0" smtClean="0"/>
+              <a:t> </a:t>
+            </a:r>
+            <a:r>
+              <a:rPr lang="es-ES" sz="1400" u="sng" dirty="0" err="1" smtClean="0"/>
+              <a:t>main</a:t>
+            </a:r>
+            <a:r>
+              <a:rPr lang="es-ES" sz="1400" u="sng" dirty="0" smtClean="0"/>
+              <a:t> script</a:t>
+            </a:r>
+          </a:p>
+          <a:p>
+            <a:r>
+              <a:rPr lang="es-ES" sz="1400" dirty="0" smtClean="0"/>
+              <a:t>-&gt; </a:t>
+            </a:r>
+            <a:r>
+              <a:rPr lang="es-ES" sz="1400" dirty="0" smtClean="0">
+                <a:latin typeface="Courier New" pitchFamily="49" charset="0"/>
+                <a:cs typeface="Courier New" pitchFamily="49" charset="0"/>
+              </a:rPr>
+              <a:t>mainAbaqusParametricStudy.py</a:t>
+            </a:r>
+            <a:endParaRPr lang="en-US" sz="1400" dirty="0">
+              <a:latin typeface="Courier New" pitchFamily="49" charset="0"/>
+              <a:cs typeface="Courier New" pitchFamily="49" charset="0"/>
+            </a:endParaRPr>
+          </a:p>
+        </p:txBody>
+      </p:sp>
+      <p:sp>
+        <p:nvSpPr>
+          <p:cNvPr id="152" name="Flowchart: Data 151"/>
+          <p:cNvSpPr/>
+          <p:nvPr/>
+        </p:nvSpPr>
+        <p:spPr>
+          <a:xfrm>
+            <a:off x="2190751" y="990601"/>
+            <a:ext cx="1800224" cy="529133"/>
+          </a:xfrm>
+          <a:prstGeom prst="flowChartInputOutput">
+            <a:avLst/>
+          </a:prstGeom>
+          <a:solidFill>
+            <a:schemeClr val="bg1"/>
+          </a:solidFill>
+          <a:ln>
+            <a:solidFill>
+              <a:schemeClr val="tx1"/>
+            </a:solidFill>
+          </a:ln>
+        </p:spPr>
+        <p:style>
+          <a:lnRef idx="2">
+            <a:schemeClr val="accent1">
+              <a:shade val="50000"/>
+            </a:schemeClr>
+          </a:lnRef>
+          <a:fillRef idx="1">
+            <a:schemeClr val="accent1"/>
+          </a:fillRef>
+          <a:effectRef idx="0">
+            <a:schemeClr val="accent1"/>
+          </a:effectRef>
+          <a:fontRef idx="minor">
+            <a:schemeClr val="lt1"/>
+          </a:fontRef>
+        </p:style>
+        <p:txBody>
+          <a:bodyPr rtlCol="0" anchor="ctr"/>
+          <a:lstStyle/>
+          <a:p>
+            <a:pPr algn="ctr"/>
+            <a:r>
+              <a:rPr lang="es-ES" sz="1200" dirty="0" err="1" smtClean="0">
+                <a:solidFill>
+                  <a:schemeClr val="tx1"/>
+                </a:solidFill>
+              </a:rPr>
+              <a:t>Read</a:t>
+            </a:r>
+            <a:r>
+              <a:rPr lang="es-ES" sz="1200" dirty="0" smtClean="0">
+                <a:solidFill>
+                  <a:schemeClr val="tx1"/>
+                </a:solidFill>
+              </a:rPr>
+              <a:t> </a:t>
+            </a:r>
+            <a:r>
+              <a:rPr lang="es-ES" sz="1200" dirty="0" err="1" smtClean="0">
+                <a:solidFill>
+                  <a:schemeClr val="tx1"/>
+                </a:solidFill>
+              </a:rPr>
+              <a:t>parameters</a:t>
+            </a:r>
+            <a:r>
+              <a:rPr lang="es-ES" sz="1200" dirty="0" smtClean="0">
+                <a:solidFill>
+                  <a:schemeClr val="tx1"/>
+                </a:solidFill>
+              </a:rPr>
+              <a:t> </a:t>
+            </a:r>
+            <a:r>
+              <a:rPr lang="es-ES" sz="1200" dirty="0" err="1" smtClean="0">
+                <a:solidFill>
+                  <a:schemeClr val="tx1"/>
+                </a:solidFill>
+              </a:rPr>
+              <a:t>ranges</a:t>
+            </a:r>
+            <a:endParaRPr lang="en-US" sz="1200" dirty="0">
+              <a:solidFill>
+                <a:schemeClr val="tx1"/>
+              </a:solidFill>
+            </a:endParaRPr>
+          </a:p>
+        </p:txBody>
+      </p:sp>
+      <p:cxnSp>
+        <p:nvCxnSpPr>
+          <p:cNvPr id="157" name="Straight Arrow Connector 156"/>
+          <p:cNvCxnSpPr>
+            <a:stCxn id="2" idx="2"/>
+            <a:endCxn id="152" idx="1"/>
+          </p:cNvCxnSpPr>
+          <p:nvPr/>
+        </p:nvCxnSpPr>
+        <p:spPr>
+          <a:xfrm>
+            <a:off x="3090863" y="857248"/>
+            <a:ext cx="0" cy="133352"/>
+          </a:xfrm>
+          <a:prstGeom prst="straightConnector1">
+            <a:avLst/>
+          </a:prstGeom>
+          <a:ln>
+            <a:solidFill>
+              <a:schemeClr val="tx1"/>
+            </a:solidFill>
+            <a:headEnd type="none" w="med" len="med"/>
+            <a:tailEnd type="triangle" w="med" len="med"/>
+          </a:ln>
+        </p:spPr>
+        <p:style>
+          <a:lnRef idx="1">
+            <a:schemeClr val="accent1"/>
+          </a:lnRef>
+          <a:fillRef idx="0">
+            <a:schemeClr val="accent1"/>
+          </a:fillRef>
+          <a:effectRef idx="0">
+            <a:schemeClr val="accent1"/>
+          </a:effectRef>
+          <a:fontRef idx="minor">
+            <a:schemeClr val="tx1"/>
+          </a:fontRef>
+        </p:style>
+      </p:cxnSp>
+    </p:spTree>
+    <p:extLst>
+      <p:ext uri="{BB962C8B-B14F-4D97-AF65-F5344CB8AC3E}">
+        <p14:creationId xmlns:p14="http://schemas.microsoft.com/office/powerpoint/2010/main" val="3546600989"/>
+      </p:ext>
+    </p:extLst>
+  </p:cSld>
+  <p:clrMapOvr>
+    <a:masterClrMapping/>
+  </p:clrMapOvr>
+</p:sld>
+</file>
+
 <file path=ppt/slides/slide2.xml><?xml version="1.0" encoding="utf-8"?>
 <p:sld xmlns:a="http://schemas.openxmlformats.org/drawingml/2006/main" xmlns:r="http://schemas.openxmlformats.org/officeDocument/2006/relationships" xmlns:p="http://schemas.openxmlformats.org/presentationml/2006/main">
   <p:cSld>
@@ -12016,7 +14970,7 @@
         </p:nvGrpSpPr>
         <p:grpSpPr>
           <a:xfrm>
-            <a:off x="457200" y="3"/>
+            <a:off x="457200" y="4"/>
             <a:ext cx="8229600" cy="6476999"/>
             <a:chOff x="631620" y="347309"/>
             <a:chExt cx="7754074" cy="5971031"/>
@@ -13682,7 +16636,7 @@
         </p:nvSpPr>
         <p:spPr>
           <a:xfrm rot="10800000">
-            <a:off x="1981200" y="1523999"/>
+            <a:off x="1981200" y="1524000"/>
             <a:ext cx="5410200" cy="3446944"/>
           </a:xfrm>
           <a:prstGeom prst="trapezoid">
@@ -13787,7 +16741,7 @@
         </p:nvGrpSpPr>
         <p:grpSpPr>
           <a:xfrm>
-            <a:off x="2214777" y="1707814"/>
+            <a:off x="2214778" y="1707815"/>
             <a:ext cx="5779241" cy="4610529"/>
             <a:chOff x="2318018" y="1713978"/>
             <a:chExt cx="5779241" cy="4610529"/>
@@ -14159,8 +17113,8 @@
         </p:nvGrpSpPr>
         <p:grpSpPr>
           <a:xfrm>
-            <a:off x="2043916" y="448540"/>
-            <a:ext cx="5709294" cy="313616"/>
+            <a:off x="2043917" y="448540"/>
+            <a:ext cx="5709295" cy="313616"/>
             <a:chOff x="1981199" y="1214791"/>
             <a:chExt cx="5709294" cy="313616"/>
           </a:xfrm>
@@ -14609,7 +17563,7 @@
         </p:nvSpPr>
         <p:spPr>
           <a:xfrm>
-            <a:off x="4319208" y="3247474"/>
+            <a:off x="4319208" y="3247475"/>
             <a:ext cx="935192" cy="890689"/>
           </a:xfrm>
           <a:prstGeom prst="arc">
@@ -14657,7 +17611,7 @@
         </p:nvSpPr>
         <p:spPr>
           <a:xfrm>
-            <a:off x="4161670" y="3768828"/>
+            <a:off x="4161671" y="3768828"/>
             <a:ext cx="546935" cy="369332"/>
           </a:xfrm>
           <a:prstGeom prst="rect">
@@ -14691,7 +17645,7 @@
         </p:nvCxnSpPr>
         <p:spPr>
           <a:xfrm>
-            <a:off x="1981203" y="1523999"/>
+            <a:off x="1981205" y="1523999"/>
             <a:ext cx="5410201" cy="0"/>
           </a:xfrm>
           <a:prstGeom prst="line">
@@ -14726,7 +17680,7 @@
         </p:nvSpPr>
         <p:spPr>
           <a:xfrm>
-            <a:off x="2106272" y="781211"/>
+            <a:off x="2106272" y="781212"/>
             <a:ext cx="353557" cy="323693"/>
           </a:xfrm>
           <a:prstGeom prst="ellipse">
@@ -14777,7 +17731,7 @@
         </p:nvSpPr>
         <p:spPr>
           <a:xfrm>
-            <a:off x="2823075" y="781211"/>
+            <a:off x="2823076" y="781212"/>
             <a:ext cx="353557" cy="323693"/>
           </a:xfrm>
           <a:prstGeom prst="ellipse">
@@ -14828,7 +17782,7 @@
         </p:nvSpPr>
         <p:spPr>
           <a:xfrm>
-            <a:off x="3440478" y="781211"/>
+            <a:off x="3440479" y="781212"/>
             <a:ext cx="353557" cy="323693"/>
           </a:xfrm>
           <a:prstGeom prst="ellipse">
@@ -14880,7 +17834,7 @@
         <p:grpSpPr>
           <a:xfrm>
             <a:off x="631620" y="3429005"/>
-            <a:ext cx="1435226" cy="1528851"/>
+            <a:ext cx="1435227" cy="1528851"/>
             <a:chOff x="631620" y="3429000"/>
             <a:chExt cx="1435226" cy="1528850"/>
           </a:xfrm>
@@ -15161,7 +18115,7 @@
         </p:nvSpPr>
         <p:spPr>
           <a:xfrm>
-            <a:off x="4103007" y="771763"/>
+            <a:off x="4103008" y="771764"/>
             <a:ext cx="353557" cy="323693"/>
           </a:xfrm>
           <a:prstGeom prst="ellipse">
@@ -15212,7 +18166,7 @@
         </p:nvSpPr>
         <p:spPr>
           <a:xfrm>
-            <a:off x="4794986" y="762312"/>
+            <a:off x="4794987" y="762313"/>
             <a:ext cx="353557" cy="323693"/>
           </a:xfrm>
           <a:prstGeom prst="ellipse">
@@ -15263,7 +18217,7 @@
         </p:nvSpPr>
         <p:spPr>
           <a:xfrm>
-            <a:off x="5530823" y="771763"/>
+            <a:off x="5530824" y="771764"/>
             <a:ext cx="353557" cy="323693"/>
           </a:xfrm>
           <a:prstGeom prst="ellipse">
@@ -15314,7 +18268,7 @@
         </p:nvSpPr>
         <p:spPr>
           <a:xfrm>
-            <a:off x="6263091" y="762312"/>
+            <a:off x="6263092" y="762313"/>
             <a:ext cx="353557" cy="323693"/>
           </a:xfrm>
           <a:prstGeom prst="ellipse">
@@ -15365,7 +18319,7 @@
         </p:nvSpPr>
         <p:spPr>
           <a:xfrm>
-            <a:off x="7053466" y="781211"/>
+            <a:off x="7053467" y="781212"/>
             <a:ext cx="353557" cy="323693"/>
           </a:xfrm>
           <a:prstGeom prst="ellipse">
@@ -15416,7 +18370,7 @@
         </p:nvCxnSpPr>
         <p:spPr>
           <a:xfrm flipH="1" flipV="1">
-            <a:off x="3124200" y="3674213"/>
+            <a:off x="3124201" y="3674213"/>
             <a:ext cx="1649356" cy="0"/>
           </a:xfrm>
           <a:prstGeom prst="straightConnector1">
@@ -15452,7 +18406,7 @@
         </p:nvSpPr>
         <p:spPr>
           <a:xfrm>
-            <a:off x="2895604" y="3779488"/>
+            <a:off x="2895606" y="3779488"/>
             <a:ext cx="546935" cy="369332"/>
           </a:xfrm>
           <a:prstGeom prst="rect">
@@ -15486,8 +18440,8 @@
         </p:nvSpPr>
         <p:spPr>
           <a:xfrm rot="10800000">
-            <a:off x="2106268" y="1086001"/>
-            <a:ext cx="1017930" cy="437995"/>
+            <a:off x="2106268" y="1086002"/>
+            <a:ext cx="1017931" cy="437995"/>
           </a:xfrm>
           <a:prstGeom prst="triangle">
             <a:avLst/>
@@ -15534,8 +18488,8 @@
         </p:nvSpPr>
         <p:spPr>
           <a:xfrm rot="10800000">
-            <a:off x="3497376" y="1086001"/>
-            <a:ext cx="1017930" cy="437995"/>
+            <a:off x="3497376" y="1086002"/>
+            <a:ext cx="1017931" cy="437995"/>
           </a:xfrm>
           <a:prstGeom prst="triangle">
             <a:avLst/>
@@ -15582,8 +18536,8 @@
         </p:nvSpPr>
         <p:spPr>
           <a:xfrm rot="10800000">
-            <a:off x="4804697" y="1095457"/>
-            <a:ext cx="1017930" cy="437995"/>
+            <a:off x="4804696" y="1095458"/>
+            <a:ext cx="1017931" cy="437995"/>
           </a:xfrm>
           <a:prstGeom prst="triangle">
             <a:avLst/>
@@ -15630,8 +18584,8 @@
         </p:nvSpPr>
         <p:spPr>
           <a:xfrm rot="10800000">
-            <a:off x="6363945" y="1104977"/>
-            <a:ext cx="1017930" cy="437995"/>
+            <a:off x="6363945" y="1104978"/>
+            <a:ext cx="1017931" cy="437995"/>
           </a:xfrm>
           <a:prstGeom prst="triangle">
             <a:avLst/>
@@ -15678,7 +18632,7 @@
         </p:nvGrpSpPr>
         <p:grpSpPr>
           <a:xfrm>
-            <a:off x="429084" y="169163"/>
+            <a:off x="429086" y="169163"/>
             <a:ext cx="7956615" cy="5469639"/>
             <a:chOff x="3103256" y="169161"/>
             <a:chExt cx="5282438" cy="5469639"/>
@@ -15920,7 +18874,7 @@
         </p:nvSpPr>
         <p:spPr>
           <a:xfrm>
-            <a:off x="1971596" y="4630336"/>
+            <a:off x="1971597" y="4630336"/>
             <a:ext cx="323492" cy="369332"/>
           </a:xfrm>
           <a:prstGeom prst="rect">
@@ -16001,7 +18955,7 @@
         </p:blipFill>
         <p:spPr>
           <a:xfrm>
-            <a:off x="76199" y="1447800"/>
+            <a:off x="76200" y="1447801"/>
             <a:ext cx="9510211" cy="3957705"/>
           </a:xfrm>
           <a:prstGeom prst="rect">
@@ -16060,7 +19014,7 @@
         </p:blipFill>
         <p:spPr>
           <a:xfrm>
-            <a:off x="771525" y="1413302"/>
+            <a:off x="771526" y="1413302"/>
             <a:ext cx="8470389" cy="3834216"/>
           </a:xfrm>
           <a:prstGeom prst="rect">
@@ -16155,7 +19109,7 @@
         </p:blipFill>
         <p:spPr>
           <a:xfrm>
-            <a:off x="-30564" y="333375"/>
+            <a:off x="-30563" y="333375"/>
             <a:ext cx="9174564" cy="5729626"/>
           </a:xfrm>
           <a:prstGeom prst="rect">
@@ -16171,7 +19125,7 @@
         </p:nvGrpSpPr>
         <p:grpSpPr>
           <a:xfrm>
-            <a:off x="1876425" y="971550"/>
+            <a:off x="1876426" y="971551"/>
             <a:ext cx="7038975" cy="5648325"/>
             <a:chOff x="1876425" y="971550"/>
             <a:chExt cx="7038975" cy="5648325"/>
@@ -17123,7 +20077,7 @@
         </p:nvGrpSpPr>
         <p:grpSpPr>
           <a:xfrm>
-            <a:off x="766906" y="533399"/>
+            <a:off x="766907" y="533399"/>
             <a:ext cx="7897604" cy="3279879"/>
             <a:chOff x="168442" y="1695138"/>
             <a:chExt cx="8746958" cy="3632616"/>
@@ -17327,8 +20281,8 @@
           </p:nvSpPr>
           <p:spPr>
             <a:xfrm rot="19431698">
-              <a:off x="1630401" y="3112925"/>
-              <a:ext cx="381000" cy="369332"/>
+              <a:off x="1630401" y="3093065"/>
+              <a:ext cx="381000" cy="409052"/>
             </a:xfrm>
             <a:prstGeom prst="rect">
               <a:avLst/>
@@ -17579,8 +20533,8 @@
           </p:nvSpPr>
           <p:spPr>
             <a:xfrm rot="20727124">
-              <a:off x="5162550" y="2590800"/>
-              <a:ext cx="323850" cy="369332"/>
+              <a:off x="5162551" y="2570940"/>
+              <a:ext cx="323849" cy="409052"/>
             </a:xfrm>
             <a:prstGeom prst="rect">
               <a:avLst/>
@@ -17609,8 +20563,8 @@
           </p:nvSpPr>
           <p:spPr>
             <a:xfrm rot="20727124">
-              <a:off x="5388985" y="3520559"/>
-              <a:ext cx="323850" cy="369332"/>
+              <a:off x="5388985" y="3500699"/>
+              <a:ext cx="323849" cy="409052"/>
             </a:xfrm>
             <a:prstGeom prst="rect">
               <a:avLst/>
@@ -17640,7 +20594,7 @@
           <p:spPr>
             <a:xfrm>
               <a:off x="2684702" y="4514852"/>
-              <a:ext cx="323850" cy="369332"/>
+              <a:ext cx="323849" cy="409052"/>
             </a:xfrm>
             <a:prstGeom prst="rect">
               <a:avLst/>
@@ -17670,10 +20624,10 @@
         </p:nvGrpSpPr>
         <p:grpSpPr>
           <a:xfrm>
-            <a:off x="3748526" y="3956502"/>
-            <a:ext cx="5277522" cy="1619688"/>
-            <a:chOff x="1006715" y="4338952"/>
-            <a:chExt cx="6902210" cy="2118310"/>
+            <a:off x="3705056" y="3956501"/>
+            <a:ext cx="5320992" cy="1640316"/>
+            <a:chOff x="949865" y="4338952"/>
+            <a:chExt cx="6959060" cy="2145289"/>
           </a:xfrm>
         </p:grpSpPr>
         <p:sp>
@@ -17684,8 +20638,8 @@
           </p:nvSpPr>
           <p:spPr>
             <a:xfrm rot="14827580">
-              <a:off x="1115181" y="5216660"/>
-              <a:ext cx="152400" cy="369332"/>
+              <a:off x="1115181" y="5159810"/>
+              <a:ext cx="152400" cy="483031"/>
             </a:xfrm>
             <a:prstGeom prst="rect">
               <a:avLst/>
@@ -18099,9 +21053,9 @@
           <p:grpSpPr>
             <a:xfrm>
               <a:off x="1405568" y="4338952"/>
-              <a:ext cx="6503357" cy="2118310"/>
+              <a:ext cx="6503357" cy="2145289"/>
               <a:chOff x="1884036" y="3977691"/>
-              <a:chExt cx="6503357" cy="2118310"/>
+              <a:chExt cx="6503357" cy="2145289"/>
             </a:xfrm>
           </p:grpSpPr>
           <p:sp>
@@ -18296,7 +21250,7 @@
             <p:spPr>
               <a:xfrm>
                 <a:off x="6905625" y="5277676"/>
-                <a:ext cx="1481768" cy="646331"/>
+                <a:ext cx="1481768" cy="845304"/>
               </a:xfrm>
               <a:prstGeom prst="rect">
                 <a:avLst/>
@@ -18417,8 +21371,8 @@
             </p:nvSpPr>
             <p:spPr>
               <a:xfrm>
-                <a:off x="4411325" y="5231520"/>
-                <a:ext cx="266699" cy="369332"/>
+                <a:off x="4411324" y="5231520"/>
+                <a:ext cx="266699" cy="483031"/>
               </a:xfrm>
               <a:prstGeom prst="rect">
                 <a:avLst/>
@@ -18447,8 +21401,8 @@
             </p:nvSpPr>
             <p:spPr>
               <a:xfrm rot="16200000">
-                <a:off x="6952004" y="4082535"/>
-                <a:ext cx="266700" cy="369332"/>
+                <a:off x="6952002" y="4025685"/>
+                <a:ext cx="266700" cy="483031"/>
               </a:xfrm>
               <a:prstGeom prst="rect">
                 <a:avLst/>
@@ -18985,8 +21939,8 @@
           </p:nvSpPr>
           <p:spPr>
             <a:xfrm rot="16456087">
-              <a:off x="4444453" y="5440072"/>
-              <a:ext cx="266700" cy="369332"/>
+              <a:off x="4444453" y="5383223"/>
+              <a:ext cx="266700" cy="483031"/>
             </a:xfrm>
             <a:prstGeom prst="rect">
               <a:avLst/>
@@ -20039,7 +22993,7 @@
         </p:nvGrpSpPr>
         <p:grpSpPr>
           <a:xfrm rot="10800000">
-            <a:off x="262564" y="4823340"/>
+            <a:off x="262565" y="4823341"/>
             <a:ext cx="4118196" cy="1604581"/>
             <a:chOff x="1405568" y="4358710"/>
             <a:chExt cx="5385984" cy="2098552"/>
@@ -21691,7 +24645,7 @@
         </p:nvSpPr>
         <p:spPr>
           <a:xfrm>
-            <a:off x="1646315" y="4904538"/>
+            <a:off x="1646315" y="4904539"/>
             <a:ext cx="1132980" cy="646331"/>
           </a:xfrm>
           <a:prstGeom prst="rect">
@@ -21745,7 +24699,7 @@
         </p:nvCxnSpPr>
         <p:spPr>
           <a:xfrm>
-            <a:off x="3244919" y="2064782"/>
+            <a:off x="3244920" y="2064783"/>
             <a:ext cx="240803" cy="897830"/>
           </a:xfrm>
           <a:prstGeom prst="straightConnector1">
@@ -21782,7 +24736,7 @@
         </p:nvCxnSpPr>
         <p:spPr>
           <a:xfrm flipV="1">
-            <a:off x="3244919" y="1967806"/>
+            <a:off x="3244920" y="1967806"/>
             <a:ext cx="412805" cy="126866"/>
           </a:xfrm>
           <a:prstGeom prst="straightConnector1">
@@ -21819,7 +24773,7 @@
         </p:nvCxnSpPr>
         <p:spPr>
           <a:xfrm flipV="1">
-            <a:off x="3485722" y="2758158"/>
+            <a:off x="3485723" y="2758159"/>
             <a:ext cx="412805" cy="126866"/>
           </a:xfrm>
           <a:prstGeom prst="straightConnector1">
@@ -21856,7 +24810,7 @@
         </p:nvSpPr>
         <p:spPr>
           <a:xfrm rot="20727124">
-            <a:off x="3365320" y="1674672"/>
+            <a:off x="3365321" y="1674672"/>
             <a:ext cx="292403" cy="369332"/>
           </a:xfrm>
           <a:prstGeom prst="rect">
@@ -21966,7 +24920,7 @@
         </p:blipFill>
         <p:spPr>
           <a:xfrm>
-            <a:off x="152399" y="152400"/>
+            <a:off x="152401" y="152401"/>
             <a:ext cx="8610601" cy="6452909"/>
           </a:xfrm>
           <a:prstGeom prst="rect">

</xml_diff>

<commit_message>
A lot of changes
</commit_message>
<xml_diff>
--- a/figures/figures.pptx
+++ b/figures/figures.pptx
@@ -24,6 +24,7 @@
     <p:sldId id="272" r:id="rId18"/>
     <p:sldId id="273" r:id="rId19"/>
     <p:sldId id="274" r:id="rId20"/>
+    <p:sldId id="275" r:id="rId21"/>
   </p:sldIdLst>
   <p:sldSz cx="9144000" cy="6858000" type="screen4x3"/>
   <p:notesSz cx="7315200" cy="9601200"/>
@@ -123,6 +124,222 @@
     </a:lvl9pPr>
   </p:defaultTextStyle>
 </p:presentation>
+</file>
+
+<file path=ppt/charts/chart1.xml><?xml version="1.0" encoding="utf-8"?>
+<c:chartSpace xmlns:c="http://schemas.openxmlformats.org/drawingml/2006/chart" xmlns:a="http://schemas.openxmlformats.org/drawingml/2006/main" xmlns:r="http://schemas.openxmlformats.org/officeDocument/2006/relationships">
+  <c:date1904 val="0"/>
+  <c:lang val="en-US"/>
+  <c:roundedCorners val="0"/>
+  <mc:AlternateContent xmlns:mc="http://schemas.openxmlformats.org/markup-compatibility/2006">
+    <mc:Choice xmlns:c14="http://schemas.microsoft.com/office/drawing/2007/8/2/chart" Requires="c14">
+      <c14:style val="102"/>
+    </mc:Choice>
+    <mc:Fallback>
+      <c:style val="2"/>
+    </mc:Fallback>
+  </mc:AlternateContent>
+  <c:chart>
+    <c:autoTitleDeleted val="0"/>
+    <c:plotArea>
+      <c:layout/>
+      <c:scatterChart>
+        <c:scatterStyle val="lineMarker"/>
+        <c:varyColors val="0"/>
+        <c:ser>
+          <c:idx val="0"/>
+          <c:order val="0"/>
+          <c:spPr>
+            <a:ln w="28575">
+              <a:noFill/>
+            </a:ln>
+          </c:spPr>
+          <c:marker>
+            <c:symbol val="circle"/>
+            <c:size val="7"/>
+            <c:spPr>
+              <a:solidFill>
+                <a:schemeClr val="tx1"/>
+              </a:solidFill>
+              <a:ln>
+                <a:noFill/>
+              </a:ln>
+            </c:spPr>
+          </c:marker>
+          <c:trendline>
+            <c:trendlineType val="linear"/>
+            <c:dispRSqr val="0"/>
+            <c:dispEq val="0"/>
+          </c:trendline>
+          <c:xVal>
+            <c:numRef>
+              <c:f>para_cbox!$F$8:$J$8</c:f>
+              <c:numCache>
+                <c:formatCode>General</c:formatCode>
+                <c:ptCount val="5"/>
+                <c:pt idx="0">
+                  <c:v>0.5</c:v>
+                </c:pt>
+                <c:pt idx="1">
+                  <c:v>0.6</c:v>
+                </c:pt>
+                <c:pt idx="2">
+                  <c:v>0.7</c:v>
+                </c:pt>
+                <c:pt idx="3">
+                  <c:v>0.8</c:v>
+                </c:pt>
+                <c:pt idx="4">
+                  <c:v>0.9</c:v>
+                </c:pt>
+              </c:numCache>
+            </c:numRef>
+          </c:xVal>
+          <c:yVal>
+            <c:numRef>
+              <c:f>para_cbox!$F$11:$J$11</c:f>
+              <c:numCache>
+                <c:formatCode>General</c:formatCode>
+                <c:ptCount val="5"/>
+                <c:pt idx="0">
+                  <c:v>224</c:v>
+                </c:pt>
+                <c:pt idx="1">
+                  <c:v>305.2</c:v>
+                </c:pt>
+                <c:pt idx="2">
+                  <c:v>384.3</c:v>
+                </c:pt>
+                <c:pt idx="3">
+                  <c:v>523.17999999999995</c:v>
+                </c:pt>
+                <c:pt idx="4">
+                  <c:v>662.06</c:v>
+                </c:pt>
+              </c:numCache>
+            </c:numRef>
+          </c:yVal>
+          <c:smooth val="0"/>
+        </c:ser>
+        <c:dLbls>
+          <c:showLegendKey val="0"/>
+          <c:showVal val="0"/>
+          <c:showCatName val="0"/>
+          <c:showSerName val="0"/>
+          <c:showPercent val="0"/>
+          <c:showBubbleSize val="0"/>
+        </c:dLbls>
+        <c:axId val="140238848"/>
+        <c:axId val="140240576"/>
+      </c:scatterChart>
+      <c:valAx>
+        <c:axId val="140238848"/>
+        <c:scaling>
+          <c:orientation val="minMax"/>
+          <c:max val="1"/>
+          <c:min val="0.4"/>
+        </c:scaling>
+        <c:delete val="0"/>
+        <c:axPos val="b"/>
+        <c:majorGridlines>
+          <c:spPr>
+            <a:ln w="15875"/>
+          </c:spPr>
+        </c:majorGridlines>
+        <c:minorGridlines/>
+        <c:title>
+          <c:tx>
+            <c:rich>
+              <a:bodyPr/>
+              <a:lstStyle/>
+              <a:p>
+                <a:pPr>
+                  <a:defRPr sz="1400"/>
+                </a:pPr>
+                <a:r>
+                  <a:rPr lang="en-US" sz="1400"/>
+                  <a:t>Wing-box thickness (mm)</a:t>
+                </a:r>
+              </a:p>
+            </c:rich>
+          </c:tx>
+          <c:layout/>
+          <c:overlay val="0"/>
+        </c:title>
+        <c:numFmt formatCode="General" sourceLinked="1"/>
+        <c:majorTickMark val="out"/>
+        <c:minorTickMark val="none"/>
+        <c:tickLblPos val="nextTo"/>
+        <c:txPr>
+          <a:bodyPr/>
+          <a:lstStyle/>
+          <a:p>
+            <a:pPr>
+              <a:defRPr sz="1200"/>
+            </a:pPr>
+            <a:endParaRPr lang="en-US"/>
+          </a:p>
+        </c:txPr>
+        <c:crossAx val="140240576"/>
+        <c:crosses val="autoZero"/>
+        <c:crossBetween val="midCat"/>
+      </c:valAx>
+      <c:valAx>
+        <c:axId val="140240576"/>
+        <c:scaling>
+          <c:orientation val="minMax"/>
+          <c:min val="200"/>
+        </c:scaling>
+        <c:delete val="0"/>
+        <c:axPos val="l"/>
+        <c:majorGridlines/>
+        <c:minorGridlines/>
+        <c:title>
+          <c:tx>
+            <c:rich>
+              <a:bodyPr/>
+              <a:lstStyle/>
+              <a:p>
+                <a:pPr>
+                  <a:defRPr sz="1400"/>
+                </a:pPr>
+                <a:r>
+                  <a:rPr lang="en-US" sz="1400"/>
+                  <a:t>Force (N)</a:t>
+                </a:r>
+              </a:p>
+            </c:rich>
+          </c:tx>
+          <c:layout/>
+          <c:overlay val="0"/>
+        </c:title>
+        <c:numFmt formatCode="General" sourceLinked="1"/>
+        <c:majorTickMark val="out"/>
+        <c:minorTickMark val="none"/>
+        <c:tickLblPos val="nextTo"/>
+        <c:txPr>
+          <a:bodyPr/>
+          <a:lstStyle/>
+          <a:p>
+            <a:pPr>
+              <a:defRPr sz="1200"/>
+            </a:pPr>
+            <a:endParaRPr lang="en-US"/>
+          </a:p>
+        </c:txPr>
+        <c:crossAx val="140238848"/>
+        <c:crosses val="autoZero"/>
+        <c:crossBetween val="midCat"/>
+      </c:valAx>
+    </c:plotArea>
+    <c:plotVisOnly val="1"/>
+    <c:dispBlanksAs val="gap"/>
+    <c:showDLblsOverMax val="0"/>
+  </c:chart>
+  <c:externalData r:id="rId1">
+    <c:autoUpdate val="0"/>
+  </c:externalData>
+</c:chartSpace>
 </file>
 
 <file path=ppt/slideLayouts/slideLayout1.xml><?xml version="1.0" encoding="utf-8"?>
@@ -306,7 +523,7 @@
           <a:p>
             <a:fld id="{B9D4E1D2-B082-4959-8BC1-1B0986A120C2}" type="datetimeFigureOut">
               <a:rPr lang="en-US" smtClean="0"/>
-              <a:t>8/6/2017</a:t>
+              <a:t>8/11/2017</a:t>
             </a:fld>
             <a:endParaRPr lang="en-US"/>
           </a:p>
@@ -476,7 +693,7 @@
           <a:p>
             <a:fld id="{B9D4E1D2-B082-4959-8BC1-1B0986A120C2}" type="datetimeFigureOut">
               <a:rPr lang="en-US" smtClean="0"/>
-              <a:t>8/6/2017</a:t>
+              <a:t>8/11/2017</a:t>
             </a:fld>
             <a:endParaRPr lang="en-US"/>
           </a:p>
@@ -656,7 +873,7 @@
           <a:p>
             <a:fld id="{B9D4E1D2-B082-4959-8BC1-1B0986A120C2}" type="datetimeFigureOut">
               <a:rPr lang="en-US" smtClean="0"/>
-              <a:t>8/6/2017</a:t>
+              <a:t>8/11/2017</a:t>
             </a:fld>
             <a:endParaRPr lang="en-US"/>
           </a:p>
@@ -826,7 +1043,7 @@
           <a:p>
             <a:fld id="{B9D4E1D2-B082-4959-8BC1-1B0986A120C2}" type="datetimeFigureOut">
               <a:rPr lang="en-US" smtClean="0"/>
-              <a:t>8/6/2017</a:t>
+              <a:t>8/11/2017</a:t>
             </a:fld>
             <a:endParaRPr lang="en-US"/>
           </a:p>
@@ -1072,7 +1289,7 @@
           <a:p>
             <a:fld id="{B9D4E1D2-B082-4959-8BC1-1B0986A120C2}" type="datetimeFigureOut">
               <a:rPr lang="en-US" smtClean="0"/>
-              <a:t>8/6/2017</a:t>
+              <a:t>8/11/2017</a:t>
             </a:fld>
             <a:endParaRPr lang="en-US"/>
           </a:p>
@@ -1360,7 +1577,7 @@
           <a:p>
             <a:fld id="{B9D4E1D2-B082-4959-8BC1-1B0986A120C2}" type="datetimeFigureOut">
               <a:rPr lang="en-US" smtClean="0"/>
-              <a:t>8/6/2017</a:t>
+              <a:t>8/11/2017</a:t>
             </a:fld>
             <a:endParaRPr lang="en-US"/>
           </a:p>
@@ -1782,7 +1999,7 @@
           <a:p>
             <a:fld id="{B9D4E1D2-B082-4959-8BC1-1B0986A120C2}" type="datetimeFigureOut">
               <a:rPr lang="en-US" smtClean="0"/>
-              <a:t>8/6/2017</a:t>
+              <a:t>8/11/2017</a:t>
             </a:fld>
             <a:endParaRPr lang="en-US"/>
           </a:p>
@@ -1900,7 +2117,7 @@
           <a:p>
             <a:fld id="{B9D4E1D2-B082-4959-8BC1-1B0986A120C2}" type="datetimeFigureOut">
               <a:rPr lang="en-US" smtClean="0"/>
-              <a:t>8/6/2017</a:t>
+              <a:t>8/11/2017</a:t>
             </a:fld>
             <a:endParaRPr lang="en-US"/>
           </a:p>
@@ -1995,7 +2212,7 @@
           <a:p>
             <a:fld id="{B9D4E1D2-B082-4959-8BC1-1B0986A120C2}" type="datetimeFigureOut">
               <a:rPr lang="en-US" smtClean="0"/>
-              <a:t>8/6/2017</a:t>
+              <a:t>8/11/2017</a:t>
             </a:fld>
             <a:endParaRPr lang="en-US"/>
           </a:p>
@@ -2272,7 +2489,7 @@
           <a:p>
             <a:fld id="{B9D4E1D2-B082-4959-8BC1-1B0986A120C2}" type="datetimeFigureOut">
               <a:rPr lang="en-US" smtClean="0"/>
-              <a:t>8/6/2017</a:t>
+              <a:t>8/11/2017</a:t>
             </a:fld>
             <a:endParaRPr lang="en-US"/>
           </a:p>
@@ -2525,7 +2742,7 @@
           <a:p>
             <a:fld id="{B9D4E1D2-B082-4959-8BC1-1B0986A120C2}" type="datetimeFigureOut">
               <a:rPr lang="en-US" smtClean="0"/>
-              <a:t>8/6/2017</a:t>
+              <a:t>8/11/2017</a:t>
             </a:fld>
             <a:endParaRPr lang="en-US"/>
           </a:p>
@@ -2738,7 +2955,7 @@
           <a:p>
             <a:fld id="{B9D4E1D2-B082-4959-8BC1-1B0986A120C2}" type="datetimeFigureOut">
               <a:rPr lang="en-US" smtClean="0"/>
-              <a:t>8/6/2017</a:t>
+              <a:t>8/11/2017</a:t>
             </a:fld>
             <a:endParaRPr lang="en-US"/>
           </a:p>
@@ -16608,6 +16825,58 @@
       </p:par>
     </p:tnLst>
   </p:timing>
+</p:sld>
+</file>
+
+<file path=ppt/slides/slide20.xml><?xml version="1.0" encoding="utf-8"?>
+<p:sld xmlns:a="http://schemas.openxmlformats.org/drawingml/2006/main" xmlns:r="http://schemas.openxmlformats.org/officeDocument/2006/relationships" xmlns:p="http://schemas.openxmlformats.org/presentationml/2006/main">
+  <p:cSld>
+    <p:spTree>
+      <p:nvGrpSpPr>
+        <p:cNvPr id="1" name=""/>
+        <p:cNvGrpSpPr/>
+        <p:nvPr/>
+      </p:nvGrpSpPr>
+      <p:grpSpPr>
+        <a:xfrm>
+          <a:off x="0" y="0"/>
+          <a:ext cx="0" cy="0"/>
+          <a:chOff x="0" y="0"/>
+          <a:chExt cx="0" cy="0"/>
+        </a:xfrm>
+      </p:grpSpPr>
+      <p:graphicFrame>
+        <p:nvGraphicFramePr>
+          <p:cNvPr id="3" name="Chart 2"/>
+          <p:cNvGraphicFramePr/>
+          <p:nvPr>
+            <p:extLst>
+              <p:ext uri="{D42A27DB-BD31-4B8C-83A1-F6EECF244321}">
+                <p14:modId xmlns:p14="http://schemas.microsoft.com/office/powerpoint/2010/main" val="3025953029"/>
+              </p:ext>
+            </p:extLst>
+          </p:nvPr>
+        </p:nvGraphicFramePr>
+        <p:xfrm>
+          <a:off x="914400" y="1066800"/>
+          <a:ext cx="7543800" cy="4648200"/>
+        </p:xfrm>
+        <a:graphic>
+          <a:graphicData uri="http://schemas.openxmlformats.org/drawingml/2006/chart">
+            <c:chart xmlns:c="http://schemas.openxmlformats.org/drawingml/2006/chart" xmlns:r="http://schemas.openxmlformats.org/officeDocument/2006/relationships" r:id="rId2"/>
+          </a:graphicData>
+        </a:graphic>
+      </p:graphicFrame>
+    </p:spTree>
+    <p:extLst>
+      <p:ext uri="{BB962C8B-B14F-4D97-AF65-F5344CB8AC3E}">
+        <p14:creationId xmlns:p14="http://schemas.microsoft.com/office/powerpoint/2010/main" val="3176270013"/>
+      </p:ext>
+    </p:extLst>
+  </p:cSld>
+  <p:clrMapOvr>
+    <a:masterClrMapping/>
+  </p:clrMapOvr>
 </p:sld>
 </file>
 

</xml_diff>

<commit_message>
A lot of new changes
</commit_message>
<xml_diff>
--- a/figures/figures.pptx
+++ b/figures/figures.pptx
@@ -25,6 +25,9 @@
     <p:sldId id="273" r:id="rId19"/>
     <p:sldId id="274" r:id="rId20"/>
     <p:sldId id="275" r:id="rId21"/>
+    <p:sldId id="276" r:id="rId22"/>
+    <p:sldId id="277" r:id="rId23"/>
+    <p:sldId id="278" r:id="rId24"/>
   </p:sldIdLst>
   <p:sldSz cx="9144000" cy="6858000" type="screen4x3"/>
   <p:notesSz cx="7315200" cy="9601200"/>
@@ -144,14 +147,16 @@
     <c:plotArea>
       <c:layout/>
       <c:scatterChart>
-        <c:scatterStyle val="lineMarker"/>
+        <c:scatterStyle val="smoothMarker"/>
         <c:varyColors val="0"/>
         <c:ser>
           <c:idx val="0"/>
           <c:order val="0"/>
           <c:spPr>
-            <a:ln w="28575">
-              <a:noFill/>
+            <a:ln w="12700">
+              <a:solidFill>
+                <a:schemeClr val="tx1"/>
+              </a:solidFill>
             </a:ln>
           </c:spPr>
           <c:marker>
@@ -161,16 +166,13 @@
               <a:solidFill>
                 <a:schemeClr val="tx1"/>
               </a:solidFill>
-              <a:ln>
-                <a:noFill/>
+              <a:ln w="12700">
+                <a:solidFill>
+                  <a:schemeClr val="tx1"/>
+                </a:solidFill>
               </a:ln>
             </c:spPr>
           </c:marker>
-          <c:trendline>
-            <c:trendlineType val="linear"/>
-            <c:dispRSqr val="0"/>
-            <c:dispEq val="0"/>
-          </c:trendline>
           <c:xVal>
             <c:numRef>
               <c:f>para_cbox!$F$8:$J$8</c:f>
@@ -219,7 +221,7 @@
               </c:numCache>
             </c:numRef>
           </c:yVal>
-          <c:smooth val="0"/>
+          <c:smooth val="1"/>
         </c:ser>
         <c:dLbls>
           <c:showLegendKey val="0"/>
@@ -229,11 +231,11 @@
           <c:showPercent val="0"/>
           <c:showBubbleSize val="0"/>
         </c:dLbls>
-        <c:axId val="86330176"/>
-        <c:axId val="86330752"/>
+        <c:axId val="117380736"/>
+        <c:axId val="117376128"/>
       </c:scatterChart>
       <c:valAx>
-        <c:axId val="86330176"/>
+        <c:axId val="117380736"/>
         <c:scaling>
           <c:orientation val="minMax"/>
           <c:max val="1"/>
@@ -280,12 +282,12 @@
             <a:endParaRPr lang="en-US"/>
           </a:p>
         </c:txPr>
-        <c:crossAx val="86330752"/>
+        <c:crossAx val="117376128"/>
         <c:crosses val="autoZero"/>
         <c:crossBetween val="midCat"/>
       </c:valAx>
       <c:valAx>
-        <c:axId val="86330752"/>
+        <c:axId val="117376128"/>
         <c:scaling>
           <c:orientation val="minMax"/>
           <c:min val="200"/>
@@ -327,7 +329,680 @@
             <a:endParaRPr lang="en-US"/>
           </a:p>
         </c:txPr>
-        <c:crossAx val="86330176"/>
+        <c:crossAx val="117380736"/>
+        <c:crosses val="autoZero"/>
+        <c:crossBetween val="midCat"/>
+      </c:valAx>
+    </c:plotArea>
+    <c:plotVisOnly val="1"/>
+    <c:dispBlanksAs val="gap"/>
+    <c:showDLblsOverMax val="0"/>
+  </c:chart>
+  <c:externalData r:id="rId1">
+    <c:autoUpdate val="0"/>
+  </c:externalData>
+</c:chartSpace>
+</file>
+
+<file path=ppt/charts/chart2.xml><?xml version="1.0" encoding="utf-8"?>
+<c:chartSpace xmlns:c="http://schemas.openxmlformats.org/drawingml/2006/chart" xmlns:a="http://schemas.openxmlformats.org/drawingml/2006/main" xmlns:r="http://schemas.openxmlformats.org/officeDocument/2006/relationships">
+  <c:date1904 val="0"/>
+  <c:lang val="en-US"/>
+  <c:roundedCorners val="0"/>
+  <mc:AlternateContent xmlns:mc="http://schemas.openxmlformats.org/markup-compatibility/2006">
+    <mc:Choice xmlns:c14="http://schemas.microsoft.com/office/drawing/2007/8/2/chart" Requires="c14">
+      <c14:style val="102"/>
+    </mc:Choice>
+    <mc:Fallback>
+      <c:style val="2"/>
+    </mc:Fallback>
+  </mc:AlternateContent>
+  <c:chart>
+    <c:autoTitleDeleted val="0"/>
+    <c:plotArea>
+      <c:layout/>
+      <c:scatterChart>
+        <c:scatterStyle val="smoothMarker"/>
+        <c:varyColors val="0"/>
+        <c:ser>
+          <c:idx val="0"/>
+          <c:order val="0"/>
+          <c:spPr>
+            <a:ln w="12700">
+              <a:solidFill>
+                <a:schemeClr val="tx1"/>
+              </a:solidFill>
+            </a:ln>
+          </c:spPr>
+          <c:marker>
+            <c:symbol val="circle"/>
+            <c:size val="7"/>
+            <c:spPr>
+              <a:solidFill>
+                <a:schemeClr val="tx1"/>
+              </a:solidFill>
+              <a:ln w="12700">
+                <a:solidFill>
+                  <a:schemeClr val="tx1"/>
+                </a:solidFill>
+              </a:ln>
+            </c:spPr>
+          </c:marker>
+          <c:xVal>
+            <c:numRef>
+              <c:f>para_eccen!$G$7:$M$7</c:f>
+              <c:numCache>
+                <c:formatCode>General</c:formatCode>
+                <c:ptCount val="7"/>
+                <c:pt idx="0">
+                  <c:v>0</c:v>
+                </c:pt>
+                <c:pt idx="1">
+                  <c:v>1E-3</c:v>
+                </c:pt>
+                <c:pt idx="2">
+                  <c:v>5.0000000000000001E-3</c:v>
+                </c:pt>
+                <c:pt idx="3">
+                  <c:v>0.01</c:v>
+                </c:pt>
+                <c:pt idx="4">
+                  <c:v>0.03</c:v>
+                </c:pt>
+                <c:pt idx="5">
+                  <c:v>0.05</c:v>
+                </c:pt>
+                <c:pt idx="6">
+                  <c:v>7.0000000000000007E-2</c:v>
+                </c:pt>
+              </c:numCache>
+            </c:numRef>
+          </c:xVal>
+          <c:yVal>
+            <c:numRef>
+              <c:f>para_eccen!$G$9:$M$9</c:f>
+              <c:numCache>
+                <c:formatCode>General</c:formatCode>
+                <c:ptCount val="7"/>
+                <c:pt idx="0">
+                  <c:v>509.66999999999996</c:v>
+                </c:pt>
+                <c:pt idx="1">
+                  <c:v>482.22999999999996</c:v>
+                </c:pt>
+                <c:pt idx="2">
+                  <c:v>493.22</c:v>
+                </c:pt>
+                <c:pt idx="3">
+                  <c:v>522.20000000000005</c:v>
+                </c:pt>
+                <c:pt idx="4">
+                  <c:v>565.88</c:v>
+                </c:pt>
+                <c:pt idx="5">
+                  <c:v>580.29999999999995</c:v>
+                </c:pt>
+                <c:pt idx="6">
+                  <c:v>662.06</c:v>
+                </c:pt>
+              </c:numCache>
+            </c:numRef>
+          </c:yVal>
+          <c:smooth val="1"/>
+        </c:ser>
+        <c:dLbls>
+          <c:showLegendKey val="0"/>
+          <c:showVal val="0"/>
+          <c:showCatName val="0"/>
+          <c:showSerName val="0"/>
+          <c:showPercent val="0"/>
+          <c:showBubbleSize val="0"/>
+        </c:dLbls>
+        <c:axId val="124919808"/>
+        <c:axId val="45793856"/>
+      </c:scatterChart>
+      <c:valAx>
+        <c:axId val="124919808"/>
+        <c:scaling>
+          <c:orientation val="minMax"/>
+          <c:max val="8.0000000000000016E-2"/>
+        </c:scaling>
+        <c:delete val="0"/>
+        <c:axPos val="b"/>
+        <c:majorGridlines>
+          <c:spPr>
+            <a:ln w="15875"/>
+          </c:spPr>
+        </c:majorGridlines>
+        <c:minorGridlines/>
+        <c:title>
+          <c:tx>
+            <c:rich>
+              <a:bodyPr/>
+              <a:lstStyle/>
+              <a:p>
+                <a:pPr>
+                  <a:defRPr sz="1400"/>
+                </a:pPr>
+                <a:r>
+                  <a:rPr lang="en-US" sz="1400"/>
+                  <a:t>Chiral eccentricity (-)</a:t>
+                </a:r>
+              </a:p>
+            </c:rich>
+          </c:tx>
+          <c:layout/>
+          <c:overlay val="0"/>
+        </c:title>
+        <c:numFmt formatCode="General" sourceLinked="1"/>
+        <c:majorTickMark val="out"/>
+        <c:minorTickMark val="none"/>
+        <c:tickLblPos val="nextTo"/>
+        <c:txPr>
+          <a:bodyPr/>
+          <a:lstStyle/>
+          <a:p>
+            <a:pPr>
+              <a:defRPr sz="1200"/>
+            </a:pPr>
+            <a:endParaRPr lang="en-US"/>
+          </a:p>
+        </c:txPr>
+        <c:crossAx val="45793856"/>
+        <c:crosses val="autoZero"/>
+        <c:crossBetween val="midCat"/>
+      </c:valAx>
+      <c:valAx>
+        <c:axId val="45793856"/>
+        <c:scaling>
+          <c:orientation val="minMax"/>
+          <c:min val="400"/>
+        </c:scaling>
+        <c:delete val="0"/>
+        <c:axPos val="l"/>
+        <c:majorGridlines/>
+        <c:minorGridlines/>
+        <c:title>
+          <c:tx>
+            <c:rich>
+              <a:bodyPr/>
+              <a:lstStyle/>
+              <a:p>
+                <a:pPr>
+                  <a:defRPr sz="1400"/>
+                </a:pPr>
+                <a:r>
+                  <a:rPr lang="en-US" sz="1400"/>
+                  <a:t>Force (N)</a:t>
+                </a:r>
+              </a:p>
+            </c:rich>
+          </c:tx>
+          <c:layout/>
+          <c:overlay val="0"/>
+        </c:title>
+        <c:numFmt formatCode="General" sourceLinked="1"/>
+        <c:majorTickMark val="out"/>
+        <c:minorTickMark val="none"/>
+        <c:tickLblPos val="nextTo"/>
+        <c:txPr>
+          <a:bodyPr/>
+          <a:lstStyle/>
+          <a:p>
+            <a:pPr>
+              <a:defRPr sz="1200"/>
+            </a:pPr>
+            <a:endParaRPr lang="en-US"/>
+          </a:p>
+        </c:txPr>
+        <c:crossAx val="124919808"/>
+        <c:crosses val="autoZero"/>
+        <c:crossBetween val="midCat"/>
+      </c:valAx>
+    </c:plotArea>
+    <c:plotVisOnly val="1"/>
+    <c:dispBlanksAs val="gap"/>
+    <c:showDLblsOverMax val="0"/>
+  </c:chart>
+  <c:externalData r:id="rId1">
+    <c:autoUpdate val="0"/>
+  </c:externalData>
+</c:chartSpace>
+</file>
+
+<file path=ppt/charts/chart3.xml><?xml version="1.0" encoding="utf-8"?>
+<c:chartSpace xmlns:c="http://schemas.openxmlformats.org/drawingml/2006/chart" xmlns:a="http://schemas.openxmlformats.org/drawingml/2006/main" xmlns:r="http://schemas.openxmlformats.org/officeDocument/2006/relationships">
+  <c:date1904 val="0"/>
+  <c:lang val="en-US"/>
+  <c:roundedCorners val="0"/>
+  <mc:AlternateContent xmlns:mc="http://schemas.openxmlformats.org/markup-compatibility/2006">
+    <mc:Choice xmlns:c14="http://schemas.microsoft.com/office/drawing/2007/8/2/chart" Requires="c14">
+      <c14:style val="102"/>
+    </mc:Choice>
+    <mc:Fallback>
+      <c:style val="2"/>
+    </mc:Fallback>
+  </mc:AlternateContent>
+  <c:chart>
+    <c:autoTitleDeleted val="0"/>
+    <c:plotArea>
+      <c:layout/>
+      <c:scatterChart>
+        <c:scatterStyle val="smoothMarker"/>
+        <c:varyColors val="0"/>
+        <c:ser>
+          <c:idx val="0"/>
+          <c:order val="0"/>
+          <c:spPr>
+            <a:ln w="19050">
+              <a:solidFill>
+                <a:schemeClr val="tx1"/>
+              </a:solidFill>
+            </a:ln>
+          </c:spPr>
+          <c:marker>
+            <c:symbol val="circle"/>
+            <c:size val="7"/>
+            <c:spPr>
+              <a:solidFill>
+                <a:schemeClr val="tx1"/>
+              </a:solidFill>
+              <a:ln w="19050">
+                <a:solidFill>
+                  <a:schemeClr val="tx1"/>
+                </a:solidFill>
+              </a:ln>
+            </c:spPr>
+          </c:marker>
+          <c:xVal>
+            <c:numRef>
+              <c:f>para_B!$F$8:$K$8</c:f>
+              <c:numCache>
+                <c:formatCode>General</c:formatCode>
+                <c:ptCount val="6"/>
+                <c:pt idx="0">
+                  <c:v>10</c:v>
+                </c:pt>
+                <c:pt idx="1">
+                  <c:v>15</c:v>
+                </c:pt>
+                <c:pt idx="2">
+                  <c:v>20</c:v>
+                </c:pt>
+                <c:pt idx="3">
+                  <c:v>25</c:v>
+                </c:pt>
+                <c:pt idx="4">
+                  <c:v>30</c:v>
+                </c:pt>
+                <c:pt idx="5">
+                  <c:v>40</c:v>
+                </c:pt>
+              </c:numCache>
+            </c:numRef>
+          </c:xVal>
+          <c:yVal>
+            <c:numRef>
+              <c:f>para_B!$F$10:$K$10</c:f>
+              <c:numCache>
+                <c:formatCode>General</c:formatCode>
+                <c:ptCount val="6"/>
+                <c:pt idx="0">
+                  <c:v>411.88</c:v>
+                </c:pt>
+                <c:pt idx="1">
+                  <c:v>480.34000000000003</c:v>
+                </c:pt>
+                <c:pt idx="2">
+                  <c:v>522.9</c:v>
+                </c:pt>
+                <c:pt idx="3">
+                  <c:v>557.13</c:v>
+                </c:pt>
+                <c:pt idx="4">
+                  <c:v>619.43000000000006</c:v>
+                </c:pt>
+                <c:pt idx="5">
+                  <c:v>679</c:v>
+                </c:pt>
+              </c:numCache>
+            </c:numRef>
+          </c:yVal>
+          <c:smooth val="1"/>
+        </c:ser>
+        <c:dLbls>
+          <c:showLegendKey val="0"/>
+          <c:showVal val="0"/>
+          <c:showCatName val="0"/>
+          <c:showSerName val="0"/>
+          <c:showPercent val="0"/>
+          <c:showBubbleSize val="0"/>
+        </c:dLbls>
+        <c:axId val="47306368"/>
+        <c:axId val="47303488"/>
+      </c:scatterChart>
+      <c:valAx>
+        <c:axId val="47306368"/>
+        <c:scaling>
+          <c:orientation val="minMax"/>
+          <c:max val="45"/>
+          <c:min val="0"/>
+        </c:scaling>
+        <c:delete val="0"/>
+        <c:axPos val="b"/>
+        <c:majorGridlines>
+          <c:spPr>
+            <a:ln w="15875"/>
+          </c:spPr>
+        </c:majorGridlines>
+        <c:minorGridlines/>
+        <c:title>
+          <c:tx>
+            <c:rich>
+              <a:bodyPr/>
+              <a:lstStyle/>
+              <a:p>
+                <a:pPr>
+                  <a:defRPr sz="1400"/>
+                </a:pPr>
+                <a:r>
+                  <a:rPr lang="en-US" sz="1400"/>
+                  <a:t>Chiral</a:t>
+                </a:r>
+                <a:r>
+                  <a:rPr lang="en-US" sz="1400" baseline="0"/>
+                  <a:t> node depth (mm)</a:t>
+                </a:r>
+                <a:endParaRPr lang="en-US" sz="1400"/>
+              </a:p>
+            </c:rich>
+          </c:tx>
+          <c:layout/>
+          <c:overlay val="0"/>
+        </c:title>
+        <c:numFmt formatCode="General" sourceLinked="1"/>
+        <c:majorTickMark val="out"/>
+        <c:minorTickMark val="none"/>
+        <c:tickLblPos val="nextTo"/>
+        <c:txPr>
+          <a:bodyPr/>
+          <a:lstStyle/>
+          <a:p>
+            <a:pPr>
+              <a:defRPr sz="1200"/>
+            </a:pPr>
+            <a:endParaRPr lang="en-US"/>
+          </a:p>
+        </c:txPr>
+        <c:crossAx val="47303488"/>
+        <c:crosses val="autoZero"/>
+        <c:crossBetween val="midCat"/>
+      </c:valAx>
+      <c:valAx>
+        <c:axId val="47303488"/>
+        <c:scaling>
+          <c:orientation val="minMax"/>
+          <c:max val="700"/>
+          <c:min val="400"/>
+        </c:scaling>
+        <c:delete val="0"/>
+        <c:axPos val="l"/>
+        <c:majorGridlines/>
+        <c:minorGridlines/>
+        <c:title>
+          <c:tx>
+            <c:rich>
+              <a:bodyPr/>
+              <a:lstStyle/>
+              <a:p>
+                <a:pPr>
+                  <a:defRPr sz="1400"/>
+                </a:pPr>
+                <a:r>
+                  <a:rPr lang="en-US" sz="1400"/>
+                  <a:t>Force (N)</a:t>
+                </a:r>
+              </a:p>
+            </c:rich>
+          </c:tx>
+          <c:layout/>
+          <c:overlay val="0"/>
+        </c:title>
+        <c:numFmt formatCode="General" sourceLinked="1"/>
+        <c:majorTickMark val="out"/>
+        <c:minorTickMark val="none"/>
+        <c:tickLblPos val="nextTo"/>
+        <c:txPr>
+          <a:bodyPr/>
+          <a:lstStyle/>
+          <a:p>
+            <a:pPr>
+              <a:defRPr sz="1200"/>
+            </a:pPr>
+            <a:endParaRPr lang="en-US"/>
+          </a:p>
+        </c:txPr>
+        <c:crossAx val="47306368"/>
+        <c:crosses val="autoZero"/>
+        <c:crossBetween val="midCat"/>
+      </c:valAx>
+    </c:plotArea>
+    <c:plotVisOnly val="1"/>
+    <c:dispBlanksAs val="gap"/>
+    <c:showDLblsOverMax val="0"/>
+  </c:chart>
+  <c:externalData r:id="rId1">
+    <c:autoUpdate val="0"/>
+  </c:externalData>
+</c:chartSpace>
+</file>
+
+<file path=ppt/charts/chart4.xml><?xml version="1.0" encoding="utf-8"?>
+<c:chartSpace xmlns:c="http://schemas.openxmlformats.org/drawingml/2006/chart" xmlns:a="http://schemas.openxmlformats.org/drawingml/2006/main" xmlns:r="http://schemas.openxmlformats.org/officeDocument/2006/relationships">
+  <c:date1904 val="0"/>
+  <c:lang val="en-US"/>
+  <c:roundedCorners val="0"/>
+  <mc:AlternateContent xmlns:mc="http://schemas.openxmlformats.org/markup-compatibility/2006">
+    <mc:Choice xmlns:c14="http://schemas.microsoft.com/office/drawing/2007/8/2/chart" Requires="c14">
+      <c14:style val="102"/>
+    </mc:Choice>
+    <mc:Fallback>
+      <c:style val="2"/>
+    </mc:Fallback>
+  </mc:AlternateContent>
+  <c:chart>
+    <c:autoTitleDeleted val="0"/>
+    <c:plotArea>
+      <c:layout/>
+      <c:scatterChart>
+        <c:scatterStyle val="smoothMarker"/>
+        <c:varyColors val="0"/>
+        <c:ser>
+          <c:idx val="0"/>
+          <c:order val="0"/>
+          <c:spPr>
+            <a:ln w="12700">
+              <a:solidFill>
+                <a:schemeClr val="tx1"/>
+              </a:solidFill>
+            </a:ln>
+          </c:spPr>
+          <c:marker>
+            <c:symbol val="circle"/>
+            <c:size val="7"/>
+            <c:spPr>
+              <a:solidFill>
+                <a:schemeClr val="tx1"/>
+              </a:solidFill>
+              <a:ln w="12700">
+                <a:solidFill>
+                  <a:schemeClr val="tx1"/>
+                </a:solidFill>
+              </a:ln>
+            </c:spPr>
+          </c:marker>
+          <c:xVal>
+            <c:numRef>
+              <c:f>para_r!$H$8:$L$8</c:f>
+              <c:numCache>
+                <c:formatCode>General</c:formatCode>
+                <c:ptCount val="5"/>
+                <c:pt idx="0">
+                  <c:v>7.5</c:v>
+                </c:pt>
+                <c:pt idx="1">
+                  <c:v>10</c:v>
+                </c:pt>
+                <c:pt idx="2">
+                  <c:v>12.5</c:v>
+                </c:pt>
+                <c:pt idx="3">
+                  <c:v>15</c:v>
+                </c:pt>
+                <c:pt idx="4">
+                  <c:v>20</c:v>
+                </c:pt>
+              </c:numCache>
+            </c:numRef>
+          </c:xVal>
+          <c:yVal>
+            <c:numRef>
+              <c:f>para_r!$H$10:$L$10</c:f>
+              <c:numCache>
+                <c:formatCode>General</c:formatCode>
+                <c:ptCount val="5"/>
+                <c:pt idx="0">
+                  <c:v>495.90000000000003</c:v>
+                </c:pt>
+                <c:pt idx="1">
+                  <c:v>516.5</c:v>
+                </c:pt>
+                <c:pt idx="2">
+                  <c:v>670.5</c:v>
+                </c:pt>
+                <c:pt idx="3">
+                  <c:v>696.8</c:v>
+                </c:pt>
+                <c:pt idx="4">
+                  <c:v>778.3</c:v>
+                </c:pt>
+              </c:numCache>
+            </c:numRef>
+          </c:yVal>
+          <c:smooth val="1"/>
+        </c:ser>
+        <c:dLbls>
+          <c:showLegendKey val="0"/>
+          <c:showVal val="0"/>
+          <c:showCatName val="0"/>
+          <c:showSerName val="0"/>
+          <c:showPercent val="0"/>
+          <c:showBubbleSize val="0"/>
+        </c:dLbls>
+        <c:axId val="117377856"/>
+        <c:axId val="132112384"/>
+      </c:scatterChart>
+      <c:valAx>
+        <c:axId val="117377856"/>
+        <c:scaling>
+          <c:orientation val="minMax"/>
+          <c:min val="5"/>
+        </c:scaling>
+        <c:delete val="0"/>
+        <c:axPos val="b"/>
+        <c:majorGridlines>
+          <c:spPr>
+            <a:ln w="15875"/>
+          </c:spPr>
+        </c:majorGridlines>
+        <c:minorGridlines/>
+        <c:title>
+          <c:tx>
+            <c:rich>
+              <a:bodyPr/>
+              <a:lstStyle/>
+              <a:p>
+                <a:pPr>
+                  <a:defRPr sz="1400"/>
+                </a:pPr>
+                <a:r>
+                  <a:rPr lang="en-US" sz="1400"/>
+                  <a:t>Chiral node</a:t>
+                </a:r>
+                <a:r>
+                  <a:rPr lang="en-US" sz="1400" baseline="0"/>
+                  <a:t> radius (mm)</a:t>
+                </a:r>
+                <a:endParaRPr lang="en-US" sz="1400"/>
+              </a:p>
+            </c:rich>
+          </c:tx>
+          <c:layout/>
+          <c:overlay val="0"/>
+        </c:title>
+        <c:numFmt formatCode="General" sourceLinked="1"/>
+        <c:majorTickMark val="out"/>
+        <c:minorTickMark val="none"/>
+        <c:tickLblPos val="nextTo"/>
+        <c:txPr>
+          <a:bodyPr/>
+          <a:lstStyle/>
+          <a:p>
+            <a:pPr>
+              <a:defRPr sz="1200"/>
+            </a:pPr>
+            <a:endParaRPr lang="en-US"/>
+          </a:p>
+        </c:txPr>
+        <c:crossAx val="132112384"/>
+        <c:crosses val="autoZero"/>
+        <c:crossBetween val="midCat"/>
+      </c:valAx>
+      <c:valAx>
+        <c:axId val="132112384"/>
+        <c:scaling>
+          <c:orientation val="minMax"/>
+          <c:max val="800"/>
+          <c:min val="400"/>
+        </c:scaling>
+        <c:delete val="0"/>
+        <c:axPos val="l"/>
+        <c:majorGridlines/>
+        <c:minorGridlines/>
+        <c:title>
+          <c:tx>
+            <c:rich>
+              <a:bodyPr/>
+              <a:lstStyle/>
+              <a:p>
+                <a:pPr>
+                  <a:defRPr sz="1400"/>
+                </a:pPr>
+                <a:r>
+                  <a:rPr lang="en-US" sz="1400"/>
+                  <a:t>Force (N)</a:t>
+                </a:r>
+              </a:p>
+            </c:rich>
+          </c:tx>
+          <c:layout/>
+          <c:overlay val="0"/>
+        </c:title>
+        <c:numFmt formatCode="General" sourceLinked="1"/>
+        <c:majorTickMark val="out"/>
+        <c:minorTickMark val="none"/>
+        <c:tickLblPos val="nextTo"/>
+        <c:txPr>
+          <a:bodyPr/>
+          <a:lstStyle/>
+          <a:p>
+            <a:pPr>
+              <a:defRPr sz="1200"/>
+            </a:pPr>
+            <a:endParaRPr lang="en-US"/>
+          </a:p>
+        </c:txPr>
+        <c:crossAx val="117377856"/>
         <c:crosses val="autoZero"/>
         <c:crossBetween val="midCat"/>
       </c:valAx>
@@ -523,7 +1198,7 @@
           <a:p>
             <a:fld id="{B9D4E1D2-B082-4959-8BC1-1B0986A120C2}" type="datetimeFigureOut">
               <a:rPr lang="en-US" smtClean="0"/>
-              <a:t>8/13/2017</a:t>
+              <a:t>8/14/2017</a:t>
             </a:fld>
             <a:endParaRPr lang="en-US"/>
           </a:p>
@@ -693,7 +1368,7 @@
           <a:p>
             <a:fld id="{B9D4E1D2-B082-4959-8BC1-1B0986A120C2}" type="datetimeFigureOut">
               <a:rPr lang="en-US" smtClean="0"/>
-              <a:t>8/13/2017</a:t>
+              <a:t>8/14/2017</a:t>
             </a:fld>
             <a:endParaRPr lang="en-US"/>
           </a:p>
@@ -873,7 +1548,7 @@
           <a:p>
             <a:fld id="{B9D4E1D2-B082-4959-8BC1-1B0986A120C2}" type="datetimeFigureOut">
               <a:rPr lang="en-US" smtClean="0"/>
-              <a:t>8/13/2017</a:t>
+              <a:t>8/14/2017</a:t>
             </a:fld>
             <a:endParaRPr lang="en-US"/>
           </a:p>
@@ -1043,7 +1718,7 @@
           <a:p>
             <a:fld id="{B9D4E1D2-B082-4959-8BC1-1B0986A120C2}" type="datetimeFigureOut">
               <a:rPr lang="en-US" smtClean="0"/>
-              <a:t>8/13/2017</a:t>
+              <a:t>8/14/2017</a:t>
             </a:fld>
             <a:endParaRPr lang="en-US"/>
           </a:p>
@@ -1289,7 +1964,7 @@
           <a:p>
             <a:fld id="{B9D4E1D2-B082-4959-8BC1-1B0986A120C2}" type="datetimeFigureOut">
               <a:rPr lang="en-US" smtClean="0"/>
-              <a:t>8/13/2017</a:t>
+              <a:t>8/14/2017</a:t>
             </a:fld>
             <a:endParaRPr lang="en-US"/>
           </a:p>
@@ -1577,7 +2252,7 @@
           <a:p>
             <a:fld id="{B9D4E1D2-B082-4959-8BC1-1B0986A120C2}" type="datetimeFigureOut">
               <a:rPr lang="en-US" smtClean="0"/>
-              <a:t>8/13/2017</a:t>
+              <a:t>8/14/2017</a:t>
             </a:fld>
             <a:endParaRPr lang="en-US"/>
           </a:p>
@@ -1999,7 +2674,7 @@
           <a:p>
             <a:fld id="{B9D4E1D2-B082-4959-8BC1-1B0986A120C2}" type="datetimeFigureOut">
               <a:rPr lang="en-US" smtClean="0"/>
-              <a:t>8/13/2017</a:t>
+              <a:t>8/14/2017</a:t>
             </a:fld>
             <a:endParaRPr lang="en-US"/>
           </a:p>
@@ -2117,7 +2792,7 @@
           <a:p>
             <a:fld id="{B9D4E1D2-B082-4959-8BC1-1B0986A120C2}" type="datetimeFigureOut">
               <a:rPr lang="en-US" smtClean="0"/>
-              <a:t>8/13/2017</a:t>
+              <a:t>8/14/2017</a:t>
             </a:fld>
             <a:endParaRPr lang="en-US"/>
           </a:p>
@@ -2212,7 +2887,7 @@
           <a:p>
             <a:fld id="{B9D4E1D2-B082-4959-8BC1-1B0986A120C2}" type="datetimeFigureOut">
               <a:rPr lang="en-US" smtClean="0"/>
-              <a:t>8/13/2017</a:t>
+              <a:t>8/14/2017</a:t>
             </a:fld>
             <a:endParaRPr lang="en-US"/>
           </a:p>
@@ -2489,7 +3164,7 @@
           <a:p>
             <a:fld id="{B9D4E1D2-B082-4959-8BC1-1B0986A120C2}" type="datetimeFigureOut">
               <a:rPr lang="en-US" smtClean="0"/>
-              <a:t>8/13/2017</a:t>
+              <a:t>8/14/2017</a:t>
             </a:fld>
             <a:endParaRPr lang="en-US"/>
           </a:p>
@@ -2742,7 +3417,7 @@
           <a:p>
             <a:fld id="{B9D4E1D2-B082-4959-8BC1-1B0986A120C2}" type="datetimeFigureOut">
               <a:rPr lang="en-US" smtClean="0"/>
-              <a:t>8/13/2017</a:t>
+              <a:t>8/14/2017</a:t>
             </a:fld>
             <a:endParaRPr lang="en-US"/>
           </a:p>
@@ -2955,7 +3630,7 @@
           <a:p>
             <a:fld id="{B9D4E1D2-B082-4959-8BC1-1B0986A120C2}" type="datetimeFigureOut">
               <a:rPr lang="en-US" smtClean="0"/>
-              <a:t>8/13/2017</a:t>
+              <a:t>8/14/2017</a:t>
             </a:fld>
             <a:endParaRPr lang="en-US"/>
           </a:p>
@@ -14915,11 +15590,7 @@
             </a:r>
             <a:r>
               <a:rPr lang="es-ES" sz="1400" u="sng" dirty="0" smtClean="0"/>
-              <a:t> </a:t>
-            </a:r>
-            <a:r>
-              <a:rPr lang="es-ES" sz="1400" u="sng" dirty="0" smtClean="0"/>
-              <a:t>script</a:t>
+              <a:t> script</a:t>
             </a:r>
           </a:p>
           <a:p>
@@ -17057,19 +17728,21 @@
       </p:grpSpPr>
       <p:graphicFrame>
         <p:nvGraphicFramePr>
-          <p:cNvPr id="3" name="Chart 2"/>
-          <p:cNvGraphicFramePr/>
+          <p:cNvPr id="4" name="Chart 3"/>
+          <p:cNvGraphicFramePr>
+            <a:graphicFrameLocks/>
+          </p:cNvGraphicFramePr>
           <p:nvPr>
             <p:extLst>
               <p:ext uri="{D42A27DB-BD31-4B8C-83A1-F6EECF244321}">
-                <p14:modId xmlns:p14="http://schemas.microsoft.com/office/powerpoint/2010/main" val="3025953029"/>
+                <p14:modId xmlns:p14="http://schemas.microsoft.com/office/powerpoint/2010/main" val="3453961491"/>
               </p:ext>
             </p:extLst>
           </p:nvPr>
         </p:nvGraphicFramePr>
         <p:xfrm>
-          <a:off x="914400" y="1066800"/>
-          <a:ext cx="7543800" cy="4648200"/>
+          <a:off x="685800" y="685800"/>
+          <a:ext cx="7848599" cy="5257799"/>
         </p:xfrm>
         <a:graphic>
           <a:graphicData uri="http://schemas.openxmlformats.org/drawingml/2006/chart">
@@ -17081,6 +17754,176 @@
     <p:extLst>
       <p:ext uri="{BB962C8B-B14F-4D97-AF65-F5344CB8AC3E}">
         <p14:creationId xmlns:p14="http://schemas.microsoft.com/office/powerpoint/2010/main" val="3176270013"/>
+      </p:ext>
+    </p:extLst>
+  </p:cSld>
+  <p:clrMapOvr>
+    <a:masterClrMapping/>
+  </p:clrMapOvr>
+</p:sld>
+</file>
+
+<file path=ppt/slides/slide21.xml><?xml version="1.0" encoding="utf-8"?>
+<p:sld xmlns:a="http://schemas.openxmlformats.org/drawingml/2006/main" xmlns:r="http://schemas.openxmlformats.org/officeDocument/2006/relationships" xmlns:p="http://schemas.openxmlformats.org/presentationml/2006/main" show="0">
+  <p:cSld>
+    <p:spTree>
+      <p:nvGrpSpPr>
+        <p:cNvPr id="1" name=""/>
+        <p:cNvGrpSpPr/>
+        <p:nvPr/>
+      </p:nvGrpSpPr>
+      <p:grpSpPr>
+        <a:xfrm>
+          <a:off x="0" y="0"/>
+          <a:ext cx="0" cy="0"/>
+          <a:chOff x="0" y="0"/>
+          <a:chExt cx="0" cy="0"/>
+        </a:xfrm>
+      </p:grpSpPr>
+      <p:graphicFrame>
+        <p:nvGraphicFramePr>
+          <p:cNvPr id="2" name="Chart 1"/>
+          <p:cNvGraphicFramePr>
+            <a:graphicFrameLocks/>
+          </p:cNvGraphicFramePr>
+          <p:nvPr>
+            <p:extLst>
+              <p:ext uri="{D42A27DB-BD31-4B8C-83A1-F6EECF244321}">
+                <p14:modId xmlns:p14="http://schemas.microsoft.com/office/powerpoint/2010/main" val="1512657439"/>
+              </p:ext>
+            </p:extLst>
+          </p:nvPr>
+        </p:nvGraphicFramePr>
+        <p:xfrm>
+          <a:off x="838200" y="990600"/>
+          <a:ext cx="7239000" cy="4724400"/>
+        </p:xfrm>
+        <a:graphic>
+          <a:graphicData uri="http://schemas.openxmlformats.org/drawingml/2006/chart">
+            <c:chart xmlns:c="http://schemas.openxmlformats.org/drawingml/2006/chart" xmlns:r="http://schemas.openxmlformats.org/officeDocument/2006/relationships" r:id="rId2"/>
+          </a:graphicData>
+        </a:graphic>
+      </p:graphicFrame>
+    </p:spTree>
+    <p:extLst>
+      <p:ext uri="{BB962C8B-B14F-4D97-AF65-F5344CB8AC3E}">
+        <p14:creationId xmlns:p14="http://schemas.microsoft.com/office/powerpoint/2010/main" val="2996904192"/>
+      </p:ext>
+    </p:extLst>
+  </p:cSld>
+  <p:clrMapOvr>
+    <a:masterClrMapping/>
+  </p:clrMapOvr>
+  <mc:AlternateContent xmlns:mc="http://schemas.openxmlformats.org/markup-compatibility/2006">
+    <mc:Choice xmlns:p14="http://schemas.microsoft.com/office/powerpoint/2010/main" Requires="p14">
+      <p:transition spd="slow" p14:dur="2000"/>
+    </mc:Choice>
+    <mc:Fallback>
+      <p:transition spd="slow"/>
+    </mc:Fallback>
+  </mc:AlternateContent>
+</p:sld>
+</file>
+
+<file path=ppt/slides/slide22.xml><?xml version="1.0" encoding="utf-8"?>
+<p:sld xmlns:a="http://schemas.openxmlformats.org/drawingml/2006/main" xmlns:r="http://schemas.openxmlformats.org/officeDocument/2006/relationships" xmlns:p="http://schemas.openxmlformats.org/presentationml/2006/main">
+  <p:cSld>
+    <p:spTree>
+      <p:nvGrpSpPr>
+        <p:cNvPr id="1" name=""/>
+        <p:cNvGrpSpPr/>
+        <p:nvPr/>
+      </p:nvGrpSpPr>
+      <p:grpSpPr>
+        <a:xfrm>
+          <a:off x="0" y="0"/>
+          <a:ext cx="0" cy="0"/>
+          <a:chOff x="0" y="0"/>
+          <a:chExt cx="0" cy="0"/>
+        </a:xfrm>
+      </p:grpSpPr>
+      <p:graphicFrame>
+        <p:nvGraphicFramePr>
+          <p:cNvPr id="2" name="Chart 1"/>
+          <p:cNvGraphicFramePr>
+            <a:graphicFrameLocks/>
+          </p:cNvGraphicFramePr>
+          <p:nvPr>
+            <p:extLst>
+              <p:ext uri="{D42A27DB-BD31-4B8C-83A1-F6EECF244321}">
+                <p14:modId xmlns:p14="http://schemas.microsoft.com/office/powerpoint/2010/main" val="3868584632"/>
+              </p:ext>
+            </p:extLst>
+          </p:nvPr>
+        </p:nvGraphicFramePr>
+        <p:xfrm>
+          <a:off x="1504950" y="1143001"/>
+          <a:ext cx="6953250" cy="3886199"/>
+        </p:xfrm>
+        <a:graphic>
+          <a:graphicData uri="http://schemas.openxmlformats.org/drawingml/2006/chart">
+            <c:chart xmlns:c="http://schemas.openxmlformats.org/drawingml/2006/chart" xmlns:r="http://schemas.openxmlformats.org/officeDocument/2006/relationships" r:id="rId2"/>
+          </a:graphicData>
+        </a:graphic>
+      </p:graphicFrame>
+    </p:spTree>
+    <p:extLst>
+      <p:ext uri="{BB962C8B-B14F-4D97-AF65-F5344CB8AC3E}">
+        <p14:creationId xmlns:p14="http://schemas.microsoft.com/office/powerpoint/2010/main" val="3482994910"/>
+      </p:ext>
+    </p:extLst>
+  </p:cSld>
+  <p:clrMapOvr>
+    <a:masterClrMapping/>
+  </p:clrMapOvr>
+</p:sld>
+</file>
+
+<file path=ppt/slides/slide23.xml><?xml version="1.0" encoding="utf-8"?>
+<p:sld xmlns:a="http://schemas.openxmlformats.org/drawingml/2006/main" xmlns:r="http://schemas.openxmlformats.org/officeDocument/2006/relationships" xmlns:p="http://schemas.openxmlformats.org/presentationml/2006/main">
+  <p:cSld>
+    <p:spTree>
+      <p:nvGrpSpPr>
+        <p:cNvPr id="1" name=""/>
+        <p:cNvGrpSpPr/>
+        <p:nvPr/>
+      </p:nvGrpSpPr>
+      <p:grpSpPr>
+        <a:xfrm>
+          <a:off x="0" y="0"/>
+          <a:ext cx="0" cy="0"/>
+          <a:chOff x="0" y="0"/>
+          <a:chExt cx="0" cy="0"/>
+        </a:xfrm>
+      </p:grpSpPr>
+      <p:graphicFrame>
+        <p:nvGraphicFramePr>
+          <p:cNvPr id="2" name="Chart 1"/>
+          <p:cNvGraphicFramePr>
+            <a:graphicFrameLocks/>
+          </p:cNvGraphicFramePr>
+          <p:nvPr>
+            <p:extLst>
+              <p:ext uri="{D42A27DB-BD31-4B8C-83A1-F6EECF244321}">
+                <p14:modId xmlns:p14="http://schemas.microsoft.com/office/powerpoint/2010/main" val="46678658"/>
+              </p:ext>
+            </p:extLst>
+          </p:nvPr>
+        </p:nvGraphicFramePr>
+        <p:xfrm>
+          <a:off x="1387928" y="1066800"/>
+          <a:ext cx="6689272" cy="4199164"/>
+        </p:xfrm>
+        <a:graphic>
+          <a:graphicData uri="http://schemas.openxmlformats.org/drawingml/2006/chart">
+            <c:chart xmlns:c="http://schemas.openxmlformats.org/drawingml/2006/chart" xmlns:r="http://schemas.openxmlformats.org/officeDocument/2006/relationships" r:id="rId2"/>
+          </a:graphicData>
+        </a:graphic>
+      </p:graphicFrame>
+    </p:spTree>
+    <p:extLst>
+      <p:ext uri="{BB962C8B-B14F-4D97-AF65-F5344CB8AC3E}">
+        <p14:creationId xmlns:p14="http://schemas.microsoft.com/office/powerpoint/2010/main" val="1668987099"/>
       </p:ext>
     </p:extLst>
   </p:cSld>

</xml_diff>

<commit_message>
Middle of the night
</commit_message>
<xml_diff>
--- a/figures/figures.pptx
+++ b/figures/figures.pptx
@@ -25,11 +25,12 @@
     <p:sldId id="273" r:id="rId19"/>
     <p:sldId id="274" r:id="rId20"/>
     <p:sldId id="275" r:id="rId21"/>
-    <p:sldId id="276" r:id="rId22"/>
-    <p:sldId id="277" r:id="rId23"/>
-    <p:sldId id="278" r:id="rId24"/>
-    <p:sldId id="279" r:id="rId25"/>
-    <p:sldId id="280" r:id="rId26"/>
+    <p:sldId id="281" r:id="rId22"/>
+    <p:sldId id="276" r:id="rId23"/>
+    <p:sldId id="277" r:id="rId24"/>
+    <p:sldId id="278" r:id="rId25"/>
+    <p:sldId id="279" r:id="rId26"/>
+    <p:sldId id="280" r:id="rId27"/>
   </p:sldIdLst>
   <p:sldSz cx="9144000" cy="6858000" type="screen4x3"/>
   <p:notesSz cx="7315200" cy="9601200"/>
@@ -155,7 +156,7 @@
           <c:idx val="0"/>
           <c:order val="0"/>
           <c:spPr>
-            <a:ln w="12700">
+            <a:ln w="57150">
               <a:solidFill>
                 <a:schemeClr val="tx1"/>
               </a:solidFill>
@@ -163,12 +164,12 @@
           </c:spPr>
           <c:marker>
             <c:symbol val="circle"/>
-            <c:size val="7"/>
+            <c:size val="10"/>
             <c:spPr>
               <a:solidFill>
                 <a:schemeClr val="tx1"/>
               </a:solidFill>
-              <a:ln w="12700">
+              <a:ln w="57150">
                 <a:solidFill>
                   <a:schemeClr val="tx1"/>
                 </a:solidFill>
@@ -233,11 +234,11 @@
           <c:showPercent val="0"/>
           <c:showBubbleSize val="0"/>
         </c:dLbls>
-        <c:axId val="56822592"/>
-        <c:axId val="56823168"/>
+        <c:axId val="95505216"/>
+        <c:axId val="95505792"/>
       </c:scatterChart>
       <c:valAx>
-        <c:axId val="56822592"/>
+        <c:axId val="95505216"/>
         <c:scaling>
           <c:orientation val="minMax"/>
           <c:max val="1"/>
@@ -258,10 +259,10 @@
               <a:lstStyle/>
               <a:p>
                 <a:pPr>
-                  <a:defRPr sz="1400"/>
+                  <a:defRPr sz="1800"/>
                 </a:pPr>
                 <a:r>
-                  <a:rPr lang="en-US" sz="1400"/>
+                  <a:rPr lang="en-US" sz="1800" dirty="0"/>
                   <a:t>Wing-box thickness (mm)</a:t>
                 </a:r>
               </a:p>
@@ -279,17 +280,17 @@
           <a:lstStyle/>
           <a:p>
             <a:pPr>
-              <a:defRPr sz="1200"/>
+              <a:defRPr sz="1400"/>
             </a:pPr>
             <a:endParaRPr lang="en-US"/>
           </a:p>
         </c:txPr>
-        <c:crossAx val="56823168"/>
+        <c:crossAx val="95505792"/>
         <c:crosses val="autoZero"/>
         <c:crossBetween val="midCat"/>
       </c:valAx>
       <c:valAx>
-        <c:axId val="56823168"/>
+        <c:axId val="95505792"/>
         <c:scaling>
           <c:orientation val="minMax"/>
           <c:min val="200"/>
@@ -305,10 +306,10 @@
               <a:lstStyle/>
               <a:p>
                 <a:pPr>
-                  <a:defRPr sz="1400"/>
+                  <a:defRPr sz="1800"/>
                 </a:pPr>
                 <a:r>
-                  <a:rPr lang="en-US" sz="1400"/>
+                  <a:rPr lang="en-US" sz="1800"/>
                   <a:t>Force (N)</a:t>
                 </a:r>
               </a:p>
@@ -326,12 +327,12 @@
           <a:lstStyle/>
           <a:p>
             <a:pPr>
-              <a:defRPr sz="1200"/>
+              <a:defRPr sz="1400"/>
             </a:pPr>
             <a:endParaRPr lang="en-US"/>
           </a:p>
         </c:txPr>
-        <c:crossAx val="56822592"/>
+        <c:crossAx val="95505216"/>
         <c:crosses val="autoZero"/>
         <c:crossBetween val="midCat"/>
       </c:valAx>
@@ -370,7 +371,7 @@
           <c:idx val="0"/>
           <c:order val="0"/>
           <c:spPr>
-            <a:ln w="12700">
+            <a:ln w="57150">
               <a:solidFill>
                 <a:schemeClr val="tx1"/>
               </a:solidFill>
@@ -378,12 +379,239 @@
           </c:spPr>
           <c:marker>
             <c:symbol val="circle"/>
-            <c:size val="7"/>
+            <c:size val="10"/>
             <c:spPr>
               <a:solidFill>
                 <a:schemeClr val="tx1"/>
               </a:solidFill>
-              <a:ln w="12700">
+              <a:ln w="57150">
+                <a:solidFill>
+                  <a:schemeClr val="tx1"/>
+                </a:solidFill>
+              </a:ln>
+            </c:spPr>
+          </c:marker>
+          <c:xVal>
+            <c:numRef>
+              <c:f>para_N!$J$8:$O$8</c:f>
+              <c:numCache>
+                <c:formatCode>General</c:formatCode>
+                <c:ptCount val="6"/>
+                <c:pt idx="0">
+                  <c:v>611.88229999999999</c:v>
+                </c:pt>
+                <c:pt idx="1">
+                  <c:v>713.86699999999996</c:v>
+                </c:pt>
+                <c:pt idx="2">
+                  <c:v>815.84</c:v>
+                </c:pt>
+                <c:pt idx="3">
+                  <c:v>917.82</c:v>
+                </c:pt>
+                <c:pt idx="4">
+                  <c:v>1019.8</c:v>
+                </c:pt>
+                <c:pt idx="5">
+                  <c:v>1121.78</c:v>
+                </c:pt>
+              </c:numCache>
+            </c:numRef>
+          </c:xVal>
+          <c:yVal>
+            <c:numRef>
+              <c:f>para_N!$C$10:$G$10</c:f>
+              <c:numCache>
+                <c:formatCode>General</c:formatCode>
+                <c:ptCount val="5"/>
+                <c:pt idx="0">
+                  <c:v>491.05</c:v>
+                </c:pt>
+                <c:pt idx="1">
+                  <c:v>409.71000000000004</c:v>
+                </c:pt>
+                <c:pt idx="2">
+                  <c:v>376.74</c:v>
+                </c:pt>
+                <c:pt idx="3">
+                  <c:v>333.2</c:v>
+                </c:pt>
+                <c:pt idx="4">
+                  <c:v>297.99</c:v>
+                </c:pt>
+              </c:numCache>
+            </c:numRef>
+          </c:yVal>
+          <c:smooth val="1"/>
+        </c:ser>
+        <c:dLbls>
+          <c:showLegendKey val="0"/>
+          <c:showVal val="0"/>
+          <c:showCatName val="0"/>
+          <c:showSerName val="0"/>
+          <c:showPercent val="0"/>
+          <c:showBubbleSize val="0"/>
+        </c:dLbls>
+        <c:axId val="95517440"/>
+        <c:axId val="95518016"/>
+      </c:scatterChart>
+      <c:valAx>
+        <c:axId val="95517440"/>
+        <c:scaling>
+          <c:orientation val="minMax"/>
+          <c:max val="1100"/>
+          <c:min val="600"/>
+        </c:scaling>
+        <c:delete val="0"/>
+        <c:axPos val="b"/>
+        <c:majorGridlines>
+          <c:spPr>
+            <a:ln w="15875"/>
+          </c:spPr>
+        </c:majorGridlines>
+        <c:minorGridlines/>
+        <c:title>
+          <c:tx>
+            <c:rich>
+              <a:bodyPr/>
+              <a:lstStyle/>
+              <a:p>
+                <a:pPr>
+                  <a:defRPr sz="1800"/>
+                </a:pPr>
+                <a:r>
+                  <a:rPr lang="en-US" sz="1800" dirty="0"/>
+                  <a:t>Wing-box length</a:t>
+                </a:r>
+                <a:r>
+                  <a:rPr lang="en-US" sz="1800" baseline="0" dirty="0"/>
+                  <a:t> </a:t>
+                </a:r>
+                <a:r>
+                  <a:rPr lang="en-US" sz="1800" dirty="0"/>
+                  <a:t>(mm)</a:t>
+                </a:r>
+              </a:p>
+            </c:rich>
+          </c:tx>
+          <c:layout/>
+          <c:overlay val="0"/>
+        </c:title>
+        <c:numFmt formatCode="General" sourceLinked="1"/>
+        <c:majorTickMark val="out"/>
+        <c:minorTickMark val="none"/>
+        <c:tickLblPos val="nextTo"/>
+        <c:txPr>
+          <a:bodyPr/>
+          <a:lstStyle/>
+          <a:p>
+            <a:pPr>
+              <a:defRPr sz="1400"/>
+            </a:pPr>
+            <a:endParaRPr lang="en-US"/>
+          </a:p>
+        </c:txPr>
+        <c:crossAx val="95518016"/>
+        <c:crosses val="autoZero"/>
+        <c:crossBetween val="midCat"/>
+      </c:valAx>
+      <c:valAx>
+        <c:axId val="95518016"/>
+        <c:scaling>
+          <c:orientation val="minMax"/>
+          <c:max val="600"/>
+          <c:min val="200"/>
+        </c:scaling>
+        <c:delete val="0"/>
+        <c:axPos val="l"/>
+        <c:majorGridlines/>
+        <c:minorGridlines/>
+        <c:title>
+          <c:tx>
+            <c:rich>
+              <a:bodyPr/>
+              <a:lstStyle/>
+              <a:p>
+                <a:pPr>
+                  <a:defRPr sz="1800"/>
+                </a:pPr>
+                <a:r>
+                  <a:rPr lang="en-US" sz="1800"/>
+                  <a:t>Force (N)</a:t>
+                </a:r>
+              </a:p>
+            </c:rich>
+          </c:tx>
+          <c:layout/>
+          <c:overlay val="0"/>
+        </c:title>
+        <c:numFmt formatCode="General" sourceLinked="1"/>
+        <c:majorTickMark val="out"/>
+        <c:minorTickMark val="none"/>
+        <c:tickLblPos val="nextTo"/>
+        <c:txPr>
+          <a:bodyPr/>
+          <a:lstStyle/>
+          <a:p>
+            <a:pPr>
+              <a:defRPr sz="1400"/>
+            </a:pPr>
+            <a:endParaRPr lang="en-US"/>
+          </a:p>
+        </c:txPr>
+        <c:crossAx val="95517440"/>
+        <c:crosses val="autoZero"/>
+        <c:crossBetween val="midCat"/>
+      </c:valAx>
+    </c:plotArea>
+    <c:plotVisOnly val="1"/>
+    <c:dispBlanksAs val="gap"/>
+    <c:showDLblsOverMax val="0"/>
+  </c:chart>
+  <c:externalData r:id="rId1">
+    <c:autoUpdate val="0"/>
+  </c:externalData>
+</c:chartSpace>
+</file>
+
+<file path=ppt/charts/chart3.xml><?xml version="1.0" encoding="utf-8"?>
+<c:chartSpace xmlns:c="http://schemas.openxmlformats.org/drawingml/2006/chart" xmlns:a="http://schemas.openxmlformats.org/drawingml/2006/main" xmlns:r="http://schemas.openxmlformats.org/officeDocument/2006/relationships">
+  <c:date1904 val="0"/>
+  <c:lang val="en-US"/>
+  <c:roundedCorners val="0"/>
+  <mc:AlternateContent xmlns:mc="http://schemas.openxmlformats.org/markup-compatibility/2006">
+    <mc:Choice xmlns:c14="http://schemas.microsoft.com/office/drawing/2007/8/2/chart" Requires="c14">
+      <c14:style val="102"/>
+    </mc:Choice>
+    <mc:Fallback>
+      <c:style val="2"/>
+    </mc:Fallback>
+  </mc:AlternateContent>
+  <c:chart>
+    <c:autoTitleDeleted val="0"/>
+    <c:plotArea>
+      <c:layout/>
+      <c:scatterChart>
+        <c:scatterStyle val="smoothMarker"/>
+        <c:varyColors val="0"/>
+        <c:ser>
+          <c:idx val="0"/>
+          <c:order val="0"/>
+          <c:spPr>
+            <a:ln w="57150">
+              <a:solidFill>
+                <a:schemeClr val="tx1"/>
+              </a:solidFill>
+            </a:ln>
+          </c:spPr>
+          <c:marker>
+            <c:symbol val="circle"/>
+            <c:size val="10"/>
+            <c:spPr>
+              <a:solidFill>
+                <a:schemeClr val="tx1"/>
+              </a:solidFill>
+              <a:ln w="57150">
                 <a:solidFill>
                   <a:schemeClr val="tx1"/>
                 </a:solidFill>
@@ -460,11 +688,11 @@
           <c:showPercent val="0"/>
           <c:showBubbleSize val="0"/>
         </c:dLbls>
-        <c:axId val="56825472"/>
-        <c:axId val="56826048"/>
+        <c:axId val="95508096"/>
+        <c:axId val="95508672"/>
       </c:scatterChart>
       <c:valAx>
-        <c:axId val="56825472"/>
+        <c:axId val="95508096"/>
         <c:scaling>
           <c:orientation val="minMax"/>
           <c:max val="8.0000000000000016E-2"/>
@@ -484,10 +712,10 @@
               <a:lstStyle/>
               <a:p>
                 <a:pPr>
-                  <a:defRPr sz="1400"/>
+                  <a:defRPr sz="1800"/>
                 </a:pPr>
                 <a:r>
-                  <a:rPr lang="en-US" sz="1400"/>
+                  <a:rPr lang="en-US" sz="1800"/>
                   <a:t>Chiral eccentricity (-)</a:t>
                 </a:r>
               </a:p>
@@ -505,17 +733,17 @@
           <a:lstStyle/>
           <a:p>
             <a:pPr>
-              <a:defRPr sz="1200"/>
+              <a:defRPr sz="1400"/>
             </a:pPr>
             <a:endParaRPr lang="en-US"/>
           </a:p>
         </c:txPr>
-        <c:crossAx val="56826048"/>
+        <c:crossAx val="95508672"/>
         <c:crosses val="autoZero"/>
         <c:crossBetween val="midCat"/>
       </c:valAx>
       <c:valAx>
-        <c:axId val="56826048"/>
+        <c:axId val="95508672"/>
         <c:scaling>
           <c:orientation val="minMax"/>
           <c:min val="400"/>
@@ -531,10 +759,10 @@
               <a:lstStyle/>
               <a:p>
                 <a:pPr>
-                  <a:defRPr sz="1400"/>
+                  <a:defRPr sz="1800"/>
                 </a:pPr>
                 <a:r>
-                  <a:rPr lang="en-US" sz="1400"/>
+                  <a:rPr lang="en-US" sz="1800"/>
                   <a:t>Force (N)</a:t>
                 </a:r>
               </a:p>
@@ -552,12 +780,12 @@
           <a:lstStyle/>
           <a:p>
             <a:pPr>
-              <a:defRPr sz="1200"/>
+              <a:defRPr sz="1400"/>
             </a:pPr>
             <a:endParaRPr lang="en-US"/>
           </a:p>
         </c:txPr>
-        <c:crossAx val="56825472"/>
+        <c:crossAx val="95508096"/>
         <c:crosses val="autoZero"/>
         <c:crossBetween val="midCat"/>
       </c:valAx>
@@ -572,7 +800,7 @@
 </c:chartSpace>
 </file>
 
-<file path=ppt/charts/chart3.xml><?xml version="1.0" encoding="utf-8"?>
+<file path=ppt/charts/chart4.xml><?xml version="1.0" encoding="utf-8"?>
 <c:chartSpace xmlns:c="http://schemas.openxmlformats.org/drawingml/2006/chart" xmlns:a="http://schemas.openxmlformats.org/drawingml/2006/main" xmlns:r="http://schemas.openxmlformats.org/officeDocument/2006/relationships">
   <c:date1904 val="0"/>
   <c:lang val="en-US"/>
@@ -596,7 +824,7 @@
           <c:idx val="0"/>
           <c:order val="0"/>
           <c:spPr>
-            <a:ln w="19050">
+            <a:ln w="57150">
               <a:solidFill>
                 <a:schemeClr val="tx1"/>
               </a:solidFill>
@@ -604,12 +832,12 @@
           </c:spPr>
           <c:marker>
             <c:symbol val="circle"/>
-            <c:size val="7"/>
+            <c:size val="10"/>
             <c:spPr>
               <a:solidFill>
                 <a:schemeClr val="tx1"/>
               </a:solidFill>
-              <a:ln w="19050">
+              <a:ln w="57150">
                 <a:solidFill>
                   <a:schemeClr val="tx1"/>
                 </a:solidFill>
@@ -680,11 +908,11 @@
           <c:showPercent val="0"/>
           <c:showBubbleSize val="0"/>
         </c:dLbls>
-        <c:axId val="110392960"/>
-        <c:axId val="110393536"/>
+        <c:axId val="120017984"/>
+        <c:axId val="120018560"/>
       </c:scatterChart>
       <c:valAx>
-        <c:axId val="110392960"/>
+        <c:axId val="120017984"/>
         <c:scaling>
           <c:orientation val="minMax"/>
           <c:max val="45"/>
@@ -705,17 +933,17 @@
               <a:lstStyle/>
               <a:p>
                 <a:pPr>
-                  <a:defRPr sz="1400"/>
+                  <a:defRPr sz="1800"/>
                 </a:pPr>
                 <a:r>
-                  <a:rPr lang="en-US" sz="1400"/>
+                  <a:rPr lang="en-US" sz="1800"/>
                   <a:t>Chiral</a:t>
                 </a:r>
                 <a:r>
-                  <a:rPr lang="en-US" sz="1400" baseline="0"/>
+                  <a:rPr lang="en-US" sz="1800" baseline="0"/>
                   <a:t> node depth (mm)</a:t>
                 </a:r>
-                <a:endParaRPr lang="en-US" sz="1400"/>
+                <a:endParaRPr lang="en-US" sz="1800"/>
               </a:p>
             </c:rich>
           </c:tx>
@@ -731,17 +959,17 @@
           <a:lstStyle/>
           <a:p>
             <a:pPr>
-              <a:defRPr sz="1200"/>
+              <a:defRPr sz="1400"/>
             </a:pPr>
             <a:endParaRPr lang="en-US"/>
           </a:p>
         </c:txPr>
-        <c:crossAx val="110393536"/>
+        <c:crossAx val="120018560"/>
         <c:crosses val="autoZero"/>
         <c:crossBetween val="midCat"/>
       </c:valAx>
       <c:valAx>
-        <c:axId val="110393536"/>
+        <c:axId val="120018560"/>
         <c:scaling>
           <c:orientation val="minMax"/>
           <c:max val="700"/>
@@ -758,10 +986,10 @@
               <a:lstStyle/>
               <a:p>
                 <a:pPr>
-                  <a:defRPr sz="1400"/>
+                  <a:defRPr sz="1800"/>
                 </a:pPr>
                 <a:r>
-                  <a:rPr lang="en-US" sz="1400"/>
+                  <a:rPr lang="en-US" sz="1800"/>
                   <a:t>Force (N)</a:t>
                 </a:r>
               </a:p>
@@ -779,12 +1007,12 @@
           <a:lstStyle/>
           <a:p>
             <a:pPr>
-              <a:defRPr sz="1200"/>
+              <a:defRPr sz="1400"/>
             </a:pPr>
             <a:endParaRPr lang="en-US"/>
           </a:p>
         </c:txPr>
-        <c:crossAx val="110392960"/>
+        <c:crossAx val="120017984"/>
         <c:crosses val="autoZero"/>
         <c:crossBetween val="midCat"/>
       </c:valAx>
@@ -799,7 +1027,7 @@
 </c:chartSpace>
 </file>
 
-<file path=ppt/charts/chart4.xml><?xml version="1.0" encoding="utf-8"?>
+<file path=ppt/charts/chart5.xml><?xml version="1.0" encoding="utf-8"?>
 <c:chartSpace xmlns:c="http://schemas.openxmlformats.org/drawingml/2006/chart" xmlns:a="http://schemas.openxmlformats.org/drawingml/2006/main" xmlns:r="http://schemas.openxmlformats.org/officeDocument/2006/relationships">
   <c:date1904 val="0"/>
   <c:lang val="en-US"/>
@@ -823,7 +1051,7 @@
           <c:idx val="0"/>
           <c:order val="0"/>
           <c:spPr>
-            <a:ln w="12700">
+            <a:ln w="57150">
               <a:solidFill>
                 <a:schemeClr val="tx1"/>
               </a:solidFill>
@@ -831,12 +1059,12 @@
           </c:spPr>
           <c:marker>
             <c:symbol val="circle"/>
-            <c:size val="7"/>
+            <c:size val="10"/>
             <c:spPr>
               <a:solidFill>
                 <a:schemeClr val="tx1"/>
               </a:solidFill>
-              <a:ln w="12700">
+              <a:ln w="57150">
                 <a:solidFill>
                   <a:schemeClr val="tx1"/>
                 </a:solidFill>
@@ -901,11 +1129,11 @@
           <c:showPercent val="0"/>
           <c:showBubbleSize val="0"/>
         </c:dLbls>
-        <c:axId val="147047552"/>
-        <c:axId val="147048128"/>
+        <c:axId val="149587072"/>
+        <c:axId val="149587648"/>
       </c:scatterChart>
       <c:valAx>
-        <c:axId val="147047552"/>
+        <c:axId val="149587072"/>
         <c:scaling>
           <c:orientation val="minMax"/>
           <c:min val="5"/>
@@ -925,20 +1153,33 @@
               <a:lstStyle/>
               <a:p>
                 <a:pPr>
-                  <a:defRPr sz="1400"/>
+                  <a:defRPr sz="1800"/>
                 </a:pPr>
                 <a:r>
-                  <a:rPr lang="en-US" sz="1400"/>
-                  <a:t>Chiral node</a:t>
+                  <a:rPr lang="en-US" sz="1800" dirty="0"/>
+                  <a:t>Chiral </a:t>
                 </a:r>
                 <a:r>
-                  <a:rPr lang="en-US" sz="1400" baseline="0"/>
-                  <a:t> radius (mm)</a:t>
+                  <a:rPr lang="en-US" sz="1800" dirty="0" smtClean="0"/>
+                  <a:t>node</a:t>
                 </a:r>
-                <a:endParaRPr lang="en-US" sz="1400"/>
+                <a:r>
+                  <a:rPr lang="en-US" sz="1800" baseline="0" dirty="0"/>
+                  <a:t> </a:t>
+                </a:r>
+                <a:r>
+                  <a:rPr lang="en-US" sz="1800" baseline="0" dirty="0" smtClean="0"/>
+                  <a:t>radius </a:t>
+                </a:r>
+                <a:r>
+                  <a:rPr lang="en-US" sz="1800" baseline="0" dirty="0"/>
+                  <a:t>(mm)</a:t>
+                </a:r>
+                <a:endParaRPr lang="en-US" sz="1800" dirty="0"/>
               </a:p>
             </c:rich>
           </c:tx>
+          <c:layout/>
           <c:overlay val="0"/>
         </c:title>
         <c:numFmt formatCode="General" sourceLinked="1"/>
@@ -950,17 +1191,17 @@
           <a:lstStyle/>
           <a:p>
             <a:pPr>
-              <a:defRPr sz="1200"/>
+              <a:defRPr sz="1400"/>
             </a:pPr>
             <a:endParaRPr lang="en-US"/>
           </a:p>
         </c:txPr>
-        <c:crossAx val="147048128"/>
+        <c:crossAx val="149587648"/>
         <c:crosses val="autoZero"/>
         <c:crossBetween val="midCat"/>
       </c:valAx>
       <c:valAx>
-        <c:axId val="147048128"/>
+        <c:axId val="149587648"/>
         <c:scaling>
           <c:orientation val="minMax"/>
           <c:max val="800"/>
@@ -977,15 +1218,16 @@
               <a:lstStyle/>
               <a:p>
                 <a:pPr>
-                  <a:defRPr sz="1400"/>
+                  <a:defRPr sz="1800"/>
                 </a:pPr>
                 <a:r>
-                  <a:rPr lang="en-US" sz="1400"/>
+                  <a:rPr lang="en-US" sz="1800"/>
                   <a:t>Force (N)</a:t>
                 </a:r>
               </a:p>
             </c:rich>
           </c:tx>
+          <c:layout/>
           <c:overlay val="0"/>
         </c:title>
         <c:numFmt formatCode="General" sourceLinked="1"/>
@@ -997,12 +1239,12 @@
           <a:lstStyle/>
           <a:p>
             <a:pPr>
-              <a:defRPr sz="1200"/>
+              <a:defRPr sz="1400"/>
             </a:pPr>
             <a:endParaRPr lang="en-US"/>
           </a:p>
         </c:txPr>
-        <c:crossAx val="147047552"/>
+        <c:crossAx val="149587072"/>
         <c:crosses val="autoZero"/>
         <c:crossBetween val="midCat"/>
       </c:valAx>
@@ -1017,7 +1259,7 @@
 </c:chartSpace>
 </file>
 
-<file path=ppt/charts/chart5.xml><?xml version="1.0" encoding="utf-8"?>
+<file path=ppt/charts/chart6.xml><?xml version="1.0" encoding="utf-8"?>
 <c:chartSpace xmlns:c="http://schemas.openxmlformats.org/drawingml/2006/chart" xmlns:a="http://schemas.openxmlformats.org/drawingml/2006/main" xmlns:r="http://schemas.openxmlformats.org/officeDocument/2006/relationships">
   <c:date1904 val="0"/>
   <c:lang val="en-US"/>
@@ -1041,7 +1283,7 @@
           <c:idx val="0"/>
           <c:order val="0"/>
           <c:spPr>
-            <a:ln w="19050">
+            <a:ln w="57150">
               <a:solidFill>
                 <a:schemeClr val="tx1"/>
               </a:solidFill>
@@ -1049,12 +1291,12 @@
           </c:spPr>
           <c:marker>
             <c:symbol val="circle"/>
-            <c:size val="7"/>
+            <c:size val="10"/>
             <c:spPr>
               <a:solidFill>
                 <a:schemeClr val="tx1"/>
               </a:solidFill>
-              <a:ln w="19050">
+              <a:ln w="57150">
                 <a:solidFill>
                   <a:schemeClr val="tx1"/>
                 </a:solidFill>
@@ -1113,11 +1355,11 @@
           <c:showPercent val="0"/>
           <c:showBubbleSize val="0"/>
         </c:dLbls>
-        <c:axId val="147050432"/>
-        <c:axId val="147051008"/>
+        <c:axId val="149589952"/>
+        <c:axId val="149590528"/>
       </c:scatterChart>
       <c:valAx>
-        <c:axId val="147050432"/>
+        <c:axId val="149589952"/>
         <c:scaling>
           <c:orientation val="minMax"/>
           <c:min val="45"/>
@@ -1137,23 +1379,36 @@
               <a:lstStyle/>
               <a:p>
                 <a:pPr>
-                  <a:defRPr sz="1400"/>
+                  <a:defRPr sz="1800"/>
                 </a:pPr>
                 <a:r>
-                  <a:rPr lang="en-US" sz="1400"/>
-                  <a:t>Chiral ligament length</a:t>
+                  <a:rPr lang="en-US" sz="1800" dirty="0"/>
+                  <a:t>Chiral </a:t>
                 </a:r>
                 <a:r>
-                  <a:rPr lang="en-US" sz="1400" baseline="0"/>
+                  <a:rPr lang="en-US" sz="1800" dirty="0" smtClean="0"/>
+                  <a:t>ligament</a:t>
+                </a:r>
+                <a:r>
+                  <a:rPr lang="en-US" sz="1800" baseline="0" dirty="0" smtClean="0"/>
                   <a:t> </a:t>
                 </a:r>
                 <a:r>
-                  <a:rPr lang="en-US" sz="1400"/>
+                  <a:rPr lang="en-US" sz="1800" dirty="0" smtClean="0"/>
+                  <a:t>length</a:t>
+                </a:r>
+                <a:r>
+                  <a:rPr lang="en-US" sz="1800" baseline="0" dirty="0" smtClean="0"/>
+                  <a:t> </a:t>
+                </a:r>
+                <a:r>
+                  <a:rPr lang="en-US" sz="1800" dirty="0"/>
                   <a:t>(mm)</a:t>
                 </a:r>
               </a:p>
             </c:rich>
           </c:tx>
+          <c:layout/>
           <c:overlay val="0"/>
         </c:title>
         <c:numFmt formatCode="General" sourceLinked="1"/>
@@ -1165,17 +1420,17 @@
           <a:lstStyle/>
           <a:p>
             <a:pPr>
-              <a:defRPr sz="1200"/>
+              <a:defRPr sz="1400"/>
             </a:pPr>
             <a:endParaRPr lang="en-US"/>
           </a:p>
         </c:txPr>
-        <c:crossAx val="147051008"/>
+        <c:crossAx val="149590528"/>
         <c:crosses val="autoZero"/>
         <c:crossBetween val="midCat"/>
       </c:valAx>
       <c:valAx>
-        <c:axId val="147051008"/>
+        <c:axId val="149590528"/>
         <c:scaling>
           <c:orientation val="minMax"/>
           <c:min val="200"/>
@@ -1191,15 +1446,16 @@
               <a:lstStyle/>
               <a:p>
                 <a:pPr>
-                  <a:defRPr sz="1400"/>
+                  <a:defRPr sz="1800"/>
                 </a:pPr>
                 <a:r>
-                  <a:rPr lang="en-US" sz="1400"/>
+                  <a:rPr lang="en-US" sz="1800"/>
                   <a:t>Force (N)</a:t>
                 </a:r>
               </a:p>
             </c:rich>
           </c:tx>
+          <c:layout/>
           <c:overlay val="0"/>
         </c:title>
         <c:numFmt formatCode="General" sourceLinked="1"/>
@@ -1211,12 +1467,12 @@
           <a:lstStyle/>
           <a:p>
             <a:pPr>
-              <a:defRPr sz="1200"/>
+              <a:defRPr sz="1400"/>
             </a:pPr>
             <a:endParaRPr lang="en-US"/>
           </a:p>
         </c:txPr>
-        <c:crossAx val="147050432"/>
+        <c:crossAx val="149589952"/>
         <c:crosses val="autoZero"/>
         <c:crossBetween val="midCat"/>
       </c:valAx>
@@ -1231,7 +1487,7 @@
 </c:chartSpace>
 </file>
 
-<file path=ppt/charts/chart6.xml><?xml version="1.0" encoding="utf-8"?>
+<file path=ppt/charts/chart7.xml><?xml version="1.0" encoding="utf-8"?>
 <c:chartSpace xmlns:c="http://schemas.openxmlformats.org/drawingml/2006/chart" xmlns:a="http://schemas.openxmlformats.org/drawingml/2006/main" xmlns:r="http://schemas.openxmlformats.org/officeDocument/2006/relationships">
   <c:date1904 val="0"/>
   <c:lang val="en-US"/>
@@ -1255,7 +1511,7 @@
           <c:idx val="0"/>
           <c:order val="0"/>
           <c:spPr>
-            <a:ln w="19050">
+            <a:ln w="57150">
               <a:solidFill>
                 <a:schemeClr val="tx1"/>
               </a:solidFill>
@@ -1263,12 +1519,12 @@
           </c:spPr>
           <c:marker>
             <c:symbol val="circle"/>
-            <c:size val="7"/>
+            <c:size val="10"/>
             <c:spPr>
               <a:solidFill>
                 <a:schemeClr val="tx1"/>
               </a:solidFill>
-              <a:ln w="19050">
+              <a:ln w="57150">
                 <a:solidFill>
                   <a:schemeClr val="tx1"/>
                 </a:solidFill>
@@ -1345,11 +1601,11 @@
           <c:showPercent val="0"/>
           <c:showBubbleSize val="0"/>
         </c:dLbls>
-        <c:axId val="147053312"/>
-        <c:axId val="147053888"/>
+        <c:axId val="149592832"/>
+        <c:axId val="149593408"/>
       </c:scatterChart>
       <c:valAx>
-        <c:axId val="147053312"/>
+        <c:axId val="149592832"/>
         <c:scaling>
           <c:orientation val="minMax"/>
           <c:max val="0.8"/>
@@ -1370,23 +1626,24 @@
               <a:lstStyle/>
               <a:p>
                 <a:pPr>
-                  <a:defRPr sz="1400"/>
+                  <a:defRPr sz="1800"/>
                 </a:pPr>
                 <a:r>
-                  <a:rPr lang="en-US" sz="1400"/>
+                  <a:rPr lang="en-US" sz="1800" dirty="0"/>
                   <a:t>Chiral lattice</a:t>
                 </a:r>
                 <a:r>
-                  <a:rPr lang="en-US" sz="1400" baseline="0"/>
+                  <a:rPr lang="en-US" sz="1800" baseline="0" dirty="0"/>
                   <a:t> thickness </a:t>
                 </a:r>
                 <a:r>
-                  <a:rPr lang="en-US" sz="1400"/>
+                  <a:rPr lang="en-US" sz="1800" dirty="0"/>
                   <a:t>(mm)</a:t>
                 </a:r>
               </a:p>
             </c:rich>
           </c:tx>
+          <c:layout/>
           <c:overlay val="0"/>
         </c:title>
         <c:numFmt formatCode="General" sourceLinked="1"/>
@@ -1398,17 +1655,17 @@
           <a:lstStyle/>
           <a:p>
             <a:pPr>
-              <a:defRPr sz="1200"/>
+              <a:defRPr sz="1400"/>
             </a:pPr>
             <a:endParaRPr lang="en-US"/>
           </a:p>
         </c:txPr>
-        <c:crossAx val="147053888"/>
+        <c:crossAx val="149593408"/>
         <c:crosses val="autoZero"/>
         <c:crossBetween val="midCat"/>
       </c:valAx>
       <c:valAx>
-        <c:axId val="147053888"/>
+        <c:axId val="149593408"/>
         <c:scaling>
           <c:orientation val="minMax"/>
           <c:min val="200"/>
@@ -1424,15 +1681,16 @@
               <a:lstStyle/>
               <a:p>
                 <a:pPr>
-                  <a:defRPr sz="1400"/>
+                  <a:defRPr sz="1800"/>
                 </a:pPr>
                 <a:r>
-                  <a:rPr lang="en-US" sz="1400"/>
+                  <a:rPr lang="en-US" sz="1800"/>
                   <a:t>Force (N)</a:t>
                 </a:r>
               </a:p>
             </c:rich>
           </c:tx>
+          <c:layout/>
           <c:overlay val="0"/>
         </c:title>
         <c:numFmt formatCode="General" sourceLinked="1"/>
@@ -1444,12 +1702,12 @@
           <a:lstStyle/>
           <a:p>
             <a:pPr>
-              <a:defRPr sz="1200"/>
+              <a:defRPr sz="1400"/>
             </a:pPr>
             <a:endParaRPr lang="en-US"/>
           </a:p>
         </c:txPr>
-        <c:crossAx val="147053312"/>
+        <c:crossAx val="149592832"/>
         <c:crosses val="autoZero"/>
         <c:crossBetween val="midCat"/>
       </c:valAx>
@@ -1645,7 +1903,7 @@
           <a:p>
             <a:fld id="{B9D4E1D2-B082-4959-8BC1-1B0986A120C2}" type="datetimeFigureOut">
               <a:rPr lang="en-US" smtClean="0"/>
-              <a:t>8/17/2017</a:t>
+              <a:t>8/20/2017</a:t>
             </a:fld>
             <a:endParaRPr lang="en-US"/>
           </a:p>
@@ -1815,7 +2073,7 @@
           <a:p>
             <a:fld id="{B9D4E1D2-B082-4959-8BC1-1B0986A120C2}" type="datetimeFigureOut">
               <a:rPr lang="en-US" smtClean="0"/>
-              <a:t>8/17/2017</a:t>
+              <a:t>8/20/2017</a:t>
             </a:fld>
             <a:endParaRPr lang="en-US"/>
           </a:p>
@@ -1995,7 +2253,7 @@
           <a:p>
             <a:fld id="{B9D4E1D2-B082-4959-8BC1-1B0986A120C2}" type="datetimeFigureOut">
               <a:rPr lang="en-US" smtClean="0"/>
-              <a:t>8/17/2017</a:t>
+              <a:t>8/20/2017</a:t>
             </a:fld>
             <a:endParaRPr lang="en-US"/>
           </a:p>
@@ -2165,7 +2423,7 @@
           <a:p>
             <a:fld id="{B9D4E1D2-B082-4959-8BC1-1B0986A120C2}" type="datetimeFigureOut">
               <a:rPr lang="en-US" smtClean="0"/>
-              <a:t>8/17/2017</a:t>
+              <a:t>8/20/2017</a:t>
             </a:fld>
             <a:endParaRPr lang="en-US"/>
           </a:p>
@@ -2411,7 +2669,7 @@
           <a:p>
             <a:fld id="{B9D4E1D2-B082-4959-8BC1-1B0986A120C2}" type="datetimeFigureOut">
               <a:rPr lang="en-US" smtClean="0"/>
-              <a:t>8/17/2017</a:t>
+              <a:t>8/20/2017</a:t>
             </a:fld>
             <a:endParaRPr lang="en-US"/>
           </a:p>
@@ -2699,7 +2957,7 @@
           <a:p>
             <a:fld id="{B9D4E1D2-B082-4959-8BC1-1B0986A120C2}" type="datetimeFigureOut">
               <a:rPr lang="en-US" smtClean="0"/>
-              <a:t>8/17/2017</a:t>
+              <a:t>8/20/2017</a:t>
             </a:fld>
             <a:endParaRPr lang="en-US"/>
           </a:p>
@@ -3121,7 +3379,7 @@
           <a:p>
             <a:fld id="{B9D4E1D2-B082-4959-8BC1-1B0986A120C2}" type="datetimeFigureOut">
               <a:rPr lang="en-US" smtClean="0"/>
-              <a:t>8/17/2017</a:t>
+              <a:t>8/20/2017</a:t>
             </a:fld>
             <a:endParaRPr lang="en-US"/>
           </a:p>
@@ -3239,7 +3497,7 @@
           <a:p>
             <a:fld id="{B9D4E1D2-B082-4959-8BC1-1B0986A120C2}" type="datetimeFigureOut">
               <a:rPr lang="en-US" smtClean="0"/>
-              <a:t>8/17/2017</a:t>
+              <a:t>8/20/2017</a:t>
             </a:fld>
             <a:endParaRPr lang="en-US"/>
           </a:p>
@@ -3334,7 +3592,7 @@
           <a:p>
             <a:fld id="{B9D4E1D2-B082-4959-8BC1-1B0986A120C2}" type="datetimeFigureOut">
               <a:rPr lang="en-US" smtClean="0"/>
-              <a:t>8/17/2017</a:t>
+              <a:t>8/20/2017</a:t>
             </a:fld>
             <a:endParaRPr lang="en-US"/>
           </a:p>
@@ -3611,7 +3869,7 @@
           <a:p>
             <a:fld id="{B9D4E1D2-B082-4959-8BC1-1B0986A120C2}" type="datetimeFigureOut">
               <a:rPr lang="en-US" smtClean="0"/>
-              <a:t>8/17/2017</a:t>
+              <a:t>8/20/2017</a:t>
             </a:fld>
             <a:endParaRPr lang="en-US"/>
           </a:p>
@@ -3864,7 +4122,7 @@
           <a:p>
             <a:fld id="{B9D4E1D2-B082-4959-8BC1-1B0986A120C2}" type="datetimeFigureOut">
               <a:rPr lang="en-US" smtClean="0"/>
-              <a:t>8/17/2017</a:t>
+              <a:t>8/20/2017</a:t>
             </a:fld>
             <a:endParaRPr lang="en-US"/>
           </a:p>
@@ -4077,7 +4335,7 @@
           <a:p>
             <a:fld id="{B9D4E1D2-B082-4959-8BC1-1B0986A120C2}" type="datetimeFigureOut">
               <a:rPr lang="en-US" smtClean="0"/>
-              <a:t>8/17/2017</a:t>
+              <a:t>8/20/2017</a:t>
             </a:fld>
             <a:endParaRPr lang="en-US"/>
           </a:p>
@@ -8770,7 +9028,6 @@
                 <a:rPr lang="es-ES" sz="2200" dirty="0" smtClean="0"/>
                 <a:t>A/2</a:t>
               </a:r>
-              <a:endParaRPr lang="es-ES" sz="2200" dirty="0" smtClean="0"/>
             </a:p>
           </p:txBody>
         </p:sp>
@@ -11699,7 +11956,7 @@
         </p:blipFill>
         <p:spPr>
           <a:xfrm>
-            <a:off x="1447800" y="333375"/>
+            <a:off x="703579" y="488746"/>
             <a:ext cx="6858000" cy="5371569"/>
           </a:xfrm>
           <a:prstGeom prst="rect">
@@ -11715,7 +11972,7 @@
         </p:nvSpPr>
         <p:spPr>
           <a:xfrm>
-            <a:off x="1844858" y="326290"/>
+            <a:off x="940751" y="0"/>
             <a:ext cx="4130082" cy="430887"/>
           </a:xfrm>
           <a:prstGeom prst="rect">
@@ -11745,7 +12002,7 @@
         </p:nvSpPr>
         <p:spPr>
           <a:xfrm>
-            <a:off x="7696200" y="4166056"/>
+            <a:off x="7827418" y="4201056"/>
             <a:ext cx="1524000" cy="430887"/>
           </a:xfrm>
           <a:prstGeom prst="rect">
@@ -11779,7 +12036,7 @@
         </p:nvSpPr>
         <p:spPr>
           <a:xfrm>
-            <a:off x="6363560" y="4935503"/>
+            <a:off x="6113779" y="5950291"/>
             <a:ext cx="2208079" cy="769441"/>
           </a:xfrm>
           <a:prstGeom prst="rect">
@@ -11813,8 +12070,8 @@
         </p:nvCxnSpPr>
         <p:spPr>
           <a:xfrm flipH="1" flipV="1">
-            <a:off x="4572000" y="685800"/>
-            <a:ext cx="914400" cy="884307"/>
+            <a:off x="3352800" y="402490"/>
+            <a:ext cx="1389379" cy="1322989"/>
           </a:xfrm>
           <a:prstGeom prst="straightConnector1">
             <a:avLst/>
@@ -11850,8 +12107,8 @@
         </p:nvCxnSpPr>
         <p:spPr>
           <a:xfrm>
-            <a:off x="5334000" y="3379112"/>
-            <a:ext cx="1524000" cy="1573888"/>
+            <a:off x="4589779" y="3534483"/>
+            <a:ext cx="2438400" cy="2488288"/>
           </a:xfrm>
           <a:prstGeom prst="straightConnector1">
             <a:avLst/>
@@ -11887,7 +12144,7 @@
         </p:nvCxnSpPr>
         <p:spPr>
           <a:xfrm>
-            <a:off x="5974940" y="3539132"/>
+            <a:off x="5230719" y="3694503"/>
             <a:ext cx="2596699" cy="626924"/>
           </a:xfrm>
           <a:prstGeom prst="straightConnector1">
@@ -11924,7 +12181,7 @@
         </p:nvCxnSpPr>
         <p:spPr>
           <a:xfrm flipV="1">
-            <a:off x="5357812" y="1570107"/>
+            <a:off x="4613591" y="1725478"/>
             <a:ext cx="152400" cy="1782692"/>
           </a:xfrm>
           <a:prstGeom prst="straightConnector1">
@@ -19145,6 +19402,11 @@
 <file path=ppt/slides/slide20.xml><?xml version="1.0" encoding="utf-8"?>
 <p:sld xmlns:a="http://schemas.openxmlformats.org/drawingml/2006/main" xmlns:r="http://schemas.openxmlformats.org/officeDocument/2006/relationships" xmlns:p="http://schemas.openxmlformats.org/presentationml/2006/main">
   <p:cSld>
+    <p:bg>
+      <p:bgRef idx="1001">
+        <a:schemeClr val="bg1"/>
+      </p:bgRef>
+    </p:bg>
     <p:spTree>
       <p:nvGrpSpPr>
         <p:cNvPr id="1" name=""/>
@@ -19168,18 +19430,18 @@
           <p:nvPr>
             <p:extLst>
               <p:ext uri="{D42A27DB-BD31-4B8C-83A1-F6EECF244321}">
-                <p14:modId xmlns:p14="http://schemas.microsoft.com/office/powerpoint/2010/main" val="3453961491"/>
+                <p14:modId xmlns:p14="http://schemas.microsoft.com/office/powerpoint/2010/main" val="547071445"/>
               </p:ext>
             </p:extLst>
           </p:nvPr>
         </p:nvGraphicFramePr>
         <p:xfrm>
-          <a:off x="685800" y="685800"/>
-          <a:ext cx="7848599" cy="5257799"/>
+          <a:off x="685800" y="1371600"/>
+          <a:ext cx="7924800" cy="4800600"/>
         </p:xfrm>
         <a:graphic>
           <a:graphicData uri="http://schemas.openxmlformats.org/drawingml/2006/chart">
-            <c:chart xmlns:c="http://schemas.openxmlformats.org/drawingml/2006/chart" xmlns:r="http://schemas.openxmlformats.org/officeDocument/2006/relationships" r:id="rId2"/>
+            <c:chart xmlns:c="http://schemas.openxmlformats.org/drawingml/2006/chart" xmlns:r="http://schemas.openxmlformats.org/officeDocument/2006/relationships" r:id="rId3"/>
           </a:graphicData>
         </a:graphic>
       </p:graphicFrame>
@@ -19191,12 +19453,66 @@
     </p:extLst>
   </p:cSld>
   <p:clrMapOvr>
+    <a:overrideClrMapping bg1="lt1" tx1="dk1" bg2="lt2" tx2="dk2" accent1="accent1" accent2="accent2" accent3="accent3" accent4="accent4" accent5="accent5" accent6="accent6" hlink="hlink" folHlink="folHlink"/>
+  </p:clrMapOvr>
+</p:sld>
+</file>
+
+<file path=ppt/slides/slide21.xml><?xml version="1.0" encoding="utf-8"?>
+<p:sld xmlns:a="http://schemas.openxmlformats.org/drawingml/2006/main" xmlns:r="http://schemas.openxmlformats.org/officeDocument/2006/relationships" xmlns:p="http://schemas.openxmlformats.org/presentationml/2006/main">
+  <p:cSld>
+    <p:spTree>
+      <p:nvGrpSpPr>
+        <p:cNvPr id="1" name=""/>
+        <p:cNvGrpSpPr/>
+        <p:nvPr/>
+      </p:nvGrpSpPr>
+      <p:grpSpPr>
+        <a:xfrm>
+          <a:off x="0" y="0"/>
+          <a:ext cx="0" cy="0"/>
+          <a:chOff x="0" y="0"/>
+          <a:chExt cx="0" cy="0"/>
+        </a:xfrm>
+      </p:grpSpPr>
+      <p:graphicFrame>
+        <p:nvGraphicFramePr>
+          <p:cNvPr id="2" name="Chart 1"/>
+          <p:cNvGraphicFramePr>
+            <a:graphicFrameLocks/>
+          </p:cNvGraphicFramePr>
+          <p:nvPr>
+            <p:extLst>
+              <p:ext uri="{D42A27DB-BD31-4B8C-83A1-F6EECF244321}">
+                <p14:modId xmlns:p14="http://schemas.microsoft.com/office/powerpoint/2010/main" val="4107554934"/>
+              </p:ext>
+            </p:extLst>
+          </p:nvPr>
+        </p:nvGraphicFramePr>
+        <p:xfrm>
+          <a:off x="685800" y="990600"/>
+          <a:ext cx="7924800" cy="4914900"/>
+        </p:xfrm>
+        <a:graphic>
+          <a:graphicData uri="http://schemas.openxmlformats.org/drawingml/2006/chart">
+            <c:chart xmlns:c="http://schemas.openxmlformats.org/drawingml/2006/chart" xmlns:r="http://schemas.openxmlformats.org/officeDocument/2006/relationships" r:id="rId2"/>
+          </a:graphicData>
+        </a:graphic>
+      </p:graphicFrame>
+    </p:spTree>
+    <p:extLst>
+      <p:ext uri="{BB962C8B-B14F-4D97-AF65-F5344CB8AC3E}">
+        <p14:creationId xmlns:p14="http://schemas.microsoft.com/office/powerpoint/2010/main" val="4112334083"/>
+      </p:ext>
+    </p:extLst>
+  </p:cSld>
+  <p:clrMapOvr>
     <a:masterClrMapping/>
   </p:clrMapOvr>
 </p:sld>
 </file>
 
-<file path=ppt/slides/slide21.xml><?xml version="1.0" encoding="utf-8"?>
+<file path=ppt/slides/slide22.xml><?xml version="1.0" encoding="utf-8"?>
 <p:sld xmlns:a="http://schemas.openxmlformats.org/drawingml/2006/main" xmlns:r="http://schemas.openxmlformats.org/officeDocument/2006/relationships" xmlns:p="http://schemas.openxmlformats.org/presentationml/2006/main" show="0">
   <p:cSld>
     <p:spTree>
@@ -19222,14 +19538,14 @@
           <p:nvPr>
             <p:extLst>
               <p:ext uri="{D42A27DB-BD31-4B8C-83A1-F6EECF244321}">
-                <p14:modId xmlns:p14="http://schemas.microsoft.com/office/powerpoint/2010/main" val="1512657439"/>
+                <p14:modId xmlns:p14="http://schemas.microsoft.com/office/powerpoint/2010/main" val="3405942741"/>
               </p:ext>
             </p:extLst>
           </p:nvPr>
         </p:nvGraphicFramePr>
         <p:xfrm>
           <a:off x="838200" y="990600"/>
-          <a:ext cx="7239000" cy="4724400"/>
+          <a:ext cx="7696200" cy="5105400"/>
         </p:xfrm>
         <a:graphic>
           <a:graphicData uri="http://schemas.openxmlformats.org/drawingml/2006/chart">
@@ -19255,60 +19571,6 @@
       <p:transition spd="slow"/>
     </mc:Fallback>
   </mc:AlternateContent>
-</p:sld>
-</file>
-
-<file path=ppt/slides/slide22.xml><?xml version="1.0" encoding="utf-8"?>
-<p:sld xmlns:a="http://schemas.openxmlformats.org/drawingml/2006/main" xmlns:r="http://schemas.openxmlformats.org/officeDocument/2006/relationships" xmlns:p="http://schemas.openxmlformats.org/presentationml/2006/main">
-  <p:cSld>
-    <p:spTree>
-      <p:nvGrpSpPr>
-        <p:cNvPr id="1" name=""/>
-        <p:cNvGrpSpPr/>
-        <p:nvPr/>
-      </p:nvGrpSpPr>
-      <p:grpSpPr>
-        <a:xfrm>
-          <a:off x="0" y="0"/>
-          <a:ext cx="0" cy="0"/>
-          <a:chOff x="0" y="0"/>
-          <a:chExt cx="0" cy="0"/>
-        </a:xfrm>
-      </p:grpSpPr>
-      <p:graphicFrame>
-        <p:nvGraphicFramePr>
-          <p:cNvPr id="2" name="Chart 1"/>
-          <p:cNvGraphicFramePr>
-            <a:graphicFrameLocks/>
-          </p:cNvGraphicFramePr>
-          <p:nvPr>
-            <p:extLst>
-              <p:ext uri="{D42A27DB-BD31-4B8C-83A1-F6EECF244321}">
-                <p14:modId xmlns:p14="http://schemas.microsoft.com/office/powerpoint/2010/main" val="3868584632"/>
-              </p:ext>
-            </p:extLst>
-          </p:nvPr>
-        </p:nvGraphicFramePr>
-        <p:xfrm>
-          <a:off x="1504950" y="1143001"/>
-          <a:ext cx="6953250" cy="3886199"/>
-        </p:xfrm>
-        <a:graphic>
-          <a:graphicData uri="http://schemas.openxmlformats.org/drawingml/2006/chart">
-            <c:chart xmlns:c="http://schemas.openxmlformats.org/drawingml/2006/chart" xmlns:r="http://schemas.openxmlformats.org/officeDocument/2006/relationships" r:id="rId2"/>
-          </a:graphicData>
-        </a:graphic>
-      </p:graphicFrame>
-    </p:spTree>
-    <p:extLst>
-      <p:ext uri="{BB962C8B-B14F-4D97-AF65-F5344CB8AC3E}">
-        <p14:creationId xmlns:p14="http://schemas.microsoft.com/office/powerpoint/2010/main" val="3482994910"/>
-      </p:ext>
-    </p:extLst>
-  </p:cSld>
-  <p:clrMapOvr>
-    <a:masterClrMapping/>
-  </p:clrMapOvr>
 </p:sld>
 </file>
 
@@ -19338,14 +19600,14 @@
           <p:nvPr>
             <p:extLst>
               <p:ext uri="{D42A27DB-BD31-4B8C-83A1-F6EECF244321}">
-                <p14:modId xmlns:p14="http://schemas.microsoft.com/office/powerpoint/2010/main" val="46678658"/>
+                <p14:modId xmlns:p14="http://schemas.microsoft.com/office/powerpoint/2010/main" val="2510261827"/>
               </p:ext>
             </p:extLst>
           </p:nvPr>
         </p:nvGraphicFramePr>
         <p:xfrm>
-          <a:off x="1387928" y="1066800"/>
-          <a:ext cx="6689272" cy="4199164"/>
+          <a:off x="762000" y="1143001"/>
+          <a:ext cx="7696200" cy="4800599"/>
         </p:xfrm>
         <a:graphic>
           <a:graphicData uri="http://schemas.openxmlformats.org/drawingml/2006/chart">
@@ -19356,7 +19618,7 @@
     </p:spTree>
     <p:extLst>
       <p:ext uri="{BB962C8B-B14F-4D97-AF65-F5344CB8AC3E}">
-        <p14:creationId xmlns:p14="http://schemas.microsoft.com/office/powerpoint/2010/main" val="1668987099"/>
+        <p14:creationId xmlns:p14="http://schemas.microsoft.com/office/powerpoint/2010/main" val="3482994910"/>
       </p:ext>
     </p:extLst>
   </p:cSld>
@@ -19392,14 +19654,14 @@
           <p:nvPr>
             <p:extLst>
               <p:ext uri="{D42A27DB-BD31-4B8C-83A1-F6EECF244321}">
-                <p14:modId xmlns:p14="http://schemas.microsoft.com/office/powerpoint/2010/main" val="4093535733"/>
+                <p14:modId xmlns:p14="http://schemas.microsoft.com/office/powerpoint/2010/main" val="1194794148"/>
               </p:ext>
             </p:extLst>
           </p:nvPr>
         </p:nvGraphicFramePr>
         <p:xfrm>
-          <a:off x="1671637" y="1757362"/>
-          <a:ext cx="5800725" cy="3343275"/>
+          <a:off x="914400" y="1066800"/>
+          <a:ext cx="7162800" cy="4800600"/>
         </p:xfrm>
         <a:graphic>
           <a:graphicData uri="http://schemas.openxmlformats.org/drawingml/2006/chart">
@@ -19410,7 +19672,7 @@
     </p:spTree>
     <p:extLst>
       <p:ext uri="{BB962C8B-B14F-4D97-AF65-F5344CB8AC3E}">
-        <p14:creationId xmlns:p14="http://schemas.microsoft.com/office/powerpoint/2010/main" val="2397629553"/>
+        <p14:creationId xmlns:p14="http://schemas.microsoft.com/office/powerpoint/2010/main" val="1668987099"/>
       </p:ext>
     </p:extLst>
   </p:cSld>
@@ -19446,14 +19708,68 @@
           <p:nvPr>
             <p:extLst>
               <p:ext uri="{D42A27DB-BD31-4B8C-83A1-F6EECF244321}">
-                <p14:modId xmlns:p14="http://schemas.microsoft.com/office/powerpoint/2010/main" val="992275568"/>
+                <p14:modId xmlns:p14="http://schemas.microsoft.com/office/powerpoint/2010/main" val="1256946858"/>
               </p:ext>
             </p:extLst>
           </p:nvPr>
         </p:nvGraphicFramePr>
         <p:xfrm>
-          <a:off x="1447800" y="1447800"/>
-          <a:ext cx="6636124" cy="3966882"/>
+          <a:off x="1066800" y="1524000"/>
+          <a:ext cx="7015163" cy="4338638"/>
+        </p:xfrm>
+        <a:graphic>
+          <a:graphicData uri="http://schemas.openxmlformats.org/drawingml/2006/chart">
+            <c:chart xmlns:c="http://schemas.openxmlformats.org/drawingml/2006/chart" xmlns:r="http://schemas.openxmlformats.org/officeDocument/2006/relationships" r:id="rId2"/>
+          </a:graphicData>
+        </a:graphic>
+      </p:graphicFrame>
+    </p:spTree>
+    <p:extLst>
+      <p:ext uri="{BB962C8B-B14F-4D97-AF65-F5344CB8AC3E}">
+        <p14:creationId xmlns:p14="http://schemas.microsoft.com/office/powerpoint/2010/main" val="2397629553"/>
+      </p:ext>
+    </p:extLst>
+  </p:cSld>
+  <p:clrMapOvr>
+    <a:masterClrMapping/>
+  </p:clrMapOvr>
+</p:sld>
+</file>
+
+<file path=ppt/slides/slide26.xml><?xml version="1.0" encoding="utf-8"?>
+<p:sld xmlns:a="http://schemas.openxmlformats.org/drawingml/2006/main" xmlns:r="http://schemas.openxmlformats.org/officeDocument/2006/relationships" xmlns:p="http://schemas.openxmlformats.org/presentationml/2006/main">
+  <p:cSld>
+    <p:spTree>
+      <p:nvGrpSpPr>
+        <p:cNvPr id="1" name=""/>
+        <p:cNvGrpSpPr/>
+        <p:nvPr/>
+      </p:nvGrpSpPr>
+      <p:grpSpPr>
+        <a:xfrm>
+          <a:off x="0" y="0"/>
+          <a:ext cx="0" cy="0"/>
+          <a:chOff x="0" y="0"/>
+          <a:chExt cx="0" cy="0"/>
+        </a:xfrm>
+      </p:grpSpPr>
+      <p:graphicFrame>
+        <p:nvGraphicFramePr>
+          <p:cNvPr id="2" name="Chart 1"/>
+          <p:cNvGraphicFramePr>
+            <a:graphicFrameLocks/>
+          </p:cNvGraphicFramePr>
+          <p:nvPr>
+            <p:extLst>
+              <p:ext uri="{D42A27DB-BD31-4B8C-83A1-F6EECF244321}">
+                <p14:modId xmlns:p14="http://schemas.microsoft.com/office/powerpoint/2010/main" val="3234731431"/>
+              </p:ext>
+            </p:extLst>
+          </p:nvPr>
+        </p:nvGraphicFramePr>
+        <p:xfrm>
+          <a:off x="914400" y="914400"/>
+          <a:ext cx="7321924" cy="4652682"/>
         </p:xfrm>
         <a:graphic>
           <a:graphicData uri="http://schemas.openxmlformats.org/drawingml/2006/chart">
@@ -28605,4 +28921,47 @@
   <a:objectDefaults/>
   <a:extraClrSchemeLst/>
 </a:theme>
+</file>
+
+<file path=ppt/theme/themeOverride1.xml><?xml version="1.0" encoding="utf-8"?>
+<a:themeOverride xmlns:a="http://schemas.openxmlformats.org/drawingml/2006/main">
+  <a:clrScheme name="Office">
+    <a:dk1>
+      <a:sysClr val="windowText" lastClr="000000"/>
+    </a:dk1>
+    <a:lt1>
+      <a:sysClr val="window" lastClr="FFFFFF"/>
+    </a:lt1>
+    <a:dk2>
+      <a:srgbClr val="1F497D"/>
+    </a:dk2>
+    <a:lt2>
+      <a:srgbClr val="EEECE1"/>
+    </a:lt2>
+    <a:accent1>
+      <a:srgbClr val="4F81BD"/>
+    </a:accent1>
+    <a:accent2>
+      <a:srgbClr val="C0504D"/>
+    </a:accent2>
+    <a:accent3>
+      <a:srgbClr val="9BBB59"/>
+    </a:accent3>
+    <a:accent4>
+      <a:srgbClr val="8064A2"/>
+    </a:accent4>
+    <a:accent5>
+      <a:srgbClr val="4BACC6"/>
+    </a:accent5>
+    <a:accent6>
+      <a:srgbClr val="F79646"/>
+    </a:accent6>
+    <a:hlink>
+      <a:srgbClr val="0000FF"/>
+    </a:hlink>
+    <a:folHlink>
+      <a:srgbClr val="800080"/>
+    </a:folHlink>
+  </a:clrScheme>
+</a:themeOverride>
 </file>
</xml_diff>

<commit_message>
changes during IAESTE monthly meeting
</commit_message>
<xml_diff>
--- a/figures/figures.pptx
+++ b/figures/figures.pptx
@@ -129,11 +129,27 @@
       </a:defRPr>
     </a:lvl9pPr>
   </p:defaultTextStyle>
+  <p:extLst>
+    <p:ext uri="{EFAFB233-063F-42B5-8137-9DF3F51BA10A}">
+      <p15:sldGuideLst xmlns:p15="http://schemas.microsoft.com/office/powerpoint/2012/main">
+        <p15:guide id="1" orient="horz" pos="2160">
+          <p15:clr>
+            <a:srgbClr val="A4A3A4"/>
+          </p15:clr>
+        </p15:guide>
+        <p15:guide id="2" pos="2880">
+          <p15:clr>
+            <a:srgbClr val="A4A3A4"/>
+          </p15:clr>
+        </p15:guide>
+      </p15:sldGuideLst>
+    </p:ext>
+  </p:extLst>
 </p:presentation>
 </file>
 
 <file path=ppt/charts/chart1.xml><?xml version="1.0" encoding="utf-8"?>
-<c:chartSpace xmlns:c="http://schemas.openxmlformats.org/drawingml/2006/chart" xmlns:a="http://schemas.openxmlformats.org/drawingml/2006/main" xmlns:r="http://schemas.openxmlformats.org/officeDocument/2006/relationships">
+<c:chartSpace xmlns:c="http://schemas.openxmlformats.org/drawingml/2006/chart" xmlns:a="http://schemas.openxmlformats.org/drawingml/2006/main" xmlns:r="http://schemas.openxmlformats.org/officeDocument/2006/relationships" xmlns:c16r2="http://schemas.microsoft.com/office/drawing/2015/06/chart">
   <c:date1904 val="0"/>
   <c:lang val="en-US"/>
   <c:roundedCorners val="0"/>
@@ -225,6 +241,11 @@
             </c:numRef>
           </c:yVal>
           <c:smooth val="1"/>
+          <c:extLst>
+            <c:ext xmlns:c16="http://schemas.microsoft.com/office/drawing/2014/chart" uri="{C3380CC4-5D6E-409C-BE32-E72D297353CC}">
+              <c16:uniqueId val="{00000000-1F86-416D-9E07-C5338B057EC3}"/>
+            </c:ext>
+          </c:extLst>
         </c:ser>
         <c:dLbls>
           <c:showLegendKey val="0"/>
@@ -268,7 +289,6 @@
               </a:p>
             </c:rich>
           </c:tx>
-          <c:layout/>
           <c:overlay val="0"/>
         </c:title>
         <c:numFmt formatCode="General" sourceLinked="1"/>
@@ -282,7 +302,7 @@
             <a:pPr>
               <a:defRPr sz="1800"/>
             </a:pPr>
-            <a:endParaRPr lang="en-US"/>
+            <a:endParaRPr lang="es-ES"/>
           </a:p>
         </c:txPr>
         <c:crossAx val="38020224"/>
@@ -315,7 +335,6 @@
               </a:p>
             </c:rich>
           </c:tx>
-          <c:layout/>
           <c:overlay val="0"/>
         </c:title>
         <c:numFmt formatCode="General" sourceLinked="1"/>
@@ -329,7 +348,7 @@
             <a:pPr>
               <a:defRPr sz="1800"/>
             </a:pPr>
-            <a:endParaRPr lang="en-US"/>
+            <a:endParaRPr lang="es-ES"/>
           </a:p>
         </c:txPr>
         <c:crossAx val="32614656"/>
@@ -348,7 +367,7 @@
 </file>
 
 <file path=ppt/charts/chart2.xml><?xml version="1.0" encoding="utf-8"?>
-<c:chartSpace xmlns:c="http://schemas.openxmlformats.org/drawingml/2006/chart" xmlns:a="http://schemas.openxmlformats.org/drawingml/2006/main" xmlns:r="http://schemas.openxmlformats.org/officeDocument/2006/relationships">
+<c:chartSpace xmlns:c="http://schemas.openxmlformats.org/drawingml/2006/chart" xmlns:a="http://schemas.openxmlformats.org/drawingml/2006/main" xmlns:r="http://schemas.openxmlformats.org/officeDocument/2006/relationships" xmlns:c16r2="http://schemas.microsoft.com/office/drawing/2015/06/chart">
   <c:date1904 val="0"/>
   <c:lang val="en-US"/>
   <c:roundedCorners val="0"/>
@@ -443,6 +462,11 @@
             </c:numRef>
           </c:yVal>
           <c:smooth val="1"/>
+          <c:extLst>
+            <c:ext xmlns:c16="http://schemas.microsoft.com/office/drawing/2014/chart" uri="{C3380CC4-5D6E-409C-BE32-E72D297353CC}">
+              <c16:uniqueId val="{00000000-91EE-4925-8041-8590932539E0}"/>
+            </c:ext>
+          </c:extLst>
         </c:ser>
         <c:dLbls>
           <c:showLegendKey val="0"/>
@@ -494,7 +518,6 @@
               </a:p>
             </c:rich>
           </c:tx>
-          <c:layout/>
           <c:overlay val="0"/>
         </c:title>
         <c:numFmt formatCode="General" sourceLinked="1"/>
@@ -508,7 +531,7 @@
             <a:pPr>
               <a:defRPr sz="1800"/>
             </a:pPr>
-            <a:endParaRPr lang="en-US"/>
+            <a:endParaRPr lang="es-ES"/>
           </a:p>
         </c:txPr>
         <c:crossAx val="38023104"/>
@@ -542,7 +565,6 @@
               </a:p>
             </c:rich>
           </c:tx>
-          <c:layout/>
           <c:overlay val="0"/>
         </c:title>
         <c:numFmt formatCode="General" sourceLinked="1"/>
@@ -556,7 +578,7 @@
             <a:pPr>
               <a:defRPr sz="1800"/>
             </a:pPr>
-            <a:endParaRPr lang="en-US"/>
+            <a:endParaRPr lang="es-ES"/>
           </a:p>
         </c:txPr>
         <c:crossAx val="38022528"/>
@@ -575,7 +597,7 @@
 </file>
 
 <file path=ppt/charts/chart3.xml><?xml version="1.0" encoding="utf-8"?>
-<c:chartSpace xmlns:c="http://schemas.openxmlformats.org/drawingml/2006/chart" xmlns:a="http://schemas.openxmlformats.org/drawingml/2006/main" xmlns:r="http://schemas.openxmlformats.org/officeDocument/2006/relationships">
+<c:chartSpace xmlns:c="http://schemas.openxmlformats.org/drawingml/2006/chart" xmlns:a="http://schemas.openxmlformats.org/drawingml/2006/main" xmlns:r="http://schemas.openxmlformats.org/officeDocument/2006/relationships" xmlns:c16r2="http://schemas.microsoft.com/office/drawing/2015/06/chart">
   <c:date1904 val="0"/>
   <c:lang val="en-US"/>
   <c:roundedCorners val="0"/>
@@ -679,6 +701,11 @@
             </c:numRef>
           </c:yVal>
           <c:smooth val="1"/>
+          <c:extLst>
+            <c:ext xmlns:c16="http://schemas.microsoft.com/office/drawing/2014/chart" uri="{C3380CC4-5D6E-409C-BE32-E72D297353CC}">
+              <c16:uniqueId val="{00000000-E9C1-4C3D-B991-CFD14D195366}"/>
+            </c:ext>
+          </c:extLst>
         </c:ser>
         <c:dLbls>
           <c:showLegendKey val="0"/>
@@ -721,7 +748,6 @@
               </a:p>
             </c:rich>
           </c:tx>
-          <c:layout/>
           <c:overlay val="0"/>
         </c:title>
         <c:numFmt formatCode="General" sourceLinked="1"/>
@@ -735,7 +761,7 @@
             <a:pPr>
               <a:defRPr sz="1400"/>
             </a:pPr>
-            <a:endParaRPr lang="en-US"/>
+            <a:endParaRPr lang="es-ES"/>
           </a:p>
         </c:txPr>
         <c:crossAx val="124060224"/>
@@ -768,7 +794,6 @@
               </a:p>
             </c:rich>
           </c:tx>
-          <c:layout/>
           <c:overlay val="0"/>
         </c:title>
         <c:numFmt formatCode="General" sourceLinked="1"/>
@@ -782,7 +807,7 @@
             <a:pPr>
               <a:defRPr sz="1400"/>
             </a:pPr>
-            <a:endParaRPr lang="en-US"/>
+            <a:endParaRPr lang="es-ES"/>
           </a:p>
         </c:txPr>
         <c:crossAx val="124059648"/>
@@ -801,7 +826,7 @@
 </file>
 
 <file path=ppt/charts/chart4.xml><?xml version="1.0" encoding="utf-8"?>
-<c:chartSpace xmlns:c="http://schemas.openxmlformats.org/drawingml/2006/chart" xmlns:a="http://schemas.openxmlformats.org/drawingml/2006/main" xmlns:r="http://schemas.openxmlformats.org/officeDocument/2006/relationships">
+<c:chartSpace xmlns:c="http://schemas.openxmlformats.org/drawingml/2006/chart" xmlns:a="http://schemas.openxmlformats.org/drawingml/2006/main" xmlns:r="http://schemas.openxmlformats.org/officeDocument/2006/relationships" xmlns:c16r2="http://schemas.microsoft.com/office/drawing/2015/06/chart">
   <c:date1904 val="0"/>
   <c:lang val="en-US"/>
   <c:roundedCorners val="0"/>
@@ -899,6 +924,11 @@
             </c:numRef>
           </c:yVal>
           <c:smooth val="1"/>
+          <c:extLst>
+            <c:ext xmlns:c16="http://schemas.microsoft.com/office/drawing/2014/chart" uri="{C3380CC4-5D6E-409C-BE32-E72D297353CC}">
+              <c16:uniqueId val="{00000000-4B16-43B5-9AC3-353662DA796C}"/>
+            </c:ext>
+          </c:extLst>
         </c:ser>
         <c:dLbls>
           <c:showLegendKey val="0"/>
@@ -947,7 +977,6 @@
               </a:p>
             </c:rich>
           </c:tx>
-          <c:layout/>
           <c:overlay val="0"/>
         </c:title>
         <c:numFmt formatCode="General" sourceLinked="1"/>
@@ -961,7 +990,7 @@
             <a:pPr>
               <a:defRPr sz="1800"/>
             </a:pPr>
-            <a:endParaRPr lang="en-US"/>
+            <a:endParaRPr lang="es-ES"/>
           </a:p>
         </c:txPr>
         <c:crossAx val="124063104"/>
@@ -995,7 +1024,6 @@
               </a:p>
             </c:rich>
           </c:tx>
-          <c:layout/>
           <c:overlay val="0"/>
         </c:title>
         <c:numFmt formatCode="General" sourceLinked="1"/>
@@ -1009,7 +1037,7 @@
             <a:pPr>
               <a:defRPr sz="1800"/>
             </a:pPr>
-            <a:endParaRPr lang="en-US"/>
+            <a:endParaRPr lang="es-ES"/>
           </a:p>
         </c:txPr>
         <c:crossAx val="124062528"/>
@@ -1028,7 +1056,7 @@
 </file>
 
 <file path=ppt/charts/chart5.xml><?xml version="1.0" encoding="utf-8"?>
-<c:chartSpace xmlns:c="http://schemas.openxmlformats.org/drawingml/2006/chart" xmlns:a="http://schemas.openxmlformats.org/drawingml/2006/main" xmlns:r="http://schemas.openxmlformats.org/officeDocument/2006/relationships">
+<c:chartSpace xmlns:c="http://schemas.openxmlformats.org/drawingml/2006/chart" xmlns:a="http://schemas.openxmlformats.org/drawingml/2006/main" xmlns:r="http://schemas.openxmlformats.org/officeDocument/2006/relationships" xmlns:c16r2="http://schemas.microsoft.com/office/drawing/2015/06/chart">
   <c:date1904 val="0"/>
   <c:lang val="en-US"/>
   <c:roundedCorners val="0"/>
@@ -1120,6 +1148,11 @@
             </c:numRef>
           </c:yVal>
           <c:smooth val="1"/>
+          <c:extLst>
+            <c:ext xmlns:c16="http://schemas.microsoft.com/office/drawing/2014/chart" uri="{C3380CC4-5D6E-409C-BE32-E72D297353CC}">
+              <c16:uniqueId val="{00000000-7BAA-49D7-A4CD-75A076D4D379}"/>
+            </c:ext>
+          </c:extLst>
         </c:ser>
         <c:dLbls>
           <c:showLegendKey val="0"/>
@@ -1157,23 +1190,11 @@
                 </a:pPr>
                 <a:r>
                   <a:rPr lang="en-US" sz="2400" dirty="0"/>
-                  <a:t>Chiral </a:t>
-                </a:r>
-                <a:r>
-                  <a:rPr lang="en-US" sz="2400" dirty="0" smtClean="0"/>
-                  <a:t>node</a:t>
+                  <a:t>Chiral node</a:t>
                 </a:r>
                 <a:r>
                   <a:rPr lang="en-US" sz="2400" baseline="0" dirty="0"/>
-                  <a:t> </a:t>
-                </a:r>
-                <a:r>
-                  <a:rPr lang="en-US" sz="2400" baseline="0" dirty="0" smtClean="0"/>
-                  <a:t>radius </a:t>
-                </a:r>
-                <a:r>
-                  <a:rPr lang="en-US" sz="2400" baseline="0" dirty="0"/>
-                  <a:t>(mm)</a:t>
+                  <a:t> radius (mm)</a:t>
                 </a:r>
                 <a:endParaRPr lang="en-US" sz="2400" dirty="0"/>
               </a:p>
@@ -1200,7 +1221,7 @@
             <a:pPr>
               <a:defRPr sz="1800"/>
             </a:pPr>
-            <a:endParaRPr lang="en-US"/>
+            <a:endParaRPr lang="es-ES"/>
           </a:p>
         </c:txPr>
         <c:crossAx val="124065984"/>
@@ -1234,7 +1255,6 @@
               </a:p>
             </c:rich>
           </c:tx>
-          <c:layout/>
           <c:overlay val="0"/>
         </c:title>
         <c:numFmt formatCode="General" sourceLinked="1"/>
@@ -1248,7 +1268,7 @@
             <a:pPr>
               <a:defRPr sz="1800"/>
             </a:pPr>
-            <a:endParaRPr lang="en-US"/>
+            <a:endParaRPr lang="es-ES"/>
           </a:p>
         </c:txPr>
         <c:crossAx val="124065408"/>
@@ -1267,7 +1287,7 @@
 </file>
 
 <file path=ppt/charts/chart6.xml><?xml version="1.0" encoding="utf-8"?>
-<c:chartSpace xmlns:c="http://schemas.openxmlformats.org/drawingml/2006/chart" xmlns:a="http://schemas.openxmlformats.org/drawingml/2006/main" xmlns:r="http://schemas.openxmlformats.org/officeDocument/2006/relationships">
+<c:chartSpace xmlns:c="http://schemas.openxmlformats.org/drawingml/2006/chart" xmlns:a="http://schemas.openxmlformats.org/drawingml/2006/main" xmlns:r="http://schemas.openxmlformats.org/officeDocument/2006/relationships" xmlns:c16r2="http://schemas.microsoft.com/office/drawing/2015/06/chart">
   <c:date1904 val="0"/>
   <c:lang val="en-US"/>
   <c:roundedCorners val="0"/>
@@ -1353,6 +1373,11 @@
             </c:numRef>
           </c:yVal>
           <c:smooth val="1"/>
+          <c:extLst>
+            <c:ext xmlns:c16="http://schemas.microsoft.com/office/drawing/2014/chart" uri="{C3380CC4-5D6E-409C-BE32-E72D297353CC}">
+              <c16:uniqueId val="{00000000-484A-46DB-89D0-8E52FBCCA629}"/>
+            </c:ext>
+          </c:extLst>
         </c:ser>
         <c:dLbls>
           <c:showLegendKey val="0"/>
@@ -1390,22 +1415,18 @@
                 </a:pPr>
                 <a:r>
                   <a:rPr lang="en-US" sz="2400" dirty="0"/>
-                  <a:t>Chiral </a:t>
+                  <a:t>Chiral ligament</a:t>
                 </a:r>
                 <a:r>
-                  <a:rPr lang="en-US" sz="2400" dirty="0" smtClean="0"/>
-                  <a:t>ligament</a:t>
-                </a:r>
-                <a:r>
-                  <a:rPr lang="en-US" sz="2400" baseline="0" dirty="0" smtClean="0"/>
+                  <a:rPr lang="en-US" sz="2400" baseline="0" dirty="0"/>
                   <a:t> </a:t>
                 </a:r>
                 <a:r>
-                  <a:rPr lang="en-US" sz="2400" dirty="0" smtClean="0"/>
+                  <a:rPr lang="en-US" sz="2400" dirty="0"/>
                   <a:t>length</a:t>
                 </a:r>
                 <a:r>
-                  <a:rPr lang="en-US" sz="2400" baseline="0" dirty="0" smtClean="0"/>
+                  <a:rPr lang="en-US" sz="2400" baseline="0" dirty="0"/>
                   <a:t> </a:t>
                 </a:r>
                 <a:r>
@@ -1415,7 +1436,6 @@
               </a:p>
             </c:rich>
           </c:tx>
-          <c:layout/>
           <c:overlay val="0"/>
         </c:title>
         <c:numFmt formatCode="General" sourceLinked="1"/>
@@ -1429,7 +1449,7 @@
             <a:pPr>
               <a:defRPr sz="1800"/>
             </a:pPr>
-            <a:endParaRPr lang="en-US"/>
+            <a:endParaRPr lang="es-ES"/>
           </a:p>
         </c:txPr>
         <c:crossAx val="124085376"/>
@@ -1462,7 +1482,6 @@
               </a:p>
             </c:rich>
           </c:tx>
-          <c:layout/>
           <c:overlay val="0"/>
         </c:title>
         <c:numFmt formatCode="General" sourceLinked="1"/>
@@ -1476,7 +1495,7 @@
             <a:pPr>
               <a:defRPr sz="1800"/>
             </a:pPr>
-            <a:endParaRPr lang="en-US"/>
+            <a:endParaRPr lang="es-ES"/>
           </a:p>
         </c:txPr>
         <c:crossAx val="124084800"/>
@@ -1495,7 +1514,7 @@
 </file>
 
 <file path=ppt/charts/chart7.xml><?xml version="1.0" encoding="utf-8"?>
-<c:chartSpace xmlns:c="http://schemas.openxmlformats.org/drawingml/2006/chart" xmlns:a="http://schemas.openxmlformats.org/drawingml/2006/main" xmlns:r="http://schemas.openxmlformats.org/officeDocument/2006/relationships">
+<c:chartSpace xmlns:c="http://schemas.openxmlformats.org/drawingml/2006/chart" xmlns:a="http://schemas.openxmlformats.org/drawingml/2006/main" xmlns:r="http://schemas.openxmlformats.org/officeDocument/2006/relationships" xmlns:c16r2="http://schemas.microsoft.com/office/drawing/2015/06/chart">
   <c:date1904 val="0"/>
   <c:lang val="en-US"/>
   <c:roundedCorners val="0"/>
@@ -1599,6 +1618,11 @@
             </c:numRef>
           </c:yVal>
           <c:smooth val="1"/>
+          <c:extLst>
+            <c:ext xmlns:c16="http://schemas.microsoft.com/office/drawing/2014/chart" uri="{C3380CC4-5D6E-409C-BE32-E72D297353CC}">
+              <c16:uniqueId val="{00000000-81F0-4E84-9D27-09CC193C1C6B}"/>
+            </c:ext>
+          </c:extLst>
         </c:ser>
         <c:dLbls>
           <c:showLegendKey val="0"/>
@@ -1650,7 +1674,6 @@
               </a:p>
             </c:rich>
           </c:tx>
-          <c:layout/>
           <c:overlay val="0"/>
         </c:title>
         <c:numFmt formatCode="General" sourceLinked="1"/>
@@ -1664,7 +1687,7 @@
             <a:pPr>
               <a:defRPr sz="1800"/>
             </a:pPr>
-            <a:endParaRPr lang="en-US"/>
+            <a:endParaRPr lang="es-ES"/>
           </a:p>
         </c:txPr>
         <c:crossAx val="124088256"/>
@@ -1697,7 +1720,6 @@
               </a:p>
             </c:rich>
           </c:tx>
-          <c:layout/>
           <c:overlay val="0"/>
         </c:title>
         <c:numFmt formatCode="General" sourceLinked="1"/>
@@ -1711,7 +1733,7 @@
             <a:pPr>
               <a:defRPr sz="1800"/>
             </a:pPr>
-            <a:endParaRPr lang="en-US"/>
+            <a:endParaRPr lang="es-ES"/>
           </a:p>
         </c:txPr>
         <c:crossAx val="124087680"/>
@@ -1767,10 +1789,9 @@
           <a:lstStyle/>
           <a:p>
             <a:r>
-              <a:rPr lang="en-US" smtClean="0"/>
+              <a:rPr lang="en-US"/>
               <a:t>Click to edit Master title style</a:t>
             </a:r>
-            <a:endParaRPr lang="en-US"/>
           </a:p>
         </p:txBody>
       </p:sp>
@@ -1886,10 +1907,9 @@
           </a:lstStyle>
           <a:p>
             <a:r>
-              <a:rPr lang="en-US" smtClean="0"/>
+              <a:rPr lang="en-US"/>
               <a:t>Click to edit Master subtitle style</a:t>
             </a:r>
-            <a:endParaRPr lang="en-US"/>
           </a:p>
         </p:txBody>
       </p:sp>
@@ -1910,7 +1930,7 @@
           <a:p>
             <a:fld id="{B9D4E1D2-B082-4959-8BC1-1B0986A120C2}" type="datetimeFigureOut">
               <a:rPr lang="en-US" smtClean="0"/>
-              <a:t>8/29/2017</a:t>
+              <a:t>8/31/2017</a:t>
             </a:fld>
             <a:endParaRPr lang="en-US"/>
           </a:p>
@@ -2004,10 +2024,9 @@
           <a:lstStyle/>
           <a:p>
             <a:r>
-              <a:rPr lang="en-US" smtClean="0"/>
+              <a:rPr lang="en-US"/>
               <a:t>Click to edit Master title style</a:t>
             </a:r>
-            <a:endParaRPr lang="en-US"/>
           </a:p>
         </p:txBody>
       </p:sp>
@@ -2028,38 +2047,37 @@
           <a:p>
             <a:pPr lvl="0"/>
             <a:r>
-              <a:rPr lang="en-US" smtClean="0"/>
+              <a:rPr lang="en-US"/>
               <a:t>Click to edit Master text styles</a:t>
             </a:r>
           </a:p>
           <a:p>
             <a:pPr lvl="1"/>
             <a:r>
-              <a:rPr lang="en-US" smtClean="0"/>
+              <a:rPr lang="en-US"/>
               <a:t>Second level</a:t>
             </a:r>
           </a:p>
           <a:p>
             <a:pPr lvl="2"/>
             <a:r>
-              <a:rPr lang="en-US" smtClean="0"/>
+              <a:rPr lang="en-US"/>
               <a:t>Third level</a:t>
             </a:r>
           </a:p>
           <a:p>
             <a:pPr lvl="3"/>
             <a:r>
-              <a:rPr lang="en-US" smtClean="0"/>
+              <a:rPr lang="en-US"/>
               <a:t>Fourth level</a:t>
             </a:r>
           </a:p>
           <a:p>
             <a:pPr lvl="4"/>
             <a:r>
-              <a:rPr lang="en-US" smtClean="0"/>
+              <a:rPr lang="en-US"/>
               <a:t>Fifth level</a:t>
             </a:r>
-            <a:endParaRPr lang="en-US"/>
           </a:p>
         </p:txBody>
       </p:sp>
@@ -2080,7 +2098,7 @@
           <a:p>
             <a:fld id="{B9D4E1D2-B082-4959-8BC1-1B0986A120C2}" type="datetimeFigureOut">
               <a:rPr lang="en-US" smtClean="0"/>
-              <a:t>8/29/2017</a:t>
+              <a:t>8/31/2017</a:t>
             </a:fld>
             <a:endParaRPr lang="en-US"/>
           </a:p>
@@ -2179,10 +2197,9 @@
           <a:lstStyle/>
           <a:p>
             <a:r>
-              <a:rPr lang="en-US" smtClean="0"/>
+              <a:rPr lang="en-US"/>
               <a:t>Click to edit Master title style</a:t>
             </a:r>
-            <a:endParaRPr lang="en-US"/>
           </a:p>
         </p:txBody>
       </p:sp>
@@ -2208,38 +2225,37 @@
           <a:p>
             <a:pPr lvl="0"/>
             <a:r>
-              <a:rPr lang="en-US" smtClean="0"/>
+              <a:rPr lang="en-US"/>
               <a:t>Click to edit Master text styles</a:t>
             </a:r>
           </a:p>
           <a:p>
             <a:pPr lvl="1"/>
             <a:r>
-              <a:rPr lang="en-US" smtClean="0"/>
+              <a:rPr lang="en-US"/>
               <a:t>Second level</a:t>
             </a:r>
           </a:p>
           <a:p>
             <a:pPr lvl="2"/>
             <a:r>
-              <a:rPr lang="en-US" smtClean="0"/>
+              <a:rPr lang="en-US"/>
               <a:t>Third level</a:t>
             </a:r>
           </a:p>
           <a:p>
             <a:pPr lvl="3"/>
             <a:r>
-              <a:rPr lang="en-US" smtClean="0"/>
+              <a:rPr lang="en-US"/>
               <a:t>Fourth level</a:t>
             </a:r>
           </a:p>
           <a:p>
             <a:pPr lvl="4"/>
             <a:r>
-              <a:rPr lang="en-US" smtClean="0"/>
+              <a:rPr lang="en-US"/>
               <a:t>Fifth level</a:t>
             </a:r>
-            <a:endParaRPr lang="en-US"/>
           </a:p>
         </p:txBody>
       </p:sp>
@@ -2260,7 +2276,7 @@
           <a:p>
             <a:fld id="{B9D4E1D2-B082-4959-8BC1-1B0986A120C2}" type="datetimeFigureOut">
               <a:rPr lang="en-US" smtClean="0"/>
-              <a:t>8/29/2017</a:t>
+              <a:t>8/31/2017</a:t>
             </a:fld>
             <a:endParaRPr lang="en-US"/>
           </a:p>
@@ -2354,10 +2370,9 @@
           <a:lstStyle/>
           <a:p>
             <a:r>
-              <a:rPr lang="en-US" smtClean="0"/>
+              <a:rPr lang="en-US"/>
               <a:t>Click to edit Master title style</a:t>
             </a:r>
-            <a:endParaRPr lang="en-US"/>
           </a:p>
         </p:txBody>
       </p:sp>
@@ -2378,38 +2393,37 @@
           <a:p>
             <a:pPr lvl="0"/>
             <a:r>
-              <a:rPr lang="en-US" smtClean="0"/>
+              <a:rPr lang="en-US"/>
               <a:t>Click to edit Master text styles</a:t>
             </a:r>
           </a:p>
           <a:p>
             <a:pPr lvl="1"/>
             <a:r>
-              <a:rPr lang="en-US" smtClean="0"/>
+              <a:rPr lang="en-US"/>
               <a:t>Second level</a:t>
             </a:r>
           </a:p>
           <a:p>
             <a:pPr lvl="2"/>
             <a:r>
-              <a:rPr lang="en-US" smtClean="0"/>
+              <a:rPr lang="en-US"/>
               <a:t>Third level</a:t>
             </a:r>
           </a:p>
           <a:p>
             <a:pPr lvl="3"/>
             <a:r>
-              <a:rPr lang="en-US" smtClean="0"/>
+              <a:rPr lang="en-US"/>
               <a:t>Fourth level</a:t>
             </a:r>
           </a:p>
           <a:p>
             <a:pPr lvl="4"/>
             <a:r>
-              <a:rPr lang="en-US" smtClean="0"/>
+              <a:rPr lang="en-US"/>
               <a:t>Fifth level</a:t>
             </a:r>
-            <a:endParaRPr lang="en-US"/>
           </a:p>
         </p:txBody>
       </p:sp>
@@ -2430,7 +2444,7 @@
           <a:p>
             <a:fld id="{B9D4E1D2-B082-4959-8BC1-1B0986A120C2}" type="datetimeFigureOut">
               <a:rPr lang="en-US" smtClean="0"/>
-              <a:t>8/29/2017</a:t>
+              <a:t>8/31/2017</a:t>
             </a:fld>
             <a:endParaRPr lang="en-US"/>
           </a:p>
@@ -2533,10 +2547,9 @@
           </a:lstStyle>
           <a:p>
             <a:r>
-              <a:rPr lang="en-US" smtClean="0"/>
+              <a:rPr lang="en-US"/>
               <a:t>Click to edit Master title style</a:t>
             </a:r>
-            <a:endParaRPr lang="en-US"/>
           </a:p>
         </p:txBody>
       </p:sp>
@@ -2653,7 +2666,7 @@
           <a:p>
             <a:pPr lvl="0"/>
             <a:r>
-              <a:rPr lang="en-US" smtClean="0"/>
+              <a:rPr lang="en-US"/>
               <a:t>Click to edit Master text styles</a:t>
             </a:r>
           </a:p>
@@ -2676,7 +2689,7 @@
           <a:p>
             <a:fld id="{B9D4E1D2-B082-4959-8BC1-1B0986A120C2}" type="datetimeFigureOut">
               <a:rPr lang="en-US" smtClean="0"/>
-              <a:t>8/29/2017</a:t>
+              <a:t>8/31/2017</a:t>
             </a:fld>
             <a:endParaRPr lang="en-US"/>
           </a:p>
@@ -2770,10 +2783,9 @@
           <a:lstStyle/>
           <a:p>
             <a:r>
-              <a:rPr lang="en-US" smtClean="0"/>
+              <a:rPr lang="en-US"/>
               <a:t>Click to edit Master title style</a:t>
             </a:r>
-            <a:endParaRPr lang="en-US"/>
           </a:p>
         </p:txBody>
       </p:sp>
@@ -2827,38 +2839,37 @@
           <a:p>
             <a:pPr lvl="0"/>
             <a:r>
-              <a:rPr lang="en-US" smtClean="0"/>
+              <a:rPr lang="en-US"/>
               <a:t>Click to edit Master text styles</a:t>
             </a:r>
           </a:p>
           <a:p>
             <a:pPr lvl="1"/>
             <a:r>
-              <a:rPr lang="en-US" smtClean="0"/>
+              <a:rPr lang="en-US"/>
               <a:t>Second level</a:t>
             </a:r>
           </a:p>
           <a:p>
             <a:pPr lvl="2"/>
             <a:r>
-              <a:rPr lang="en-US" smtClean="0"/>
+              <a:rPr lang="en-US"/>
               <a:t>Third level</a:t>
             </a:r>
           </a:p>
           <a:p>
             <a:pPr lvl="3"/>
             <a:r>
-              <a:rPr lang="en-US" smtClean="0"/>
+              <a:rPr lang="en-US"/>
               <a:t>Fourth level</a:t>
             </a:r>
           </a:p>
           <a:p>
             <a:pPr lvl="4"/>
             <a:r>
-              <a:rPr lang="en-US" smtClean="0"/>
+              <a:rPr lang="en-US"/>
               <a:t>Fifth level</a:t>
             </a:r>
-            <a:endParaRPr lang="en-US"/>
           </a:p>
         </p:txBody>
       </p:sp>
@@ -2912,38 +2923,37 @@
           <a:p>
             <a:pPr lvl="0"/>
             <a:r>
-              <a:rPr lang="en-US" smtClean="0"/>
+              <a:rPr lang="en-US"/>
               <a:t>Click to edit Master text styles</a:t>
             </a:r>
           </a:p>
           <a:p>
             <a:pPr lvl="1"/>
             <a:r>
-              <a:rPr lang="en-US" smtClean="0"/>
+              <a:rPr lang="en-US"/>
               <a:t>Second level</a:t>
             </a:r>
           </a:p>
           <a:p>
             <a:pPr lvl="2"/>
             <a:r>
-              <a:rPr lang="en-US" smtClean="0"/>
+              <a:rPr lang="en-US"/>
               <a:t>Third level</a:t>
             </a:r>
           </a:p>
           <a:p>
             <a:pPr lvl="3"/>
             <a:r>
-              <a:rPr lang="en-US" smtClean="0"/>
+              <a:rPr lang="en-US"/>
               <a:t>Fourth level</a:t>
             </a:r>
           </a:p>
           <a:p>
             <a:pPr lvl="4"/>
             <a:r>
-              <a:rPr lang="en-US" smtClean="0"/>
+              <a:rPr lang="en-US"/>
               <a:t>Fifth level</a:t>
             </a:r>
-            <a:endParaRPr lang="en-US"/>
           </a:p>
         </p:txBody>
       </p:sp>
@@ -2964,7 +2974,7 @@
           <a:p>
             <a:fld id="{B9D4E1D2-B082-4959-8BC1-1B0986A120C2}" type="datetimeFigureOut">
               <a:rPr lang="en-US" smtClean="0"/>
-              <a:t>8/29/2017</a:t>
+              <a:t>8/31/2017</a:t>
             </a:fld>
             <a:endParaRPr lang="en-US"/>
           </a:p>
@@ -3062,10 +3072,9 @@
           </a:lstStyle>
           <a:p>
             <a:r>
-              <a:rPr lang="en-US" smtClean="0"/>
+              <a:rPr lang="en-US"/>
               <a:t>Click to edit Master title style</a:t>
             </a:r>
-            <a:endParaRPr lang="en-US"/>
           </a:p>
         </p:txBody>
       </p:sp>
@@ -3128,7 +3137,7 @@
           <a:p>
             <a:pPr lvl="0"/>
             <a:r>
-              <a:rPr lang="en-US" smtClean="0"/>
+              <a:rPr lang="en-US"/>
               <a:t>Click to edit Master text styles</a:t>
             </a:r>
           </a:p>
@@ -3184,38 +3193,37 @@
           <a:p>
             <a:pPr lvl="0"/>
             <a:r>
-              <a:rPr lang="en-US" smtClean="0"/>
+              <a:rPr lang="en-US"/>
               <a:t>Click to edit Master text styles</a:t>
             </a:r>
           </a:p>
           <a:p>
             <a:pPr lvl="1"/>
             <a:r>
-              <a:rPr lang="en-US" smtClean="0"/>
+              <a:rPr lang="en-US"/>
               <a:t>Second level</a:t>
             </a:r>
           </a:p>
           <a:p>
             <a:pPr lvl="2"/>
             <a:r>
-              <a:rPr lang="en-US" smtClean="0"/>
+              <a:rPr lang="en-US"/>
               <a:t>Third level</a:t>
             </a:r>
           </a:p>
           <a:p>
             <a:pPr lvl="3"/>
             <a:r>
-              <a:rPr lang="en-US" smtClean="0"/>
+              <a:rPr lang="en-US"/>
               <a:t>Fourth level</a:t>
             </a:r>
           </a:p>
           <a:p>
             <a:pPr lvl="4"/>
             <a:r>
-              <a:rPr lang="en-US" smtClean="0"/>
+              <a:rPr lang="en-US"/>
               <a:t>Fifth level</a:t>
             </a:r>
-            <a:endParaRPr lang="en-US"/>
           </a:p>
         </p:txBody>
       </p:sp>
@@ -3278,7 +3286,7 @@
           <a:p>
             <a:pPr lvl="0"/>
             <a:r>
-              <a:rPr lang="en-US" smtClean="0"/>
+              <a:rPr lang="en-US"/>
               <a:t>Click to edit Master text styles</a:t>
             </a:r>
           </a:p>
@@ -3334,38 +3342,37 @@
           <a:p>
             <a:pPr lvl="0"/>
             <a:r>
-              <a:rPr lang="en-US" smtClean="0"/>
+              <a:rPr lang="en-US"/>
               <a:t>Click to edit Master text styles</a:t>
             </a:r>
           </a:p>
           <a:p>
             <a:pPr lvl="1"/>
             <a:r>
-              <a:rPr lang="en-US" smtClean="0"/>
+              <a:rPr lang="en-US"/>
               <a:t>Second level</a:t>
             </a:r>
           </a:p>
           <a:p>
             <a:pPr lvl="2"/>
             <a:r>
-              <a:rPr lang="en-US" smtClean="0"/>
+              <a:rPr lang="en-US"/>
               <a:t>Third level</a:t>
             </a:r>
           </a:p>
           <a:p>
             <a:pPr lvl="3"/>
             <a:r>
-              <a:rPr lang="en-US" smtClean="0"/>
+              <a:rPr lang="en-US"/>
               <a:t>Fourth level</a:t>
             </a:r>
           </a:p>
           <a:p>
             <a:pPr lvl="4"/>
             <a:r>
-              <a:rPr lang="en-US" smtClean="0"/>
+              <a:rPr lang="en-US"/>
               <a:t>Fifth level</a:t>
             </a:r>
-            <a:endParaRPr lang="en-US"/>
           </a:p>
         </p:txBody>
       </p:sp>
@@ -3386,7 +3393,7 @@
           <a:p>
             <a:fld id="{B9D4E1D2-B082-4959-8BC1-1B0986A120C2}" type="datetimeFigureOut">
               <a:rPr lang="en-US" smtClean="0"/>
-              <a:t>8/29/2017</a:t>
+              <a:t>8/31/2017</a:t>
             </a:fld>
             <a:endParaRPr lang="en-US"/>
           </a:p>
@@ -3480,10 +3487,9 @@
           <a:lstStyle/>
           <a:p>
             <a:r>
-              <a:rPr lang="en-US" smtClean="0"/>
+              <a:rPr lang="en-US"/>
               <a:t>Click to edit Master title style</a:t>
             </a:r>
-            <a:endParaRPr lang="en-US"/>
           </a:p>
         </p:txBody>
       </p:sp>
@@ -3504,7 +3510,7 @@
           <a:p>
             <a:fld id="{B9D4E1D2-B082-4959-8BC1-1B0986A120C2}" type="datetimeFigureOut">
               <a:rPr lang="en-US" smtClean="0"/>
-              <a:t>8/29/2017</a:t>
+              <a:t>8/31/2017</a:t>
             </a:fld>
             <a:endParaRPr lang="en-US"/>
           </a:p>
@@ -3599,7 +3605,7 @@
           <a:p>
             <a:fld id="{B9D4E1D2-B082-4959-8BC1-1B0986A120C2}" type="datetimeFigureOut">
               <a:rPr lang="en-US" smtClean="0"/>
-              <a:t>8/29/2017</a:t>
+              <a:t>8/31/2017</a:t>
             </a:fld>
             <a:endParaRPr lang="en-US"/>
           </a:p>
@@ -3702,10 +3708,9 @@
           </a:lstStyle>
           <a:p>
             <a:r>
-              <a:rPr lang="en-US" smtClean="0"/>
+              <a:rPr lang="en-US"/>
               <a:t>Click to edit Master title style</a:t>
             </a:r>
-            <a:endParaRPr lang="en-US"/>
           </a:p>
         </p:txBody>
       </p:sp>
@@ -3759,38 +3764,37 @@
           <a:p>
             <a:pPr lvl="0"/>
             <a:r>
-              <a:rPr lang="en-US" smtClean="0"/>
+              <a:rPr lang="en-US"/>
               <a:t>Click to edit Master text styles</a:t>
             </a:r>
           </a:p>
           <a:p>
             <a:pPr lvl="1"/>
             <a:r>
-              <a:rPr lang="en-US" smtClean="0"/>
+              <a:rPr lang="en-US"/>
               <a:t>Second level</a:t>
             </a:r>
           </a:p>
           <a:p>
             <a:pPr lvl="2"/>
             <a:r>
-              <a:rPr lang="en-US" smtClean="0"/>
+              <a:rPr lang="en-US"/>
               <a:t>Third level</a:t>
             </a:r>
           </a:p>
           <a:p>
             <a:pPr lvl="3"/>
             <a:r>
-              <a:rPr lang="en-US" smtClean="0"/>
+              <a:rPr lang="en-US"/>
               <a:t>Fourth level</a:t>
             </a:r>
           </a:p>
           <a:p>
             <a:pPr lvl="4"/>
             <a:r>
-              <a:rPr lang="en-US" smtClean="0"/>
+              <a:rPr lang="en-US"/>
               <a:t>Fifth level</a:t>
             </a:r>
-            <a:endParaRPr lang="en-US"/>
           </a:p>
         </p:txBody>
       </p:sp>
@@ -3853,7 +3857,7 @@
           <a:p>
             <a:pPr lvl="0"/>
             <a:r>
-              <a:rPr lang="en-US" smtClean="0"/>
+              <a:rPr lang="en-US"/>
               <a:t>Click to edit Master text styles</a:t>
             </a:r>
           </a:p>
@@ -3876,7 +3880,7 @@
           <a:p>
             <a:fld id="{B9D4E1D2-B082-4959-8BC1-1B0986A120C2}" type="datetimeFigureOut">
               <a:rPr lang="en-US" smtClean="0"/>
-              <a:t>8/29/2017</a:t>
+              <a:t>8/31/2017</a:t>
             </a:fld>
             <a:endParaRPr lang="en-US"/>
           </a:p>
@@ -3979,10 +3983,9 @@
           </a:lstStyle>
           <a:p>
             <a:r>
-              <a:rPr lang="en-US" smtClean="0"/>
+              <a:rPr lang="en-US"/>
               <a:t>Click to edit Master title style</a:t>
             </a:r>
-            <a:endParaRPr lang="en-US"/>
           </a:p>
         </p:txBody>
       </p:sp>
@@ -4106,7 +4109,7 @@
           <a:p>
             <a:pPr lvl="0"/>
             <a:r>
-              <a:rPr lang="en-US" smtClean="0"/>
+              <a:rPr lang="en-US"/>
               <a:t>Click to edit Master text styles</a:t>
             </a:r>
           </a:p>
@@ -4129,7 +4132,7 @@
           <a:p>
             <a:fld id="{B9D4E1D2-B082-4959-8BC1-1B0986A120C2}" type="datetimeFigureOut">
               <a:rPr lang="en-US" smtClean="0"/>
-              <a:t>8/29/2017</a:t>
+              <a:t>8/31/2017</a:t>
             </a:fld>
             <a:endParaRPr lang="en-US"/>
           </a:p>
@@ -4238,10 +4241,9 @@
           <a:lstStyle/>
           <a:p>
             <a:r>
-              <a:rPr lang="en-US" smtClean="0"/>
+              <a:rPr lang="en-US"/>
               <a:t>Click to edit Master title style</a:t>
             </a:r>
-            <a:endParaRPr lang="en-US"/>
           </a:p>
         </p:txBody>
       </p:sp>
@@ -4272,38 +4274,37 @@
           <a:p>
             <a:pPr lvl="0"/>
             <a:r>
-              <a:rPr lang="en-US" smtClean="0"/>
+              <a:rPr lang="en-US"/>
               <a:t>Click to edit Master text styles</a:t>
             </a:r>
           </a:p>
           <a:p>
             <a:pPr lvl="1"/>
             <a:r>
-              <a:rPr lang="en-US" smtClean="0"/>
+              <a:rPr lang="en-US"/>
               <a:t>Second level</a:t>
             </a:r>
           </a:p>
           <a:p>
             <a:pPr lvl="2"/>
             <a:r>
-              <a:rPr lang="en-US" smtClean="0"/>
+              <a:rPr lang="en-US"/>
               <a:t>Third level</a:t>
             </a:r>
           </a:p>
           <a:p>
             <a:pPr lvl="3"/>
             <a:r>
-              <a:rPr lang="en-US" smtClean="0"/>
+              <a:rPr lang="en-US"/>
               <a:t>Fourth level</a:t>
             </a:r>
           </a:p>
           <a:p>
             <a:pPr lvl="4"/>
             <a:r>
-              <a:rPr lang="en-US" smtClean="0"/>
+              <a:rPr lang="en-US"/>
               <a:t>Fifth level</a:t>
             </a:r>
-            <a:endParaRPr lang="en-US"/>
           </a:p>
         </p:txBody>
       </p:sp>
@@ -4342,7 +4343,7 @@
           <a:p>
             <a:fld id="{B9D4E1D2-B082-4959-8BC1-1B0986A120C2}" type="datetimeFigureOut">
               <a:rPr lang="en-US" smtClean="0"/>
-              <a:t>8/29/2017</a:t>
+              <a:t>8/31/2017</a:t>
             </a:fld>
             <a:endParaRPr lang="en-US"/>
           </a:p>
@@ -5820,7 +5821,7 @@
               <a:lstStyle/>
               <a:p>
                 <a:r>
-                  <a:rPr lang="es-ES" sz="2200" dirty="0" smtClean="0"/>
+                  <a:rPr lang="es-ES" sz="2200" dirty="0"/>
                   <a:t>y</a:t>
                 </a:r>
                 <a:endParaRPr lang="en-US" sz="2200" dirty="0"/>
@@ -5850,7 +5851,7 @@
               <a:lstStyle/>
               <a:p>
                 <a:r>
-                  <a:rPr lang="es-ES" sz="2200" dirty="0" smtClean="0"/>
+                  <a:rPr lang="es-ES" sz="2200" dirty="0"/>
                   <a:t>x</a:t>
                 </a:r>
                 <a:endParaRPr lang="en-US" sz="2200" dirty="0"/>
@@ -6014,7 +6015,7 @@
             <a:lstStyle/>
             <a:p>
               <a:r>
-                <a:rPr lang="es-ES" sz="2200" dirty="0" smtClean="0"/>
+                <a:rPr lang="es-ES" sz="2200" dirty="0"/>
                 <a:t>z</a:t>
               </a:r>
               <a:endParaRPr lang="en-US" sz="2200" dirty="0"/>
@@ -6082,7 +6083,7 @@
               <a:lstStyle/>
               <a:p>
                 <a:r>
-                  <a:rPr lang="es-ES" sz="2200" dirty="0" err="1" smtClean="0">
+                  <a:rPr lang="es-ES" sz="2200" dirty="0" err="1">
                     <a:solidFill>
                       <a:schemeClr val="tx1"/>
                     </a:solidFill>
@@ -6090,7 +6091,7 @@
                   <a:t>Wing</a:t>
                 </a:r>
                 <a:r>
-                  <a:rPr lang="es-ES" sz="2200" dirty="0" smtClean="0">
+                  <a:rPr lang="es-ES" sz="2200" dirty="0">
                     <a:solidFill>
                       <a:schemeClr val="tx1"/>
                     </a:solidFill>
@@ -6152,7 +6153,7 @@
               <a:lstStyle/>
               <a:p>
                 <a:r>
-                  <a:rPr lang="es-ES" sz="2200" dirty="0" err="1" smtClean="0">
+                  <a:rPr lang="es-ES" sz="2200" dirty="0" err="1">
                     <a:solidFill>
                       <a:schemeClr val="tx1"/>
                     </a:solidFill>
@@ -6160,7 +6161,7 @@
                   <a:t>Lattice</a:t>
                 </a:r>
                 <a:r>
-                  <a:rPr lang="es-ES" sz="2200" dirty="0" smtClean="0">
+                  <a:rPr lang="es-ES" sz="2200" dirty="0">
                     <a:solidFill>
                       <a:schemeClr val="tx1"/>
                     </a:solidFill>
@@ -6168,7 +6169,7 @@
                   <a:t> </a:t>
                 </a:r>
                 <a:r>
-                  <a:rPr lang="es-ES" sz="2200" dirty="0" err="1" smtClean="0">
+                  <a:rPr lang="es-ES" sz="2200" dirty="0" err="1">
                     <a:solidFill>
                       <a:schemeClr val="tx1"/>
                     </a:solidFill>
@@ -6231,7 +6232,7 @@
               <a:p>
                 <a:pPr algn="r"/>
                 <a:r>
-                  <a:rPr lang="es-ES" sz="2200" dirty="0" err="1" smtClean="0">
+                  <a:rPr lang="es-ES" sz="2200" dirty="0" err="1">
                     <a:solidFill>
                       <a:schemeClr val="tx1"/>
                     </a:solidFill>
@@ -6239,7 +6240,7 @@
                   <a:t>Lattice</a:t>
                 </a:r>
                 <a:r>
-                  <a:rPr lang="es-ES" sz="2200" dirty="0" smtClean="0">
+                  <a:rPr lang="es-ES" sz="2200" dirty="0">
                     <a:solidFill>
                       <a:schemeClr val="tx1"/>
                     </a:solidFill>
@@ -6247,7 +6248,7 @@
                   <a:t> </a:t>
                 </a:r>
                 <a:r>
-                  <a:rPr lang="es-ES" sz="2200" dirty="0" err="1" smtClean="0">
+                  <a:rPr lang="es-ES" sz="2200" dirty="0" err="1">
                     <a:solidFill>
                       <a:schemeClr val="tx1"/>
                     </a:solidFill>
@@ -6274,13 +6275,6 @@
   <p:clrMapOvr>
     <a:masterClrMapping/>
   </p:clrMapOvr>
-  <p:timing>
-    <p:tnLst>
-      <p:par>
-        <p:cTn id="1" dur="indefinite" restart="never" nodeType="tmRoot"/>
-      </p:par>
-    </p:tnLst>
-  </p:timing>
 </p:sld>
 </file>
 
@@ -7218,7 +7212,7 @@
             <a:p>
               <a:pPr algn="ctr"/>
               <a:r>
-                <a:rPr lang="es-ES" dirty="0" smtClean="0"/>
+                <a:rPr lang="es-ES" dirty="0"/>
                 <a:t>W</a:t>
               </a:r>
               <a:endParaRPr lang="en-US" dirty="0"/>
@@ -7249,7 +7243,7 @@
             <a:p>
               <a:pPr algn="ctr"/>
               <a:r>
-                <a:rPr lang="es-ES" dirty="0" smtClean="0"/>
+                <a:rPr lang="es-ES" dirty="0"/>
                 <a:t>H</a:t>
               </a:r>
               <a:endParaRPr lang="en-US" dirty="0"/>
@@ -7280,7 +7274,7 @@
             <a:p>
               <a:pPr algn="ctr"/>
               <a:r>
-                <a:rPr lang="es-ES" dirty="0" smtClean="0"/>
+                <a:rPr lang="es-ES" dirty="0"/>
                 <a:t>t</a:t>
               </a:r>
               <a:endParaRPr lang="en-US" dirty="0"/>
@@ -7826,13 +7820,6 @@
   <p:clrMapOvr>
     <a:masterClrMapping/>
   </p:clrMapOvr>
-  <p:timing>
-    <p:tnLst>
-      <p:par>
-        <p:cTn id="1" dur="indefinite" restart="never" nodeType="tmRoot"/>
-      </p:par>
-    </p:tnLst>
-  </p:timing>
 </p:sld>
 </file>
 
@@ -8178,11 +8165,11 @@
           <a:p>
             <a:pPr algn="ctr"/>
             <a:r>
-              <a:rPr lang="es-ES" sz="2200" dirty="0" err="1" smtClean="0"/>
+              <a:rPr lang="es-ES" sz="2200" dirty="0" err="1"/>
               <a:t>W</a:t>
             </a:r>
             <a:r>
-              <a:rPr lang="es-ES" sz="2200" baseline="-25000" dirty="0" err="1" smtClean="0"/>
+              <a:rPr lang="es-ES" sz="2200" baseline="-25000" dirty="0" err="1"/>
               <a:t>closed</a:t>
             </a:r>
             <a:endParaRPr lang="en-US" sz="2200" baseline="-25000" dirty="0"/>
@@ -8213,7 +8200,7 @@
           <a:p>
             <a:pPr algn="ctr"/>
             <a:r>
-              <a:rPr lang="es-ES" sz="2200" dirty="0" smtClean="0"/>
+              <a:rPr lang="es-ES" sz="2200" dirty="0"/>
               <a:t>H</a:t>
             </a:r>
             <a:endParaRPr lang="en-US" sz="2200" dirty="0"/>
@@ -8351,11 +8338,11 @@
           <a:p>
             <a:pPr algn="ctr"/>
             <a:r>
-              <a:rPr lang="es-ES" sz="2200" dirty="0" err="1" smtClean="0"/>
+              <a:rPr lang="es-ES" sz="2200" dirty="0" err="1"/>
               <a:t>W</a:t>
             </a:r>
             <a:r>
-              <a:rPr lang="es-ES" sz="2200" baseline="-25000" dirty="0" err="1" smtClean="0"/>
+              <a:rPr lang="es-ES" sz="2200" baseline="-25000" dirty="0" err="1"/>
               <a:t>open</a:t>
             </a:r>
             <a:endParaRPr lang="en-US" sz="2200" baseline="-25000" dirty="0"/>
@@ -8493,7 +8480,7 @@
           <a:p>
             <a:pPr algn="ctr"/>
             <a:r>
-              <a:rPr lang="es-ES" sz="2200" dirty="0" smtClean="0"/>
+              <a:rPr lang="es-ES" sz="2200" dirty="0"/>
               <a:t>H</a:t>
             </a:r>
             <a:endParaRPr lang="en-US" sz="2200" dirty="0"/>
@@ -8642,7 +8629,7 @@
           <a:p>
             <a:pPr algn="ctr"/>
             <a:r>
-              <a:rPr lang="es-ES" sz="2200" dirty="0" smtClean="0"/>
+              <a:rPr lang="es-ES" sz="2200" dirty="0"/>
               <a:t>45°</a:t>
             </a:r>
             <a:endParaRPr lang="en-US" sz="2200" baseline="-25000" dirty="0"/>
@@ -8724,7 +8711,7 @@
             <a:p>
               <a:pPr algn="ctr"/>
               <a:r>
-                <a:rPr lang="es-ES" sz="2200" dirty="0" smtClean="0"/>
+                <a:rPr lang="es-ES" sz="2200" dirty="0"/>
                 <a:t>A</a:t>
               </a:r>
             </a:p>
@@ -8843,7 +8830,7 @@
             <a:p>
               <a:pPr algn="ctr"/>
               <a:r>
-                <a:rPr lang="es-ES" sz="2200" dirty="0" smtClean="0"/>
+                <a:rPr lang="es-ES" sz="2200" dirty="0"/>
                 <a:t>A</a:t>
               </a:r>
             </a:p>
@@ -9032,7 +9019,7 @@
             <a:p>
               <a:pPr algn="ctr"/>
               <a:r>
-                <a:rPr lang="es-ES" sz="2200" dirty="0" smtClean="0"/>
+                <a:rPr lang="es-ES" sz="2200" dirty="0"/>
                 <a:t>A/2</a:t>
               </a:r>
             </a:p>
@@ -9145,13 +9132,6 @@
   <p:clrMapOvr>
     <a:masterClrMapping/>
   </p:clrMapOvr>
-  <p:timing>
-    <p:tnLst>
-      <p:par>
-        <p:cTn id="1" dur="indefinite" restart="never" nodeType="tmRoot"/>
-      </p:par>
-    </p:tnLst>
-  </p:timing>
 </p:sld>
 </file>
 
@@ -10129,7 +10109,7 @@
             <a:p>
               <a:pPr algn="ctr"/>
               <a:r>
-                <a:rPr lang="es-ES" sz="2200" dirty="0" smtClean="0"/>
+                <a:rPr lang="es-ES" sz="2200" dirty="0"/>
                 <a:t>t</a:t>
               </a:r>
               <a:endParaRPr lang="en-US" sz="2200" dirty="0"/>
@@ -10160,7 +10140,7 @@
             <a:p>
               <a:pPr algn="ctr"/>
               <a:r>
-                <a:rPr lang="es-ES" sz="2200" dirty="0" smtClean="0"/>
+                <a:rPr lang="es-ES" sz="2200" dirty="0"/>
                 <a:t>Ø r</a:t>
               </a:r>
               <a:endParaRPr lang="en-US" sz="2200" dirty="0"/>
@@ -10261,7 +10241,7 @@
             <a:p>
               <a:pPr algn="ctr"/>
               <a:r>
-                <a:rPr lang="es-ES" sz="2200" dirty="0" smtClean="0"/>
+                <a:rPr lang="es-ES" sz="2200" dirty="0"/>
                 <a:t>B</a:t>
               </a:r>
               <a:endParaRPr lang="en-US" sz="2200" dirty="0"/>
@@ -11752,10 +11732,9 @@
           <a:lstStyle/>
           <a:p>
             <a:r>
-              <a:rPr lang="en-US" sz="2200" dirty="0" smtClean="0"/>
+              <a:rPr lang="en-US" sz="2200" dirty="0"/>
               <a:t>Wing-box C-profile</a:t>
             </a:r>
-            <a:endParaRPr lang="en-US" sz="2200" dirty="0"/>
           </a:p>
         </p:txBody>
       </p:sp>
@@ -11784,7 +11763,7 @@
           <a:lstStyle/>
           <a:p>
             <a:r>
-              <a:rPr lang="en-US" sz="2200" dirty="0" err="1" smtClean="0"/>
+              <a:rPr lang="en-US" sz="2200" dirty="0" err="1"/>
               <a:t>Tyre</a:t>
             </a:r>
             <a:endParaRPr lang="en-US" sz="2200" dirty="0"/>
@@ -11816,10 +11795,9 @@
           <a:lstStyle/>
           <a:p>
             <a:r>
-              <a:rPr lang="en-US" sz="2200" dirty="0" smtClean="0"/>
+              <a:rPr lang="en-US" sz="2200" dirty="0"/>
               <a:t>Lattice node</a:t>
             </a:r>
-            <a:endParaRPr lang="en-US" sz="2200" dirty="0"/>
           </a:p>
         </p:txBody>
       </p:sp>
@@ -11848,17 +11826,16 @@
           <a:lstStyle/>
           <a:p>
             <a:r>
-              <a:rPr lang="en-US" sz="2200" dirty="0" smtClean="0"/>
+              <a:rPr lang="en-US" sz="2200" dirty="0"/>
               <a:t>Lattice</a:t>
             </a:r>
             <a:br>
-              <a:rPr lang="en-US" sz="2200" dirty="0" smtClean="0"/>
+              <a:rPr lang="en-US" sz="2200" dirty="0"/>
             </a:br>
             <a:r>
-              <a:rPr lang="en-US" sz="2200" dirty="0" smtClean="0"/>
+              <a:rPr lang="en-US" sz="2200" dirty="0"/>
               <a:t>ligament</a:t>
             </a:r>
-            <a:endParaRPr lang="en-US" sz="2200" dirty="0"/>
           </a:p>
         </p:txBody>
       </p:sp>
@@ -11914,13 +11891,6 @@
   <p:clrMapOvr>
     <a:masterClrMapping/>
   </p:clrMapOvr>
-  <p:timing>
-    <p:tnLst>
-      <p:par>
-        <p:cTn id="1" dur="indefinite" restart="never" nodeType="tmRoot"/>
-      </p:par>
-    </p:tnLst>
-  </p:timing>
 </p:sld>
 </file>
 
@@ -11994,10 +11964,9 @@
           <a:lstStyle/>
           <a:p>
             <a:r>
-              <a:rPr lang="en-US" sz="2200" dirty="0" smtClean="0"/>
+              <a:rPr lang="en-US" sz="2200" dirty="0"/>
               <a:t>Master node on wing-box skin</a:t>
             </a:r>
-            <a:endParaRPr lang="en-US" sz="2200" dirty="0"/>
           </a:p>
         </p:txBody>
       </p:sp>
@@ -12024,14 +11993,13 @@
           <a:lstStyle/>
           <a:p>
             <a:r>
-              <a:rPr lang="en-US" sz="2200" dirty="0" err="1" smtClean="0"/>
+              <a:rPr lang="en-US" sz="2200" dirty="0" err="1"/>
               <a:t>Tyre</a:t>
             </a:r>
             <a:r>
-              <a:rPr lang="en-US" sz="2200" dirty="0" smtClean="0"/>
+              <a:rPr lang="en-US" sz="2200" dirty="0"/>
               <a:t> part</a:t>
             </a:r>
-            <a:endParaRPr lang="en-US" sz="2200" dirty="0"/>
           </a:p>
         </p:txBody>
       </p:sp>
@@ -12058,11 +12026,11 @@
           <a:lstStyle/>
           <a:p>
             <a:r>
-              <a:rPr lang="en-US" sz="2200" dirty="0" smtClean="0"/>
+              <a:rPr lang="en-US" sz="2200" dirty="0"/>
               <a:t>Slave node on </a:t>
             </a:r>
             <a:r>
-              <a:rPr lang="en-US" sz="2200" dirty="0" err="1" smtClean="0"/>
+              <a:rPr lang="en-US" sz="2200" dirty="0" err="1"/>
               <a:t>tyre</a:t>
             </a:r>
             <a:endParaRPr lang="en-US" sz="2200" dirty="0"/>
@@ -13346,7 +13314,7 @@
               <a:lstStyle/>
               <a:p>
                 <a:r>
-                  <a:rPr lang="es-ES" sz="2200" dirty="0" smtClean="0"/>
+                  <a:rPr lang="es-ES" sz="2200" dirty="0"/>
                   <a:t>y</a:t>
                 </a:r>
                 <a:endParaRPr lang="en-US" sz="2200" dirty="0"/>
@@ -13376,7 +13344,7 @@
               <a:lstStyle/>
               <a:p>
                 <a:r>
-                  <a:rPr lang="es-ES" sz="2200" dirty="0" smtClean="0"/>
+                  <a:rPr lang="es-ES" sz="2200" dirty="0"/>
                   <a:t>x</a:t>
                 </a:r>
                 <a:endParaRPr lang="en-US" sz="2200" dirty="0"/>
@@ -13540,7 +13508,7 @@
             <a:lstStyle/>
             <a:p>
               <a:r>
-                <a:rPr lang="es-ES" sz="2200" dirty="0" smtClean="0"/>
+                <a:rPr lang="es-ES" sz="2200" dirty="0"/>
                 <a:t>z</a:t>
               </a:r>
               <a:endParaRPr lang="en-US" sz="2200" dirty="0"/>
@@ -13608,7 +13576,7 @@
               <a:lstStyle/>
               <a:p>
                 <a:r>
-                  <a:rPr lang="es-ES" sz="2200" dirty="0" err="1" smtClean="0">
+                  <a:rPr lang="es-ES" sz="2200" dirty="0" err="1">
                     <a:solidFill>
                       <a:schemeClr val="tx1"/>
                     </a:solidFill>
@@ -13616,7 +13584,7 @@
                   <a:t>Wing</a:t>
                 </a:r>
                 <a:r>
-                  <a:rPr lang="es-ES" sz="2200" dirty="0" smtClean="0">
+                  <a:rPr lang="es-ES" sz="2200" dirty="0">
                     <a:solidFill>
                       <a:schemeClr val="tx1"/>
                     </a:solidFill>
@@ -13678,7 +13646,7 @@
               <a:lstStyle/>
               <a:p>
                 <a:r>
-                  <a:rPr lang="es-ES" sz="2200" dirty="0" err="1" smtClean="0">
+                  <a:rPr lang="es-ES" sz="2200" dirty="0" err="1">
                     <a:solidFill>
                       <a:schemeClr val="tx1"/>
                     </a:solidFill>
@@ -13686,7 +13654,7 @@
                   <a:t>Lattice</a:t>
                 </a:r>
                 <a:r>
-                  <a:rPr lang="es-ES" sz="2200" dirty="0" smtClean="0">
+                  <a:rPr lang="es-ES" sz="2200" dirty="0">
                     <a:solidFill>
                       <a:schemeClr val="tx1"/>
                     </a:solidFill>
@@ -13694,7 +13662,7 @@
                   <a:t> </a:t>
                 </a:r>
                 <a:r>
-                  <a:rPr lang="es-ES" sz="2200" dirty="0" err="1" smtClean="0">
+                  <a:rPr lang="es-ES" sz="2200" dirty="0" err="1">
                     <a:solidFill>
                       <a:schemeClr val="tx1"/>
                     </a:solidFill>
@@ -13757,7 +13725,7 @@
               <a:p>
                 <a:pPr algn="r"/>
                 <a:r>
-                  <a:rPr lang="es-ES" sz="2200" dirty="0" err="1" smtClean="0">
+                  <a:rPr lang="es-ES" sz="2200" dirty="0" err="1">
                     <a:solidFill>
                       <a:schemeClr val="tx1"/>
                     </a:solidFill>
@@ -13765,7 +13733,7 @@
                   <a:t>Lattice</a:t>
                 </a:r>
                 <a:r>
-                  <a:rPr lang="es-ES" sz="2200" dirty="0" smtClean="0">
+                  <a:rPr lang="es-ES" sz="2200" dirty="0">
                     <a:solidFill>
                       <a:schemeClr val="tx1"/>
                     </a:solidFill>
@@ -13773,7 +13741,7 @@
                   <a:t> </a:t>
                 </a:r>
                 <a:r>
-                  <a:rPr lang="es-ES" sz="2200" dirty="0" err="1" smtClean="0">
+                  <a:rPr lang="es-ES" sz="2200" dirty="0" err="1">
                     <a:solidFill>
                       <a:schemeClr val="tx1"/>
                     </a:solidFill>
@@ -14069,7 +14037,7 @@
           <a:lstStyle/>
           <a:p>
             <a:r>
-              <a:rPr lang="es-ES" sz="2200" dirty="0" smtClean="0"/>
+              <a:rPr lang="es-ES" sz="2200" dirty="0"/>
               <a:t>z</a:t>
             </a:r>
             <a:endParaRPr lang="en-US" sz="2200" dirty="0"/>
@@ -14219,10 +14187,9 @@
           <a:lstStyle/>
           <a:p>
             <a:r>
-              <a:rPr lang="en-US" sz="2200" dirty="0" smtClean="0"/>
+              <a:rPr lang="en-US" sz="2200" dirty="0"/>
               <a:t>Master node on wing-box skin</a:t>
             </a:r>
-            <a:endParaRPr lang="en-US" sz="2200" dirty="0"/>
           </a:p>
         </p:txBody>
       </p:sp>
@@ -14249,10 +14216,9 @@
           <a:lstStyle/>
           <a:p>
             <a:r>
-              <a:rPr lang="en-US" sz="2200" dirty="0" smtClean="0"/>
+              <a:rPr lang="en-US" sz="2200" dirty="0"/>
               <a:t>Local cylindrical reference system</a:t>
             </a:r>
-            <a:endParaRPr lang="en-US" sz="2200" dirty="0"/>
           </a:p>
         </p:txBody>
       </p:sp>
@@ -14531,7 +14497,7 @@
           <a:lstStyle/>
           <a:p>
             <a:r>
-              <a:rPr lang="es-ES" sz="2200" dirty="0" smtClean="0"/>
+              <a:rPr lang="es-ES" sz="2200" dirty="0"/>
               <a:t>z</a:t>
             </a:r>
             <a:endParaRPr lang="en-US" sz="2200" dirty="0"/>
@@ -14643,7 +14609,7 @@
           <a:p>
             <a:pPr algn="ctr"/>
             <a:r>
-              <a:rPr lang="es-ES" sz="1200" dirty="0" err="1" smtClean="0">
+              <a:rPr lang="es-ES" sz="1200" dirty="0" err="1">
                 <a:solidFill>
                   <a:schemeClr val="tx1"/>
                 </a:solidFill>
@@ -14703,7 +14669,7 @@
           <a:p>
             <a:pPr algn="ctr"/>
             <a:r>
-              <a:rPr lang="es-ES" sz="1200" dirty="0" err="1" smtClean="0">
+              <a:rPr lang="es-ES" sz="1200" dirty="0" err="1">
                 <a:solidFill>
                   <a:schemeClr val="tx1"/>
                 </a:solidFill>
@@ -14711,7 +14677,7 @@
               <a:t>Build</a:t>
             </a:r>
             <a:r>
-              <a:rPr lang="es-ES" sz="1200" dirty="0" smtClean="0">
+              <a:rPr lang="es-ES" sz="1200" dirty="0">
                 <a:solidFill>
                   <a:schemeClr val="tx1"/>
                 </a:solidFill>
@@ -14719,7 +14685,7 @@
               <a:t> </a:t>
             </a:r>
             <a:r>
-              <a:rPr lang="es-ES" sz="1200" dirty="0" err="1" smtClean="0">
+              <a:rPr lang="es-ES" sz="1200" dirty="0" err="1">
                 <a:solidFill>
                   <a:schemeClr val="tx1"/>
                 </a:solidFill>
@@ -14779,7 +14745,7 @@
           <a:p>
             <a:pPr algn="ctr"/>
             <a:r>
-              <a:rPr lang="es-ES" sz="1200" dirty="0" err="1" smtClean="0">
+              <a:rPr lang="es-ES" sz="1200" dirty="0" err="1">
                 <a:solidFill>
                   <a:schemeClr val="tx1"/>
                 </a:solidFill>
@@ -14787,7 +14753,7 @@
               <a:t>for</a:t>
             </a:r>
             <a:r>
-              <a:rPr lang="es-ES" sz="1200" dirty="0" smtClean="0">
+              <a:rPr lang="es-ES" sz="1200" dirty="0">
                 <a:solidFill>
                   <a:schemeClr val="tx1"/>
                 </a:solidFill>
@@ -14795,7 +14761,7 @@
               <a:t> </a:t>
             </a:r>
             <a:r>
-              <a:rPr lang="es-ES" sz="1200" dirty="0" err="1" smtClean="0">
+              <a:rPr lang="es-ES" sz="1200" dirty="0" err="1">
                 <a:solidFill>
                   <a:schemeClr val="tx1"/>
                 </a:solidFill>
@@ -14803,7 +14769,7 @@
               <a:t>all</a:t>
             </a:r>
             <a:r>
-              <a:rPr lang="es-ES" sz="1200" dirty="0" smtClean="0">
+              <a:rPr lang="es-ES" sz="1200" dirty="0">
                 <a:solidFill>
                   <a:schemeClr val="tx1"/>
                 </a:solidFill>
@@ -14863,7 +14829,7 @@
           <a:p>
             <a:pPr algn="ctr"/>
             <a:r>
-              <a:rPr lang="es-ES" sz="1200" dirty="0" err="1" smtClean="0">
+              <a:rPr lang="es-ES" sz="1200" dirty="0" err="1">
                 <a:solidFill>
                   <a:schemeClr val="tx1"/>
                 </a:solidFill>
@@ -14871,7 +14837,7 @@
               <a:t>Write</a:t>
             </a:r>
             <a:r>
-              <a:rPr lang="es-ES" sz="1200" dirty="0" smtClean="0">
+              <a:rPr lang="es-ES" sz="1200" dirty="0">
                 <a:solidFill>
                   <a:schemeClr val="tx1"/>
                 </a:solidFill>
@@ -15011,7 +14977,7 @@
           <a:p>
             <a:pPr algn="ctr"/>
             <a:r>
-              <a:rPr lang="es-ES" sz="1200" dirty="0" err="1" smtClean="0">
+              <a:rPr lang="es-ES" sz="1200" dirty="0" err="1">
                 <a:solidFill>
                   <a:schemeClr val="tx1"/>
                 </a:solidFill>
@@ -15019,7 +14985,7 @@
               <a:t>Write</a:t>
             </a:r>
             <a:r>
-              <a:rPr lang="es-ES" sz="1200" dirty="0" smtClean="0">
+              <a:rPr lang="es-ES" sz="1200" dirty="0">
                 <a:solidFill>
                   <a:schemeClr val="tx1"/>
                 </a:solidFill>
@@ -15027,7 +14993,7 @@
               <a:t> </a:t>
             </a:r>
             <a:r>
-              <a:rPr lang="es-ES" sz="1200" dirty="0" err="1" smtClean="0">
+              <a:rPr lang="es-ES" sz="1200" dirty="0" err="1">
                 <a:solidFill>
                   <a:schemeClr val="tx1"/>
                 </a:solidFill>
@@ -15035,7 +15001,7 @@
               <a:t>Abaqus</a:t>
             </a:r>
             <a:r>
-              <a:rPr lang="es-ES" sz="1200" dirty="0" smtClean="0">
+              <a:rPr lang="es-ES" sz="1200" dirty="0">
                 <a:solidFill>
                   <a:schemeClr val="tx1"/>
                 </a:solidFill>
@@ -15043,7 +15009,7 @@
               <a:t> input </a:t>
             </a:r>
             <a:r>
-              <a:rPr lang="es-ES" sz="1200" dirty="0" err="1" smtClean="0">
+              <a:rPr lang="es-ES" sz="1200" dirty="0" err="1">
                 <a:solidFill>
                   <a:schemeClr val="tx1"/>
                 </a:solidFill>
@@ -15051,7 +15017,7 @@
               <a:t>to</a:t>
             </a:r>
             <a:r>
-              <a:rPr lang="es-ES" sz="1200" dirty="0" smtClean="0">
+              <a:rPr lang="es-ES" sz="1200" dirty="0">
                 <a:solidFill>
                   <a:schemeClr val="tx1"/>
                 </a:solidFill>
@@ -15059,7 +15025,7 @@
               <a:t> .</a:t>
             </a:r>
             <a:r>
-              <a:rPr lang="es-ES" sz="1200" dirty="0" err="1" smtClean="0">
+              <a:rPr lang="es-ES" sz="1200" dirty="0" err="1">
                 <a:solidFill>
                   <a:schemeClr val="tx1"/>
                 </a:solidFill>
@@ -15067,7 +15033,7 @@
               <a:t>txt</a:t>
             </a:r>
             <a:r>
-              <a:rPr lang="es-ES" sz="1200" dirty="0" smtClean="0">
+              <a:rPr lang="es-ES" sz="1200" dirty="0">
                 <a:solidFill>
                   <a:schemeClr val="tx1"/>
                 </a:solidFill>
@@ -15127,7 +15093,7 @@
           <a:p>
             <a:pPr algn="ctr"/>
             <a:r>
-              <a:rPr lang="es-ES" sz="1200" dirty="0" err="1" smtClean="0">
+              <a:rPr lang="es-ES" sz="1200" dirty="0" err="1">
                 <a:solidFill>
                   <a:schemeClr val="tx1"/>
                 </a:solidFill>
@@ -15135,7 +15101,7 @@
               <a:t>Execute</a:t>
             </a:r>
             <a:r>
-              <a:rPr lang="es-ES" sz="1200" dirty="0" smtClean="0">
+              <a:rPr lang="es-ES" sz="1200" dirty="0">
                 <a:solidFill>
                   <a:schemeClr val="tx1"/>
                 </a:solidFill>
@@ -15143,7 +15109,7 @@
               <a:t> </a:t>
             </a:r>
             <a:r>
-              <a:rPr lang="es-ES" sz="1200" dirty="0" err="1" smtClean="0">
+              <a:rPr lang="es-ES" sz="1200" dirty="0" err="1">
                 <a:solidFill>
                   <a:schemeClr val="tx1"/>
                 </a:solidFill>
@@ -15151,7 +15117,7 @@
               <a:t>nonlinear</a:t>
             </a:r>
             <a:r>
-              <a:rPr lang="es-ES" sz="1200" dirty="0" smtClean="0">
+              <a:rPr lang="es-ES" sz="1200" dirty="0">
                 <a:solidFill>
                   <a:schemeClr val="tx1"/>
                 </a:solidFill>
@@ -15159,7 +15125,7 @@
               <a:t> </a:t>
             </a:r>
             <a:r>
-              <a:rPr lang="es-ES" sz="1200" dirty="0" err="1" smtClean="0">
+              <a:rPr lang="es-ES" sz="1200" dirty="0" err="1">
                 <a:solidFill>
                   <a:schemeClr val="tx1"/>
                 </a:solidFill>
@@ -15167,7 +15133,7 @@
               <a:t>Abaqus</a:t>
             </a:r>
             <a:r>
-              <a:rPr lang="es-ES" sz="1200" dirty="0" smtClean="0">
+              <a:rPr lang="es-ES" sz="1200" dirty="0">
                 <a:solidFill>
                   <a:schemeClr val="tx1"/>
                 </a:solidFill>
@@ -15175,7 +15141,7 @@
               <a:t> </a:t>
             </a:r>
             <a:r>
-              <a:rPr lang="es-ES" sz="1200" dirty="0" err="1" smtClean="0">
+              <a:rPr lang="es-ES" sz="1200" dirty="0" err="1">
                 <a:solidFill>
                   <a:schemeClr val="tx1"/>
                 </a:solidFill>
@@ -15300,18 +15266,10 @@
                   <a:schemeClr val="tx1"/>
                 </a:solidFill>
               </a:rPr>
-              <a:t>R</a:t>
+              <a:t>Read</a:t>
             </a:r>
             <a:r>
-              <a:rPr lang="es-ES" sz="1200" dirty="0" err="1" smtClean="0">
-                <a:solidFill>
-                  <a:schemeClr val="tx1"/>
-                </a:solidFill>
-              </a:rPr>
-              <a:t>ead</a:t>
-            </a:r>
-            <a:r>
-              <a:rPr lang="es-ES" sz="1200" dirty="0" smtClean="0">
+              <a:rPr lang="es-ES" sz="1200" dirty="0">
                 <a:solidFill>
                   <a:schemeClr val="tx1"/>
                 </a:solidFill>
@@ -15319,7 +15277,7 @@
               <a:t> </a:t>
             </a:r>
             <a:r>
-              <a:rPr lang="es-ES" sz="1200" dirty="0" err="1" smtClean="0">
+              <a:rPr lang="es-ES" sz="1200" dirty="0" err="1">
                 <a:solidFill>
                   <a:schemeClr val="tx1"/>
                 </a:solidFill>
@@ -15327,7 +15285,7 @@
               <a:t>model</a:t>
             </a:r>
             <a:r>
-              <a:rPr lang="es-ES" sz="1200" dirty="0" smtClean="0">
+              <a:rPr lang="es-ES" sz="1200" dirty="0">
                 <a:solidFill>
                   <a:schemeClr val="tx1"/>
                 </a:solidFill>
@@ -15335,7 +15293,7 @@
               <a:t> </a:t>
             </a:r>
             <a:r>
-              <a:rPr lang="es-ES" sz="1200" dirty="0" err="1" smtClean="0">
+              <a:rPr lang="es-ES" sz="1200" dirty="0" err="1">
                 <a:solidFill>
                   <a:schemeClr val="tx1"/>
                 </a:solidFill>
@@ -15343,7 +15301,7 @@
               <a:t>parameters</a:t>
             </a:r>
             <a:r>
-              <a:rPr lang="es-ES" sz="1200" dirty="0" smtClean="0">
+              <a:rPr lang="es-ES" sz="1200" dirty="0">
                 <a:solidFill>
                   <a:schemeClr val="tx1"/>
                 </a:solidFill>
@@ -15351,7 +15309,7 @@
               <a:t> </a:t>
             </a:r>
             <a:r>
-              <a:rPr lang="es-ES" sz="1200" dirty="0" err="1" smtClean="0">
+              <a:rPr lang="es-ES" sz="1200" dirty="0" err="1">
                 <a:solidFill>
                   <a:schemeClr val="tx1"/>
                 </a:solidFill>
@@ -15359,7 +15317,7 @@
               <a:t>from</a:t>
             </a:r>
             <a:r>
-              <a:rPr lang="es-ES" sz="1200" dirty="0" smtClean="0">
+              <a:rPr lang="es-ES" sz="1200" dirty="0">
                 <a:solidFill>
                   <a:schemeClr val="tx1"/>
                 </a:solidFill>
@@ -15367,7 +15325,7 @@
               <a:t> .</a:t>
             </a:r>
             <a:r>
-              <a:rPr lang="es-ES" sz="1200" dirty="0" err="1" smtClean="0">
+              <a:rPr lang="es-ES" sz="1200" dirty="0" err="1">
                 <a:solidFill>
                   <a:schemeClr val="tx1"/>
                 </a:solidFill>
@@ -15375,7 +15333,7 @@
               <a:t>txt</a:t>
             </a:r>
             <a:r>
-              <a:rPr lang="es-ES" sz="1200" dirty="0" smtClean="0">
+              <a:rPr lang="es-ES" sz="1200" dirty="0">
                 <a:solidFill>
                   <a:schemeClr val="tx1"/>
                 </a:solidFill>
@@ -15435,7 +15393,7 @@
           <a:p>
             <a:pPr algn="ctr"/>
             <a:r>
-              <a:rPr lang="es-ES" sz="1200" dirty="0" err="1" smtClean="0">
+              <a:rPr lang="es-ES" sz="1200" dirty="0" err="1">
                 <a:solidFill>
                   <a:schemeClr val="tx1"/>
                 </a:solidFill>
@@ -15443,7 +15401,7 @@
               <a:t>Submit</a:t>
             </a:r>
             <a:r>
-              <a:rPr lang="es-ES" sz="1200" dirty="0" smtClean="0">
+              <a:rPr lang="es-ES" sz="1200" dirty="0">
                 <a:solidFill>
                   <a:schemeClr val="tx1"/>
                 </a:solidFill>
@@ -15451,7 +15409,7 @@
               <a:t> </a:t>
             </a:r>
             <a:r>
-              <a:rPr lang="es-ES" sz="1200" dirty="0" err="1" smtClean="0">
+              <a:rPr lang="es-ES" sz="1200" dirty="0" err="1">
                 <a:solidFill>
                   <a:schemeClr val="tx1"/>
                 </a:solidFill>
@@ -15511,7 +15469,7 @@
           <a:p>
             <a:pPr algn="ctr"/>
             <a:r>
-              <a:rPr lang="es-ES" sz="1200" dirty="0" err="1" smtClean="0">
+              <a:rPr lang="es-ES" sz="1200" dirty="0" err="1">
                 <a:solidFill>
                   <a:schemeClr val="tx1"/>
                 </a:solidFill>
@@ -15519,7 +15477,7 @@
               <a:t>Simulation</a:t>
             </a:r>
             <a:r>
-              <a:rPr lang="es-ES" sz="1200" dirty="0" smtClean="0">
+              <a:rPr lang="es-ES" sz="1200" dirty="0">
                 <a:solidFill>
                   <a:schemeClr val="tx1"/>
                 </a:solidFill>
@@ -15579,18 +15537,13 @@
           <a:p>
             <a:pPr algn="ctr"/>
             <a:r>
-              <a:rPr lang="en-US" sz="1200" dirty="0" smtClean="0">
+              <a:rPr lang="en-US" sz="1200" dirty="0">
                 <a:solidFill>
                   <a:schemeClr val="tx1"/>
                 </a:solidFill>
               </a:rPr>
               <a:t>Evaluate problems</a:t>
             </a:r>
-            <a:endParaRPr lang="en-US" sz="1200" dirty="0">
-              <a:solidFill>
-                <a:schemeClr val="tx1"/>
-              </a:solidFill>
-            </a:endParaRPr>
           </a:p>
         </p:txBody>
       </p:sp>
@@ -15617,7 +15570,7 @@
           <a:lstStyle/>
           <a:p>
             <a:r>
-              <a:rPr lang="es-ES" sz="1000" dirty="0" smtClean="0"/>
+              <a:rPr lang="es-ES" sz="1000" dirty="0"/>
               <a:t>No</a:t>
             </a:r>
             <a:endParaRPr lang="en-US" sz="1000" dirty="0"/>
@@ -15669,7 +15622,7 @@
           <a:p>
             <a:pPr algn="ctr"/>
             <a:r>
-              <a:rPr lang="es-ES" sz="1200" dirty="0" err="1" smtClean="0">
+              <a:rPr lang="es-ES" sz="1200" dirty="0" err="1">
                 <a:solidFill>
                   <a:schemeClr val="tx1"/>
                 </a:solidFill>
@@ -15677,7 +15630,7 @@
               <a:t>Run</a:t>
             </a:r>
             <a:r>
-              <a:rPr lang="es-ES" sz="1200" dirty="0" smtClean="0">
+              <a:rPr lang="es-ES" sz="1200" dirty="0">
                 <a:solidFill>
                   <a:schemeClr val="tx1"/>
                 </a:solidFill>
@@ -15685,7 +15638,7 @@
               <a:t> post-</a:t>
             </a:r>
             <a:r>
-              <a:rPr lang="es-ES" sz="1200" dirty="0" err="1" smtClean="0">
+              <a:rPr lang="es-ES" sz="1200" dirty="0" err="1">
                 <a:solidFill>
                   <a:schemeClr val="tx1"/>
                 </a:solidFill>
@@ -15745,7 +15698,7 @@
           <a:p>
             <a:pPr algn="ctr"/>
             <a:r>
-              <a:rPr lang="es-ES" sz="1200" dirty="0" err="1" smtClean="0">
+              <a:rPr lang="es-ES" sz="1200" dirty="0" err="1">
                 <a:solidFill>
                   <a:schemeClr val="tx1"/>
                 </a:solidFill>
@@ -15753,7 +15706,7 @@
               <a:t>Write</a:t>
             </a:r>
             <a:r>
-              <a:rPr lang="es-ES" sz="1200" dirty="0" smtClean="0">
+              <a:rPr lang="es-ES" sz="1200" dirty="0">
                 <a:solidFill>
                   <a:schemeClr val="tx1"/>
                 </a:solidFill>
@@ -15791,7 +15744,7 @@
           <a:lstStyle/>
           <a:p>
             <a:r>
-              <a:rPr lang="es-ES" sz="1000" dirty="0" smtClean="0"/>
+              <a:rPr lang="es-ES" sz="1000" dirty="0"/>
               <a:t>Yes</a:t>
             </a:r>
             <a:endParaRPr lang="en-US" sz="1000" dirty="0"/>
@@ -15843,7 +15796,7 @@
           <a:p>
             <a:pPr algn="ctr"/>
             <a:r>
-              <a:rPr lang="es-ES" sz="1200" dirty="0" err="1" smtClean="0">
+              <a:rPr lang="es-ES" sz="1200" dirty="0" err="1">
                 <a:solidFill>
                   <a:schemeClr val="tx1"/>
                 </a:solidFill>
@@ -15851,7 +15804,7 @@
               <a:t>Move</a:t>
             </a:r>
             <a:r>
-              <a:rPr lang="es-ES" sz="1200" dirty="0" smtClean="0">
+              <a:rPr lang="es-ES" sz="1200" dirty="0">
                 <a:solidFill>
                   <a:schemeClr val="tx1"/>
                 </a:solidFill>
@@ -15859,7 +15812,7 @@
               <a:t> input </a:t>
             </a:r>
             <a:r>
-              <a:rPr lang="es-ES" sz="1200" dirty="0" err="1" smtClean="0">
+              <a:rPr lang="es-ES" sz="1200" dirty="0" err="1">
                 <a:solidFill>
                   <a:schemeClr val="tx1"/>
                 </a:solidFill>
@@ -15867,7 +15820,7 @@
               <a:t>to</a:t>
             </a:r>
             <a:r>
-              <a:rPr lang="es-ES" sz="1200" dirty="0" smtClean="0">
+              <a:rPr lang="es-ES" sz="1200" dirty="0">
                 <a:solidFill>
                   <a:schemeClr val="tx1"/>
                 </a:solidFill>
@@ -15875,7 +15828,7 @@
               <a:t> </a:t>
             </a:r>
             <a:r>
-              <a:rPr lang="es-ES" sz="1200" dirty="0" err="1" smtClean="0">
+              <a:rPr lang="es-ES" sz="1200" dirty="0" err="1">
                 <a:solidFill>
                   <a:schemeClr val="tx1"/>
                 </a:solidFill>
@@ -15883,7 +15836,7 @@
               <a:t>postProc</a:t>
             </a:r>
             <a:r>
-              <a:rPr lang="es-ES" sz="1200" dirty="0" smtClean="0">
+              <a:rPr lang="es-ES" sz="1200" dirty="0">
                 <a:solidFill>
                   <a:schemeClr val="tx1"/>
                 </a:solidFill>
@@ -15943,7 +15896,7 @@
           <a:p>
             <a:pPr algn="ctr"/>
             <a:r>
-              <a:rPr lang="es-ES" sz="1200" dirty="0" err="1" smtClean="0">
+              <a:rPr lang="es-ES" sz="1200" dirty="0" err="1">
                 <a:solidFill>
                   <a:schemeClr val="tx1"/>
                 </a:solidFill>
@@ -15951,7 +15904,7 @@
               <a:t>Move</a:t>
             </a:r>
             <a:r>
-              <a:rPr lang="es-ES" sz="1200" dirty="0" smtClean="0">
+              <a:rPr lang="es-ES" sz="1200" dirty="0">
                 <a:solidFill>
                   <a:schemeClr val="tx1"/>
                 </a:solidFill>
@@ -15959,7 +15912,7 @@
               <a:t> output files </a:t>
             </a:r>
             <a:r>
-              <a:rPr lang="es-ES" sz="1200" dirty="0" err="1" smtClean="0">
+              <a:rPr lang="es-ES" sz="1200" dirty="0" err="1">
                 <a:solidFill>
                   <a:schemeClr val="tx1"/>
                 </a:solidFill>
@@ -15967,7 +15920,7 @@
               <a:t>to</a:t>
             </a:r>
             <a:r>
-              <a:rPr lang="es-ES" sz="1200" dirty="0" smtClean="0">
+              <a:rPr lang="es-ES" sz="1200" dirty="0">
                 <a:solidFill>
                   <a:schemeClr val="tx1"/>
                 </a:solidFill>
@@ -15975,7 +15928,7 @@
               <a:t> </a:t>
             </a:r>
             <a:r>
-              <a:rPr lang="es-ES" sz="1200" dirty="0" err="1" smtClean="0">
+              <a:rPr lang="es-ES" sz="1200" dirty="0" err="1">
                 <a:solidFill>
                   <a:schemeClr val="tx1"/>
                 </a:solidFill>
@@ -15983,7 +15936,7 @@
               <a:t>postProc</a:t>
             </a:r>
             <a:r>
-              <a:rPr lang="es-ES" sz="1200" dirty="0" smtClean="0">
+              <a:rPr lang="es-ES" sz="1200" dirty="0">
                 <a:solidFill>
                   <a:schemeClr val="tx1"/>
                 </a:solidFill>
@@ -16043,7 +15996,7 @@
           <a:p>
             <a:pPr algn="ctr"/>
             <a:r>
-              <a:rPr lang="es-ES" sz="1200" dirty="0" err="1" smtClean="0">
+              <a:rPr lang="es-ES" sz="1200" dirty="0" err="1">
                 <a:solidFill>
                   <a:schemeClr val="tx1"/>
                 </a:solidFill>
@@ -16051,7 +16004,7 @@
               <a:t>Execute</a:t>
             </a:r>
             <a:r>
-              <a:rPr lang="es-ES" sz="1200" dirty="0" smtClean="0">
+              <a:rPr lang="es-ES" sz="1200" dirty="0">
                 <a:solidFill>
                   <a:schemeClr val="tx1"/>
                 </a:solidFill>
@@ -16059,7 +16012,7 @@
               <a:t> </a:t>
             </a:r>
             <a:r>
-              <a:rPr lang="es-ES" sz="1200" dirty="0" err="1" smtClean="0">
+              <a:rPr lang="es-ES" sz="1200" dirty="0" err="1">
                 <a:solidFill>
                   <a:schemeClr val="tx1"/>
                 </a:solidFill>
@@ -16067,7 +16020,7 @@
               <a:t>nonlinear</a:t>
             </a:r>
             <a:r>
-              <a:rPr lang="es-ES" sz="1200" dirty="0" smtClean="0">
+              <a:rPr lang="es-ES" sz="1200" dirty="0">
                 <a:solidFill>
                   <a:schemeClr val="tx1"/>
                 </a:solidFill>
@@ -16075,7 +16028,7 @@
               <a:t> </a:t>
             </a:r>
             <a:r>
-              <a:rPr lang="es-ES" sz="1200" dirty="0" err="1" smtClean="0">
+              <a:rPr lang="es-ES" sz="1200" dirty="0" err="1">
                 <a:solidFill>
                   <a:schemeClr val="tx1"/>
                 </a:solidFill>
@@ -16083,7 +16036,7 @@
               <a:t>Abaqus</a:t>
             </a:r>
             <a:r>
-              <a:rPr lang="es-ES" sz="1200" dirty="0" smtClean="0">
+              <a:rPr lang="es-ES" sz="1200" dirty="0">
                 <a:solidFill>
                   <a:schemeClr val="tx1"/>
                 </a:solidFill>
@@ -16091,7 +16044,7 @@
               <a:t> </a:t>
             </a:r>
             <a:r>
-              <a:rPr lang="es-ES" sz="1200" dirty="0" err="1" smtClean="0">
+              <a:rPr lang="es-ES" sz="1200" dirty="0" err="1">
                 <a:solidFill>
                   <a:schemeClr val="tx1"/>
                 </a:solidFill>
@@ -16151,7 +16104,7 @@
           <a:p>
             <a:pPr algn="ctr"/>
             <a:r>
-              <a:rPr lang="es-ES" sz="1200" dirty="0" err="1" smtClean="0">
+              <a:rPr lang="es-ES" sz="1200" dirty="0" err="1">
                 <a:solidFill>
                   <a:schemeClr val="tx1"/>
                 </a:solidFill>
@@ -16159,7 +16112,7 @@
               <a:t>Move</a:t>
             </a:r>
             <a:r>
-              <a:rPr lang="es-ES" sz="1200" dirty="0" smtClean="0">
+              <a:rPr lang="es-ES" sz="1200" dirty="0">
                 <a:solidFill>
                   <a:schemeClr val="tx1"/>
                 </a:solidFill>
@@ -16167,7 +16120,7 @@
               <a:t> input </a:t>
             </a:r>
             <a:r>
-              <a:rPr lang="es-ES" sz="1200" dirty="0" err="1" smtClean="0">
+              <a:rPr lang="es-ES" sz="1200" dirty="0" err="1">
                 <a:solidFill>
                   <a:schemeClr val="tx1"/>
                 </a:solidFill>
@@ -16175,7 +16128,7 @@
               <a:t>to</a:t>
             </a:r>
             <a:r>
-              <a:rPr lang="es-ES" sz="1200" dirty="0" smtClean="0">
+              <a:rPr lang="es-ES" sz="1200" dirty="0">
                 <a:solidFill>
                   <a:schemeClr val="tx1"/>
                 </a:solidFill>
@@ -16183,7 +16136,7 @@
               <a:t> </a:t>
             </a:r>
             <a:r>
-              <a:rPr lang="es-ES" sz="1200" dirty="0" err="1" smtClean="0">
+              <a:rPr lang="es-ES" sz="1200" dirty="0" err="1">
                 <a:solidFill>
                   <a:schemeClr val="tx1"/>
                 </a:solidFill>
@@ -16191,7 +16144,7 @@
               <a:t>postProc</a:t>
             </a:r>
             <a:r>
-              <a:rPr lang="es-ES" sz="1200" dirty="0" smtClean="0">
+              <a:rPr lang="es-ES" sz="1200" dirty="0">
                 <a:solidFill>
                   <a:schemeClr val="tx1"/>
                 </a:solidFill>
@@ -16355,7 +16308,7 @@
           <a:p>
             <a:pPr algn="ctr"/>
             <a:r>
-              <a:rPr lang="es-ES" sz="1200" dirty="0" err="1" smtClean="0">
+              <a:rPr lang="es-ES" sz="1200" dirty="0" err="1">
                 <a:solidFill>
                   <a:schemeClr val="tx1"/>
                 </a:solidFill>
@@ -17266,37 +17219,37 @@
           <a:lstStyle/>
           <a:p>
             <a:r>
-              <a:rPr lang="es-ES" sz="1400" u="sng" dirty="0" err="1" smtClean="0"/>
+              <a:rPr lang="es-ES" sz="1400" u="sng" dirty="0" err="1"/>
               <a:t>Abaqus</a:t>
             </a:r>
             <a:r>
-              <a:rPr lang="es-ES" sz="1400" u="sng" dirty="0" smtClean="0"/>
+              <a:rPr lang="es-ES" sz="1400" u="sng" dirty="0"/>
               <a:t> </a:t>
             </a:r>
             <a:r>
-              <a:rPr lang="es-ES" sz="1400" u="sng" dirty="0" err="1" smtClean="0"/>
+              <a:rPr lang="es-ES" sz="1400" u="sng" dirty="0" err="1"/>
               <a:t>execution</a:t>
             </a:r>
             <a:r>
-              <a:rPr lang="es-ES" sz="1400" u="sng" dirty="0" smtClean="0"/>
+              <a:rPr lang="es-ES" sz="1400" u="sng" dirty="0"/>
               <a:t> </a:t>
             </a:r>
             <a:r>
-              <a:rPr lang="es-ES" sz="1400" u="sng" dirty="0" err="1" smtClean="0"/>
+              <a:rPr lang="es-ES" sz="1400" u="sng" dirty="0" err="1"/>
               <a:t>python</a:t>
             </a:r>
             <a:r>
-              <a:rPr lang="es-ES" sz="1400" u="sng" dirty="0" smtClean="0"/>
+              <a:rPr lang="es-ES" sz="1400" u="sng" dirty="0"/>
               <a:t> script</a:t>
             </a:r>
           </a:p>
           <a:p>
             <a:r>
-              <a:rPr lang="es-ES" sz="1400" dirty="0" smtClean="0"/>
+              <a:rPr lang="es-ES" sz="1400" dirty="0"/>
               <a:t>-&gt; </a:t>
             </a:r>
             <a:r>
-              <a:rPr lang="es-ES" sz="1400" dirty="0" smtClean="0">
+              <a:rPr lang="es-ES" sz="1400" dirty="0">
                 <a:latin typeface="Courier New" pitchFamily="49" charset="0"/>
                 <a:cs typeface="Courier New" pitchFamily="49" charset="0"/>
               </a:rPr>
@@ -17332,45 +17285,45 @@
           <a:lstStyle/>
           <a:p>
             <a:r>
-              <a:rPr lang="es-ES" sz="1400" u="sng" dirty="0" err="1" smtClean="0"/>
+              <a:rPr lang="es-ES" sz="1400" u="sng" dirty="0" err="1"/>
               <a:t>Parametric</a:t>
             </a:r>
             <a:r>
-              <a:rPr lang="es-ES" sz="1400" u="sng" dirty="0" smtClean="0"/>
+              <a:rPr lang="es-ES" sz="1400" u="sng" dirty="0"/>
               <a:t> </a:t>
             </a:r>
             <a:r>
-              <a:rPr lang="es-ES" sz="1400" u="sng" dirty="0" err="1" smtClean="0"/>
+              <a:rPr lang="es-ES" sz="1400" u="sng" dirty="0" err="1"/>
               <a:t>study</a:t>
             </a:r>
             <a:r>
-              <a:rPr lang="es-ES" sz="1400" u="sng" dirty="0" smtClean="0"/>
+              <a:rPr lang="es-ES" sz="1400" u="sng" dirty="0"/>
               <a:t> </a:t>
             </a:r>
             <a:r>
-              <a:rPr lang="es-ES" sz="1400" u="sng" dirty="0" err="1" smtClean="0"/>
+              <a:rPr lang="es-ES" sz="1400" u="sng" dirty="0" err="1"/>
               <a:t>python</a:t>
             </a:r>
             <a:r>
-              <a:rPr lang="es-ES" sz="1400" u="sng" dirty="0" smtClean="0"/>
+              <a:rPr lang="es-ES" sz="1400" u="sng" dirty="0"/>
               <a:t> </a:t>
             </a:r>
             <a:r>
-              <a:rPr lang="es-ES" sz="1400" u="sng" dirty="0" err="1" smtClean="0"/>
+              <a:rPr lang="es-ES" sz="1400" u="sng" dirty="0" err="1"/>
               <a:t>main</a:t>
             </a:r>
             <a:r>
-              <a:rPr lang="es-ES" sz="1400" u="sng" dirty="0" smtClean="0"/>
+              <a:rPr lang="es-ES" sz="1400" u="sng" dirty="0"/>
               <a:t> script</a:t>
             </a:r>
           </a:p>
           <a:p>
             <a:r>
-              <a:rPr lang="es-ES" sz="1400" dirty="0" smtClean="0"/>
+              <a:rPr lang="es-ES" sz="1400" dirty="0"/>
               <a:t>-&gt; </a:t>
             </a:r>
             <a:r>
-              <a:rPr lang="es-ES" sz="1400" dirty="0" smtClean="0">
+              <a:rPr lang="es-ES" sz="1400" dirty="0">
                 <a:latin typeface="Courier New" pitchFamily="49" charset="0"/>
                 <a:cs typeface="Courier New" pitchFamily="49" charset="0"/>
               </a:rPr>
@@ -17428,7 +17381,7 @@
           <a:p>
             <a:pPr algn="ctr"/>
             <a:r>
-              <a:rPr lang="es-ES" sz="1200" dirty="0" err="1" smtClean="0">
+              <a:rPr lang="es-ES" sz="1200" dirty="0" err="1">
                 <a:solidFill>
                   <a:schemeClr val="tx1"/>
                 </a:solidFill>
@@ -17436,7 +17389,7 @@
               <a:t>Read</a:t>
             </a:r>
             <a:r>
-              <a:rPr lang="es-ES" sz="1200" dirty="0" smtClean="0">
+              <a:rPr lang="es-ES" sz="1200" dirty="0">
                 <a:solidFill>
                   <a:schemeClr val="tx1"/>
                 </a:solidFill>
@@ -17444,7 +17397,7 @@
               <a:t> </a:t>
             </a:r>
             <a:r>
-              <a:rPr lang="es-ES" sz="1200" dirty="0" err="1" smtClean="0">
+              <a:rPr lang="es-ES" sz="1200" dirty="0" err="1">
                 <a:solidFill>
                   <a:schemeClr val="tx1"/>
                 </a:solidFill>
@@ -17452,7 +17405,7 @@
               <a:t>parameters</a:t>
             </a:r>
             <a:r>
-              <a:rPr lang="es-ES" sz="1200" dirty="0" smtClean="0">
+              <a:rPr lang="es-ES" sz="1200" dirty="0">
                 <a:solidFill>
                   <a:schemeClr val="tx1"/>
                 </a:solidFill>
@@ -17460,7 +17413,7 @@
               <a:t> </a:t>
             </a:r>
             <a:r>
-              <a:rPr lang="es-ES" sz="1200" dirty="0" err="1" smtClean="0">
+              <a:rPr lang="es-ES" sz="1200" dirty="0" err="1">
                 <a:solidFill>
                   <a:schemeClr val="tx1"/>
                 </a:solidFill>
@@ -17621,43 +17574,39 @@
           <a:p>
             <a:pPr algn="ctr"/>
             <a:r>
-              <a:rPr lang="es-ES" sz="1000" dirty="0" err="1" smtClean="0"/>
+              <a:rPr lang="es-ES" sz="1000" dirty="0" err="1"/>
               <a:t>If</a:t>
-            </a:r>
-            <a:r>
-              <a:rPr lang="es-ES" sz="1000" dirty="0" smtClean="0"/>
-              <a:t> </a:t>
-            </a:r>
-            <a:r>
-              <a:rPr lang="es-ES" sz="1000" dirty="0" err="1" smtClean="0"/>
-              <a:t>mesh</a:t>
-            </a:r>
-            <a:r>
-              <a:rPr lang="es-ES" sz="1000" dirty="0" smtClean="0"/>
-              <a:t> </a:t>
-            </a:r>
-            <a:r>
-              <a:rPr lang="es-ES" sz="1000" dirty="0" err="1" smtClean="0"/>
-              <a:t>problems</a:t>
             </a:r>
             <a:r>
               <a:rPr lang="es-ES" sz="1000" dirty="0"/>
               <a:t> </a:t>
             </a:r>
             <a:r>
-              <a:rPr lang="es-ES" sz="1000" dirty="0" smtClean="0"/>
-              <a:t>-&gt; </a:t>
+              <a:rPr lang="es-ES" sz="1000" dirty="0" err="1"/>
+              <a:t>mesh</a:t>
             </a:r>
             <a:r>
-              <a:rPr lang="es-ES" sz="1000" dirty="0" err="1" smtClean="0"/>
+              <a:rPr lang="es-ES" sz="1000" dirty="0"/>
+              <a:t> </a:t>
+            </a:r>
+            <a:r>
+              <a:rPr lang="es-ES" sz="1000" dirty="0" err="1"/>
+              <a:t>problems</a:t>
+            </a:r>
+            <a:r>
+              <a:rPr lang="es-ES" sz="1000" dirty="0"/>
+              <a:t> -&gt; </a:t>
+            </a:r>
+            <a:r>
+              <a:rPr lang="es-ES" sz="1000" dirty="0" err="1"/>
               <a:t>Modify</a:t>
             </a:r>
             <a:r>
-              <a:rPr lang="es-ES" sz="1000" dirty="0" smtClean="0"/>
+              <a:rPr lang="es-ES" sz="1000" dirty="0"/>
               <a:t> </a:t>
             </a:r>
             <a:r>
-              <a:rPr lang="es-ES" sz="1000" dirty="0" err="1" smtClean="0"/>
+              <a:rPr lang="es-ES" sz="1000" dirty="0" err="1"/>
               <a:t>mesh</a:t>
             </a:r>
             <a:endParaRPr lang="en-US" sz="1000" dirty="0"/>
@@ -17688,39 +17637,39 @@
           <a:p>
             <a:pPr algn="ctr"/>
             <a:r>
-              <a:rPr lang="es-ES" sz="1000" dirty="0" err="1" smtClean="0"/>
+              <a:rPr lang="es-ES" sz="1000" dirty="0" err="1"/>
               <a:t>If</a:t>
             </a:r>
             <a:r>
-              <a:rPr lang="es-ES" sz="1000" dirty="0" smtClean="0"/>
+              <a:rPr lang="es-ES" sz="1000" dirty="0"/>
               <a:t> </a:t>
             </a:r>
             <a:r>
-              <a:rPr lang="es-ES" sz="1000" dirty="0" err="1" smtClean="0"/>
+              <a:rPr lang="es-ES" sz="1000" dirty="0" err="1"/>
               <a:t>convergency</a:t>
             </a:r>
             <a:r>
-              <a:rPr lang="es-ES" sz="1000" dirty="0" smtClean="0"/>
+              <a:rPr lang="es-ES" sz="1000" dirty="0"/>
               <a:t> </a:t>
             </a:r>
             <a:r>
-              <a:rPr lang="es-ES" sz="1000" dirty="0" err="1" smtClean="0"/>
+              <a:rPr lang="es-ES" sz="1000" dirty="0" err="1"/>
               <a:t>problems</a:t>
             </a:r>
             <a:r>
-              <a:rPr lang="es-ES" sz="1000" dirty="0" smtClean="0"/>
+              <a:rPr lang="es-ES" sz="1000" dirty="0"/>
               <a:t> -&gt; </a:t>
             </a:r>
             <a:r>
-              <a:rPr lang="es-ES" sz="1000" dirty="0" err="1" smtClean="0"/>
+              <a:rPr lang="es-ES" sz="1000" dirty="0" err="1"/>
               <a:t>Modify</a:t>
             </a:r>
             <a:r>
-              <a:rPr lang="es-ES" sz="1000" dirty="0" smtClean="0"/>
+              <a:rPr lang="es-ES" sz="1000" dirty="0"/>
               <a:t> </a:t>
             </a:r>
             <a:r>
-              <a:rPr lang="es-ES" sz="1000" dirty="0" err="1" smtClean="0"/>
+              <a:rPr lang="es-ES" sz="1000" dirty="0" err="1"/>
               <a:t>damping</a:t>
             </a:r>
             <a:endParaRPr lang="en-US" sz="1000" dirty="0"/>
@@ -18797,40 +18746,6 @@
             </a:p>
           </p:txBody>
         </p:sp>
-        <p:sp>
-          <p:nvSpPr>
-            <p:cNvPr id="75" name="TextBox 74"/>
-            <p:cNvSpPr txBox="1"/>
-            <p:nvPr/>
-          </p:nvSpPr>
-          <p:spPr>
-            <a:xfrm>
-              <a:off x="4089334" y="3810000"/>
-              <a:ext cx="546935" cy="709334"/>
-            </a:xfrm>
-            <a:prstGeom prst="rect">
-              <a:avLst/>
-            </a:prstGeom>
-            <a:noFill/>
-          </p:spPr>
-          <p:txBody>
-            <a:bodyPr wrap="square" rtlCol="0">
-              <a:spAutoFit/>
-            </a:bodyPr>
-            <a:lstStyle/>
-            <a:p>
-              <a:r>
-                <a:rPr lang="es-ES" sz="2200" dirty="0" smtClean="0"/>
-                <a:t>UR</a:t>
-              </a:r>
-              <a:r>
-                <a:rPr lang="es-ES" sz="2200" baseline="-25000" dirty="0" smtClean="0"/>
-                <a:t>3</a:t>
-              </a:r>
-              <a:endParaRPr lang="en-US" sz="2200" dirty="0"/>
-            </a:p>
-          </p:txBody>
-        </p:sp>
         <p:grpSp>
           <p:nvGrpSpPr>
             <p:cNvPr id="98" name="Group 97"/>
@@ -18942,7 +18857,7 @@
               <a:lstStyle/>
               <a:p>
                 <a:r>
-                  <a:rPr lang="es-ES" sz="2200" dirty="0" smtClean="0"/>
+                  <a:rPr lang="es-ES" sz="2200" dirty="0"/>
                   <a:t>y</a:t>
                 </a:r>
                 <a:endParaRPr lang="en-US" sz="2200" dirty="0"/>
@@ -18972,7 +18887,7 @@
               <a:lstStyle/>
               <a:p>
                 <a:r>
-                  <a:rPr lang="es-ES" sz="2200" dirty="0" smtClean="0"/>
+                  <a:rPr lang="es-ES" sz="2200" dirty="0"/>
                   <a:t>x</a:t>
                 </a:r>
                 <a:endParaRPr lang="en-US" sz="2200" dirty="0"/>
@@ -19136,7 +19051,7 @@
             <a:lstStyle/>
             <a:p>
               <a:r>
-                <a:rPr lang="es-ES" sz="2200" dirty="0" smtClean="0"/>
+                <a:rPr lang="es-ES" sz="2200" dirty="0"/>
                 <a:t>z</a:t>
               </a:r>
               <a:endParaRPr lang="en-US" sz="2200" dirty="0"/>
@@ -19204,7 +19119,7 @@
               <a:lstStyle/>
               <a:p>
                 <a:r>
-                  <a:rPr lang="es-ES" sz="2200" dirty="0" err="1" smtClean="0">
+                  <a:rPr lang="es-ES" sz="2200" dirty="0" err="1">
                     <a:solidFill>
                       <a:schemeClr val="tx1"/>
                     </a:solidFill>
@@ -19212,7 +19127,7 @@
                   <a:t>Wing</a:t>
                 </a:r>
                 <a:r>
-                  <a:rPr lang="es-ES" sz="2200" dirty="0" smtClean="0">
+                  <a:rPr lang="es-ES" sz="2200" dirty="0">
                     <a:solidFill>
                       <a:schemeClr val="tx1"/>
                     </a:solidFill>
@@ -19274,7 +19189,7 @@
               <a:lstStyle/>
               <a:p>
                 <a:r>
-                  <a:rPr lang="es-ES" sz="2200" dirty="0" err="1" smtClean="0">
+                  <a:rPr lang="es-ES" sz="2200" dirty="0" err="1">
                     <a:solidFill>
                       <a:schemeClr val="tx1"/>
                     </a:solidFill>
@@ -19282,7 +19197,7 @@
                   <a:t>Lattice</a:t>
                 </a:r>
                 <a:r>
-                  <a:rPr lang="es-ES" sz="2200" dirty="0" smtClean="0">
+                  <a:rPr lang="es-ES" sz="2200" dirty="0">
                     <a:solidFill>
                       <a:schemeClr val="tx1"/>
                     </a:solidFill>
@@ -19290,7 +19205,7 @@
                   <a:t> </a:t>
                 </a:r>
                 <a:r>
-                  <a:rPr lang="es-ES" sz="2200" dirty="0" err="1" smtClean="0">
+                  <a:rPr lang="es-ES" sz="2200" dirty="0" err="1">
                     <a:solidFill>
                       <a:schemeClr val="tx1"/>
                     </a:solidFill>
@@ -19353,7 +19268,7 @@
               <a:p>
                 <a:pPr algn="r"/>
                 <a:r>
-                  <a:rPr lang="es-ES" sz="2200" dirty="0" err="1" smtClean="0">
+                  <a:rPr lang="es-ES" sz="2200" dirty="0" err="1">
                     <a:solidFill>
                       <a:schemeClr val="tx1"/>
                     </a:solidFill>
@@ -19361,7 +19276,7 @@
                   <a:t>Lattice</a:t>
                 </a:r>
                 <a:r>
-                  <a:rPr lang="es-ES" sz="2200" dirty="0" smtClean="0">
+                  <a:rPr lang="es-ES" sz="2200" dirty="0">
                     <a:solidFill>
                       <a:schemeClr val="tx1"/>
                     </a:solidFill>
@@ -19369,7 +19284,7 @@
                   <a:t> </a:t>
                 </a:r>
                 <a:r>
-                  <a:rPr lang="es-ES" sz="2200" dirty="0" err="1" smtClean="0">
+                  <a:rPr lang="es-ES" sz="2200" dirty="0" err="1">
                     <a:solidFill>
                       <a:schemeClr val="tx1"/>
                     </a:solidFill>
@@ -19386,6 +19301,36 @@
           </p:sp>
         </p:grpSp>
       </p:grpSp>
+      <p:sp>
+        <p:nvSpPr>
+          <p:cNvPr id="45" name="TextBox 44"/>
+          <p:cNvSpPr txBox="1"/>
+          <p:nvPr/>
+        </p:nvSpPr>
+        <p:spPr>
+          <a:xfrm>
+            <a:off x="4296105" y="3793900"/>
+            <a:ext cx="546935" cy="430887"/>
+          </a:xfrm>
+          <a:prstGeom prst="rect">
+            <a:avLst/>
+          </a:prstGeom>
+          <a:noFill/>
+        </p:spPr>
+        <p:txBody>
+          <a:bodyPr wrap="square" rtlCol="0">
+            <a:spAutoFit/>
+          </a:bodyPr>
+          <a:lstStyle/>
+          <a:p>
+            <a:r>
+              <a:rPr lang="el-GR" sz="2200" i="1" dirty="0"/>
+              <a:t>ϑ</a:t>
+            </a:r>
+            <a:endParaRPr lang="en-US" sz="2200" i="1" dirty="0"/>
+          </a:p>
+        </p:txBody>
+      </p:sp>
     </p:spTree>
     <p:extLst>
       <p:ext uri="{BB962C8B-B14F-4D97-AF65-F5344CB8AC3E}">
@@ -19396,13 +19341,6 @@
   <p:clrMapOvr>
     <a:masterClrMapping/>
   </p:clrMapOvr>
-  <p:timing>
-    <p:tnLst>
-      <p:par>
-        <p:cTn id="1" dur="indefinite" restart="never" nodeType="tmRoot"/>
-      </p:par>
-    </p:tnLst>
-  </p:timing>
 </p:sld>
 </file>
 
@@ -19570,14 +19508,6 @@
   <p:clrMapOvr>
     <a:masterClrMapping/>
   </p:clrMapOvr>
-  <mc:AlternateContent xmlns:mc="http://schemas.openxmlformats.org/markup-compatibility/2006" xmlns:p14="http://schemas.microsoft.com/office/powerpoint/2010/main">
-    <mc:Choice Requires="p14">
-      <p:transition spd="slow" p14:dur="2000"/>
-    </mc:Choice>
-    <mc:Fallback xmlns="">
-      <p:transition spd="slow"/>
-    </mc:Fallback>
-  </mc:AlternateContent>
 </p:sld>
 </file>
 
@@ -20812,7 +20742,7 @@
           <a:lstStyle/>
           <a:p>
             <a:r>
-              <a:rPr lang="el-GR" sz="2200" i="1" dirty="0" smtClean="0"/>
+              <a:rPr lang="el-GR" sz="2200" i="1" dirty="0"/>
               <a:t>ϑ</a:t>
             </a:r>
             <a:endParaRPr lang="en-US" sz="2200" i="1" dirty="0"/>
@@ -21118,7 +21048,7 @@
             <a:lstStyle/>
             <a:p>
               <a:r>
-                <a:rPr lang="es-ES" sz="2200" dirty="0" smtClean="0"/>
+                <a:rPr lang="es-ES" sz="2200" dirty="0"/>
                 <a:t>y</a:t>
               </a:r>
               <a:endParaRPr lang="en-US" sz="2200" dirty="0"/>
@@ -21148,7 +21078,7 @@
             <a:lstStyle/>
             <a:p>
               <a:r>
-                <a:rPr lang="es-ES" sz="2200" dirty="0" smtClean="0"/>
+                <a:rPr lang="es-ES" sz="2200" dirty="0"/>
                 <a:t>x</a:t>
               </a:r>
               <a:endParaRPr lang="en-US" sz="2200" dirty="0"/>
@@ -21863,7 +21793,7 @@
             <a:lstStyle/>
             <a:p>
               <a:r>
-                <a:rPr lang="es-ES" sz="2200" dirty="0" err="1" smtClean="0">
+                <a:rPr lang="es-ES" sz="2200" dirty="0" err="1">
                   <a:solidFill>
                     <a:schemeClr val="tx1"/>
                   </a:solidFill>
@@ -21871,7 +21801,7 @@
                 <a:t>Wing</a:t>
               </a:r>
               <a:r>
-                <a:rPr lang="es-ES" sz="2200" dirty="0" smtClean="0">
+                <a:rPr lang="es-ES" sz="2200" dirty="0">
                   <a:solidFill>
                     <a:schemeClr val="tx1"/>
                   </a:solidFill>
@@ -21933,7 +21863,7 @@
             <a:lstStyle/>
             <a:p>
               <a:r>
-                <a:rPr lang="es-ES" sz="2200" dirty="0" err="1" smtClean="0">
+                <a:rPr lang="es-ES" sz="2200" dirty="0" err="1">
                   <a:solidFill>
                     <a:schemeClr val="tx1"/>
                   </a:solidFill>
@@ -21941,7 +21871,7 @@
                 <a:t>Lattice</a:t>
               </a:r>
               <a:r>
-                <a:rPr lang="es-ES" sz="2200" dirty="0" smtClean="0">
+                <a:rPr lang="es-ES" sz="2200" dirty="0">
                   <a:solidFill>
                     <a:schemeClr val="tx1"/>
                   </a:solidFill>
@@ -21949,7 +21879,7 @@
                 <a:t> </a:t>
               </a:r>
               <a:r>
-                <a:rPr lang="es-ES" sz="2200" dirty="0" err="1" smtClean="0">
+                <a:rPr lang="es-ES" sz="2200" dirty="0" err="1">
                   <a:solidFill>
                     <a:schemeClr val="tx1"/>
                   </a:solidFill>
@@ -22012,7 +21942,7 @@
             <a:p>
               <a:pPr algn="r"/>
               <a:r>
-                <a:rPr lang="es-ES" sz="2200" dirty="0" err="1" smtClean="0">
+                <a:rPr lang="es-ES" sz="2200" dirty="0" err="1">
                   <a:solidFill>
                     <a:schemeClr val="tx1"/>
                   </a:solidFill>
@@ -22020,7 +21950,7 @@
                 <a:t>Lattice</a:t>
               </a:r>
               <a:r>
-                <a:rPr lang="es-ES" sz="2200" dirty="0" smtClean="0">
+                <a:rPr lang="es-ES" sz="2200" dirty="0">
                   <a:solidFill>
                     <a:schemeClr val="tx1"/>
                   </a:solidFill>
@@ -22028,7 +21958,7 @@
                 <a:t> </a:t>
               </a:r>
               <a:r>
-                <a:rPr lang="es-ES" sz="2200" dirty="0" err="1" smtClean="0">
+                <a:rPr lang="es-ES" sz="2200" dirty="0" err="1">
                   <a:solidFill>
                     <a:schemeClr val="tx1"/>
                   </a:solidFill>
@@ -22067,7 +21997,7 @@
           <a:lstStyle/>
           <a:p>
             <a:r>
-              <a:rPr lang="es-ES" sz="2200" dirty="0" smtClean="0"/>
+              <a:rPr lang="es-ES" sz="2200" dirty="0"/>
               <a:t>z</a:t>
             </a:r>
             <a:endParaRPr lang="en-US" sz="2200" dirty="0"/>
@@ -22084,13 +22014,6 @@
   <p:clrMapOvr>
     <a:masterClrMapping/>
   </p:clrMapOvr>
-  <p:timing>
-    <p:tnLst>
-      <p:par>
-        <p:cTn id="1" dur="indefinite" restart="never" nodeType="tmRoot"/>
-      </p:par>
-    </p:tnLst>
-  </p:timing>
 </p:sld>
 </file>
 
@@ -22166,10 +22089,9 @@
           <a:lstStyle/>
           <a:p>
             <a:r>
-              <a:rPr lang="en-US" sz="2200" dirty="0" smtClean="0"/>
+              <a:rPr lang="en-US" sz="2200" dirty="0"/>
               <a:t>Course mesh</a:t>
             </a:r>
-            <a:endParaRPr lang="en-US" sz="2200" dirty="0"/>
           </a:p>
         </p:txBody>
       </p:sp>
@@ -22272,10 +22194,9 @@
           <a:lstStyle/>
           <a:p>
             <a:r>
-              <a:rPr lang="en-US" sz="2200" dirty="0" smtClean="0"/>
+              <a:rPr lang="en-US" sz="2200" dirty="0"/>
               <a:t>Fine mesh</a:t>
             </a:r>
-            <a:endParaRPr lang="en-US" sz="2200" dirty="0"/>
           </a:p>
         </p:txBody>
       </p:sp>
@@ -22392,10 +22313,9 @@
           <a:lstStyle/>
           <a:p>
             <a:r>
-              <a:rPr lang="en-US" sz="2200" dirty="0" smtClean="0"/>
+              <a:rPr lang="en-US" sz="2200" dirty="0"/>
               <a:t>Root rib</a:t>
             </a:r>
-            <a:endParaRPr lang="en-US" sz="2200" dirty="0"/>
           </a:p>
         </p:txBody>
       </p:sp>
@@ -22424,10 +22344,9 @@
           <a:lstStyle/>
           <a:p>
             <a:r>
-              <a:rPr lang="en-US" sz="2200" dirty="0" smtClean="0"/>
+              <a:rPr lang="en-US" sz="2200" dirty="0"/>
               <a:t>Lattice</a:t>
             </a:r>
-            <a:endParaRPr lang="en-US" sz="2200" dirty="0"/>
           </a:p>
         </p:txBody>
       </p:sp>
@@ -22456,10 +22375,9 @@
           <a:lstStyle/>
           <a:p>
             <a:r>
-              <a:rPr lang="en-US" sz="2200" dirty="0" smtClean="0"/>
+              <a:rPr lang="en-US" sz="2200" dirty="0"/>
               <a:t>Inner rib</a:t>
             </a:r>
-            <a:endParaRPr lang="en-US" sz="2200" dirty="0"/>
           </a:p>
         </p:txBody>
       </p:sp>
@@ -22488,10 +22406,9 @@
           <a:lstStyle/>
           <a:p>
             <a:r>
-              <a:rPr lang="en-US" sz="2200" dirty="0" smtClean="0"/>
+              <a:rPr lang="en-US" sz="2200" dirty="0"/>
               <a:t>Tip rib</a:t>
             </a:r>
-            <a:endParaRPr lang="en-US" sz="2200" dirty="0"/>
           </a:p>
         </p:txBody>
       </p:sp>
@@ -22520,10 +22437,9 @@
           <a:lstStyle/>
           <a:p>
             <a:r>
-              <a:rPr lang="en-US" sz="2200" dirty="0" smtClean="0"/>
+              <a:rPr lang="en-US" sz="2200" dirty="0"/>
               <a:t>Wing-box C-profile</a:t>
             </a:r>
-            <a:endParaRPr lang="en-US" sz="2200" dirty="0"/>
           </a:p>
         </p:txBody>
       </p:sp>
@@ -22537,13 +22453,6 @@
   <p:clrMapOvr>
     <a:masterClrMapping/>
   </p:clrMapOvr>
-  <p:timing>
-    <p:tnLst>
-      <p:par>
-        <p:cTn id="1" dur="indefinite" restart="never" nodeType="tmRoot"/>
-      </p:par>
-    </p:tnLst>
-  </p:timing>
 </p:sld>
 </file>
 
@@ -22845,7 +22754,7 @@
           <a:lstStyle/>
           <a:p>
             <a:r>
-              <a:rPr lang="es-ES" sz="2200" dirty="0" smtClean="0"/>
+              <a:rPr lang="es-ES" sz="2200" dirty="0"/>
               <a:t>N</a:t>
             </a:r>
             <a:endParaRPr lang="en-US" sz="2200" dirty="0"/>
@@ -22875,7 +22784,7 @@
           <a:lstStyle/>
           <a:p>
             <a:r>
-              <a:rPr lang="es-ES" sz="2200" dirty="0" smtClean="0"/>
+              <a:rPr lang="es-ES" sz="2200" dirty="0"/>
               <a:t>M</a:t>
             </a:r>
             <a:endParaRPr lang="en-US" sz="2200" dirty="0"/>
@@ -22907,10 +22816,9 @@
           <a:lstStyle/>
           <a:p>
             <a:r>
-              <a:rPr lang="en-US" sz="2200" dirty="0" smtClean="0"/>
+              <a:rPr lang="en-US" sz="2200" dirty="0"/>
               <a:t>Lattice node</a:t>
             </a:r>
-            <a:endParaRPr lang="en-US" sz="2200" dirty="0"/>
           </a:p>
         </p:txBody>
       </p:sp>
@@ -22939,14 +22847,14 @@
           <a:lstStyle/>
           <a:p>
             <a:r>
-              <a:rPr lang="en-US" sz="2200" dirty="0" smtClean="0"/>
+              <a:rPr lang="en-US" sz="2200" dirty="0"/>
               <a:t>Lattice</a:t>
             </a:r>
             <a:br>
-              <a:rPr lang="en-US" sz="2200" dirty="0" smtClean="0"/>
+              <a:rPr lang="en-US" sz="2200" dirty="0"/>
             </a:br>
             <a:r>
-              <a:rPr lang="en-US" sz="2200" dirty="0" smtClean="0"/>
+              <a:rPr lang="en-US" sz="2200" dirty="0"/>
               <a:t>ligament</a:t>
             </a:r>
           </a:p>
@@ -22962,13 +22870,6 @@
   <p:clrMapOvr>
     <a:masterClrMapping/>
   </p:clrMapOvr>
-  <p:timing>
-    <p:tnLst>
-      <p:par>
-        <p:cTn id="1" dur="indefinite" restart="never" nodeType="tmRoot"/>
-      </p:par>
-    </p:tnLst>
-  </p:timing>
 </p:sld>
 </file>
 
@@ -23616,13 +23517,6 @@
   <p:clrMapOvr>
     <a:masterClrMapping/>
   </p:clrMapOvr>
-  <p:timing>
-    <p:tnLst>
-      <p:par>
-        <p:cTn id="1" dur="indefinite" restart="never" nodeType="tmRoot"/>
-      </p:par>
-    </p:tnLst>
-  </p:timing>
 </p:sld>
 </file>
 
@@ -24122,7 +24016,7 @@
             <a:lstStyle/>
             <a:p>
               <a:r>
-                <a:rPr lang="es-ES" sz="2200" dirty="0" smtClean="0"/>
+                <a:rPr lang="es-ES" sz="2200" dirty="0"/>
                 <a:t>A</a:t>
               </a:r>
               <a:endParaRPr lang="en-US" sz="2200" dirty="0"/>
@@ -24152,7 +24046,7 @@
             <a:lstStyle/>
             <a:p>
               <a:r>
-                <a:rPr lang="es-ES" sz="2200" dirty="0" smtClean="0"/>
+                <a:rPr lang="es-ES" sz="2200" dirty="0"/>
                 <a:t>A</a:t>
               </a:r>
               <a:endParaRPr lang="en-US" sz="2200" dirty="0"/>
@@ -24182,7 +24076,7 @@
             <a:lstStyle/>
             <a:p>
               <a:r>
-                <a:rPr lang="es-ES" sz="2200" dirty="0" smtClean="0"/>
+                <a:rPr lang="es-ES" sz="2200" dirty="0"/>
                 <a:t>L</a:t>
               </a:r>
               <a:endParaRPr lang="en-US" sz="2200" dirty="0"/>
@@ -24839,26 +24733,22 @@
               <a:p>
                 <a:pPr algn="ctr"/>
                 <a:r>
-                  <a:rPr lang="es-ES" dirty="0" err="1" smtClean="0"/>
+                  <a:rPr lang="es-ES" dirty="0" err="1"/>
                   <a:t>Cut</a:t>
                 </a:r>
                 <a:r>
-                  <a:rPr lang="es-ES" dirty="0" smtClean="0"/>
+                  <a:rPr lang="es-ES" dirty="0"/>
                   <a:t> </a:t>
                 </a:r>
                 <a:r>
-                  <a:rPr lang="es-ES" dirty="0" err="1" smtClean="0"/>
+                  <a:rPr lang="es-ES" dirty="0" err="1"/>
                   <a:t>view</a:t>
                 </a:r>
-                <a:r>
-                  <a:rPr lang="es-ES" dirty="0" smtClean="0"/>
-                  <a:t/>
-                </a:r>
                 <a:br>
-                  <a:rPr lang="es-ES" dirty="0" smtClean="0"/>
+                  <a:rPr lang="es-ES" dirty="0"/>
                 </a:br>
                 <a:r>
-                  <a:rPr lang="es-ES" dirty="0" smtClean="0"/>
+                  <a:rPr lang="es-ES" dirty="0"/>
                   <a:t>A-A</a:t>
                 </a:r>
                 <a:endParaRPr lang="en-US" dirty="0"/>
@@ -24960,7 +24850,7 @@
               <a:lstStyle/>
               <a:p>
                 <a:r>
-                  <a:rPr lang="es-ES" sz="2200" dirty="0" smtClean="0"/>
+                  <a:rPr lang="es-ES" sz="2200" dirty="0"/>
                   <a:t>B</a:t>
                 </a:r>
                 <a:endParaRPr lang="en-US" sz="2200" dirty="0"/>
@@ -24990,7 +24880,7 @@
               <a:lstStyle/>
               <a:p>
                 <a:r>
-                  <a:rPr lang="es-ES" sz="2200" dirty="0" smtClean="0"/>
+                  <a:rPr lang="es-ES" sz="2200" dirty="0"/>
                   <a:t>e</a:t>
                 </a:r>
                 <a:endParaRPr lang="en-US" sz="2200" dirty="0"/>
@@ -25528,7 +25418,7 @@
             <a:lstStyle/>
             <a:p>
               <a:r>
-                <a:rPr lang="es-ES" sz="2200" dirty="0" smtClean="0"/>
+                <a:rPr lang="es-ES" sz="2200" dirty="0"/>
                 <a:t>R</a:t>
               </a:r>
               <a:endParaRPr lang="en-US" sz="2200" dirty="0"/>
@@ -28235,31 +28125,23 @@
           <a:p>
             <a:pPr algn="ctr"/>
             <a:r>
-              <a:rPr lang="es-ES" sz="2200" dirty="0" err="1" smtClean="0"/>
+              <a:rPr lang="es-ES" sz="2200" dirty="0" err="1"/>
               <a:t>Cut</a:t>
             </a:r>
             <a:r>
-              <a:rPr lang="es-ES" sz="2200" dirty="0" smtClean="0"/>
+              <a:rPr lang="es-ES" sz="2200" dirty="0"/>
               <a:t> </a:t>
             </a:r>
             <a:r>
-              <a:rPr lang="es-ES" sz="2200" dirty="0" err="1" smtClean="0"/>
+              <a:rPr lang="es-ES" sz="2200" dirty="0" err="1"/>
               <a:t>view</a:t>
             </a:r>
-            <a:r>
-              <a:rPr lang="es-ES" sz="2200" dirty="0" smtClean="0"/>
-              <a:t/>
-            </a:r>
             <a:br>
-              <a:rPr lang="es-ES" sz="2200" dirty="0" smtClean="0"/>
+              <a:rPr lang="es-ES" sz="2200" dirty="0"/>
             </a:br>
             <a:r>
               <a:rPr lang="es-ES" sz="2200" dirty="0"/>
-              <a:t>B</a:t>
-            </a:r>
-            <a:r>
-              <a:rPr lang="es-ES" sz="2200" dirty="0" smtClean="0"/>
-              <a:t>-B</a:t>
+              <a:t>B-B</a:t>
             </a:r>
             <a:endParaRPr lang="en-US" sz="2200" dirty="0"/>
           </a:p>
@@ -28504,13 +28386,6 @@
   <p:clrMapOvr>
     <a:masterClrMapping/>
   </p:clrMapOvr>
-  <p:timing>
-    <p:tnLst>
-      <p:par>
-        <p:cTn id="1" dur="indefinite" restart="never" nodeType="tmRoot"/>
-      </p:par>
-    </p:tnLst>
-  </p:timing>
 </p:sld>
 </file>
 
@@ -28627,13 +28502,6 @@
   <p:clrMapOvr>
     <a:masterClrMapping/>
   </p:clrMapOvr>
-  <p:timing>
-    <p:tnLst>
-      <p:par>
-        <p:cTn id="1" dur="indefinite" restart="never" nodeType="tmRoot"/>
-      </p:par>
-    </p:tnLst>
-  </p:timing>
 </p:sld>
 </file>
 

</xml_diff>